<commit_message>
-Add feature selection (removal of oldpeak)
</commit_message>
<xml_diff>
--- a/documents/DSCI 631 Final Project Presentation.pptx
+++ b/documents/DSCI 631 Final Project Presentation.pptx
@@ -31,37 +31,39 @@
     <p:sldId id="276" r:id="rId26"/>
     <p:sldId id="277" r:id="rId27"/>
     <p:sldId id="278" r:id="rId28"/>
+    <p:sldId id="279" r:id="rId29"/>
+    <p:sldId id="280" r:id="rId30"/>
   </p:sldIdLst>
   <p:sldSz cy="5143500" cx="9144000"/>
   <p:notesSz cx="6858000" cy="9144000"/>
   <p:embeddedFontLst>
     <p:embeddedFont>
       <p:font typeface="Ubuntu"/>
-      <p:regular r:id="rId29"/>
-      <p:bold r:id="rId30"/>
-      <p:italic r:id="rId31"/>
-      <p:boldItalic r:id="rId32"/>
+      <p:regular r:id="rId31"/>
+      <p:bold r:id="rId32"/>
+      <p:italic r:id="rId33"/>
+      <p:boldItalic r:id="rId34"/>
     </p:embeddedFont>
     <p:embeddedFont>
       <p:font typeface="Ubuntu Light"/>
-      <p:regular r:id="rId33"/>
-      <p:bold r:id="rId34"/>
-      <p:italic r:id="rId35"/>
-      <p:boldItalic r:id="rId36"/>
+      <p:regular r:id="rId35"/>
+      <p:bold r:id="rId36"/>
+      <p:italic r:id="rId37"/>
+      <p:boldItalic r:id="rId38"/>
     </p:embeddedFont>
     <p:embeddedFont>
       <p:font typeface="Economica"/>
-      <p:regular r:id="rId37"/>
-      <p:bold r:id="rId38"/>
-      <p:italic r:id="rId39"/>
-      <p:boldItalic r:id="rId40"/>
+      <p:regular r:id="rId39"/>
+      <p:bold r:id="rId40"/>
+      <p:italic r:id="rId41"/>
+      <p:boldItalic r:id="rId42"/>
     </p:embeddedFont>
     <p:embeddedFont>
       <p:font typeface="Open Sans"/>
-      <p:regular r:id="rId41"/>
-      <p:bold r:id="rId42"/>
-      <p:italic r:id="rId43"/>
-      <p:boldItalic r:id="rId44"/>
+      <p:regular r:id="rId43"/>
+      <p:bold r:id="rId44"/>
+      <p:italic r:id="rId45"/>
+      <p:boldItalic r:id="rId46"/>
     </p:embeddedFont>
   </p:embeddedFontLst>
   <p:defaultTextStyle>
@@ -309,7 +311,7 @@
       </p15:sldGuideLst>
     </p:ext>
     <p:ext uri="http://customooxmlschemas.google.com/">
-      <go:slidesCustomData xmlns:go="http://customooxmlschemas.google.com/" r:id="rId45" roundtripDataSignature="AMtx7mgE69sL8y5XkZYVa5P/5o1BDEjIkg=="/>
+      <go:slidesCustomData xmlns:go="http://customooxmlschemas.google.com/" r:id="rId47" roundtripDataSignature="AMtx7mirBfROewmV/Y8xShHX3lBld/2buA=="/>
     </p:ext>
   </p:extLst>
 </p:presentation>
@@ -1714,7 +1716,205 @@
       </p:grpSpPr>
       <p:sp>
         <p:nvSpPr>
-          <p:cNvPr id="156" name="Google Shape;156;gec2e1cceae_0_5:notes"/>
+          <p:cNvPr id="156" name="Google Shape;156;gec2e1cceae_0_119:notes"/>
+          <p:cNvSpPr/>
+          <p:nvPr>
+            <p:ph idx="2" type="sldImg"/>
+          </p:nvPr>
+        </p:nvSpPr>
+        <p:spPr>
+          <a:xfrm>
+            <a:off x="381300" y="685800"/>
+            <a:ext cx="6096000" cy="3429000"/>
+          </a:xfrm>
+          <a:custGeom>
+            <a:rect b="b" l="l" r="r" t="t"/>
+            <a:pathLst>
+              <a:path extrusionOk="0" h="120000" w="120000">
+                <a:moveTo>
+                  <a:pt x="0" y="0"/>
+                </a:moveTo>
+                <a:lnTo>
+                  <a:pt x="120000" y="0"/>
+                </a:lnTo>
+                <a:lnTo>
+                  <a:pt x="120000" y="120000"/>
+                </a:lnTo>
+                <a:lnTo>
+                  <a:pt x="0" y="120000"/>
+                </a:lnTo>
+                <a:close/>
+              </a:path>
+            </a:pathLst>
+          </a:custGeom>
+        </p:spPr>
+      </p:sp>
+      <p:sp>
+        <p:nvSpPr>
+          <p:cNvPr id="157" name="Google Shape;157;gec2e1cceae_0_119:notes"/>
+          <p:cNvSpPr txBox="1"/>
+          <p:nvPr>
+            <p:ph idx="1" type="body"/>
+          </p:nvPr>
+        </p:nvSpPr>
+        <p:spPr>
+          <a:xfrm>
+            <a:off x="685800" y="4343400"/>
+            <a:ext cx="5486400" cy="4114800"/>
+          </a:xfrm>
+          <a:prstGeom prst="rect">
+            <a:avLst/>
+          </a:prstGeom>
+        </p:spPr>
+        <p:txBody>
+          <a:bodyPr anchorCtr="0" anchor="t" bIns="91425" lIns="91425" spcFirstLastPara="1" rIns="91425" wrap="square" tIns="91425">
+            <a:noAutofit/>
+          </a:bodyPr>
+          <a:lstStyle/>
+          <a:p>
+            <a:pPr indent="0" lvl="0" marL="0" rtl="0" algn="l">
+              <a:spcBef>
+                <a:spcPts val="0"/>
+              </a:spcBef>
+              <a:spcAft>
+                <a:spcPts val="0"/>
+              </a:spcAft>
+              <a:buNone/>
+            </a:pPr>
+            <a:r>
+              <a:t/>
+            </a:r>
+            <a:endParaRPr/>
+          </a:p>
+        </p:txBody>
+      </p:sp>
+    </p:spTree>
+  </p:cSld>
+  <p:clrMapOvr>
+    <a:masterClrMapping/>
+  </p:clrMapOvr>
+</p:notes>
+</file>
+
+<file path=ppt/notesSlides/notesSlide17.xml><?xml version="1.0" encoding="utf-8"?>
+<p:notes xmlns:a="http://schemas.openxmlformats.org/drawingml/2006/main" xmlns:r="http://schemas.openxmlformats.org/officeDocument/2006/relationships" xmlns:mc="http://schemas.openxmlformats.org/markup-compatibility/2006" xmlns:mv="urn:schemas-microsoft-com:mac:vml" xmlns:p="http://schemas.openxmlformats.org/presentationml/2006/main" xmlns:c="http://schemas.openxmlformats.org/drawingml/2006/chart" xmlns:dgm="http://schemas.openxmlformats.org/drawingml/2006/diagram" xmlns:o="urn:schemas-microsoft-com:office:office" xmlns:v="urn:schemas-microsoft-com:vml" xmlns:pvml="urn:schemas-microsoft-com:office:powerpoint" xmlns:com="http://schemas.openxmlformats.org/drawingml/2006/compatibility" xmlns:p14="http://schemas.microsoft.com/office/powerpoint/2010/main" xmlns:p15="http://schemas.microsoft.com/office/powerpoint/2012/main" xmlns:ahyp="http://schemas.microsoft.com/office/drawing/2018/hyperlinkcolor" showMasterPhAnim="0" showMasterSp="0">
+  <p:cSld>
+    <p:spTree>
+      <p:nvGrpSpPr>
+        <p:cNvPr id="162" name="Shape 162"/>
+        <p:cNvGrpSpPr/>
+        <p:nvPr/>
+      </p:nvGrpSpPr>
+      <p:grpSpPr>
+        <a:xfrm>
+          <a:off x="0" y="0"/>
+          <a:ext cx="0" cy="0"/>
+          <a:chOff x="0" y="0"/>
+          <a:chExt cx="0" cy="0"/>
+        </a:xfrm>
+      </p:grpSpPr>
+      <p:sp>
+        <p:nvSpPr>
+          <p:cNvPr id="163" name="Google Shape;163;gec2e1cceae_0_127:notes"/>
+          <p:cNvSpPr/>
+          <p:nvPr>
+            <p:ph idx="2" type="sldImg"/>
+          </p:nvPr>
+        </p:nvSpPr>
+        <p:spPr>
+          <a:xfrm>
+            <a:off x="381300" y="685800"/>
+            <a:ext cx="6096000" cy="3429000"/>
+          </a:xfrm>
+          <a:custGeom>
+            <a:rect b="b" l="l" r="r" t="t"/>
+            <a:pathLst>
+              <a:path extrusionOk="0" h="120000" w="120000">
+                <a:moveTo>
+                  <a:pt x="0" y="0"/>
+                </a:moveTo>
+                <a:lnTo>
+                  <a:pt x="120000" y="0"/>
+                </a:lnTo>
+                <a:lnTo>
+                  <a:pt x="120000" y="120000"/>
+                </a:lnTo>
+                <a:lnTo>
+                  <a:pt x="0" y="120000"/>
+                </a:lnTo>
+                <a:close/>
+              </a:path>
+            </a:pathLst>
+          </a:custGeom>
+        </p:spPr>
+      </p:sp>
+      <p:sp>
+        <p:nvSpPr>
+          <p:cNvPr id="164" name="Google Shape;164;gec2e1cceae_0_127:notes"/>
+          <p:cNvSpPr txBox="1"/>
+          <p:nvPr>
+            <p:ph idx="1" type="body"/>
+          </p:nvPr>
+        </p:nvSpPr>
+        <p:spPr>
+          <a:xfrm>
+            <a:off x="685800" y="4343400"/>
+            <a:ext cx="5486400" cy="4114800"/>
+          </a:xfrm>
+          <a:prstGeom prst="rect">
+            <a:avLst/>
+          </a:prstGeom>
+        </p:spPr>
+        <p:txBody>
+          <a:bodyPr anchorCtr="0" anchor="t" bIns="91425" lIns="91425" spcFirstLastPara="1" rIns="91425" wrap="square" tIns="91425">
+            <a:noAutofit/>
+          </a:bodyPr>
+          <a:lstStyle/>
+          <a:p>
+            <a:pPr indent="0" lvl="0" marL="0" rtl="0" algn="l">
+              <a:spcBef>
+                <a:spcPts val="0"/>
+              </a:spcBef>
+              <a:spcAft>
+                <a:spcPts val="0"/>
+              </a:spcAft>
+              <a:buNone/>
+            </a:pPr>
+            <a:r>
+              <a:t/>
+            </a:r>
+            <a:endParaRPr/>
+          </a:p>
+        </p:txBody>
+      </p:sp>
+    </p:spTree>
+  </p:cSld>
+  <p:clrMapOvr>
+    <a:masterClrMapping/>
+  </p:clrMapOvr>
+</p:notes>
+</file>
+
+<file path=ppt/notesSlides/notesSlide18.xml><?xml version="1.0" encoding="utf-8"?>
+<p:notes xmlns:a="http://schemas.openxmlformats.org/drawingml/2006/main" xmlns:r="http://schemas.openxmlformats.org/officeDocument/2006/relationships" xmlns:mc="http://schemas.openxmlformats.org/markup-compatibility/2006" xmlns:mv="urn:schemas-microsoft-com:mac:vml" xmlns:p="http://schemas.openxmlformats.org/presentationml/2006/main" xmlns:c="http://schemas.openxmlformats.org/drawingml/2006/chart" xmlns:dgm="http://schemas.openxmlformats.org/drawingml/2006/diagram" xmlns:o="urn:schemas-microsoft-com:office:office" xmlns:v="urn:schemas-microsoft-com:vml" xmlns:pvml="urn:schemas-microsoft-com:office:powerpoint" xmlns:com="http://schemas.openxmlformats.org/drawingml/2006/compatibility" xmlns:p14="http://schemas.microsoft.com/office/powerpoint/2010/main" xmlns:p15="http://schemas.microsoft.com/office/powerpoint/2012/main" xmlns:ahyp="http://schemas.microsoft.com/office/drawing/2018/hyperlinkcolor" showMasterPhAnim="0" showMasterSp="0">
+  <p:cSld>
+    <p:spTree>
+      <p:nvGrpSpPr>
+        <p:cNvPr id="169" name="Shape 169"/>
+        <p:cNvGrpSpPr/>
+        <p:nvPr/>
+      </p:nvGrpSpPr>
+      <p:grpSpPr>
+        <a:xfrm>
+          <a:off x="0" y="0"/>
+          <a:ext cx="0" cy="0"/>
+          <a:chOff x="0" y="0"/>
+          <a:chExt cx="0" cy="0"/>
+        </a:xfrm>
+      </p:grpSpPr>
+      <p:sp>
+        <p:nvSpPr>
+          <p:cNvPr id="170" name="Google Shape;170;gec2e1cceae_0_5:notes"/>
           <p:cNvSpPr/>
           <p:nvPr>
             <p:ph idx="2" type="sldImg"/>
@@ -1759,7 +1959,7 @@
       </p:sp>
       <p:sp>
         <p:nvSpPr>
-          <p:cNvPr id="157" name="Google Shape;157;gec2e1cceae_0_5:notes"/>
+          <p:cNvPr id="171" name="Google Shape;171;gec2e1cceae_0_5:notes"/>
           <p:cNvSpPr txBox="1"/>
           <p:nvPr>
             <p:ph idx="1" type="body"/>
@@ -1812,12 +2012,12 @@
 </p:notes>
 </file>
 
-<file path=ppt/notesSlides/notesSlide17.xml><?xml version="1.0" encoding="utf-8"?>
+<file path=ppt/notesSlides/notesSlide19.xml><?xml version="1.0" encoding="utf-8"?>
 <p:notes xmlns:a="http://schemas.openxmlformats.org/drawingml/2006/main" xmlns:r="http://schemas.openxmlformats.org/officeDocument/2006/relationships" xmlns:mc="http://schemas.openxmlformats.org/markup-compatibility/2006" xmlns:mv="urn:schemas-microsoft-com:mac:vml" xmlns:p="http://schemas.openxmlformats.org/presentationml/2006/main" xmlns:c="http://schemas.openxmlformats.org/drawingml/2006/chart" xmlns:dgm="http://schemas.openxmlformats.org/drawingml/2006/diagram" xmlns:o="urn:schemas-microsoft-com:office:office" xmlns:v="urn:schemas-microsoft-com:vml" xmlns:pvml="urn:schemas-microsoft-com:office:powerpoint" xmlns:com="http://schemas.openxmlformats.org/drawingml/2006/compatibility" xmlns:p14="http://schemas.microsoft.com/office/powerpoint/2010/main" xmlns:p15="http://schemas.microsoft.com/office/powerpoint/2012/main" xmlns:ahyp="http://schemas.microsoft.com/office/drawing/2018/hyperlinkcolor" showMasterPhAnim="0" showMasterSp="0">
   <p:cSld>
     <p:spTree>
       <p:nvGrpSpPr>
-        <p:cNvPr id="161" name="Shape 161"/>
+        <p:cNvPr id="175" name="Shape 175"/>
         <p:cNvGrpSpPr/>
         <p:nvPr/>
       </p:nvGrpSpPr>
@@ -1831,7 +2031,7 @@
       </p:grpSpPr>
       <p:sp>
         <p:nvSpPr>
-          <p:cNvPr id="162" name="Google Shape;162;p11:notes"/>
+          <p:cNvPr id="176" name="Google Shape;176;p11:notes"/>
           <p:cNvSpPr/>
           <p:nvPr>
             <p:ph idx="2" type="sldImg"/>
@@ -1876,241 +2076,7 @@
       </p:sp>
       <p:sp>
         <p:nvSpPr>
-          <p:cNvPr id="163" name="Google Shape;163;p11:notes"/>
-          <p:cNvSpPr txBox="1"/>
-          <p:nvPr>
-            <p:ph idx="1" type="body"/>
-          </p:nvPr>
-        </p:nvSpPr>
-        <p:spPr>
-          <a:xfrm>
-            <a:off x="685800" y="4343400"/>
-            <a:ext cx="5486400" cy="4114800"/>
-          </a:xfrm>
-          <a:prstGeom prst="rect">
-            <a:avLst/>
-          </a:prstGeom>
-          <a:noFill/>
-          <a:ln>
-            <a:noFill/>
-          </a:ln>
-        </p:spPr>
-        <p:txBody>
-          <a:bodyPr anchorCtr="0" anchor="t" bIns="91425" lIns="91425" spcFirstLastPara="1" rIns="91425" wrap="square" tIns="91425">
-            <a:noAutofit/>
-          </a:bodyPr>
-          <a:lstStyle/>
-          <a:p>
-            <a:pPr indent="0" lvl="0" marL="0" rtl="0" algn="l">
-              <a:lnSpc>
-                <a:spcPct val="100000"/>
-              </a:lnSpc>
-              <a:spcBef>
-                <a:spcPts val="0"/>
-              </a:spcBef>
-              <a:spcAft>
-                <a:spcPts val="0"/>
-              </a:spcAft>
-              <a:buSzPts val="1100"/>
-              <a:buNone/>
-            </a:pPr>
-            <a:r>
-              <a:t/>
-            </a:r>
-            <a:endParaRPr/>
-          </a:p>
-        </p:txBody>
-      </p:sp>
-    </p:spTree>
-  </p:cSld>
-  <p:clrMapOvr>
-    <a:masterClrMapping/>
-  </p:clrMapOvr>
-</p:notes>
-</file>
-
-<file path=ppt/notesSlides/notesSlide18.xml><?xml version="1.0" encoding="utf-8"?>
-<p:notes xmlns:a="http://schemas.openxmlformats.org/drawingml/2006/main" xmlns:r="http://schemas.openxmlformats.org/officeDocument/2006/relationships" xmlns:mc="http://schemas.openxmlformats.org/markup-compatibility/2006" xmlns:mv="urn:schemas-microsoft-com:mac:vml" xmlns:p="http://schemas.openxmlformats.org/presentationml/2006/main" xmlns:c="http://schemas.openxmlformats.org/drawingml/2006/chart" xmlns:dgm="http://schemas.openxmlformats.org/drawingml/2006/diagram" xmlns:o="urn:schemas-microsoft-com:office:office" xmlns:v="urn:schemas-microsoft-com:vml" xmlns:pvml="urn:schemas-microsoft-com:office:powerpoint" xmlns:com="http://schemas.openxmlformats.org/drawingml/2006/compatibility" xmlns:p14="http://schemas.microsoft.com/office/powerpoint/2010/main" xmlns:p15="http://schemas.microsoft.com/office/powerpoint/2012/main" xmlns:ahyp="http://schemas.microsoft.com/office/drawing/2018/hyperlinkcolor" showMasterPhAnim="0" showMasterSp="0">
-  <p:cSld>
-    <p:spTree>
-      <p:nvGrpSpPr>
-        <p:cNvPr id="167" name="Shape 167"/>
-        <p:cNvGrpSpPr/>
-        <p:nvPr/>
-      </p:nvGrpSpPr>
-      <p:grpSpPr>
-        <a:xfrm>
-          <a:off x="0" y="0"/>
-          <a:ext cx="0" cy="0"/>
-          <a:chOff x="0" y="0"/>
-          <a:chExt cx="0" cy="0"/>
-        </a:xfrm>
-      </p:grpSpPr>
-      <p:sp>
-        <p:nvSpPr>
-          <p:cNvPr id="168" name="Google Shape;168;gec2e1cceae_0_10:notes"/>
-          <p:cNvSpPr/>
-          <p:nvPr>
-            <p:ph idx="2" type="sldImg"/>
-          </p:nvPr>
-        </p:nvSpPr>
-        <p:spPr>
-          <a:xfrm>
-            <a:off x="381300" y="685800"/>
-            <a:ext cx="6096000" cy="3429000"/>
-          </a:xfrm>
-          <a:custGeom>
-            <a:rect b="b" l="l" r="r" t="t"/>
-            <a:pathLst>
-              <a:path extrusionOk="0" h="120000" w="120000">
-                <a:moveTo>
-                  <a:pt x="0" y="0"/>
-                </a:moveTo>
-                <a:lnTo>
-                  <a:pt x="120000" y="0"/>
-                </a:lnTo>
-                <a:lnTo>
-                  <a:pt x="120000" y="120000"/>
-                </a:lnTo>
-                <a:lnTo>
-                  <a:pt x="0" y="120000"/>
-                </a:lnTo>
-                <a:close/>
-              </a:path>
-            </a:pathLst>
-          </a:custGeom>
-          <a:noFill/>
-          <a:ln cap="flat" cmpd="sng" w="9525">
-            <a:solidFill>
-              <a:srgbClr val="000000"/>
-            </a:solidFill>
-            <a:prstDash val="solid"/>
-            <a:round/>
-            <a:headEnd len="sm" w="sm" type="none"/>
-            <a:tailEnd len="sm" w="sm" type="none"/>
-          </a:ln>
-        </p:spPr>
-      </p:sp>
-      <p:sp>
-        <p:nvSpPr>
-          <p:cNvPr id="169" name="Google Shape;169;gec2e1cceae_0_10:notes"/>
-          <p:cNvSpPr txBox="1"/>
-          <p:nvPr>
-            <p:ph idx="1" type="body"/>
-          </p:nvPr>
-        </p:nvSpPr>
-        <p:spPr>
-          <a:xfrm>
-            <a:off x="685800" y="4343400"/>
-            <a:ext cx="5486400" cy="4114800"/>
-          </a:xfrm>
-          <a:prstGeom prst="rect">
-            <a:avLst/>
-          </a:prstGeom>
-          <a:noFill/>
-          <a:ln>
-            <a:noFill/>
-          </a:ln>
-        </p:spPr>
-        <p:txBody>
-          <a:bodyPr anchorCtr="0" anchor="t" bIns="91425" lIns="91425" spcFirstLastPara="1" rIns="91425" wrap="square" tIns="91425">
-            <a:noAutofit/>
-          </a:bodyPr>
-          <a:lstStyle/>
-          <a:p>
-            <a:pPr indent="0" lvl="0" marL="0" rtl="0" algn="l">
-              <a:lnSpc>
-                <a:spcPct val="100000"/>
-              </a:lnSpc>
-              <a:spcBef>
-                <a:spcPts val="0"/>
-              </a:spcBef>
-              <a:spcAft>
-                <a:spcPts val="0"/>
-              </a:spcAft>
-              <a:buSzPts val="1100"/>
-              <a:buNone/>
-            </a:pPr>
-            <a:r>
-              <a:t/>
-            </a:r>
-            <a:endParaRPr/>
-          </a:p>
-        </p:txBody>
-      </p:sp>
-    </p:spTree>
-  </p:cSld>
-  <p:clrMapOvr>
-    <a:masterClrMapping/>
-  </p:clrMapOvr>
-</p:notes>
-</file>
-
-<file path=ppt/notesSlides/notesSlide19.xml><?xml version="1.0" encoding="utf-8"?>
-<p:notes xmlns:a="http://schemas.openxmlformats.org/drawingml/2006/main" xmlns:r="http://schemas.openxmlformats.org/officeDocument/2006/relationships" xmlns:mc="http://schemas.openxmlformats.org/markup-compatibility/2006" xmlns:mv="urn:schemas-microsoft-com:mac:vml" xmlns:p="http://schemas.openxmlformats.org/presentationml/2006/main" xmlns:c="http://schemas.openxmlformats.org/drawingml/2006/chart" xmlns:dgm="http://schemas.openxmlformats.org/drawingml/2006/diagram" xmlns:o="urn:schemas-microsoft-com:office:office" xmlns:v="urn:schemas-microsoft-com:vml" xmlns:pvml="urn:schemas-microsoft-com:office:powerpoint" xmlns:com="http://schemas.openxmlformats.org/drawingml/2006/compatibility" xmlns:p14="http://schemas.microsoft.com/office/powerpoint/2010/main" xmlns:p15="http://schemas.microsoft.com/office/powerpoint/2012/main" xmlns:ahyp="http://schemas.microsoft.com/office/drawing/2018/hyperlinkcolor" showMasterPhAnim="0" showMasterSp="0">
-  <p:cSld>
-    <p:spTree>
-      <p:nvGrpSpPr>
-        <p:cNvPr id="173" name="Shape 173"/>
-        <p:cNvGrpSpPr/>
-        <p:nvPr/>
-      </p:nvGrpSpPr>
-      <p:grpSpPr>
-        <a:xfrm>
-          <a:off x="0" y="0"/>
-          <a:ext cx="0" cy="0"/>
-          <a:chOff x="0" y="0"/>
-          <a:chExt cx="0" cy="0"/>
-        </a:xfrm>
-      </p:grpSpPr>
-      <p:sp>
-        <p:nvSpPr>
-          <p:cNvPr id="174" name="Google Shape;174;p16:notes"/>
-          <p:cNvSpPr/>
-          <p:nvPr>
-            <p:ph idx="2" type="sldImg"/>
-          </p:nvPr>
-        </p:nvSpPr>
-        <p:spPr>
-          <a:xfrm>
-            <a:off x="381300" y="685800"/>
-            <a:ext cx="6096000" cy="3429000"/>
-          </a:xfrm>
-          <a:custGeom>
-            <a:rect b="b" l="l" r="r" t="t"/>
-            <a:pathLst>
-              <a:path extrusionOk="0" h="120000" w="120000">
-                <a:moveTo>
-                  <a:pt x="0" y="0"/>
-                </a:moveTo>
-                <a:lnTo>
-                  <a:pt x="120000" y="0"/>
-                </a:lnTo>
-                <a:lnTo>
-                  <a:pt x="120000" y="120000"/>
-                </a:lnTo>
-                <a:lnTo>
-                  <a:pt x="0" y="120000"/>
-                </a:lnTo>
-                <a:close/>
-              </a:path>
-            </a:pathLst>
-          </a:custGeom>
-          <a:noFill/>
-          <a:ln cap="flat" cmpd="sng" w="9525">
-            <a:solidFill>
-              <a:srgbClr val="000000"/>
-            </a:solidFill>
-            <a:prstDash val="solid"/>
-            <a:round/>
-            <a:headEnd len="sm" w="sm" type="none"/>
-            <a:tailEnd len="sm" w="sm" type="none"/>
-          </a:ln>
-        </p:spPr>
-      </p:sp>
-      <p:sp>
-        <p:nvSpPr>
-          <p:cNvPr id="175" name="Google Shape;175;p16:notes"/>
+          <p:cNvPr id="177" name="Google Shape;177;p11:notes"/>
           <p:cNvSpPr txBox="1"/>
           <p:nvPr>
             <p:ph idx="1" type="body"/>
@@ -2285,7 +2251,7 @@
   <p:cSld>
     <p:spTree>
       <p:nvGrpSpPr>
-        <p:cNvPr id="179" name="Shape 179"/>
+        <p:cNvPr id="181" name="Shape 181"/>
         <p:cNvGrpSpPr/>
         <p:nvPr/>
       </p:nvGrpSpPr>
@@ -2299,7 +2265,7 @@
       </p:grpSpPr>
       <p:sp>
         <p:nvSpPr>
-          <p:cNvPr id="180" name="Google Shape;180;gec2e1cceae_0_20:notes"/>
+          <p:cNvPr id="182" name="Google Shape;182;gec2e1cceae_0_10:notes"/>
           <p:cNvSpPr/>
           <p:nvPr>
             <p:ph idx="2" type="sldImg"/>
@@ -2344,7 +2310,7 @@
       </p:sp>
       <p:sp>
         <p:nvSpPr>
-          <p:cNvPr id="181" name="Google Shape;181;gec2e1cceae_0_20:notes"/>
+          <p:cNvPr id="183" name="Google Shape;183;gec2e1cceae_0_10:notes"/>
           <p:cNvSpPr txBox="1"/>
           <p:nvPr>
             <p:ph idx="1" type="body"/>
@@ -2402,7 +2368,7 @@
   <p:cSld>
     <p:spTree>
       <p:nvGrpSpPr>
-        <p:cNvPr id="185" name="Shape 185"/>
+        <p:cNvPr id="187" name="Shape 187"/>
         <p:cNvGrpSpPr/>
         <p:nvPr/>
       </p:nvGrpSpPr>
@@ -2416,7 +2382,7 @@
       </p:grpSpPr>
       <p:sp>
         <p:nvSpPr>
-          <p:cNvPr id="186" name="Google Shape;186;p25:notes"/>
+          <p:cNvPr id="188" name="Google Shape;188;p16:notes"/>
           <p:cNvSpPr/>
           <p:nvPr>
             <p:ph idx="2" type="sldImg"/>
@@ -2461,7 +2427,7 @@
       </p:sp>
       <p:sp>
         <p:nvSpPr>
-          <p:cNvPr id="187" name="Google Shape;187;p25:notes"/>
+          <p:cNvPr id="189" name="Google Shape;189;p16:notes"/>
           <p:cNvSpPr txBox="1"/>
           <p:nvPr>
             <p:ph idx="1" type="body"/>
@@ -2519,7 +2485,7 @@
   <p:cSld>
     <p:spTree>
       <p:nvGrpSpPr>
-        <p:cNvPr id="191" name="Shape 191"/>
+        <p:cNvPr id="193" name="Shape 193"/>
         <p:cNvGrpSpPr/>
         <p:nvPr/>
       </p:nvGrpSpPr>
@@ -2533,7 +2499,7 @@
       </p:grpSpPr>
       <p:sp>
         <p:nvSpPr>
-          <p:cNvPr id="192" name="Google Shape;192;gec2e1cceae_0_25:notes"/>
+          <p:cNvPr id="194" name="Google Shape;194;gec2e1cceae_0_20:notes"/>
           <p:cNvSpPr/>
           <p:nvPr>
             <p:ph idx="2" type="sldImg"/>
@@ -2578,7 +2544,7 @@
       </p:sp>
       <p:sp>
         <p:nvSpPr>
-          <p:cNvPr id="193" name="Google Shape;193;gec2e1cceae_0_25:notes"/>
+          <p:cNvPr id="195" name="Google Shape;195;gec2e1cceae_0_20:notes"/>
           <p:cNvSpPr txBox="1"/>
           <p:nvPr>
             <p:ph idx="1" type="body"/>
@@ -2636,7 +2602,7 @@
   <p:cSld>
     <p:spTree>
       <p:nvGrpSpPr>
-        <p:cNvPr id="197" name="Shape 197"/>
+        <p:cNvPr id="199" name="Shape 199"/>
         <p:cNvGrpSpPr/>
         <p:nvPr/>
       </p:nvGrpSpPr>
@@ -2650,7 +2616,7 @@
       </p:grpSpPr>
       <p:sp>
         <p:nvSpPr>
-          <p:cNvPr id="198" name="Google Shape;198;p40:notes"/>
+          <p:cNvPr id="200" name="Google Shape;200;p25:notes"/>
           <p:cNvSpPr/>
           <p:nvPr>
             <p:ph idx="2" type="sldImg"/>
@@ -2695,7 +2661,241 @@
       </p:sp>
       <p:sp>
         <p:nvSpPr>
-          <p:cNvPr id="199" name="Google Shape;199;p40:notes"/>
+          <p:cNvPr id="201" name="Google Shape;201;p25:notes"/>
+          <p:cNvSpPr txBox="1"/>
+          <p:nvPr>
+            <p:ph idx="1" type="body"/>
+          </p:nvPr>
+        </p:nvSpPr>
+        <p:spPr>
+          <a:xfrm>
+            <a:off x="685800" y="4343400"/>
+            <a:ext cx="5486400" cy="4114800"/>
+          </a:xfrm>
+          <a:prstGeom prst="rect">
+            <a:avLst/>
+          </a:prstGeom>
+          <a:noFill/>
+          <a:ln>
+            <a:noFill/>
+          </a:ln>
+        </p:spPr>
+        <p:txBody>
+          <a:bodyPr anchorCtr="0" anchor="t" bIns="91425" lIns="91425" spcFirstLastPara="1" rIns="91425" wrap="square" tIns="91425">
+            <a:noAutofit/>
+          </a:bodyPr>
+          <a:lstStyle/>
+          <a:p>
+            <a:pPr indent="0" lvl="0" marL="0" rtl="0" algn="l">
+              <a:lnSpc>
+                <a:spcPct val="100000"/>
+              </a:lnSpc>
+              <a:spcBef>
+                <a:spcPts val="0"/>
+              </a:spcBef>
+              <a:spcAft>
+                <a:spcPts val="0"/>
+              </a:spcAft>
+              <a:buSzPts val="1100"/>
+              <a:buNone/>
+            </a:pPr>
+            <a:r>
+              <a:t/>
+            </a:r>
+            <a:endParaRPr/>
+          </a:p>
+        </p:txBody>
+      </p:sp>
+    </p:spTree>
+  </p:cSld>
+  <p:clrMapOvr>
+    <a:masterClrMapping/>
+  </p:clrMapOvr>
+</p:notes>
+</file>
+
+<file path=ppt/notesSlides/notesSlide24.xml><?xml version="1.0" encoding="utf-8"?>
+<p:notes xmlns:a="http://schemas.openxmlformats.org/drawingml/2006/main" xmlns:r="http://schemas.openxmlformats.org/officeDocument/2006/relationships" xmlns:mc="http://schemas.openxmlformats.org/markup-compatibility/2006" xmlns:mv="urn:schemas-microsoft-com:mac:vml" xmlns:p="http://schemas.openxmlformats.org/presentationml/2006/main" xmlns:c="http://schemas.openxmlformats.org/drawingml/2006/chart" xmlns:dgm="http://schemas.openxmlformats.org/drawingml/2006/diagram" xmlns:o="urn:schemas-microsoft-com:office:office" xmlns:v="urn:schemas-microsoft-com:vml" xmlns:pvml="urn:schemas-microsoft-com:office:powerpoint" xmlns:com="http://schemas.openxmlformats.org/drawingml/2006/compatibility" xmlns:p14="http://schemas.microsoft.com/office/powerpoint/2010/main" xmlns:p15="http://schemas.microsoft.com/office/powerpoint/2012/main" xmlns:ahyp="http://schemas.microsoft.com/office/drawing/2018/hyperlinkcolor" showMasterPhAnim="0" showMasterSp="0">
+  <p:cSld>
+    <p:spTree>
+      <p:nvGrpSpPr>
+        <p:cNvPr id="205" name="Shape 205"/>
+        <p:cNvGrpSpPr/>
+        <p:nvPr/>
+      </p:nvGrpSpPr>
+      <p:grpSpPr>
+        <a:xfrm>
+          <a:off x="0" y="0"/>
+          <a:ext cx="0" cy="0"/>
+          <a:chOff x="0" y="0"/>
+          <a:chExt cx="0" cy="0"/>
+        </a:xfrm>
+      </p:grpSpPr>
+      <p:sp>
+        <p:nvSpPr>
+          <p:cNvPr id="206" name="Google Shape;206;gec2e1cceae_0_25:notes"/>
+          <p:cNvSpPr/>
+          <p:nvPr>
+            <p:ph idx="2" type="sldImg"/>
+          </p:nvPr>
+        </p:nvSpPr>
+        <p:spPr>
+          <a:xfrm>
+            <a:off x="381300" y="685800"/>
+            <a:ext cx="6096000" cy="3429000"/>
+          </a:xfrm>
+          <a:custGeom>
+            <a:rect b="b" l="l" r="r" t="t"/>
+            <a:pathLst>
+              <a:path extrusionOk="0" h="120000" w="120000">
+                <a:moveTo>
+                  <a:pt x="0" y="0"/>
+                </a:moveTo>
+                <a:lnTo>
+                  <a:pt x="120000" y="0"/>
+                </a:lnTo>
+                <a:lnTo>
+                  <a:pt x="120000" y="120000"/>
+                </a:lnTo>
+                <a:lnTo>
+                  <a:pt x="0" y="120000"/>
+                </a:lnTo>
+                <a:close/>
+              </a:path>
+            </a:pathLst>
+          </a:custGeom>
+          <a:noFill/>
+          <a:ln cap="flat" cmpd="sng" w="9525">
+            <a:solidFill>
+              <a:srgbClr val="000000"/>
+            </a:solidFill>
+            <a:prstDash val="solid"/>
+            <a:round/>
+            <a:headEnd len="sm" w="sm" type="none"/>
+            <a:tailEnd len="sm" w="sm" type="none"/>
+          </a:ln>
+        </p:spPr>
+      </p:sp>
+      <p:sp>
+        <p:nvSpPr>
+          <p:cNvPr id="207" name="Google Shape;207;gec2e1cceae_0_25:notes"/>
+          <p:cNvSpPr txBox="1"/>
+          <p:nvPr>
+            <p:ph idx="1" type="body"/>
+          </p:nvPr>
+        </p:nvSpPr>
+        <p:spPr>
+          <a:xfrm>
+            <a:off x="685800" y="4343400"/>
+            <a:ext cx="5486400" cy="4114800"/>
+          </a:xfrm>
+          <a:prstGeom prst="rect">
+            <a:avLst/>
+          </a:prstGeom>
+          <a:noFill/>
+          <a:ln>
+            <a:noFill/>
+          </a:ln>
+        </p:spPr>
+        <p:txBody>
+          <a:bodyPr anchorCtr="0" anchor="t" bIns="91425" lIns="91425" spcFirstLastPara="1" rIns="91425" wrap="square" tIns="91425">
+            <a:noAutofit/>
+          </a:bodyPr>
+          <a:lstStyle/>
+          <a:p>
+            <a:pPr indent="0" lvl="0" marL="0" rtl="0" algn="l">
+              <a:lnSpc>
+                <a:spcPct val="100000"/>
+              </a:lnSpc>
+              <a:spcBef>
+                <a:spcPts val="0"/>
+              </a:spcBef>
+              <a:spcAft>
+                <a:spcPts val="0"/>
+              </a:spcAft>
+              <a:buSzPts val="1100"/>
+              <a:buNone/>
+            </a:pPr>
+            <a:r>
+              <a:t/>
+            </a:r>
+            <a:endParaRPr/>
+          </a:p>
+        </p:txBody>
+      </p:sp>
+    </p:spTree>
+  </p:cSld>
+  <p:clrMapOvr>
+    <a:masterClrMapping/>
+  </p:clrMapOvr>
+</p:notes>
+</file>
+
+<file path=ppt/notesSlides/notesSlide25.xml><?xml version="1.0" encoding="utf-8"?>
+<p:notes xmlns:a="http://schemas.openxmlformats.org/drawingml/2006/main" xmlns:r="http://schemas.openxmlformats.org/officeDocument/2006/relationships" xmlns:mc="http://schemas.openxmlformats.org/markup-compatibility/2006" xmlns:mv="urn:schemas-microsoft-com:mac:vml" xmlns:p="http://schemas.openxmlformats.org/presentationml/2006/main" xmlns:c="http://schemas.openxmlformats.org/drawingml/2006/chart" xmlns:dgm="http://schemas.openxmlformats.org/drawingml/2006/diagram" xmlns:o="urn:schemas-microsoft-com:office:office" xmlns:v="urn:schemas-microsoft-com:vml" xmlns:pvml="urn:schemas-microsoft-com:office:powerpoint" xmlns:com="http://schemas.openxmlformats.org/drawingml/2006/compatibility" xmlns:p14="http://schemas.microsoft.com/office/powerpoint/2010/main" xmlns:p15="http://schemas.microsoft.com/office/powerpoint/2012/main" xmlns:ahyp="http://schemas.microsoft.com/office/drawing/2018/hyperlinkcolor" showMasterPhAnim="0" showMasterSp="0">
+  <p:cSld>
+    <p:spTree>
+      <p:nvGrpSpPr>
+        <p:cNvPr id="211" name="Shape 211"/>
+        <p:cNvGrpSpPr/>
+        <p:nvPr/>
+      </p:nvGrpSpPr>
+      <p:grpSpPr>
+        <a:xfrm>
+          <a:off x="0" y="0"/>
+          <a:ext cx="0" cy="0"/>
+          <a:chOff x="0" y="0"/>
+          <a:chExt cx="0" cy="0"/>
+        </a:xfrm>
+      </p:grpSpPr>
+      <p:sp>
+        <p:nvSpPr>
+          <p:cNvPr id="212" name="Google Shape;212;p40:notes"/>
+          <p:cNvSpPr/>
+          <p:nvPr>
+            <p:ph idx="2" type="sldImg"/>
+          </p:nvPr>
+        </p:nvSpPr>
+        <p:spPr>
+          <a:xfrm>
+            <a:off x="381300" y="685800"/>
+            <a:ext cx="6096000" cy="3429000"/>
+          </a:xfrm>
+          <a:custGeom>
+            <a:rect b="b" l="l" r="r" t="t"/>
+            <a:pathLst>
+              <a:path extrusionOk="0" h="120000" w="120000">
+                <a:moveTo>
+                  <a:pt x="0" y="0"/>
+                </a:moveTo>
+                <a:lnTo>
+                  <a:pt x="120000" y="0"/>
+                </a:lnTo>
+                <a:lnTo>
+                  <a:pt x="120000" y="120000"/>
+                </a:lnTo>
+                <a:lnTo>
+                  <a:pt x="0" y="120000"/>
+                </a:lnTo>
+                <a:close/>
+              </a:path>
+            </a:pathLst>
+          </a:custGeom>
+          <a:noFill/>
+          <a:ln cap="flat" cmpd="sng" w="9525">
+            <a:solidFill>
+              <a:srgbClr val="000000"/>
+            </a:solidFill>
+            <a:prstDash val="solid"/>
+            <a:round/>
+            <a:headEnd len="sm" w="sm" type="none"/>
+            <a:tailEnd len="sm" w="sm" type="none"/>
+          </a:ln>
+        </p:spPr>
+      </p:sp>
+      <p:sp>
+        <p:nvSpPr>
+          <p:cNvPr id="213" name="Google Shape;213;p40:notes"/>
           <p:cNvSpPr txBox="1"/>
           <p:nvPr>
             <p:ph idx="1" type="body"/>
@@ -12832,7 +13032,7 @@
         <p:spPr>
           <a:xfrm>
             <a:off x="567275" y="1306925"/>
-            <a:ext cx="2663100" cy="766500"/>
+            <a:ext cx="2663100" cy="951300"/>
           </a:xfrm>
           <a:prstGeom prst="rect">
             <a:avLst/>
@@ -12847,6 +13047,44 @@
             <a:spAutoFit/>
           </a:bodyPr>
           <a:lstStyle/>
+          <a:p>
+            <a:pPr indent="0" lvl="0" marL="0" rtl="0" algn="l">
+              <a:spcBef>
+                <a:spcPts val="0"/>
+              </a:spcBef>
+              <a:spcAft>
+                <a:spcPts val="0"/>
+              </a:spcAft>
+              <a:buNone/>
+            </a:pPr>
+            <a:r>
+              <a:rPr lang="en" sz="1200">
+                <a:solidFill>
+                  <a:schemeClr val="dk1"/>
+                </a:solidFill>
+                <a:highlight>
+                  <a:srgbClr val="FFFFFF"/>
+                </a:highlight>
+                <a:latin typeface="Courier New"/>
+                <a:ea typeface="Courier New"/>
+                <a:cs typeface="Courier New"/>
+                <a:sym typeface="Courier New"/>
+              </a:rPr>
+              <a:t>Training Set (80%)</a:t>
+            </a:r>
+            <a:endParaRPr sz="1200">
+              <a:solidFill>
+                <a:schemeClr val="dk1"/>
+              </a:solidFill>
+              <a:highlight>
+                <a:srgbClr val="FFFFFF"/>
+              </a:highlight>
+              <a:latin typeface="Courier New"/>
+              <a:ea typeface="Courier New"/>
+              <a:cs typeface="Courier New"/>
+              <a:sym typeface="Courier New"/>
+            </a:endParaRPr>
+          </a:p>
           <a:p>
             <a:pPr indent="0" lvl="0" marL="0" rtl="0" algn="l">
               <a:spcBef>
@@ -13018,7 +13256,7 @@
         <p:spPr>
           <a:xfrm>
             <a:off x="5125125" y="1306925"/>
-            <a:ext cx="3000000" cy="794100"/>
+            <a:ext cx="3000000" cy="1006500"/>
           </a:xfrm>
           <a:prstGeom prst="rect">
             <a:avLst/>
@@ -13033,6 +13271,47 @@
             <a:spAutoFit/>
           </a:bodyPr>
           <a:lstStyle/>
+          <a:p>
+            <a:pPr indent="0" lvl="0" marL="0" rtl="0" algn="l">
+              <a:lnSpc>
+                <a:spcPct val="115000"/>
+              </a:lnSpc>
+              <a:spcBef>
+                <a:spcPts val="0"/>
+              </a:spcBef>
+              <a:spcAft>
+                <a:spcPts val="0"/>
+              </a:spcAft>
+              <a:buNone/>
+            </a:pPr>
+            <a:r>
+              <a:rPr lang="en" sz="1200">
+                <a:solidFill>
+                  <a:schemeClr val="dk1"/>
+                </a:solidFill>
+                <a:highlight>
+                  <a:srgbClr val="FFFFFF"/>
+                </a:highlight>
+                <a:latin typeface="Courier New"/>
+                <a:ea typeface="Courier New"/>
+                <a:cs typeface="Courier New"/>
+                <a:sym typeface="Courier New"/>
+              </a:rPr>
+              <a:t>Test Set (20% of datase</a:t>
+            </a:r>
+            <a:endParaRPr sz="1200">
+              <a:solidFill>
+                <a:schemeClr val="dk1"/>
+              </a:solidFill>
+              <a:highlight>
+                <a:srgbClr val="FFFFFF"/>
+              </a:highlight>
+              <a:latin typeface="Courier New"/>
+              <a:ea typeface="Courier New"/>
+              <a:cs typeface="Courier New"/>
+              <a:sym typeface="Courier New"/>
+            </a:endParaRPr>
+          </a:p>
           <a:p>
             <a:pPr indent="0" lvl="0" marL="0" rtl="0" algn="l">
               <a:lnSpc>
@@ -13224,44 +13503,16 @@
           <a:chExt cx="0" cy="0"/>
         </a:xfrm>
       </p:grpSpPr>
-      <p:pic>
-        <p:nvPicPr>
-          <p:cNvPr id="153" name="Google Shape;153;gec2e1cceae_0_107"/>
-          <p:cNvPicPr preferRelativeResize="0"/>
-          <p:nvPr/>
-        </p:nvPicPr>
-        <p:blipFill>
-          <a:blip r:embed="rId3">
-            <a:alphaModFix/>
-          </a:blip>
-          <a:stretch>
-            <a:fillRect/>
-          </a:stretch>
-        </p:blipFill>
-        <p:spPr>
-          <a:xfrm>
-            <a:off x="2538099" y="522350"/>
-            <a:ext cx="6661002" cy="3997249"/>
-          </a:xfrm>
-          <a:prstGeom prst="rect">
-            <a:avLst/>
-          </a:prstGeom>
-          <a:noFill/>
-          <a:ln>
-            <a:noFill/>
-          </a:ln>
-        </p:spPr>
-      </p:pic>
       <p:sp>
         <p:nvSpPr>
-          <p:cNvPr id="154" name="Google Shape;154;gec2e1cceae_0_107"/>
+          <p:cNvPr id="153" name="Google Shape;153;gec2e1cceae_0_107"/>
           <p:cNvSpPr txBox="1"/>
           <p:nvPr/>
         </p:nvSpPr>
         <p:spPr>
           <a:xfrm>
-            <a:off x="0" y="1920300"/>
-            <a:ext cx="2538000" cy="1477500"/>
+            <a:off x="0" y="1725150"/>
+            <a:ext cx="2538000" cy="1908600"/>
           </a:xfrm>
           <a:prstGeom prst="rect">
             <a:avLst/>
@@ -13345,7 +13596,7 @@
                 <a:cs typeface="Consolas"/>
                 <a:sym typeface="Consolas"/>
               </a:rPr>
-              <a:t>age-thalachh (-0.41)</a:t>
+              <a:t>age-thalachh (-0.31)</a:t>
             </a:r>
             <a:endParaRPr>
               <a:latin typeface="Consolas"/>
@@ -13371,7 +13622,7 @@
                 <a:cs typeface="Consolas"/>
                 <a:sym typeface="Consolas"/>
               </a:rPr>
-              <a:t>Oldpeak-thalachh (-0.33)</a:t>
+              <a:t>Oldpeak-thalachh (-0.37)</a:t>
             </a:r>
             <a:endParaRPr>
               <a:latin typeface="Consolas"/>
@@ -13412,12 +13663,57 @@
             </a:pPr>
             <a:r>
               <a:rPr lang="en">
+                <a:latin typeface="Ubuntu Light"/>
+                <a:ea typeface="Ubuntu Light"/>
+                <a:cs typeface="Ubuntu Light"/>
+                <a:sym typeface="Ubuntu Light"/>
+              </a:rPr>
+              <a:t>Discard </a:t>
+            </a:r>
+            <a:r>
+              <a:rPr lang="en">
                 <a:latin typeface="Consolas"/>
                 <a:ea typeface="Consolas"/>
                 <a:cs typeface="Consolas"/>
                 <a:sym typeface="Consolas"/>
               </a:rPr>
-              <a:t>Can discard </a:t>
+              <a:t>oldpeak</a:t>
+            </a:r>
+            <a:r>
+              <a:rPr lang="en">
+                <a:latin typeface="Ubuntu Light"/>
+                <a:ea typeface="Ubuntu Light"/>
+                <a:cs typeface="Ubuntu Light"/>
+                <a:sym typeface="Ubuntu Light"/>
+              </a:rPr>
+              <a:t>.  </a:t>
+            </a:r>
+            <a:r>
+              <a:rPr lang="en">
+                <a:latin typeface="Consolas"/>
+                <a:ea typeface="Consolas"/>
+                <a:cs typeface="Consolas"/>
+                <a:sym typeface="Consolas"/>
+              </a:rPr>
+              <a:t>thalachh</a:t>
+            </a:r>
+            <a:r>
+              <a:rPr lang="en">
+                <a:latin typeface="Ubuntu Light"/>
+                <a:ea typeface="Ubuntu Light"/>
+                <a:cs typeface="Ubuntu Light"/>
+                <a:sym typeface="Ubuntu Light"/>
+              </a:rPr>
+              <a:t> is more correlated with </a:t>
+            </a:r>
+            <a:r>
+              <a:rPr lang="en">
+                <a:latin typeface="Consolas"/>
+                <a:ea typeface="Consolas"/>
+                <a:cs typeface="Consolas"/>
+                <a:sym typeface="Consolas"/>
+              </a:rPr>
+              <a:t>output</a:t>
             </a:r>
             <a:endParaRPr>
               <a:latin typeface="Consolas"/>
@@ -13428,6 +13724,34 @@
           </a:p>
         </p:txBody>
       </p:sp>
+      <p:pic>
+        <p:nvPicPr>
+          <p:cNvPr id="154" name="Google Shape;154;gec2e1cceae_0_107"/>
+          <p:cNvPicPr preferRelativeResize="0"/>
+          <p:nvPr/>
+        </p:nvPicPr>
+        <p:blipFill>
+          <a:blip r:embed="rId3">
+            <a:alphaModFix/>
+          </a:blip>
+          <a:stretch>
+            <a:fillRect/>
+          </a:stretch>
+        </p:blipFill>
+        <p:spPr>
+          <a:xfrm>
+            <a:off x="2538000" y="454813"/>
+            <a:ext cx="7055324" cy="4233874"/>
+          </a:xfrm>
+          <a:prstGeom prst="rect">
+            <a:avLst/>
+          </a:prstGeom>
+          <a:noFill/>
+          <a:ln>
+            <a:noFill/>
+          </a:ln>
+        </p:spPr>
+      </p:pic>
     </p:spTree>
   </p:cSld>
   <p:clrMapOvr>
@@ -13455,7 +13779,85 @@
       </p:grpSpPr>
       <p:sp>
         <p:nvSpPr>
-          <p:cNvPr id="159" name="Google Shape;159;gec2e1cceae_0_5"/>
+          <p:cNvPr id="159" name="Google Shape;159;gec2e1cceae_0_119"/>
+          <p:cNvSpPr txBox="1"/>
+          <p:nvPr>
+            <p:ph idx="1" type="body"/>
+          </p:nvPr>
+        </p:nvSpPr>
+        <p:spPr>
+          <a:xfrm>
+            <a:off x="311700" y="1225225"/>
+            <a:ext cx="8520600" cy="3354000"/>
+          </a:xfrm>
+          <a:prstGeom prst="rect">
+            <a:avLst/>
+          </a:prstGeom>
+        </p:spPr>
+        <p:txBody>
+          <a:bodyPr anchorCtr="0" anchor="t" bIns="91425" lIns="91425" spcFirstLastPara="1" rIns="91425" wrap="square" tIns="91425">
+            <a:normAutofit/>
+          </a:bodyPr>
+          <a:lstStyle/>
+          <a:p>
+            <a:pPr indent="-342900" lvl="0" marL="457200" rtl="0" algn="l">
+              <a:spcBef>
+                <a:spcPts val="0"/>
+              </a:spcBef>
+              <a:spcAft>
+                <a:spcPts val="0"/>
+              </a:spcAft>
+              <a:buSzPts val="1800"/>
+              <a:buChar char="●"/>
+            </a:pPr>
+            <a:r>
+              <a:rPr lang="en">
+                <a:latin typeface="Ubuntu Light"/>
+                <a:ea typeface="Ubuntu Light"/>
+                <a:cs typeface="Ubuntu Light"/>
+                <a:sym typeface="Ubuntu Light"/>
+              </a:rPr>
+              <a:t>Removal of </a:t>
+            </a:r>
+            <a:r>
+              <a:rPr lang="en">
+                <a:latin typeface="Consolas"/>
+                <a:ea typeface="Consolas"/>
+                <a:cs typeface="Consolas"/>
+                <a:sym typeface="Consolas"/>
+              </a:rPr>
+              <a:t>oldpeak</a:t>
+            </a:r>
+            <a:r>
+              <a:rPr lang="en">
+                <a:latin typeface="Ubuntu Light"/>
+                <a:ea typeface="Ubuntu Light"/>
+                <a:cs typeface="Ubuntu Light"/>
+                <a:sym typeface="Ubuntu Light"/>
+              </a:rPr>
+              <a:t> improves accuracy by 2% when using </a:t>
+            </a:r>
+            <a:r>
+              <a:rPr lang="en">
+                <a:latin typeface="Consolas"/>
+                <a:ea typeface="Consolas"/>
+                <a:cs typeface="Consolas"/>
+                <a:sym typeface="Consolas"/>
+              </a:rPr>
+              <a:t>LogisticRegression</a:t>
+            </a:r>
+            <a:endParaRPr>
+              <a:latin typeface="Consolas"/>
+              <a:ea typeface="Consolas"/>
+              <a:cs typeface="Consolas"/>
+              <a:sym typeface="Consolas"/>
+            </a:endParaRPr>
+          </a:p>
+        </p:txBody>
+      </p:sp>
+      <p:sp>
+        <p:nvSpPr>
+          <p:cNvPr id="160" name="Google Shape;160;gec2e1cceae_0_119"/>
           <p:cNvSpPr txBox="1"/>
           <p:nvPr>
             <p:ph type="title"/>
@@ -13494,6 +13896,327 @@
               <a:buNone/>
             </a:pPr>
             <a:r>
+              <a:rPr lang="en" sz="3100">
+                <a:latin typeface="Ubuntu"/>
+                <a:ea typeface="Ubuntu"/>
+                <a:cs typeface="Ubuntu"/>
+                <a:sym typeface="Ubuntu"/>
+              </a:rPr>
+              <a:t>Feature Selection</a:t>
+            </a:r>
+            <a:endParaRPr sz="3100">
+              <a:latin typeface="Ubuntu"/>
+              <a:ea typeface="Ubuntu"/>
+              <a:cs typeface="Ubuntu"/>
+              <a:sym typeface="Ubuntu"/>
+            </a:endParaRPr>
+          </a:p>
+        </p:txBody>
+      </p:sp>
+      <p:pic>
+        <p:nvPicPr>
+          <p:cNvPr id="161" name="Google Shape;161;gec2e1cceae_0_119"/>
+          <p:cNvPicPr preferRelativeResize="0"/>
+          <p:nvPr/>
+        </p:nvPicPr>
+        <p:blipFill>
+          <a:blip r:embed="rId3">
+            <a:alphaModFix/>
+          </a:blip>
+          <a:stretch>
+            <a:fillRect/>
+          </a:stretch>
+        </p:blipFill>
+        <p:spPr>
+          <a:xfrm>
+            <a:off x="1013900" y="2268850"/>
+            <a:ext cx="6784076" cy="2310375"/>
+          </a:xfrm>
+          <a:prstGeom prst="rect">
+            <a:avLst/>
+          </a:prstGeom>
+          <a:noFill/>
+          <a:ln>
+            <a:noFill/>
+          </a:ln>
+        </p:spPr>
+      </p:pic>
+    </p:spTree>
+  </p:cSld>
+  <p:clrMapOvr>
+    <a:masterClrMapping/>
+  </p:clrMapOvr>
+</p:sld>
+</file>
+
+<file path=ppt/slides/slide17.xml><?xml version="1.0" encoding="utf-8"?>
+<p:sld xmlns:a="http://schemas.openxmlformats.org/drawingml/2006/main" xmlns:r="http://schemas.openxmlformats.org/officeDocument/2006/relationships" xmlns:mc="http://schemas.openxmlformats.org/markup-compatibility/2006" xmlns:mv="urn:schemas-microsoft-com:mac:vml" xmlns:p="http://schemas.openxmlformats.org/presentationml/2006/main" xmlns:c="http://schemas.openxmlformats.org/drawingml/2006/chart" xmlns:dgm="http://schemas.openxmlformats.org/drawingml/2006/diagram" xmlns:o="urn:schemas-microsoft-com:office:office" xmlns:v="urn:schemas-microsoft-com:vml" xmlns:pvml="urn:schemas-microsoft-com:office:powerpoint" xmlns:com="http://schemas.openxmlformats.org/drawingml/2006/compatibility" xmlns:p14="http://schemas.microsoft.com/office/powerpoint/2010/main" xmlns:p15="http://schemas.microsoft.com/office/powerpoint/2012/main" xmlns:ahyp="http://schemas.microsoft.com/office/drawing/2018/hyperlinkcolor">
+  <p:cSld>
+    <p:spTree>
+      <p:nvGrpSpPr>
+        <p:cNvPr id="165" name="Shape 165"/>
+        <p:cNvGrpSpPr/>
+        <p:nvPr/>
+      </p:nvGrpSpPr>
+      <p:grpSpPr>
+        <a:xfrm>
+          <a:off x="0" y="0"/>
+          <a:ext cx="0" cy="0"/>
+          <a:chOff x="0" y="0"/>
+          <a:chExt cx="0" cy="0"/>
+        </a:xfrm>
+      </p:grpSpPr>
+      <p:sp>
+        <p:nvSpPr>
+          <p:cNvPr id="166" name="Google Shape;166;gec2e1cceae_0_127"/>
+          <p:cNvSpPr txBox="1"/>
+          <p:nvPr>
+            <p:ph idx="1" type="body"/>
+          </p:nvPr>
+        </p:nvSpPr>
+        <p:spPr>
+          <a:xfrm>
+            <a:off x="311700" y="2022150"/>
+            <a:ext cx="2912400" cy="1099200"/>
+          </a:xfrm>
+          <a:prstGeom prst="rect">
+            <a:avLst/>
+          </a:prstGeom>
+        </p:spPr>
+        <p:txBody>
+          <a:bodyPr anchorCtr="0" anchor="t" bIns="91425" lIns="91425" spcFirstLastPara="1" rIns="91425" wrap="square" tIns="91425">
+            <a:normAutofit/>
+          </a:bodyPr>
+          <a:lstStyle/>
+          <a:p>
+            <a:pPr indent="-342900" lvl="0" marL="457200" rtl="0" algn="l">
+              <a:spcBef>
+                <a:spcPts val="0"/>
+              </a:spcBef>
+              <a:spcAft>
+                <a:spcPts val="0"/>
+              </a:spcAft>
+              <a:buSzPts val="1800"/>
+              <a:buChar char="●"/>
+            </a:pPr>
+            <a:r>
+              <a:rPr lang="en">
+                <a:latin typeface="Consolas"/>
+                <a:ea typeface="Consolas"/>
+                <a:cs typeface="Consolas"/>
+                <a:sym typeface="Consolas"/>
+              </a:rPr>
+              <a:t>MinMaxScaler()</a:t>
+            </a:r>
+            <a:endParaRPr>
+              <a:latin typeface="Ubuntu Light"/>
+              <a:ea typeface="Ubuntu Light"/>
+              <a:cs typeface="Ubuntu Light"/>
+              <a:sym typeface="Ubuntu Light"/>
+            </a:endParaRPr>
+          </a:p>
+          <a:p>
+            <a:pPr indent="-342900" lvl="0" marL="457200" rtl="0" algn="l">
+              <a:spcBef>
+                <a:spcPts val="0"/>
+              </a:spcBef>
+              <a:spcAft>
+                <a:spcPts val="0"/>
+              </a:spcAft>
+              <a:buSzPts val="1800"/>
+              <a:buFont typeface="Consolas"/>
+              <a:buChar char="●"/>
+            </a:pPr>
+            <a:r>
+              <a:rPr lang="en">
+                <a:latin typeface="Consolas"/>
+                <a:ea typeface="Consolas"/>
+                <a:cs typeface="Consolas"/>
+                <a:sym typeface="Consolas"/>
+              </a:rPr>
+              <a:t>OneHotEncoder()</a:t>
+            </a:r>
+            <a:endParaRPr>
+              <a:latin typeface="Consolas"/>
+              <a:ea typeface="Consolas"/>
+              <a:cs typeface="Consolas"/>
+              <a:sym typeface="Consolas"/>
+            </a:endParaRPr>
+          </a:p>
+          <a:p>
+            <a:pPr indent="0" lvl="0" marL="457200" rtl="0" algn="l">
+              <a:spcBef>
+                <a:spcPts val="0"/>
+              </a:spcBef>
+              <a:spcAft>
+                <a:spcPts val="0"/>
+              </a:spcAft>
+              <a:buNone/>
+            </a:pPr>
+            <a:r>
+              <a:t/>
+            </a:r>
+            <a:endParaRPr>
+              <a:latin typeface="Ubuntu Light"/>
+              <a:ea typeface="Ubuntu Light"/>
+              <a:cs typeface="Ubuntu Light"/>
+              <a:sym typeface="Ubuntu Light"/>
+            </a:endParaRPr>
+          </a:p>
+        </p:txBody>
+      </p:sp>
+      <p:sp>
+        <p:nvSpPr>
+          <p:cNvPr id="167" name="Google Shape;167;gec2e1cceae_0_127"/>
+          <p:cNvSpPr txBox="1"/>
+          <p:nvPr>
+            <p:ph type="title"/>
+          </p:nvPr>
+        </p:nvSpPr>
+        <p:spPr>
+          <a:xfrm>
+            <a:off x="311700" y="315925"/>
+            <a:ext cx="8520600" cy="831300"/>
+          </a:xfrm>
+          <a:prstGeom prst="rect">
+            <a:avLst/>
+          </a:prstGeom>
+          <a:noFill/>
+          <a:ln>
+            <a:noFill/>
+          </a:ln>
+        </p:spPr>
+        <p:txBody>
+          <a:bodyPr anchorCtr="0" anchor="b" bIns="91425" lIns="91425" spcFirstLastPara="1" rIns="91425" wrap="square" tIns="91425">
+            <a:normAutofit/>
+          </a:bodyPr>
+          <a:lstStyle/>
+          <a:p>
+            <a:pPr indent="0" lvl="0" marL="0" rtl="0" algn="l">
+              <a:lnSpc>
+                <a:spcPct val="100000"/>
+              </a:lnSpc>
+              <a:spcBef>
+                <a:spcPts val="0"/>
+              </a:spcBef>
+              <a:spcAft>
+                <a:spcPts val="0"/>
+              </a:spcAft>
+              <a:buSzPts val="4200"/>
+              <a:buNone/>
+            </a:pPr>
+            <a:r>
+              <a:rPr lang="en" sz="3100">
+                <a:latin typeface="Ubuntu"/>
+                <a:ea typeface="Ubuntu"/>
+                <a:cs typeface="Ubuntu"/>
+                <a:sym typeface="Ubuntu"/>
+              </a:rPr>
+              <a:t>Pipeline Set Up</a:t>
+            </a:r>
+            <a:endParaRPr sz="3100">
+              <a:latin typeface="Ubuntu"/>
+              <a:ea typeface="Ubuntu"/>
+              <a:cs typeface="Ubuntu"/>
+              <a:sym typeface="Ubuntu"/>
+            </a:endParaRPr>
+          </a:p>
+        </p:txBody>
+      </p:sp>
+      <p:pic>
+        <p:nvPicPr>
+          <p:cNvPr id="168" name="Google Shape;168;gec2e1cceae_0_127"/>
+          <p:cNvPicPr preferRelativeResize="0"/>
+          <p:nvPr/>
+        </p:nvPicPr>
+        <p:blipFill>
+          <a:blip r:embed="rId3">
+            <a:alphaModFix/>
+          </a:blip>
+          <a:stretch>
+            <a:fillRect/>
+          </a:stretch>
+        </p:blipFill>
+        <p:spPr>
+          <a:xfrm>
+            <a:off x="4498325" y="1370263"/>
+            <a:ext cx="4333976" cy="2053965"/>
+          </a:xfrm>
+          <a:prstGeom prst="rect">
+            <a:avLst/>
+          </a:prstGeom>
+          <a:noFill/>
+          <a:ln>
+            <a:noFill/>
+          </a:ln>
+        </p:spPr>
+      </p:pic>
+    </p:spTree>
+  </p:cSld>
+  <p:clrMapOvr>
+    <a:masterClrMapping/>
+  </p:clrMapOvr>
+</p:sld>
+</file>
+
+<file path=ppt/slides/slide18.xml><?xml version="1.0" encoding="utf-8"?>
+<p:sld xmlns:a="http://schemas.openxmlformats.org/drawingml/2006/main" xmlns:r="http://schemas.openxmlformats.org/officeDocument/2006/relationships" xmlns:mc="http://schemas.openxmlformats.org/markup-compatibility/2006" xmlns:mv="urn:schemas-microsoft-com:mac:vml" xmlns:p="http://schemas.openxmlformats.org/presentationml/2006/main" xmlns:c="http://schemas.openxmlformats.org/drawingml/2006/chart" xmlns:dgm="http://schemas.openxmlformats.org/drawingml/2006/diagram" xmlns:o="urn:schemas-microsoft-com:office:office" xmlns:v="urn:schemas-microsoft-com:vml" xmlns:pvml="urn:schemas-microsoft-com:office:powerpoint" xmlns:com="http://schemas.openxmlformats.org/drawingml/2006/compatibility" xmlns:p14="http://schemas.microsoft.com/office/powerpoint/2010/main" xmlns:p15="http://schemas.microsoft.com/office/powerpoint/2012/main" xmlns:ahyp="http://schemas.microsoft.com/office/drawing/2018/hyperlinkcolor">
+  <p:cSld>
+    <p:spTree>
+      <p:nvGrpSpPr>
+        <p:cNvPr id="172" name="Shape 172"/>
+        <p:cNvGrpSpPr/>
+        <p:nvPr/>
+      </p:nvGrpSpPr>
+      <p:grpSpPr>
+        <a:xfrm>
+          <a:off x="0" y="0"/>
+          <a:ext cx="0" cy="0"/>
+          <a:chOff x="0" y="0"/>
+          <a:chExt cx="0" cy="0"/>
+        </a:xfrm>
+      </p:grpSpPr>
+      <p:sp>
+        <p:nvSpPr>
+          <p:cNvPr id="173" name="Google Shape;173;gec2e1cceae_0_5"/>
+          <p:cNvSpPr txBox="1"/>
+          <p:nvPr>
+            <p:ph type="title"/>
+          </p:nvPr>
+        </p:nvSpPr>
+        <p:spPr>
+          <a:xfrm>
+            <a:off x="311700" y="315925"/>
+            <a:ext cx="8520600" cy="831300"/>
+          </a:xfrm>
+          <a:prstGeom prst="rect">
+            <a:avLst/>
+          </a:prstGeom>
+          <a:noFill/>
+          <a:ln>
+            <a:noFill/>
+          </a:ln>
+        </p:spPr>
+        <p:txBody>
+          <a:bodyPr anchorCtr="0" anchor="b" bIns="91425" lIns="91425" spcFirstLastPara="1" rIns="91425" wrap="square" tIns="91425">
+            <a:normAutofit/>
+          </a:bodyPr>
+          <a:lstStyle/>
+          <a:p>
+            <a:pPr indent="0" lvl="0" marL="0" rtl="0" algn="l">
+              <a:lnSpc>
+                <a:spcPct val="100000"/>
+              </a:lnSpc>
+              <a:spcBef>
+                <a:spcPts val="0"/>
+              </a:spcBef>
+              <a:spcAft>
+                <a:spcPts val="0"/>
+              </a:spcAft>
+              <a:buSzPts val="4200"/>
+              <a:buNone/>
+            </a:pPr>
+            <a:r>
               <a:rPr lang="en">
                 <a:latin typeface="Ubuntu"/>
                 <a:ea typeface="Ubuntu"/>
@@ -13513,7 +14236,7 @@
       </p:sp>
       <p:sp>
         <p:nvSpPr>
-          <p:cNvPr id="160" name="Google Shape;160;gec2e1cceae_0_5"/>
+          <p:cNvPr id="174" name="Google Shape;174;gec2e1cceae_0_5"/>
           <p:cNvSpPr txBox="1"/>
           <p:nvPr>
             <p:ph idx="1" type="body"/>
@@ -13834,12 +14557,12 @@
 </p:sld>
 </file>
 
-<file path=ppt/slides/slide17.xml><?xml version="1.0" encoding="utf-8"?>
+<file path=ppt/slides/slide19.xml><?xml version="1.0" encoding="utf-8"?>
 <p:sld xmlns:a="http://schemas.openxmlformats.org/drawingml/2006/main" xmlns:r="http://schemas.openxmlformats.org/officeDocument/2006/relationships" xmlns:mc="http://schemas.openxmlformats.org/markup-compatibility/2006" xmlns:mv="urn:schemas-microsoft-com:mac:vml" xmlns:p="http://schemas.openxmlformats.org/presentationml/2006/main" xmlns:c="http://schemas.openxmlformats.org/drawingml/2006/chart" xmlns:dgm="http://schemas.openxmlformats.org/drawingml/2006/diagram" xmlns:o="urn:schemas-microsoft-com:office:office" xmlns:v="urn:schemas-microsoft-com:vml" xmlns:pvml="urn:schemas-microsoft-com:office:powerpoint" xmlns:com="http://schemas.openxmlformats.org/drawingml/2006/compatibility" xmlns:p14="http://schemas.microsoft.com/office/powerpoint/2010/main" xmlns:p15="http://schemas.microsoft.com/office/powerpoint/2012/main" xmlns:ahyp="http://schemas.microsoft.com/office/drawing/2018/hyperlinkcolor">
   <p:cSld>
     <p:spTree>
       <p:nvGrpSpPr>
-        <p:cNvPr id="164" name="Shape 164"/>
+        <p:cNvPr id="178" name="Shape 178"/>
         <p:cNvGrpSpPr/>
         <p:nvPr/>
       </p:nvGrpSpPr>
@@ -13853,7 +14576,7 @@
       </p:grpSpPr>
       <p:sp>
         <p:nvSpPr>
-          <p:cNvPr id="165" name="Google Shape;165;p11"/>
+          <p:cNvPr id="179" name="Google Shape;179;p11"/>
           <p:cNvSpPr txBox="1"/>
           <p:nvPr>
             <p:ph type="title"/>
@@ -13911,7 +14634,7 @@
       </p:sp>
       <p:sp>
         <p:nvSpPr>
-          <p:cNvPr id="166" name="Google Shape;166;p11"/>
+          <p:cNvPr id="180" name="Google Shape;180;p11"/>
           <p:cNvSpPr txBox="1"/>
           <p:nvPr>
             <p:ph idx="1" type="body"/>
@@ -13942,540 +14665,6 @@
               </a:lnSpc>
               <a:spcBef>
                 <a:spcPts val="0"/>
-              </a:spcBef>
-              <a:spcAft>
-                <a:spcPts val="0"/>
-              </a:spcAft>
-              <a:buSzPts val="1800"/>
-              <a:buFont typeface="Ubuntu"/>
-              <a:buChar char="●"/>
-            </a:pPr>
-            <a:r>
-              <a:t/>
-            </a:r>
-            <a:endParaRPr>
-              <a:latin typeface="Ubuntu"/>
-              <a:ea typeface="Ubuntu"/>
-              <a:cs typeface="Ubuntu"/>
-              <a:sym typeface="Ubuntu"/>
-            </a:endParaRPr>
-          </a:p>
-        </p:txBody>
-      </p:sp>
-    </p:spTree>
-  </p:cSld>
-  <p:clrMapOvr>
-    <a:masterClrMapping/>
-  </p:clrMapOvr>
-</p:sld>
-</file>
-
-<file path=ppt/slides/slide18.xml><?xml version="1.0" encoding="utf-8"?>
-<p:sld xmlns:a="http://schemas.openxmlformats.org/drawingml/2006/main" xmlns:r="http://schemas.openxmlformats.org/officeDocument/2006/relationships" xmlns:mc="http://schemas.openxmlformats.org/markup-compatibility/2006" xmlns:mv="urn:schemas-microsoft-com:mac:vml" xmlns:p="http://schemas.openxmlformats.org/presentationml/2006/main" xmlns:c="http://schemas.openxmlformats.org/drawingml/2006/chart" xmlns:dgm="http://schemas.openxmlformats.org/drawingml/2006/diagram" xmlns:o="urn:schemas-microsoft-com:office:office" xmlns:v="urn:schemas-microsoft-com:vml" xmlns:pvml="urn:schemas-microsoft-com:office:powerpoint" xmlns:com="http://schemas.openxmlformats.org/drawingml/2006/compatibility" xmlns:p14="http://schemas.microsoft.com/office/powerpoint/2010/main" xmlns:p15="http://schemas.microsoft.com/office/powerpoint/2012/main" xmlns:ahyp="http://schemas.microsoft.com/office/drawing/2018/hyperlinkcolor">
-  <p:cSld>
-    <p:spTree>
-      <p:nvGrpSpPr>
-        <p:cNvPr id="170" name="Shape 170"/>
-        <p:cNvGrpSpPr/>
-        <p:nvPr/>
-      </p:nvGrpSpPr>
-      <p:grpSpPr>
-        <a:xfrm>
-          <a:off x="0" y="0"/>
-          <a:ext cx="0" cy="0"/>
-          <a:chOff x="0" y="0"/>
-          <a:chExt cx="0" cy="0"/>
-        </a:xfrm>
-      </p:grpSpPr>
-      <p:sp>
-        <p:nvSpPr>
-          <p:cNvPr id="171" name="Google Shape;171;gec2e1cceae_0_10"/>
-          <p:cNvSpPr txBox="1"/>
-          <p:nvPr>
-            <p:ph type="title"/>
-          </p:nvPr>
-        </p:nvSpPr>
-        <p:spPr>
-          <a:xfrm>
-            <a:off x="311700" y="315925"/>
-            <a:ext cx="8520600" cy="831300"/>
-          </a:xfrm>
-          <a:prstGeom prst="rect">
-            <a:avLst/>
-          </a:prstGeom>
-          <a:noFill/>
-          <a:ln>
-            <a:noFill/>
-          </a:ln>
-        </p:spPr>
-        <p:txBody>
-          <a:bodyPr anchorCtr="0" anchor="b" bIns="91425" lIns="91425" spcFirstLastPara="1" rIns="91425" wrap="square" tIns="91425">
-            <a:normAutofit/>
-          </a:bodyPr>
-          <a:lstStyle/>
-          <a:p>
-            <a:pPr indent="0" lvl="0" marL="0" rtl="0" algn="l">
-              <a:lnSpc>
-                <a:spcPct val="100000"/>
-              </a:lnSpc>
-              <a:spcBef>
-                <a:spcPts val="0"/>
-              </a:spcBef>
-              <a:spcAft>
-                <a:spcPts val="0"/>
-              </a:spcAft>
-              <a:buSzPts val="4200"/>
-              <a:buNone/>
-            </a:pPr>
-            <a:r>
-              <a:rPr lang="en">
-                <a:latin typeface="Ubuntu"/>
-                <a:ea typeface="Ubuntu"/>
-                <a:cs typeface="Ubuntu"/>
-                <a:sym typeface="Ubuntu"/>
-              </a:rPr>
-              <a:t>AGENDA</a:t>
-            </a:r>
-            <a:endParaRPr>
-              <a:latin typeface="Ubuntu"/>
-              <a:ea typeface="Ubuntu"/>
-              <a:cs typeface="Ubuntu"/>
-              <a:sym typeface="Ubuntu"/>
-            </a:endParaRPr>
-          </a:p>
-        </p:txBody>
-      </p:sp>
-      <p:sp>
-        <p:nvSpPr>
-          <p:cNvPr id="172" name="Google Shape;172;gec2e1cceae_0_10"/>
-          <p:cNvSpPr txBox="1"/>
-          <p:nvPr>
-            <p:ph idx="1" type="body"/>
-          </p:nvPr>
-        </p:nvSpPr>
-        <p:spPr>
-          <a:xfrm>
-            <a:off x="311700" y="1225225"/>
-            <a:ext cx="8520600" cy="3354000"/>
-          </a:xfrm>
-          <a:prstGeom prst="rect">
-            <a:avLst/>
-          </a:prstGeom>
-          <a:noFill/>
-          <a:ln>
-            <a:noFill/>
-          </a:ln>
-        </p:spPr>
-        <p:txBody>
-          <a:bodyPr anchorCtr="0" anchor="t" bIns="91425" lIns="91425" spcFirstLastPara="1" rIns="91425" wrap="square" tIns="91425">
-            <a:normAutofit/>
-          </a:bodyPr>
-          <a:lstStyle/>
-          <a:p>
-            <a:pPr indent="-368300" lvl="0" marL="457200" rtl="0" algn="l">
-              <a:spcBef>
-                <a:spcPts val="0"/>
-              </a:spcBef>
-              <a:spcAft>
-                <a:spcPts val="0"/>
-              </a:spcAft>
-              <a:buClr>
-                <a:schemeClr val="dk2"/>
-              </a:buClr>
-              <a:buSzPts val="2200"/>
-              <a:buFont typeface="Ubuntu Light"/>
-              <a:buChar char="●"/>
-            </a:pPr>
-            <a:r>
-              <a:rPr lang="en" sz="2200">
-                <a:solidFill>
-                  <a:schemeClr val="dk2"/>
-                </a:solidFill>
-                <a:latin typeface="Ubuntu Light"/>
-                <a:ea typeface="Ubuntu Light"/>
-                <a:cs typeface="Ubuntu Light"/>
-                <a:sym typeface="Ubuntu Light"/>
-              </a:rPr>
-              <a:t>Project Overview</a:t>
-            </a:r>
-            <a:endParaRPr sz="2200">
-              <a:solidFill>
-                <a:schemeClr val="dk2"/>
-              </a:solidFill>
-              <a:latin typeface="Ubuntu Light"/>
-              <a:ea typeface="Ubuntu Light"/>
-              <a:cs typeface="Ubuntu Light"/>
-              <a:sym typeface="Ubuntu Light"/>
-            </a:endParaRPr>
-          </a:p>
-          <a:p>
-            <a:pPr indent="-368300" lvl="0" marL="457200" rtl="0" algn="l">
-              <a:spcBef>
-                <a:spcPts val="0"/>
-              </a:spcBef>
-              <a:spcAft>
-                <a:spcPts val="0"/>
-              </a:spcAft>
-              <a:buClr>
-                <a:schemeClr val="dk2"/>
-              </a:buClr>
-              <a:buSzPts val="2200"/>
-              <a:buFont typeface="Ubuntu Light"/>
-              <a:buChar char="●"/>
-            </a:pPr>
-            <a:r>
-              <a:rPr lang="en" sz="2200">
-                <a:solidFill>
-                  <a:schemeClr val="dk2"/>
-                </a:solidFill>
-                <a:latin typeface="Ubuntu Light"/>
-                <a:ea typeface="Ubuntu Light"/>
-                <a:cs typeface="Ubuntu Light"/>
-                <a:sym typeface="Ubuntu Light"/>
-              </a:rPr>
-              <a:t>Data Overview</a:t>
-            </a:r>
-            <a:endParaRPr sz="2200">
-              <a:solidFill>
-                <a:schemeClr val="dk2"/>
-              </a:solidFill>
-              <a:latin typeface="Ubuntu Light"/>
-              <a:ea typeface="Ubuntu Light"/>
-              <a:cs typeface="Ubuntu Light"/>
-              <a:sym typeface="Ubuntu Light"/>
-            </a:endParaRPr>
-          </a:p>
-          <a:p>
-            <a:pPr indent="-368300" lvl="0" marL="457200" rtl="0" algn="l">
-              <a:spcBef>
-                <a:spcPts val="0"/>
-              </a:spcBef>
-              <a:spcAft>
-                <a:spcPts val="0"/>
-              </a:spcAft>
-              <a:buClr>
-                <a:schemeClr val="dk2"/>
-              </a:buClr>
-              <a:buSzPts val="2200"/>
-              <a:buFont typeface="Ubuntu Light"/>
-              <a:buChar char="●"/>
-            </a:pPr>
-            <a:r>
-              <a:rPr lang="en" sz="2200">
-                <a:solidFill>
-                  <a:schemeClr val="dk2"/>
-                </a:solidFill>
-                <a:latin typeface="Ubuntu Light"/>
-                <a:ea typeface="Ubuntu Light"/>
-                <a:cs typeface="Ubuntu Light"/>
-                <a:sym typeface="Ubuntu Light"/>
-              </a:rPr>
-              <a:t>EDA and Pipeline Set Up</a:t>
-            </a:r>
-            <a:endParaRPr sz="2200">
-              <a:solidFill>
-                <a:schemeClr val="dk2"/>
-              </a:solidFill>
-              <a:latin typeface="Ubuntu Light"/>
-              <a:ea typeface="Ubuntu Light"/>
-              <a:cs typeface="Ubuntu Light"/>
-              <a:sym typeface="Ubuntu Light"/>
-            </a:endParaRPr>
-          </a:p>
-          <a:p>
-            <a:pPr indent="-368300" lvl="0" marL="457200" rtl="0" algn="l">
-              <a:spcBef>
-                <a:spcPts val="0"/>
-              </a:spcBef>
-              <a:spcAft>
-                <a:spcPts val="0"/>
-              </a:spcAft>
-              <a:buClr>
-                <a:schemeClr val="dk2"/>
-              </a:buClr>
-              <a:buSzPts val="2200"/>
-              <a:buFont typeface="Ubuntu Light"/>
-              <a:buChar char="●"/>
-            </a:pPr>
-            <a:r>
-              <a:rPr lang="en" sz="2200">
-                <a:solidFill>
-                  <a:schemeClr val="dk2"/>
-                </a:solidFill>
-                <a:latin typeface="Ubuntu Light"/>
-                <a:ea typeface="Ubuntu Light"/>
-                <a:cs typeface="Ubuntu Light"/>
-                <a:sym typeface="Ubuntu Light"/>
-              </a:rPr>
-              <a:t>ML Algorithms</a:t>
-            </a:r>
-            <a:endParaRPr sz="2200">
-              <a:solidFill>
-                <a:schemeClr val="dk2"/>
-              </a:solidFill>
-              <a:latin typeface="Ubuntu Light"/>
-              <a:ea typeface="Ubuntu Light"/>
-              <a:cs typeface="Ubuntu Light"/>
-              <a:sym typeface="Ubuntu Light"/>
-            </a:endParaRPr>
-          </a:p>
-          <a:p>
-            <a:pPr indent="-368300" lvl="0" marL="457200" rtl="0" algn="l">
-              <a:spcBef>
-                <a:spcPts val="0"/>
-              </a:spcBef>
-              <a:spcAft>
-                <a:spcPts val="0"/>
-              </a:spcAft>
-              <a:buSzPts val="2200"/>
-              <a:buFont typeface="Ubuntu Light"/>
-              <a:buChar char="●"/>
-            </a:pPr>
-            <a:r>
-              <a:rPr lang="en" sz="2200">
-                <a:latin typeface="Ubuntu Light"/>
-                <a:ea typeface="Ubuntu Light"/>
-                <a:cs typeface="Ubuntu Light"/>
-                <a:sym typeface="Ubuntu Light"/>
-              </a:rPr>
-              <a:t>Summary</a:t>
-            </a:r>
-            <a:endParaRPr sz="2200">
-              <a:latin typeface="Ubuntu Light"/>
-              <a:ea typeface="Ubuntu Light"/>
-              <a:cs typeface="Ubuntu Light"/>
-              <a:sym typeface="Ubuntu Light"/>
-            </a:endParaRPr>
-          </a:p>
-          <a:p>
-            <a:pPr indent="-368300" lvl="0" marL="457200" rtl="0" algn="l">
-              <a:spcBef>
-                <a:spcPts val="0"/>
-              </a:spcBef>
-              <a:spcAft>
-                <a:spcPts val="0"/>
-              </a:spcAft>
-              <a:buSzPts val="2200"/>
-              <a:buFont typeface="Ubuntu Light"/>
-              <a:buChar char="●"/>
-            </a:pPr>
-            <a:r>
-              <a:rPr lang="en" sz="2200">
-                <a:latin typeface="Ubuntu Light"/>
-                <a:ea typeface="Ubuntu Light"/>
-                <a:cs typeface="Ubuntu Light"/>
-                <a:sym typeface="Ubuntu Light"/>
-              </a:rPr>
-              <a:t>Final Report</a:t>
-            </a:r>
-            <a:endParaRPr sz="2200">
-              <a:latin typeface="Ubuntu Light"/>
-              <a:ea typeface="Ubuntu Light"/>
-              <a:cs typeface="Ubuntu Light"/>
-              <a:sym typeface="Ubuntu Light"/>
-            </a:endParaRPr>
-          </a:p>
-          <a:p>
-            <a:pPr indent="-368300" lvl="0" marL="457200" rtl="0" algn="l">
-              <a:spcBef>
-                <a:spcPts val="0"/>
-              </a:spcBef>
-              <a:spcAft>
-                <a:spcPts val="0"/>
-              </a:spcAft>
-              <a:buClr>
-                <a:schemeClr val="dk2"/>
-              </a:buClr>
-              <a:buSzPts val="2200"/>
-              <a:buFont typeface="Ubuntu Light"/>
-              <a:buChar char="●"/>
-            </a:pPr>
-            <a:r>
-              <a:rPr lang="en" sz="2200">
-                <a:solidFill>
-                  <a:schemeClr val="dk2"/>
-                </a:solidFill>
-                <a:latin typeface="Ubuntu Light"/>
-                <a:ea typeface="Ubuntu Light"/>
-                <a:cs typeface="Ubuntu Light"/>
-                <a:sym typeface="Ubuntu Light"/>
-              </a:rPr>
-              <a:t>Known Limitations of Project</a:t>
-            </a:r>
-            <a:endParaRPr sz="2200">
-              <a:solidFill>
-                <a:schemeClr val="dk2"/>
-              </a:solidFill>
-              <a:latin typeface="Ubuntu Light"/>
-              <a:ea typeface="Ubuntu Light"/>
-              <a:cs typeface="Ubuntu Light"/>
-              <a:sym typeface="Ubuntu Light"/>
-            </a:endParaRPr>
-          </a:p>
-          <a:p>
-            <a:pPr indent="-368300" lvl="0" marL="457200" rtl="0" algn="l">
-              <a:spcBef>
-                <a:spcPts val="0"/>
-              </a:spcBef>
-              <a:spcAft>
-                <a:spcPts val="0"/>
-              </a:spcAft>
-              <a:buClr>
-                <a:schemeClr val="dk2"/>
-              </a:buClr>
-              <a:buSzPts val="2200"/>
-              <a:buFont typeface="Ubuntu Light"/>
-              <a:buChar char="●"/>
-            </a:pPr>
-            <a:r>
-              <a:rPr lang="en" sz="2200">
-                <a:solidFill>
-                  <a:schemeClr val="dk2"/>
-                </a:solidFill>
-                <a:latin typeface="Ubuntu Light"/>
-                <a:ea typeface="Ubuntu Light"/>
-                <a:cs typeface="Ubuntu Light"/>
-                <a:sym typeface="Ubuntu Light"/>
-              </a:rPr>
-              <a:t>Potential Future Development</a:t>
-            </a:r>
-            <a:endParaRPr>
-              <a:solidFill>
-                <a:schemeClr val="dk2"/>
-              </a:solidFill>
-              <a:latin typeface="Ubuntu Light"/>
-              <a:ea typeface="Ubuntu Light"/>
-              <a:cs typeface="Ubuntu Light"/>
-              <a:sym typeface="Ubuntu Light"/>
-            </a:endParaRPr>
-          </a:p>
-        </p:txBody>
-      </p:sp>
-    </p:spTree>
-  </p:cSld>
-  <p:clrMapOvr>
-    <a:masterClrMapping/>
-  </p:clrMapOvr>
-</p:sld>
-</file>
-
-<file path=ppt/slides/slide19.xml><?xml version="1.0" encoding="utf-8"?>
-<p:sld xmlns:a="http://schemas.openxmlformats.org/drawingml/2006/main" xmlns:r="http://schemas.openxmlformats.org/officeDocument/2006/relationships" xmlns:mc="http://schemas.openxmlformats.org/markup-compatibility/2006" xmlns:mv="urn:schemas-microsoft-com:mac:vml" xmlns:p="http://schemas.openxmlformats.org/presentationml/2006/main" xmlns:c="http://schemas.openxmlformats.org/drawingml/2006/chart" xmlns:dgm="http://schemas.openxmlformats.org/drawingml/2006/diagram" xmlns:o="urn:schemas-microsoft-com:office:office" xmlns:v="urn:schemas-microsoft-com:vml" xmlns:pvml="urn:schemas-microsoft-com:office:powerpoint" xmlns:com="http://schemas.openxmlformats.org/drawingml/2006/compatibility" xmlns:p14="http://schemas.microsoft.com/office/powerpoint/2010/main" xmlns:p15="http://schemas.microsoft.com/office/powerpoint/2012/main" xmlns:ahyp="http://schemas.microsoft.com/office/drawing/2018/hyperlinkcolor">
-  <p:cSld>
-    <p:spTree>
-      <p:nvGrpSpPr>
-        <p:cNvPr id="176" name="Shape 176"/>
-        <p:cNvGrpSpPr/>
-        <p:nvPr/>
-      </p:nvGrpSpPr>
-      <p:grpSpPr>
-        <a:xfrm>
-          <a:off x="0" y="0"/>
-          <a:ext cx="0" cy="0"/>
-          <a:chOff x="0" y="0"/>
-          <a:chExt cx="0" cy="0"/>
-        </a:xfrm>
-      </p:grpSpPr>
-      <p:sp>
-        <p:nvSpPr>
-          <p:cNvPr id="177" name="Google Shape;177;p16"/>
-          <p:cNvSpPr txBox="1"/>
-          <p:nvPr>
-            <p:ph type="title"/>
-          </p:nvPr>
-        </p:nvSpPr>
-        <p:spPr>
-          <a:xfrm>
-            <a:off x="311700" y="315925"/>
-            <a:ext cx="8520600" cy="831300"/>
-          </a:xfrm>
-          <a:prstGeom prst="rect">
-            <a:avLst/>
-          </a:prstGeom>
-          <a:noFill/>
-          <a:ln>
-            <a:noFill/>
-          </a:ln>
-        </p:spPr>
-        <p:txBody>
-          <a:bodyPr anchorCtr="0" anchor="b" bIns="91425" lIns="91425" spcFirstLastPara="1" rIns="91425" wrap="square" tIns="91425">
-            <a:normAutofit fontScale="90000"/>
-          </a:bodyPr>
-          <a:lstStyle/>
-          <a:p>
-            <a:pPr indent="0" lvl="0" marL="0" rtl="0" algn="l">
-              <a:lnSpc>
-                <a:spcPct val="100000"/>
-              </a:lnSpc>
-              <a:spcBef>
-                <a:spcPts val="0"/>
-              </a:spcBef>
-              <a:spcAft>
-                <a:spcPts val="0"/>
-              </a:spcAft>
-              <a:buSzPct val="100000"/>
-              <a:buNone/>
-            </a:pPr>
-            <a:r>
-              <a:rPr lang="en">
-                <a:latin typeface="Ubuntu"/>
-                <a:ea typeface="Ubuntu"/>
-                <a:cs typeface="Ubuntu"/>
-                <a:sym typeface="Ubuntu"/>
-              </a:rPr>
-              <a:t>Summary of </a:t>
-            </a:r>
-            <a:r>
-              <a:rPr lang="en">
-                <a:latin typeface="Consolas"/>
-                <a:ea typeface="Consolas"/>
-                <a:cs typeface="Consolas"/>
-                <a:sym typeface="Consolas"/>
-              </a:rPr>
-              <a:t>classification_report</a:t>
-            </a:r>
-            <a:endParaRPr>
-              <a:latin typeface="Consolas"/>
-              <a:ea typeface="Consolas"/>
-              <a:cs typeface="Consolas"/>
-              <a:sym typeface="Consolas"/>
-            </a:endParaRPr>
-          </a:p>
-        </p:txBody>
-      </p:sp>
-      <p:sp>
-        <p:nvSpPr>
-          <p:cNvPr id="178" name="Google Shape;178;p16"/>
-          <p:cNvSpPr txBox="1"/>
-          <p:nvPr>
-            <p:ph idx="1" type="body"/>
-          </p:nvPr>
-        </p:nvSpPr>
-        <p:spPr>
-          <a:xfrm>
-            <a:off x="311700" y="1225225"/>
-            <a:ext cx="8520600" cy="3354000"/>
-          </a:xfrm>
-          <a:prstGeom prst="rect">
-            <a:avLst/>
-          </a:prstGeom>
-          <a:noFill/>
-          <a:ln>
-            <a:noFill/>
-          </a:ln>
-        </p:spPr>
-        <p:txBody>
-          <a:bodyPr anchorCtr="0" anchor="t" bIns="91425" lIns="91425" spcFirstLastPara="1" rIns="91425" wrap="square" tIns="91425">
-            <a:normAutofit/>
-          </a:bodyPr>
-          <a:lstStyle/>
-          <a:p>
-            <a:pPr indent="-342900" lvl="0" marL="457200" rtl="0" algn="l">
-              <a:lnSpc>
-                <a:spcPct val="115000"/>
-              </a:lnSpc>
-              <a:spcBef>
-                <a:spcPts val="1200"/>
               </a:spcBef>
               <a:spcAft>
                 <a:spcPts val="0"/>
@@ -14868,7 +15057,7 @@
   <p:cSld>
     <p:spTree>
       <p:nvGrpSpPr>
-        <p:cNvPr id="182" name="Shape 182"/>
+        <p:cNvPr id="184" name="Shape 184"/>
         <p:cNvGrpSpPr/>
         <p:nvPr/>
       </p:nvGrpSpPr>
@@ -14882,7 +15071,7 @@
       </p:grpSpPr>
       <p:sp>
         <p:nvSpPr>
-          <p:cNvPr id="183" name="Google Shape;183;gec2e1cceae_0_20"/>
+          <p:cNvPr id="185" name="Google Shape;185;gec2e1cceae_0_10"/>
           <p:cNvSpPr txBox="1"/>
           <p:nvPr>
             <p:ph type="title"/>
@@ -14940,7 +15129,7 @@
       </p:sp>
       <p:sp>
         <p:nvSpPr>
-          <p:cNvPr id="184" name="Google Shape;184;gec2e1cceae_0_20"/>
+          <p:cNvPr id="186" name="Google Shape;186;gec2e1cceae_0_10"/>
           <p:cNvSpPr txBox="1"/>
           <p:nvPr>
             <p:ph idx="1" type="body"/>
@@ -15120,18 +15309,12 @@
               <a:spcAft>
                 <a:spcPts val="0"/>
               </a:spcAft>
-              <a:buClr>
-                <a:schemeClr val="dk2"/>
-              </a:buClr>
               <a:buSzPts val="2200"/>
               <a:buFont typeface="Ubuntu Light"/>
               <a:buChar char="●"/>
             </a:pPr>
             <a:r>
               <a:rPr lang="en" sz="2200">
-                <a:solidFill>
-                  <a:schemeClr val="dk2"/>
-                </a:solidFill>
                 <a:latin typeface="Ubuntu Light"/>
                 <a:ea typeface="Ubuntu Light"/>
                 <a:cs typeface="Ubuntu Light"/>
@@ -15140,9 +15323,6 @@
               <a:t>Summary</a:t>
             </a:r>
             <a:endParaRPr sz="2200">
-              <a:solidFill>
-                <a:schemeClr val="dk2"/>
-              </a:solidFill>
               <a:latin typeface="Ubuntu Light"/>
               <a:ea typeface="Ubuntu Light"/>
               <a:cs typeface="Ubuntu Light"/>
@@ -15157,18 +15337,12 @@
               <a:spcAft>
                 <a:spcPts val="0"/>
               </a:spcAft>
-              <a:buClr>
-                <a:schemeClr val="dk2"/>
-              </a:buClr>
               <a:buSzPts val="2200"/>
               <a:buFont typeface="Ubuntu Light"/>
               <a:buChar char="●"/>
             </a:pPr>
             <a:r>
               <a:rPr lang="en" sz="2200">
-                <a:solidFill>
-                  <a:schemeClr val="dk2"/>
-                </a:solidFill>
                 <a:latin typeface="Ubuntu Light"/>
                 <a:ea typeface="Ubuntu Light"/>
                 <a:cs typeface="Ubuntu Light"/>
@@ -15177,9 +15351,6 @@
               <a:t>Final Report</a:t>
             </a:r>
             <a:endParaRPr sz="2200">
-              <a:solidFill>
-                <a:schemeClr val="dk2"/>
-              </a:solidFill>
               <a:latin typeface="Ubuntu Light"/>
               <a:ea typeface="Ubuntu Light"/>
               <a:cs typeface="Ubuntu Light"/>
@@ -15194,12 +15365,18 @@
               <a:spcAft>
                 <a:spcPts val="0"/>
               </a:spcAft>
+              <a:buClr>
+                <a:schemeClr val="dk2"/>
+              </a:buClr>
               <a:buSzPts val="2200"/>
               <a:buFont typeface="Ubuntu Light"/>
               <a:buChar char="●"/>
             </a:pPr>
             <a:r>
               <a:rPr lang="en" sz="2200">
+                <a:solidFill>
+                  <a:schemeClr val="dk2"/>
+                </a:solidFill>
                 <a:latin typeface="Ubuntu Light"/>
                 <a:ea typeface="Ubuntu Light"/>
                 <a:cs typeface="Ubuntu Light"/>
@@ -15208,6 +15385,9 @@
               <a:t>Known Limitations of Project</a:t>
             </a:r>
             <a:endParaRPr sz="2200">
+              <a:solidFill>
+                <a:schemeClr val="dk2"/>
+              </a:solidFill>
               <a:latin typeface="Ubuntu Light"/>
               <a:ea typeface="Ubuntu Light"/>
               <a:cs typeface="Ubuntu Light"/>
@@ -15266,7 +15446,7 @@
   <p:cSld>
     <p:spTree>
       <p:nvGrpSpPr>
-        <p:cNvPr id="188" name="Shape 188"/>
+        <p:cNvPr id="190" name="Shape 190"/>
         <p:cNvGrpSpPr/>
         <p:nvPr/>
       </p:nvGrpSpPr>
@@ -15280,7 +15460,550 @@
       </p:grpSpPr>
       <p:sp>
         <p:nvSpPr>
-          <p:cNvPr id="189" name="Google Shape;189;p25"/>
+          <p:cNvPr id="191" name="Google Shape;191;p16"/>
+          <p:cNvSpPr txBox="1"/>
+          <p:nvPr>
+            <p:ph type="title"/>
+          </p:nvPr>
+        </p:nvSpPr>
+        <p:spPr>
+          <a:xfrm>
+            <a:off x="311700" y="315925"/>
+            <a:ext cx="8520600" cy="831300"/>
+          </a:xfrm>
+          <a:prstGeom prst="rect">
+            <a:avLst/>
+          </a:prstGeom>
+          <a:noFill/>
+          <a:ln>
+            <a:noFill/>
+          </a:ln>
+        </p:spPr>
+        <p:txBody>
+          <a:bodyPr anchorCtr="0" anchor="b" bIns="91425" lIns="91425" spcFirstLastPara="1" rIns="91425" wrap="square" tIns="91425">
+            <a:normAutofit fontScale="90000"/>
+          </a:bodyPr>
+          <a:lstStyle/>
+          <a:p>
+            <a:pPr indent="0" lvl="0" marL="0" rtl="0" algn="l">
+              <a:lnSpc>
+                <a:spcPct val="100000"/>
+              </a:lnSpc>
+              <a:spcBef>
+                <a:spcPts val="0"/>
+              </a:spcBef>
+              <a:spcAft>
+                <a:spcPts val="0"/>
+              </a:spcAft>
+              <a:buSzPct val="100000"/>
+              <a:buNone/>
+            </a:pPr>
+            <a:r>
+              <a:rPr lang="en">
+                <a:latin typeface="Ubuntu"/>
+                <a:ea typeface="Ubuntu"/>
+                <a:cs typeface="Ubuntu"/>
+                <a:sym typeface="Ubuntu"/>
+              </a:rPr>
+              <a:t>Summary of </a:t>
+            </a:r>
+            <a:r>
+              <a:rPr lang="en">
+                <a:latin typeface="Consolas"/>
+                <a:ea typeface="Consolas"/>
+                <a:cs typeface="Consolas"/>
+                <a:sym typeface="Consolas"/>
+              </a:rPr>
+              <a:t>classification_report</a:t>
+            </a:r>
+            <a:endParaRPr>
+              <a:latin typeface="Consolas"/>
+              <a:ea typeface="Consolas"/>
+              <a:cs typeface="Consolas"/>
+              <a:sym typeface="Consolas"/>
+            </a:endParaRPr>
+          </a:p>
+        </p:txBody>
+      </p:sp>
+      <p:sp>
+        <p:nvSpPr>
+          <p:cNvPr id="192" name="Google Shape;192;p16"/>
+          <p:cNvSpPr txBox="1"/>
+          <p:nvPr>
+            <p:ph idx="1" type="body"/>
+          </p:nvPr>
+        </p:nvSpPr>
+        <p:spPr>
+          <a:xfrm>
+            <a:off x="311700" y="1225225"/>
+            <a:ext cx="8520600" cy="3354000"/>
+          </a:xfrm>
+          <a:prstGeom prst="rect">
+            <a:avLst/>
+          </a:prstGeom>
+          <a:noFill/>
+          <a:ln>
+            <a:noFill/>
+          </a:ln>
+        </p:spPr>
+        <p:txBody>
+          <a:bodyPr anchorCtr="0" anchor="t" bIns="91425" lIns="91425" spcFirstLastPara="1" rIns="91425" wrap="square" tIns="91425">
+            <a:normAutofit/>
+          </a:bodyPr>
+          <a:lstStyle/>
+          <a:p>
+            <a:pPr indent="-342900" lvl="0" marL="457200" rtl="0" algn="l">
+              <a:lnSpc>
+                <a:spcPct val="115000"/>
+              </a:lnSpc>
+              <a:spcBef>
+                <a:spcPts val="1200"/>
+              </a:spcBef>
+              <a:spcAft>
+                <a:spcPts val="0"/>
+              </a:spcAft>
+              <a:buSzPts val="1800"/>
+              <a:buFont typeface="Ubuntu"/>
+              <a:buChar char="●"/>
+            </a:pPr>
+            <a:r>
+              <a:t/>
+            </a:r>
+            <a:endParaRPr>
+              <a:latin typeface="Ubuntu"/>
+              <a:ea typeface="Ubuntu"/>
+              <a:cs typeface="Ubuntu"/>
+              <a:sym typeface="Ubuntu"/>
+            </a:endParaRPr>
+          </a:p>
+        </p:txBody>
+      </p:sp>
+    </p:spTree>
+  </p:cSld>
+  <p:clrMapOvr>
+    <a:masterClrMapping/>
+  </p:clrMapOvr>
+</p:sld>
+</file>
+
+<file path=ppt/slides/slide22.xml><?xml version="1.0" encoding="utf-8"?>
+<p:sld xmlns:a="http://schemas.openxmlformats.org/drawingml/2006/main" xmlns:r="http://schemas.openxmlformats.org/officeDocument/2006/relationships" xmlns:mc="http://schemas.openxmlformats.org/markup-compatibility/2006" xmlns:mv="urn:schemas-microsoft-com:mac:vml" xmlns:p="http://schemas.openxmlformats.org/presentationml/2006/main" xmlns:c="http://schemas.openxmlformats.org/drawingml/2006/chart" xmlns:dgm="http://schemas.openxmlformats.org/drawingml/2006/diagram" xmlns:o="urn:schemas-microsoft-com:office:office" xmlns:v="urn:schemas-microsoft-com:vml" xmlns:pvml="urn:schemas-microsoft-com:office:powerpoint" xmlns:com="http://schemas.openxmlformats.org/drawingml/2006/compatibility" xmlns:p14="http://schemas.microsoft.com/office/powerpoint/2010/main" xmlns:p15="http://schemas.microsoft.com/office/powerpoint/2012/main" xmlns:ahyp="http://schemas.microsoft.com/office/drawing/2018/hyperlinkcolor">
+  <p:cSld>
+    <p:spTree>
+      <p:nvGrpSpPr>
+        <p:cNvPr id="196" name="Shape 196"/>
+        <p:cNvGrpSpPr/>
+        <p:nvPr/>
+      </p:nvGrpSpPr>
+      <p:grpSpPr>
+        <a:xfrm>
+          <a:off x="0" y="0"/>
+          <a:ext cx="0" cy="0"/>
+          <a:chOff x="0" y="0"/>
+          <a:chExt cx="0" cy="0"/>
+        </a:xfrm>
+      </p:grpSpPr>
+      <p:sp>
+        <p:nvSpPr>
+          <p:cNvPr id="197" name="Google Shape;197;gec2e1cceae_0_20"/>
+          <p:cNvSpPr txBox="1"/>
+          <p:nvPr>
+            <p:ph type="title"/>
+          </p:nvPr>
+        </p:nvSpPr>
+        <p:spPr>
+          <a:xfrm>
+            <a:off x="311700" y="315925"/>
+            <a:ext cx="8520600" cy="831300"/>
+          </a:xfrm>
+          <a:prstGeom prst="rect">
+            <a:avLst/>
+          </a:prstGeom>
+          <a:noFill/>
+          <a:ln>
+            <a:noFill/>
+          </a:ln>
+        </p:spPr>
+        <p:txBody>
+          <a:bodyPr anchorCtr="0" anchor="b" bIns="91425" lIns="91425" spcFirstLastPara="1" rIns="91425" wrap="square" tIns="91425">
+            <a:normAutofit/>
+          </a:bodyPr>
+          <a:lstStyle/>
+          <a:p>
+            <a:pPr indent="0" lvl="0" marL="0" rtl="0" algn="l">
+              <a:lnSpc>
+                <a:spcPct val="100000"/>
+              </a:lnSpc>
+              <a:spcBef>
+                <a:spcPts val="0"/>
+              </a:spcBef>
+              <a:spcAft>
+                <a:spcPts val="0"/>
+              </a:spcAft>
+              <a:buSzPts val="4200"/>
+              <a:buNone/>
+            </a:pPr>
+            <a:r>
+              <a:rPr lang="en">
+                <a:latin typeface="Ubuntu"/>
+                <a:ea typeface="Ubuntu"/>
+                <a:cs typeface="Ubuntu"/>
+                <a:sym typeface="Ubuntu"/>
+              </a:rPr>
+              <a:t>AGENDA</a:t>
+            </a:r>
+            <a:endParaRPr>
+              <a:latin typeface="Ubuntu"/>
+              <a:ea typeface="Ubuntu"/>
+              <a:cs typeface="Ubuntu"/>
+              <a:sym typeface="Ubuntu"/>
+            </a:endParaRPr>
+          </a:p>
+        </p:txBody>
+      </p:sp>
+      <p:sp>
+        <p:nvSpPr>
+          <p:cNvPr id="198" name="Google Shape;198;gec2e1cceae_0_20"/>
+          <p:cNvSpPr txBox="1"/>
+          <p:nvPr>
+            <p:ph idx="1" type="body"/>
+          </p:nvPr>
+        </p:nvSpPr>
+        <p:spPr>
+          <a:xfrm>
+            <a:off x="311700" y="1225225"/>
+            <a:ext cx="8520600" cy="3354000"/>
+          </a:xfrm>
+          <a:prstGeom prst="rect">
+            <a:avLst/>
+          </a:prstGeom>
+          <a:noFill/>
+          <a:ln>
+            <a:noFill/>
+          </a:ln>
+        </p:spPr>
+        <p:txBody>
+          <a:bodyPr anchorCtr="0" anchor="t" bIns="91425" lIns="91425" spcFirstLastPara="1" rIns="91425" wrap="square" tIns="91425">
+            <a:normAutofit/>
+          </a:bodyPr>
+          <a:lstStyle/>
+          <a:p>
+            <a:pPr indent="-368300" lvl="0" marL="457200" rtl="0" algn="l">
+              <a:spcBef>
+                <a:spcPts val="0"/>
+              </a:spcBef>
+              <a:spcAft>
+                <a:spcPts val="0"/>
+              </a:spcAft>
+              <a:buClr>
+                <a:schemeClr val="dk2"/>
+              </a:buClr>
+              <a:buSzPts val="2200"/>
+              <a:buFont typeface="Ubuntu Light"/>
+              <a:buChar char="●"/>
+            </a:pPr>
+            <a:r>
+              <a:rPr lang="en" sz="2200">
+                <a:solidFill>
+                  <a:schemeClr val="dk2"/>
+                </a:solidFill>
+                <a:latin typeface="Ubuntu Light"/>
+                <a:ea typeface="Ubuntu Light"/>
+                <a:cs typeface="Ubuntu Light"/>
+                <a:sym typeface="Ubuntu Light"/>
+              </a:rPr>
+              <a:t>Project Overview</a:t>
+            </a:r>
+            <a:endParaRPr sz="2200">
+              <a:solidFill>
+                <a:schemeClr val="dk2"/>
+              </a:solidFill>
+              <a:latin typeface="Ubuntu Light"/>
+              <a:ea typeface="Ubuntu Light"/>
+              <a:cs typeface="Ubuntu Light"/>
+              <a:sym typeface="Ubuntu Light"/>
+            </a:endParaRPr>
+          </a:p>
+          <a:p>
+            <a:pPr indent="-368300" lvl="0" marL="457200" rtl="0" algn="l">
+              <a:spcBef>
+                <a:spcPts val="0"/>
+              </a:spcBef>
+              <a:spcAft>
+                <a:spcPts val="0"/>
+              </a:spcAft>
+              <a:buClr>
+                <a:schemeClr val="dk2"/>
+              </a:buClr>
+              <a:buSzPts val="2200"/>
+              <a:buFont typeface="Ubuntu Light"/>
+              <a:buChar char="●"/>
+            </a:pPr>
+            <a:r>
+              <a:rPr lang="en" sz="2200">
+                <a:solidFill>
+                  <a:schemeClr val="dk2"/>
+                </a:solidFill>
+                <a:latin typeface="Ubuntu Light"/>
+                <a:ea typeface="Ubuntu Light"/>
+                <a:cs typeface="Ubuntu Light"/>
+                <a:sym typeface="Ubuntu Light"/>
+              </a:rPr>
+              <a:t>Data Overview</a:t>
+            </a:r>
+            <a:endParaRPr sz="2200">
+              <a:solidFill>
+                <a:schemeClr val="dk2"/>
+              </a:solidFill>
+              <a:latin typeface="Ubuntu Light"/>
+              <a:ea typeface="Ubuntu Light"/>
+              <a:cs typeface="Ubuntu Light"/>
+              <a:sym typeface="Ubuntu Light"/>
+            </a:endParaRPr>
+          </a:p>
+          <a:p>
+            <a:pPr indent="-368300" lvl="0" marL="457200" rtl="0" algn="l">
+              <a:spcBef>
+                <a:spcPts val="0"/>
+              </a:spcBef>
+              <a:spcAft>
+                <a:spcPts val="0"/>
+              </a:spcAft>
+              <a:buClr>
+                <a:schemeClr val="dk2"/>
+              </a:buClr>
+              <a:buSzPts val="2200"/>
+              <a:buFont typeface="Ubuntu Light"/>
+              <a:buChar char="●"/>
+            </a:pPr>
+            <a:r>
+              <a:rPr lang="en" sz="2200">
+                <a:solidFill>
+                  <a:schemeClr val="dk2"/>
+                </a:solidFill>
+                <a:latin typeface="Ubuntu Light"/>
+                <a:ea typeface="Ubuntu Light"/>
+                <a:cs typeface="Ubuntu Light"/>
+                <a:sym typeface="Ubuntu Light"/>
+              </a:rPr>
+              <a:t>EDA and Pipeline Set Up</a:t>
+            </a:r>
+            <a:endParaRPr sz="2200">
+              <a:solidFill>
+                <a:schemeClr val="dk2"/>
+              </a:solidFill>
+              <a:latin typeface="Ubuntu Light"/>
+              <a:ea typeface="Ubuntu Light"/>
+              <a:cs typeface="Ubuntu Light"/>
+              <a:sym typeface="Ubuntu Light"/>
+            </a:endParaRPr>
+          </a:p>
+          <a:p>
+            <a:pPr indent="-368300" lvl="0" marL="457200" rtl="0" algn="l">
+              <a:spcBef>
+                <a:spcPts val="0"/>
+              </a:spcBef>
+              <a:spcAft>
+                <a:spcPts val="0"/>
+              </a:spcAft>
+              <a:buClr>
+                <a:schemeClr val="dk2"/>
+              </a:buClr>
+              <a:buSzPts val="2200"/>
+              <a:buFont typeface="Ubuntu Light"/>
+              <a:buChar char="●"/>
+            </a:pPr>
+            <a:r>
+              <a:rPr lang="en" sz="2200">
+                <a:solidFill>
+                  <a:schemeClr val="dk2"/>
+                </a:solidFill>
+                <a:latin typeface="Ubuntu Light"/>
+                <a:ea typeface="Ubuntu Light"/>
+                <a:cs typeface="Ubuntu Light"/>
+                <a:sym typeface="Ubuntu Light"/>
+              </a:rPr>
+              <a:t>ML Algorithms</a:t>
+            </a:r>
+            <a:endParaRPr sz="2200">
+              <a:solidFill>
+                <a:schemeClr val="dk2"/>
+              </a:solidFill>
+              <a:latin typeface="Ubuntu Light"/>
+              <a:ea typeface="Ubuntu Light"/>
+              <a:cs typeface="Ubuntu Light"/>
+              <a:sym typeface="Ubuntu Light"/>
+            </a:endParaRPr>
+          </a:p>
+          <a:p>
+            <a:pPr indent="-368300" lvl="0" marL="457200" rtl="0" algn="l">
+              <a:spcBef>
+                <a:spcPts val="0"/>
+              </a:spcBef>
+              <a:spcAft>
+                <a:spcPts val="0"/>
+              </a:spcAft>
+              <a:buClr>
+                <a:schemeClr val="dk2"/>
+              </a:buClr>
+              <a:buSzPts val="2200"/>
+              <a:buFont typeface="Ubuntu Light"/>
+              <a:buChar char="●"/>
+            </a:pPr>
+            <a:r>
+              <a:rPr lang="en" sz="2200">
+                <a:solidFill>
+                  <a:schemeClr val="dk2"/>
+                </a:solidFill>
+                <a:latin typeface="Ubuntu Light"/>
+                <a:ea typeface="Ubuntu Light"/>
+                <a:cs typeface="Ubuntu Light"/>
+                <a:sym typeface="Ubuntu Light"/>
+              </a:rPr>
+              <a:t>Summary</a:t>
+            </a:r>
+            <a:endParaRPr sz="2200">
+              <a:solidFill>
+                <a:schemeClr val="dk2"/>
+              </a:solidFill>
+              <a:latin typeface="Ubuntu Light"/>
+              <a:ea typeface="Ubuntu Light"/>
+              <a:cs typeface="Ubuntu Light"/>
+              <a:sym typeface="Ubuntu Light"/>
+            </a:endParaRPr>
+          </a:p>
+          <a:p>
+            <a:pPr indent="-368300" lvl="0" marL="457200" rtl="0" algn="l">
+              <a:spcBef>
+                <a:spcPts val="0"/>
+              </a:spcBef>
+              <a:spcAft>
+                <a:spcPts val="0"/>
+              </a:spcAft>
+              <a:buClr>
+                <a:schemeClr val="dk2"/>
+              </a:buClr>
+              <a:buSzPts val="2200"/>
+              <a:buFont typeface="Ubuntu Light"/>
+              <a:buChar char="●"/>
+            </a:pPr>
+            <a:r>
+              <a:rPr lang="en" sz="2200">
+                <a:solidFill>
+                  <a:schemeClr val="dk2"/>
+                </a:solidFill>
+                <a:latin typeface="Ubuntu Light"/>
+                <a:ea typeface="Ubuntu Light"/>
+                <a:cs typeface="Ubuntu Light"/>
+                <a:sym typeface="Ubuntu Light"/>
+              </a:rPr>
+              <a:t>Final Report</a:t>
+            </a:r>
+            <a:endParaRPr sz="2200">
+              <a:solidFill>
+                <a:schemeClr val="dk2"/>
+              </a:solidFill>
+              <a:latin typeface="Ubuntu Light"/>
+              <a:ea typeface="Ubuntu Light"/>
+              <a:cs typeface="Ubuntu Light"/>
+              <a:sym typeface="Ubuntu Light"/>
+            </a:endParaRPr>
+          </a:p>
+          <a:p>
+            <a:pPr indent="-368300" lvl="0" marL="457200" rtl="0" algn="l">
+              <a:spcBef>
+                <a:spcPts val="0"/>
+              </a:spcBef>
+              <a:spcAft>
+                <a:spcPts val="0"/>
+              </a:spcAft>
+              <a:buSzPts val="2200"/>
+              <a:buFont typeface="Ubuntu Light"/>
+              <a:buChar char="●"/>
+            </a:pPr>
+            <a:r>
+              <a:rPr lang="en" sz="2200">
+                <a:latin typeface="Ubuntu Light"/>
+                <a:ea typeface="Ubuntu Light"/>
+                <a:cs typeface="Ubuntu Light"/>
+                <a:sym typeface="Ubuntu Light"/>
+              </a:rPr>
+              <a:t>Known Limitations of Project</a:t>
+            </a:r>
+            <a:endParaRPr sz="2200">
+              <a:latin typeface="Ubuntu Light"/>
+              <a:ea typeface="Ubuntu Light"/>
+              <a:cs typeface="Ubuntu Light"/>
+              <a:sym typeface="Ubuntu Light"/>
+            </a:endParaRPr>
+          </a:p>
+          <a:p>
+            <a:pPr indent="-368300" lvl="0" marL="457200" rtl="0" algn="l">
+              <a:spcBef>
+                <a:spcPts val="0"/>
+              </a:spcBef>
+              <a:spcAft>
+                <a:spcPts val="0"/>
+              </a:spcAft>
+              <a:buClr>
+                <a:schemeClr val="dk2"/>
+              </a:buClr>
+              <a:buSzPts val="2200"/>
+              <a:buFont typeface="Ubuntu Light"/>
+              <a:buChar char="●"/>
+            </a:pPr>
+            <a:r>
+              <a:rPr lang="en" sz="2200">
+                <a:solidFill>
+                  <a:schemeClr val="dk2"/>
+                </a:solidFill>
+                <a:latin typeface="Ubuntu Light"/>
+                <a:ea typeface="Ubuntu Light"/>
+                <a:cs typeface="Ubuntu Light"/>
+                <a:sym typeface="Ubuntu Light"/>
+              </a:rPr>
+              <a:t>Potential Future Development</a:t>
+            </a:r>
+            <a:endParaRPr>
+              <a:solidFill>
+                <a:schemeClr val="dk2"/>
+              </a:solidFill>
+              <a:latin typeface="Ubuntu Light"/>
+              <a:ea typeface="Ubuntu Light"/>
+              <a:cs typeface="Ubuntu Light"/>
+              <a:sym typeface="Ubuntu Light"/>
+            </a:endParaRPr>
+          </a:p>
+        </p:txBody>
+      </p:sp>
+    </p:spTree>
+  </p:cSld>
+  <p:clrMapOvr>
+    <a:masterClrMapping/>
+  </p:clrMapOvr>
+</p:sld>
+</file>
+
+<file path=ppt/slides/slide23.xml><?xml version="1.0" encoding="utf-8"?>
+<p:sld xmlns:a="http://schemas.openxmlformats.org/drawingml/2006/main" xmlns:r="http://schemas.openxmlformats.org/officeDocument/2006/relationships" xmlns:mc="http://schemas.openxmlformats.org/markup-compatibility/2006" xmlns:mv="urn:schemas-microsoft-com:mac:vml" xmlns:p="http://schemas.openxmlformats.org/presentationml/2006/main" xmlns:c="http://schemas.openxmlformats.org/drawingml/2006/chart" xmlns:dgm="http://schemas.openxmlformats.org/drawingml/2006/diagram" xmlns:o="urn:schemas-microsoft-com:office:office" xmlns:v="urn:schemas-microsoft-com:vml" xmlns:pvml="urn:schemas-microsoft-com:office:powerpoint" xmlns:com="http://schemas.openxmlformats.org/drawingml/2006/compatibility" xmlns:p14="http://schemas.microsoft.com/office/powerpoint/2010/main" xmlns:p15="http://schemas.microsoft.com/office/powerpoint/2012/main" xmlns:ahyp="http://schemas.microsoft.com/office/drawing/2018/hyperlinkcolor">
+  <p:cSld>
+    <p:spTree>
+      <p:nvGrpSpPr>
+        <p:cNvPr id="202" name="Shape 202"/>
+        <p:cNvGrpSpPr/>
+        <p:nvPr/>
+      </p:nvGrpSpPr>
+      <p:grpSpPr>
+        <a:xfrm>
+          <a:off x="0" y="0"/>
+          <a:ext cx="0" cy="0"/>
+          <a:chOff x="0" y="0"/>
+          <a:chExt cx="0" cy="0"/>
+        </a:xfrm>
+      </p:grpSpPr>
+      <p:sp>
+        <p:nvSpPr>
+          <p:cNvPr id="203" name="Google Shape;203;p25"/>
           <p:cNvSpPr txBox="1"/>
           <p:nvPr>
             <p:ph type="title"/>
@@ -15338,7 +16061,7 @@
       </p:sp>
       <p:sp>
         <p:nvSpPr>
-          <p:cNvPr id="190" name="Google Shape;190;p25"/>
+          <p:cNvPr id="204" name="Google Shape;204;p25"/>
           <p:cNvSpPr txBox="1"/>
           <p:nvPr>
             <p:ph idx="1" type="body"/>
@@ -15397,12 +16120,12 @@
 </p:sld>
 </file>
 
-<file path=ppt/slides/slide22.xml><?xml version="1.0" encoding="utf-8"?>
+<file path=ppt/slides/slide24.xml><?xml version="1.0" encoding="utf-8"?>
 <p:sld xmlns:a="http://schemas.openxmlformats.org/drawingml/2006/main" xmlns:r="http://schemas.openxmlformats.org/officeDocument/2006/relationships" xmlns:mc="http://schemas.openxmlformats.org/markup-compatibility/2006" xmlns:mv="urn:schemas-microsoft-com:mac:vml" xmlns:p="http://schemas.openxmlformats.org/presentationml/2006/main" xmlns:c="http://schemas.openxmlformats.org/drawingml/2006/chart" xmlns:dgm="http://schemas.openxmlformats.org/drawingml/2006/diagram" xmlns:o="urn:schemas-microsoft-com:office:office" xmlns:v="urn:schemas-microsoft-com:vml" xmlns:pvml="urn:schemas-microsoft-com:office:powerpoint" xmlns:com="http://schemas.openxmlformats.org/drawingml/2006/compatibility" xmlns:p14="http://schemas.microsoft.com/office/powerpoint/2010/main" xmlns:p15="http://schemas.microsoft.com/office/powerpoint/2012/main" xmlns:ahyp="http://schemas.microsoft.com/office/drawing/2018/hyperlinkcolor">
   <p:cSld>
     <p:spTree>
       <p:nvGrpSpPr>
-        <p:cNvPr id="194" name="Shape 194"/>
+        <p:cNvPr id="208" name="Shape 208"/>
         <p:cNvGrpSpPr/>
         <p:nvPr/>
       </p:nvGrpSpPr>
@@ -15416,7 +16139,7 @@
       </p:grpSpPr>
       <p:sp>
         <p:nvSpPr>
-          <p:cNvPr id="195" name="Google Shape;195;gec2e1cceae_0_25"/>
+          <p:cNvPr id="209" name="Google Shape;209;gec2e1cceae_0_25"/>
           <p:cNvSpPr txBox="1"/>
           <p:nvPr>
             <p:ph type="title"/>
@@ -15474,7 +16197,7 @@
       </p:sp>
       <p:sp>
         <p:nvSpPr>
-          <p:cNvPr id="196" name="Google Shape;196;gec2e1cceae_0_25"/>
+          <p:cNvPr id="210" name="Google Shape;210;gec2e1cceae_0_25"/>
           <p:cNvSpPr txBox="1"/>
           <p:nvPr>
             <p:ph idx="1" type="body"/>
@@ -15795,12 +16518,12 @@
 </p:sld>
 </file>
 
-<file path=ppt/slides/slide23.xml><?xml version="1.0" encoding="utf-8"?>
+<file path=ppt/slides/slide25.xml><?xml version="1.0" encoding="utf-8"?>
 <p:sld xmlns:a="http://schemas.openxmlformats.org/drawingml/2006/main" xmlns:r="http://schemas.openxmlformats.org/officeDocument/2006/relationships" xmlns:mc="http://schemas.openxmlformats.org/markup-compatibility/2006" xmlns:mv="urn:schemas-microsoft-com:mac:vml" xmlns:p="http://schemas.openxmlformats.org/presentationml/2006/main" xmlns:c="http://schemas.openxmlformats.org/drawingml/2006/chart" xmlns:dgm="http://schemas.openxmlformats.org/drawingml/2006/diagram" xmlns:o="urn:schemas-microsoft-com:office:office" xmlns:v="urn:schemas-microsoft-com:vml" xmlns:pvml="urn:schemas-microsoft-com:office:powerpoint" xmlns:com="http://schemas.openxmlformats.org/drawingml/2006/compatibility" xmlns:p14="http://schemas.microsoft.com/office/powerpoint/2010/main" xmlns:p15="http://schemas.microsoft.com/office/powerpoint/2012/main" xmlns:ahyp="http://schemas.microsoft.com/office/drawing/2018/hyperlinkcolor">
   <p:cSld>
     <p:spTree>
       <p:nvGrpSpPr>
-        <p:cNvPr id="200" name="Shape 200"/>
+        <p:cNvPr id="214" name="Shape 214"/>
         <p:cNvGrpSpPr/>
         <p:nvPr/>
       </p:nvGrpSpPr>
@@ -15814,7 +16537,7 @@
       </p:grpSpPr>
       <p:sp>
         <p:nvSpPr>
-          <p:cNvPr id="201" name="Google Shape;201;p40"/>
+          <p:cNvPr id="215" name="Google Shape;215;p40"/>
           <p:cNvSpPr txBox="1"/>
           <p:nvPr>
             <p:ph type="title"/>
@@ -15872,7 +16595,7 @@
       </p:sp>
       <p:sp>
         <p:nvSpPr>
-          <p:cNvPr id="202" name="Google Shape;202;p40"/>
+          <p:cNvPr id="216" name="Google Shape;216;p40"/>
           <p:cNvSpPr txBox="1"/>
           <p:nvPr>
             <p:ph idx="1" type="body"/>
@@ -15923,6 +16646,40 @@
                 <a:hlinkClick r:id="rId3"/>
               </a:rPr>
               <a:t>https://www.kaggle.com/rashikrahmanpritom/heart-attack-analysis-prediction-dataset</a:t>
+            </a:r>
+            <a:endParaRPr sz="1500">
+              <a:latin typeface="Ubuntu Light"/>
+              <a:ea typeface="Ubuntu Light"/>
+              <a:cs typeface="Ubuntu Light"/>
+              <a:sym typeface="Ubuntu Light"/>
+            </a:endParaRPr>
+          </a:p>
+          <a:p>
+            <a:pPr indent="-323850" lvl="0" marL="457200" rtl="0" algn="l">
+              <a:lnSpc>
+                <a:spcPct val="115000"/>
+              </a:lnSpc>
+              <a:spcBef>
+                <a:spcPts val="0"/>
+              </a:spcBef>
+              <a:spcAft>
+                <a:spcPts val="0"/>
+              </a:spcAft>
+              <a:buSzPts val="1500"/>
+              <a:buFont typeface="Ubuntu Light"/>
+              <a:buAutoNum type="arabicPeriod"/>
+            </a:pPr>
+            <a:r>
+              <a:rPr lang="en" sz="1500" u="sng">
+                <a:solidFill>
+                  <a:schemeClr val="hlink"/>
+                </a:solidFill>
+                <a:latin typeface="Ubuntu Light"/>
+                <a:ea typeface="Ubuntu Light"/>
+                <a:cs typeface="Ubuntu Light"/>
+                <a:sym typeface="Ubuntu Light"/>
+              </a:rPr>
+              <a:t>https://archive.ics.uci.edu/ml/datasets/Heart+Disease</a:t>
             </a:r>
             <a:endParaRPr sz="1500">
               <a:latin typeface="Ubuntu Light"/>
@@ -16531,7 +17288,7 @@
                 <a:cs typeface="Ubuntu Light"/>
                 <a:sym typeface="Ubuntu Light"/>
               </a:rPr>
-              <a:t>1</a:t>
+              <a:t>1 </a:t>
             </a:r>
             <a:endParaRPr baseline="30000" sz="2000">
               <a:latin typeface="Ubuntu Light"/>
@@ -16559,7 +17316,7 @@
                 <a:cs typeface="Ubuntu Light"/>
                 <a:sym typeface="Ubuntu Light"/>
               </a:rPr>
-              <a:t>Public repository available for download on Github </a:t>
+              <a:t>Originally sourced from UCI Machine Learning Repository </a:t>
             </a:r>
             <a:r>
               <a:rPr baseline="30000" lang="en" sz="2000">
@@ -16569,6 +17326,43 @@
                 <a:sym typeface="Ubuntu Light"/>
               </a:rPr>
               <a:t>2</a:t>
+            </a:r>
+            <a:endParaRPr sz="2000">
+              <a:latin typeface="Ubuntu Light"/>
+              <a:ea typeface="Ubuntu Light"/>
+              <a:cs typeface="Ubuntu Light"/>
+              <a:sym typeface="Ubuntu Light"/>
+            </a:endParaRPr>
+          </a:p>
+          <a:p>
+            <a:pPr indent="-355600" lvl="0" marL="457200" rtl="0" algn="l">
+              <a:spcBef>
+                <a:spcPts val="0"/>
+              </a:spcBef>
+              <a:spcAft>
+                <a:spcPts val="0"/>
+              </a:spcAft>
+              <a:buSzPts val="2000"/>
+              <a:buFont typeface="Ubuntu Light"/>
+              <a:buChar char="●"/>
+            </a:pPr>
+            <a:r>
+              <a:rPr lang="en" sz="2000">
+                <a:latin typeface="Ubuntu Light"/>
+                <a:ea typeface="Ubuntu Light"/>
+                <a:cs typeface="Ubuntu Light"/>
+                <a:sym typeface="Ubuntu Light"/>
+              </a:rPr>
+              <a:t>Public repository available for download on Github </a:t>
+            </a:r>
+            <a:r>
+              <a:rPr baseline="30000" lang="en" sz="2000">
+                <a:latin typeface="Ubuntu Light"/>
+                <a:ea typeface="Ubuntu Light"/>
+                <a:cs typeface="Ubuntu Light"/>
+                <a:sym typeface="Ubuntu Light"/>
+              </a:rPr>
+              <a:t>3</a:t>
             </a:r>
             <a:endParaRPr baseline="30000" sz="2000">
               <a:latin typeface="Ubuntu Light"/>

</xml_diff>

<commit_message>
Added hypertuning of RF
</commit_message>
<xml_diff>
--- a/documents/DSCI 631 Final Project Presentation.pptx
+++ b/documents/DSCI 631 Final Project Presentation.pptx
@@ -2,68 +2,69 @@
 <file path=ppt/presentation.xml><?xml version="1.0" encoding="utf-8"?>
 <p:presentation xmlns:a="http://schemas.openxmlformats.org/drawingml/2006/main" xmlns:r="http://schemas.openxmlformats.org/officeDocument/2006/relationships" xmlns:mc="http://schemas.openxmlformats.org/markup-compatibility/2006" xmlns:mv="urn:schemas-microsoft-com:mac:vml" xmlns:p="http://schemas.openxmlformats.org/presentationml/2006/main" xmlns:c="http://schemas.openxmlformats.org/drawingml/2006/chart" xmlns:dgm="http://schemas.openxmlformats.org/drawingml/2006/diagram" xmlns:o="urn:schemas-microsoft-com:office:office" xmlns:v="urn:schemas-microsoft-com:vml" xmlns:pvml="urn:schemas-microsoft-com:office:powerpoint" xmlns:com="http://schemas.openxmlformats.org/drawingml/2006/compatibility" xmlns:p14="http://schemas.microsoft.com/office/powerpoint/2010/main" xmlns:p15="http://schemas.microsoft.com/office/powerpoint/2012/main" xmlns:ahyp="http://schemas.microsoft.com/office/drawing/2018/hyperlinkcolor" autoCompressPictures="0" embedTrueTypeFonts="1" strictFirstAndLastChars="0" saveSubsetFonts="1">
   <p:sldMasterIdLst>
-    <p:sldMasterId id="2147483648" r:id="rId4"/>
+    <p:sldMasterId id="2147483648" r:id="rId5"/>
   </p:sldMasterIdLst>
   <p:notesMasterIdLst>
-    <p:notesMasterId r:id="rId5"/>
+    <p:notesMasterId r:id="rId6"/>
   </p:notesMasterIdLst>
   <p:sldIdLst>
-    <p:sldId id="256" r:id="rId6"/>
-    <p:sldId id="257" r:id="rId7"/>
-    <p:sldId id="258" r:id="rId8"/>
-    <p:sldId id="259" r:id="rId9"/>
-    <p:sldId id="260" r:id="rId10"/>
-    <p:sldId id="261" r:id="rId11"/>
-    <p:sldId id="262" r:id="rId12"/>
-    <p:sldId id="263" r:id="rId13"/>
-    <p:sldId id="264" r:id="rId14"/>
-    <p:sldId id="265" r:id="rId15"/>
-    <p:sldId id="266" r:id="rId16"/>
-    <p:sldId id="267" r:id="rId17"/>
-    <p:sldId id="268" r:id="rId18"/>
-    <p:sldId id="269" r:id="rId19"/>
-    <p:sldId id="270" r:id="rId20"/>
-    <p:sldId id="271" r:id="rId21"/>
-    <p:sldId id="272" r:id="rId22"/>
-    <p:sldId id="273" r:id="rId23"/>
-    <p:sldId id="274" r:id="rId24"/>
-    <p:sldId id="275" r:id="rId25"/>
-    <p:sldId id="276" r:id="rId26"/>
-    <p:sldId id="277" r:id="rId27"/>
-    <p:sldId id="278" r:id="rId28"/>
-    <p:sldId id="279" r:id="rId29"/>
-    <p:sldId id="280" r:id="rId30"/>
+    <p:sldId id="256" r:id="rId7"/>
+    <p:sldId id="257" r:id="rId8"/>
+    <p:sldId id="258" r:id="rId9"/>
+    <p:sldId id="259" r:id="rId10"/>
+    <p:sldId id="260" r:id="rId11"/>
+    <p:sldId id="261" r:id="rId12"/>
+    <p:sldId id="262" r:id="rId13"/>
+    <p:sldId id="263" r:id="rId14"/>
+    <p:sldId id="264" r:id="rId15"/>
+    <p:sldId id="265" r:id="rId16"/>
+    <p:sldId id="266" r:id="rId17"/>
+    <p:sldId id="267" r:id="rId18"/>
+    <p:sldId id="268" r:id="rId19"/>
+    <p:sldId id="269" r:id="rId20"/>
+    <p:sldId id="270" r:id="rId21"/>
+    <p:sldId id="271" r:id="rId22"/>
+    <p:sldId id="272" r:id="rId23"/>
+    <p:sldId id="273" r:id="rId24"/>
+    <p:sldId id="274" r:id="rId25"/>
+    <p:sldId id="275" r:id="rId26"/>
+    <p:sldId id="276" r:id="rId27"/>
+    <p:sldId id="277" r:id="rId28"/>
+    <p:sldId id="278" r:id="rId29"/>
+    <p:sldId id="279" r:id="rId30"/>
+    <p:sldId id="280" r:id="rId31"/>
+    <p:sldId id="281" r:id="rId32"/>
   </p:sldIdLst>
   <p:sldSz cy="5143500" cx="9144000"/>
   <p:notesSz cx="6858000" cy="9144000"/>
   <p:embeddedFontLst>
     <p:embeddedFont>
       <p:font typeface="Ubuntu"/>
-      <p:regular r:id="rId31"/>
-      <p:bold r:id="rId32"/>
-      <p:italic r:id="rId33"/>
-      <p:boldItalic r:id="rId34"/>
+      <p:regular r:id="rId33"/>
+      <p:bold r:id="rId34"/>
+      <p:italic r:id="rId35"/>
+      <p:boldItalic r:id="rId36"/>
     </p:embeddedFont>
     <p:embeddedFont>
       <p:font typeface="Ubuntu Light"/>
-      <p:regular r:id="rId35"/>
-      <p:bold r:id="rId36"/>
-      <p:italic r:id="rId37"/>
-      <p:boldItalic r:id="rId38"/>
+      <p:regular r:id="rId37"/>
+      <p:bold r:id="rId38"/>
+      <p:italic r:id="rId39"/>
+      <p:boldItalic r:id="rId40"/>
     </p:embeddedFont>
     <p:embeddedFont>
       <p:font typeface="Economica"/>
-      <p:regular r:id="rId39"/>
-      <p:bold r:id="rId40"/>
-      <p:italic r:id="rId41"/>
-      <p:boldItalic r:id="rId42"/>
+      <p:regular r:id="rId41"/>
+      <p:bold r:id="rId42"/>
+      <p:italic r:id="rId43"/>
+      <p:boldItalic r:id="rId44"/>
     </p:embeddedFont>
     <p:embeddedFont>
       <p:font typeface="Open Sans"/>
-      <p:regular r:id="rId43"/>
-      <p:bold r:id="rId44"/>
-      <p:italic r:id="rId45"/>
-      <p:boldItalic r:id="rId46"/>
+      <p:regular r:id="rId45"/>
+      <p:bold r:id="rId46"/>
+      <p:italic r:id="rId47"/>
+      <p:boldItalic r:id="rId48"/>
     </p:embeddedFont>
   </p:embeddedFontLst>
   <p:defaultTextStyle>
@@ -311,7 +312,7 @@
       </p15:sldGuideLst>
     </p:ext>
     <p:ext uri="http://customooxmlschemas.google.com/">
-      <go:slidesCustomData xmlns:go="http://customooxmlschemas.google.com/" r:id="rId47" roundtripDataSignature="AMtx7mirBfROewmV/Y8xShHX3lBld/2buA=="/>
+      <go:slidesCustomData xmlns:go="http://customooxmlschemas.google.com/" r:id="rId49" roundtripDataSignature="AMtx7mgqphWjFLhbkVsTYQf+b77XAZhvmA=="/>
     </p:ext>
   </p:extLst>
 </p:presentation>
@@ -2265,7 +2266,7 @@
       </p:grpSpPr>
       <p:sp>
         <p:nvSpPr>
-          <p:cNvPr id="182" name="Google Shape;182;gec2e1cceae_0_10:notes"/>
+          <p:cNvPr id="182" name="Google Shape;182;gec2e1cceae_0_140:notes"/>
           <p:cNvSpPr/>
           <p:nvPr>
             <p:ph idx="2" type="sldImg"/>
@@ -2310,7 +2311,7 @@
       </p:sp>
       <p:sp>
         <p:nvSpPr>
-          <p:cNvPr id="183" name="Google Shape;183;gec2e1cceae_0_10:notes"/>
+          <p:cNvPr id="183" name="Google Shape;183;gec2e1cceae_0_140:notes"/>
           <p:cNvSpPr txBox="1"/>
           <p:nvPr>
             <p:ph idx="1" type="body"/>
@@ -2382,7 +2383,7 @@
       </p:grpSpPr>
       <p:sp>
         <p:nvSpPr>
-          <p:cNvPr id="188" name="Google Shape;188;p16:notes"/>
+          <p:cNvPr id="188" name="Google Shape;188;gec2e1cceae_0_10:notes"/>
           <p:cNvSpPr/>
           <p:nvPr>
             <p:ph idx="2" type="sldImg"/>
@@ -2427,7 +2428,7 @@
       </p:sp>
       <p:sp>
         <p:nvSpPr>
-          <p:cNvPr id="189" name="Google Shape;189;p16:notes"/>
+          <p:cNvPr id="189" name="Google Shape;189;gec2e1cceae_0_10:notes"/>
           <p:cNvSpPr txBox="1"/>
           <p:nvPr>
             <p:ph idx="1" type="body"/>
@@ -2499,7 +2500,7 @@
       </p:grpSpPr>
       <p:sp>
         <p:nvSpPr>
-          <p:cNvPr id="194" name="Google Shape;194;gec2e1cceae_0_20:notes"/>
+          <p:cNvPr id="194" name="Google Shape;194;p16:notes"/>
           <p:cNvSpPr/>
           <p:nvPr>
             <p:ph idx="2" type="sldImg"/>
@@ -2544,7 +2545,7 @@
       </p:sp>
       <p:sp>
         <p:nvSpPr>
-          <p:cNvPr id="195" name="Google Shape;195;gec2e1cceae_0_20:notes"/>
+          <p:cNvPr id="195" name="Google Shape;195;p16:notes"/>
           <p:cNvSpPr txBox="1"/>
           <p:nvPr>
             <p:ph idx="1" type="body"/>
@@ -2616,7 +2617,7 @@
       </p:grpSpPr>
       <p:sp>
         <p:nvSpPr>
-          <p:cNvPr id="200" name="Google Shape;200;p25:notes"/>
+          <p:cNvPr id="200" name="Google Shape;200;gec2e1cceae_0_20:notes"/>
           <p:cNvSpPr/>
           <p:nvPr>
             <p:ph idx="2" type="sldImg"/>
@@ -2661,7 +2662,7 @@
       </p:sp>
       <p:sp>
         <p:nvSpPr>
-          <p:cNvPr id="201" name="Google Shape;201;p25:notes"/>
+          <p:cNvPr id="201" name="Google Shape;201;gec2e1cceae_0_20:notes"/>
           <p:cNvSpPr txBox="1"/>
           <p:nvPr>
             <p:ph idx="1" type="body"/>
@@ -2733,7 +2734,7 @@
       </p:grpSpPr>
       <p:sp>
         <p:nvSpPr>
-          <p:cNvPr id="206" name="Google Shape;206;gec2e1cceae_0_25:notes"/>
+          <p:cNvPr id="206" name="Google Shape;206;p25:notes"/>
           <p:cNvSpPr/>
           <p:nvPr>
             <p:ph idx="2" type="sldImg"/>
@@ -2778,7 +2779,7 @@
       </p:sp>
       <p:sp>
         <p:nvSpPr>
-          <p:cNvPr id="207" name="Google Shape;207;gec2e1cceae_0_25:notes"/>
+          <p:cNvPr id="207" name="Google Shape;207;p25:notes"/>
           <p:cNvSpPr txBox="1"/>
           <p:nvPr>
             <p:ph idx="1" type="body"/>
@@ -2850,7 +2851,7 @@
       </p:grpSpPr>
       <p:sp>
         <p:nvSpPr>
-          <p:cNvPr id="212" name="Google Shape;212;p40:notes"/>
+          <p:cNvPr id="212" name="Google Shape;212;gec2e1cceae_0_25:notes"/>
           <p:cNvSpPr/>
           <p:nvPr>
             <p:ph idx="2" type="sldImg"/>
@@ -2895,7 +2896,124 @@
       </p:sp>
       <p:sp>
         <p:nvSpPr>
-          <p:cNvPr id="213" name="Google Shape;213;p40:notes"/>
+          <p:cNvPr id="213" name="Google Shape;213;gec2e1cceae_0_25:notes"/>
+          <p:cNvSpPr txBox="1"/>
+          <p:nvPr>
+            <p:ph idx="1" type="body"/>
+          </p:nvPr>
+        </p:nvSpPr>
+        <p:spPr>
+          <a:xfrm>
+            <a:off x="685800" y="4343400"/>
+            <a:ext cx="5486400" cy="4114800"/>
+          </a:xfrm>
+          <a:prstGeom prst="rect">
+            <a:avLst/>
+          </a:prstGeom>
+          <a:noFill/>
+          <a:ln>
+            <a:noFill/>
+          </a:ln>
+        </p:spPr>
+        <p:txBody>
+          <a:bodyPr anchorCtr="0" anchor="t" bIns="91425" lIns="91425" spcFirstLastPara="1" rIns="91425" wrap="square" tIns="91425">
+            <a:noAutofit/>
+          </a:bodyPr>
+          <a:lstStyle/>
+          <a:p>
+            <a:pPr indent="0" lvl="0" marL="0" rtl="0" algn="l">
+              <a:lnSpc>
+                <a:spcPct val="100000"/>
+              </a:lnSpc>
+              <a:spcBef>
+                <a:spcPts val="0"/>
+              </a:spcBef>
+              <a:spcAft>
+                <a:spcPts val="0"/>
+              </a:spcAft>
+              <a:buSzPts val="1100"/>
+              <a:buNone/>
+            </a:pPr>
+            <a:r>
+              <a:t/>
+            </a:r>
+            <a:endParaRPr/>
+          </a:p>
+        </p:txBody>
+      </p:sp>
+    </p:spTree>
+  </p:cSld>
+  <p:clrMapOvr>
+    <a:masterClrMapping/>
+  </p:clrMapOvr>
+</p:notes>
+</file>
+
+<file path=ppt/notesSlides/notesSlide26.xml><?xml version="1.0" encoding="utf-8"?>
+<p:notes xmlns:a="http://schemas.openxmlformats.org/drawingml/2006/main" xmlns:r="http://schemas.openxmlformats.org/officeDocument/2006/relationships" xmlns:mc="http://schemas.openxmlformats.org/markup-compatibility/2006" xmlns:mv="urn:schemas-microsoft-com:mac:vml" xmlns:p="http://schemas.openxmlformats.org/presentationml/2006/main" xmlns:c="http://schemas.openxmlformats.org/drawingml/2006/chart" xmlns:dgm="http://schemas.openxmlformats.org/drawingml/2006/diagram" xmlns:o="urn:schemas-microsoft-com:office:office" xmlns:v="urn:schemas-microsoft-com:vml" xmlns:pvml="urn:schemas-microsoft-com:office:powerpoint" xmlns:com="http://schemas.openxmlformats.org/drawingml/2006/compatibility" xmlns:p14="http://schemas.microsoft.com/office/powerpoint/2010/main" xmlns:p15="http://schemas.microsoft.com/office/powerpoint/2012/main" xmlns:ahyp="http://schemas.microsoft.com/office/drawing/2018/hyperlinkcolor" showMasterPhAnim="0" showMasterSp="0">
+  <p:cSld>
+    <p:spTree>
+      <p:nvGrpSpPr>
+        <p:cNvPr id="217" name="Shape 217"/>
+        <p:cNvGrpSpPr/>
+        <p:nvPr/>
+      </p:nvGrpSpPr>
+      <p:grpSpPr>
+        <a:xfrm>
+          <a:off x="0" y="0"/>
+          <a:ext cx="0" cy="0"/>
+          <a:chOff x="0" y="0"/>
+          <a:chExt cx="0" cy="0"/>
+        </a:xfrm>
+      </p:grpSpPr>
+      <p:sp>
+        <p:nvSpPr>
+          <p:cNvPr id="218" name="Google Shape;218;p40:notes"/>
+          <p:cNvSpPr/>
+          <p:nvPr>
+            <p:ph idx="2" type="sldImg"/>
+          </p:nvPr>
+        </p:nvSpPr>
+        <p:spPr>
+          <a:xfrm>
+            <a:off x="381300" y="685800"/>
+            <a:ext cx="6096000" cy="3429000"/>
+          </a:xfrm>
+          <a:custGeom>
+            <a:rect b="b" l="l" r="r" t="t"/>
+            <a:pathLst>
+              <a:path extrusionOk="0" h="120000" w="120000">
+                <a:moveTo>
+                  <a:pt x="0" y="0"/>
+                </a:moveTo>
+                <a:lnTo>
+                  <a:pt x="120000" y="0"/>
+                </a:lnTo>
+                <a:lnTo>
+                  <a:pt x="120000" y="120000"/>
+                </a:lnTo>
+                <a:lnTo>
+                  <a:pt x="0" y="120000"/>
+                </a:lnTo>
+                <a:close/>
+              </a:path>
+            </a:pathLst>
+          </a:custGeom>
+          <a:noFill/>
+          <a:ln cap="flat" cmpd="sng" w="9525">
+            <a:solidFill>
+              <a:srgbClr val="000000"/>
+            </a:solidFill>
+            <a:prstDash val="solid"/>
+            <a:round/>
+            <a:headEnd len="sm" w="sm" type="none"/>
+            <a:tailEnd len="sm" w="sm" type="none"/>
+          </a:ln>
+        </p:spPr>
+      </p:sp>
+      <p:sp>
+        <p:nvSpPr>
+          <p:cNvPr id="219" name="Google Shape;219;p40:notes"/>
           <p:cNvSpPr txBox="1"/>
           <p:nvPr>
             <p:ph idx="1" type="body"/>
@@ -13032,7 +13150,7 @@
         <p:spPr>
           <a:xfrm>
             <a:off x="567275" y="1306925"/>
-            <a:ext cx="2663100" cy="951300"/>
+            <a:ext cx="3042600" cy="951300"/>
           </a:xfrm>
           <a:prstGeom prst="rect">
             <a:avLst/>
@@ -13058,7 +13176,7 @@
               <a:buNone/>
             </a:pPr>
             <a:r>
-              <a:rPr lang="en" sz="1200">
+              <a:rPr b="1" lang="en" sz="1200">
                 <a:solidFill>
                   <a:schemeClr val="dk1"/>
                 </a:solidFill>
@@ -13070,9 +13188,9 @@
                 <a:cs typeface="Courier New"/>
                 <a:sym typeface="Courier New"/>
               </a:rPr>
-              <a:t>Training Set (80%)</a:t>
-            </a:r>
-            <a:endParaRPr sz="1200">
+              <a:t>Training Set (80% of dataset)</a:t>
+            </a:r>
+            <a:endParaRPr b="1" sz="1200">
               <a:solidFill>
                 <a:schemeClr val="dk1"/>
               </a:solidFill>
@@ -13285,7 +13403,7 @@
               <a:buNone/>
             </a:pPr>
             <a:r>
-              <a:rPr lang="en" sz="1200">
+              <a:rPr b="1" lang="en" sz="1200">
                 <a:solidFill>
                   <a:schemeClr val="dk1"/>
                 </a:solidFill>
@@ -13297,9 +13415,9 @@
                 <a:cs typeface="Courier New"/>
                 <a:sym typeface="Courier New"/>
               </a:rPr>
-              <a:t>Test Set (20% of datase</a:t>
-            </a:r>
-            <a:endParaRPr sz="1200">
+              <a:t>Test Set (20% of dataset)</a:t>
+            </a:r>
+            <a:endParaRPr b="1" sz="1200">
               <a:solidFill>
                 <a:schemeClr val="dk1"/>
               </a:solidFill>
@@ -13985,18 +14103,18 @@
         </p:spPr>
         <p:txBody>
           <a:bodyPr anchorCtr="0" anchor="t" bIns="91425" lIns="91425" spcFirstLastPara="1" rIns="91425" wrap="square" tIns="91425">
-            <a:normAutofit/>
+            <a:normAutofit fontScale="70000" lnSpcReduction="20000"/>
           </a:bodyPr>
           <a:lstStyle/>
           <a:p>
-            <a:pPr indent="-342900" lvl="0" marL="457200" rtl="0" algn="l">
-              <a:spcBef>
-                <a:spcPts val="0"/>
-              </a:spcBef>
-              <a:spcAft>
-                <a:spcPts val="0"/>
-              </a:spcAft>
-              <a:buSzPts val="1800"/>
+            <a:pPr indent="-308610" lvl="0" marL="457200" rtl="0" algn="l">
+              <a:spcBef>
+                <a:spcPts val="0"/>
+              </a:spcBef>
+              <a:spcAft>
+                <a:spcPts val="0"/>
+              </a:spcAft>
+              <a:buSzPct val="100000"/>
               <a:buChar char="●"/>
             </a:pPr>
             <a:r>
@@ -14016,14 +14134,14 @@
             </a:endParaRPr>
           </a:p>
           <a:p>
-            <a:pPr indent="-342900" lvl="0" marL="457200" rtl="0" algn="l">
-              <a:spcBef>
-                <a:spcPts val="0"/>
-              </a:spcBef>
-              <a:spcAft>
-                <a:spcPts val="0"/>
-              </a:spcAft>
-              <a:buSzPts val="1800"/>
+            <a:pPr indent="-308610" lvl="0" marL="457200" rtl="0" algn="l">
+              <a:spcBef>
+                <a:spcPts val="0"/>
+              </a:spcBef>
+              <a:spcAft>
+                <a:spcPts val="0"/>
+              </a:spcAft>
+              <a:buSzPct val="100000"/>
               <a:buFont typeface="Consolas"/>
               <a:buChar char="●"/>
             </a:pPr>
@@ -14035,6 +14153,60 @@
                 <a:sym typeface="Consolas"/>
               </a:rPr>
               <a:t>OneHotEncoder()</a:t>
+            </a:r>
+            <a:endParaRPr>
+              <a:latin typeface="Consolas"/>
+              <a:ea typeface="Consolas"/>
+              <a:cs typeface="Consolas"/>
+              <a:sym typeface="Consolas"/>
+            </a:endParaRPr>
+          </a:p>
+          <a:p>
+            <a:pPr indent="-308610" lvl="0" marL="457200" rtl="0" algn="l">
+              <a:spcBef>
+                <a:spcPts val="0"/>
+              </a:spcBef>
+              <a:spcAft>
+                <a:spcPts val="0"/>
+              </a:spcAft>
+              <a:buSzPct val="100000"/>
+              <a:buFont typeface="Consolas"/>
+              <a:buChar char="●"/>
+            </a:pPr>
+            <a:r>
+              <a:rPr lang="en">
+                <a:latin typeface="Consolas"/>
+                <a:ea typeface="Consolas"/>
+                <a:cs typeface="Consolas"/>
+                <a:sym typeface="Consolas"/>
+              </a:rPr>
+              <a:t>heart_pipeline.shape</a:t>
+            </a:r>
+            <a:endParaRPr>
+              <a:latin typeface="Consolas"/>
+              <a:ea typeface="Consolas"/>
+              <a:cs typeface="Consolas"/>
+              <a:sym typeface="Consolas"/>
+            </a:endParaRPr>
+          </a:p>
+          <a:p>
+            <a:pPr indent="0" lvl="0" marL="914400" rtl="0" algn="l">
+              <a:spcBef>
+                <a:spcPts val="0"/>
+              </a:spcBef>
+              <a:spcAft>
+                <a:spcPts val="0"/>
+              </a:spcAft>
+              <a:buNone/>
+            </a:pPr>
+            <a:r>
+              <a:rPr lang="en">
+                <a:latin typeface="Consolas"/>
+                <a:ea typeface="Consolas"/>
+                <a:cs typeface="Consolas"/>
+                <a:sym typeface="Consolas"/>
+              </a:rPr>
+              <a:t>(242, 30)</a:t>
             </a:r>
             <a:endParaRPr>
               <a:latin typeface="Consolas"/>
@@ -14139,8 +14311,8 @@
         </p:blipFill>
         <p:spPr>
           <a:xfrm>
-            <a:off x="4498325" y="1370263"/>
-            <a:ext cx="4333976" cy="2053965"/>
+            <a:off x="3756675" y="1241675"/>
+            <a:ext cx="5149299" cy="2440350"/>
           </a:xfrm>
           <a:prstGeom prst="rect">
             <a:avLst/>
@@ -14670,17 +14842,116 @@
                 <a:spcPts val="0"/>
               </a:spcAft>
               <a:buSzPts val="1800"/>
-              <a:buFont typeface="Ubuntu"/>
+              <a:buFont typeface="Ubuntu Light"/>
               <a:buChar char="●"/>
             </a:pPr>
             <a:r>
-              <a:t/>
+              <a:rPr lang="en">
+                <a:latin typeface="Ubuntu Light"/>
+                <a:ea typeface="Ubuntu Light"/>
+                <a:cs typeface="Ubuntu Light"/>
+                <a:sym typeface="Ubuntu Light"/>
+              </a:rPr>
+              <a:t>Logistic Regression (+Softmax)</a:t>
             </a:r>
             <a:endParaRPr>
-              <a:latin typeface="Ubuntu"/>
-              <a:ea typeface="Ubuntu"/>
-              <a:cs typeface="Ubuntu"/>
-              <a:sym typeface="Ubuntu"/>
+              <a:latin typeface="Ubuntu Light"/>
+              <a:ea typeface="Ubuntu Light"/>
+              <a:cs typeface="Ubuntu Light"/>
+              <a:sym typeface="Ubuntu Light"/>
+            </a:endParaRPr>
+          </a:p>
+          <a:p>
+            <a:pPr indent="-342900" lvl="0" marL="457200" rtl="0" algn="l">
+              <a:lnSpc>
+                <a:spcPct val="115000"/>
+              </a:lnSpc>
+              <a:spcBef>
+                <a:spcPts val="0"/>
+              </a:spcBef>
+              <a:spcAft>
+                <a:spcPts val="0"/>
+              </a:spcAft>
+              <a:buSzPts val="1800"/>
+              <a:buFont typeface="Ubuntu Light"/>
+              <a:buChar char="●"/>
+            </a:pPr>
+            <a:r>
+              <a:rPr lang="en">
+                <a:latin typeface="Ubuntu Light"/>
+                <a:ea typeface="Ubuntu Light"/>
+                <a:cs typeface="Ubuntu Light"/>
+                <a:sym typeface="Ubuntu Light"/>
+              </a:rPr>
+              <a:t>Random Forests</a:t>
+            </a:r>
+            <a:endParaRPr>
+              <a:latin typeface="Ubuntu Light"/>
+              <a:ea typeface="Ubuntu Light"/>
+              <a:cs typeface="Ubuntu Light"/>
+              <a:sym typeface="Ubuntu Light"/>
+            </a:endParaRPr>
+          </a:p>
+          <a:p>
+            <a:pPr indent="-342900" lvl="0" marL="457200" rtl="0" algn="l">
+              <a:lnSpc>
+                <a:spcPct val="115000"/>
+              </a:lnSpc>
+              <a:spcBef>
+                <a:spcPts val="0"/>
+              </a:spcBef>
+              <a:spcAft>
+                <a:spcPts val="0"/>
+              </a:spcAft>
+              <a:buSzPts val="1800"/>
+              <a:buFont typeface="Ubuntu Light"/>
+              <a:buChar char="●"/>
+            </a:pPr>
+            <a:r>
+              <a:rPr lang="en">
+                <a:latin typeface="Ubuntu Light"/>
+                <a:ea typeface="Ubuntu Light"/>
+                <a:cs typeface="Ubuntu Light"/>
+                <a:sym typeface="Ubuntu Light"/>
+              </a:rPr>
+              <a:t>SVMs</a:t>
+            </a:r>
+            <a:endParaRPr>
+              <a:latin typeface="Ubuntu Light"/>
+              <a:ea typeface="Ubuntu Light"/>
+              <a:cs typeface="Ubuntu Light"/>
+              <a:sym typeface="Ubuntu Light"/>
+            </a:endParaRPr>
+          </a:p>
+          <a:p>
+            <a:pPr indent="-342900" lvl="0" marL="457200" rtl="0" algn="l">
+              <a:lnSpc>
+                <a:spcPct val="115000"/>
+              </a:lnSpc>
+              <a:spcBef>
+                <a:spcPts val="0"/>
+              </a:spcBef>
+              <a:spcAft>
+                <a:spcPts val="0"/>
+              </a:spcAft>
+              <a:buSzPts val="1800"/>
+              <a:buFont typeface="Ubuntu Light"/>
+              <a:buChar char="●"/>
+            </a:pPr>
+            <a:r>
+              <a:rPr lang="en">
+                <a:latin typeface="Ubuntu Light"/>
+                <a:ea typeface="Ubuntu Light"/>
+                <a:cs typeface="Ubuntu Light"/>
+                <a:sym typeface="Ubuntu Light"/>
+              </a:rPr>
+              <a:t>PCA (+KernelPCA)</a:t>
+            </a:r>
+            <a:endParaRPr>
+              <a:latin typeface="Ubuntu Light"/>
+              <a:ea typeface="Ubuntu Light"/>
+              <a:cs typeface="Ubuntu Light"/>
+              <a:sym typeface="Ubuntu Light"/>
             </a:endParaRPr>
           </a:p>
         </p:txBody>
@@ -15071,7 +15342,7 @@
       </p:grpSpPr>
       <p:sp>
         <p:nvSpPr>
-          <p:cNvPr id="185" name="Google Shape;185;gec2e1cceae_0_10"/>
+          <p:cNvPr id="185" name="Google Shape;185;gec2e1cceae_0_140"/>
           <p:cNvSpPr txBox="1"/>
           <p:nvPr>
             <p:ph type="title"/>
@@ -15092,7 +15363,7 @@
         </p:spPr>
         <p:txBody>
           <a:bodyPr anchorCtr="0" anchor="b" bIns="91425" lIns="91425" spcFirstLastPara="1" rIns="91425" wrap="square" tIns="91425">
-            <a:normAutofit/>
+            <a:normAutofit fontScale="90000"/>
           </a:bodyPr>
           <a:lstStyle/>
           <a:p>
@@ -15106,7 +15377,31 @@
               <a:spcAft>
                 <a:spcPts val="0"/>
               </a:spcAft>
-              <a:buSzPts val="4200"/>
+              <a:buSzPct val="100000"/>
+              <a:buNone/>
+            </a:pPr>
+            <a:r>
+              <a:t/>
+            </a:r>
+            <a:endParaRPr>
+              <a:latin typeface="Ubuntu"/>
+              <a:ea typeface="Ubuntu"/>
+              <a:cs typeface="Ubuntu"/>
+              <a:sym typeface="Ubuntu"/>
+            </a:endParaRPr>
+          </a:p>
+          <a:p>
+            <a:pPr indent="0" lvl="0" marL="0" rtl="0" algn="l">
+              <a:lnSpc>
+                <a:spcPct val="100000"/>
+              </a:lnSpc>
+              <a:spcBef>
+                <a:spcPts val="0"/>
+              </a:spcBef>
+              <a:spcAft>
+                <a:spcPts val="0"/>
+              </a:spcAft>
+              <a:buSzPct val="100000"/>
               <a:buNone/>
             </a:pPr>
             <a:r>
@@ -15116,7 +15411,7 @@
                 <a:cs typeface="Ubuntu"/>
                 <a:sym typeface="Ubuntu"/>
               </a:rPr>
-              <a:t>AGENDA</a:t>
+              <a:t>ML Algorithms</a:t>
             </a:r>
             <a:endParaRPr>
               <a:latin typeface="Ubuntu"/>
@@ -15127,312 +15422,795 @@
           </a:p>
         </p:txBody>
       </p:sp>
-      <p:sp>
-        <p:nvSpPr>
-          <p:cNvPr id="186" name="Google Shape;186;gec2e1cceae_0_10"/>
-          <p:cNvSpPr txBox="1"/>
-          <p:nvPr>
-            <p:ph idx="1" type="body"/>
-          </p:nvPr>
-        </p:nvSpPr>
-        <p:spPr>
-          <a:xfrm>
-            <a:off x="311700" y="1225225"/>
-            <a:ext cx="8520600" cy="3354000"/>
-          </a:xfrm>
-          <a:prstGeom prst="rect">
-            <a:avLst/>
-          </a:prstGeom>
-          <a:noFill/>
-          <a:ln>
-            <a:noFill/>
-          </a:ln>
-        </p:spPr>
-        <p:txBody>
-          <a:bodyPr anchorCtr="0" anchor="t" bIns="91425" lIns="91425" spcFirstLastPara="1" rIns="91425" wrap="square" tIns="91425">
-            <a:normAutofit/>
-          </a:bodyPr>
-          <a:lstStyle/>
-          <a:p>
-            <a:pPr indent="-368300" lvl="0" marL="457200" rtl="0" algn="l">
-              <a:spcBef>
-                <a:spcPts val="0"/>
-              </a:spcBef>
-              <a:spcAft>
-                <a:spcPts val="0"/>
-              </a:spcAft>
-              <a:buClr>
-                <a:schemeClr val="dk2"/>
-              </a:buClr>
-              <a:buSzPts val="2200"/>
-              <a:buFont typeface="Ubuntu Light"/>
-              <a:buChar char="●"/>
-            </a:pPr>
-            <a:r>
-              <a:rPr lang="en" sz="2200">
-                <a:solidFill>
-                  <a:schemeClr val="dk2"/>
-                </a:solidFill>
-                <a:latin typeface="Ubuntu Light"/>
-                <a:ea typeface="Ubuntu Light"/>
-                <a:cs typeface="Ubuntu Light"/>
-                <a:sym typeface="Ubuntu Light"/>
-              </a:rPr>
-              <a:t>Project Overview</a:t>
-            </a:r>
-            <a:endParaRPr sz="2200">
-              <a:solidFill>
-                <a:schemeClr val="dk2"/>
-              </a:solidFill>
-              <a:latin typeface="Ubuntu Light"/>
-              <a:ea typeface="Ubuntu Light"/>
-              <a:cs typeface="Ubuntu Light"/>
-              <a:sym typeface="Ubuntu Light"/>
-            </a:endParaRPr>
-          </a:p>
-          <a:p>
-            <a:pPr indent="-368300" lvl="0" marL="457200" rtl="0" algn="l">
-              <a:spcBef>
-                <a:spcPts val="0"/>
-              </a:spcBef>
-              <a:spcAft>
-                <a:spcPts val="0"/>
-              </a:spcAft>
-              <a:buClr>
-                <a:schemeClr val="dk2"/>
-              </a:buClr>
-              <a:buSzPts val="2200"/>
-              <a:buFont typeface="Ubuntu Light"/>
-              <a:buChar char="●"/>
-            </a:pPr>
-            <a:r>
-              <a:rPr lang="en" sz="2200">
-                <a:solidFill>
-                  <a:schemeClr val="dk2"/>
-                </a:solidFill>
-                <a:latin typeface="Ubuntu Light"/>
-                <a:ea typeface="Ubuntu Light"/>
-                <a:cs typeface="Ubuntu Light"/>
-                <a:sym typeface="Ubuntu Light"/>
-              </a:rPr>
-              <a:t>Data Overview</a:t>
-            </a:r>
-            <a:endParaRPr sz="2200">
-              <a:solidFill>
-                <a:schemeClr val="dk2"/>
-              </a:solidFill>
-              <a:latin typeface="Ubuntu Light"/>
-              <a:ea typeface="Ubuntu Light"/>
-              <a:cs typeface="Ubuntu Light"/>
-              <a:sym typeface="Ubuntu Light"/>
-            </a:endParaRPr>
-          </a:p>
-          <a:p>
-            <a:pPr indent="-368300" lvl="0" marL="457200" rtl="0" algn="l">
-              <a:spcBef>
-                <a:spcPts val="0"/>
-              </a:spcBef>
-              <a:spcAft>
-                <a:spcPts val="0"/>
-              </a:spcAft>
-              <a:buClr>
-                <a:schemeClr val="dk2"/>
-              </a:buClr>
-              <a:buSzPts val="2200"/>
-              <a:buFont typeface="Ubuntu Light"/>
-              <a:buChar char="●"/>
-            </a:pPr>
-            <a:r>
-              <a:rPr lang="en" sz="2200">
-                <a:solidFill>
-                  <a:schemeClr val="dk2"/>
-                </a:solidFill>
-                <a:latin typeface="Ubuntu Light"/>
-                <a:ea typeface="Ubuntu Light"/>
-                <a:cs typeface="Ubuntu Light"/>
-                <a:sym typeface="Ubuntu Light"/>
-              </a:rPr>
-              <a:t>EDA and Pipeline Set Up</a:t>
-            </a:r>
-            <a:endParaRPr sz="2200">
-              <a:solidFill>
-                <a:schemeClr val="dk2"/>
-              </a:solidFill>
-              <a:latin typeface="Ubuntu Light"/>
-              <a:ea typeface="Ubuntu Light"/>
-              <a:cs typeface="Ubuntu Light"/>
-              <a:sym typeface="Ubuntu Light"/>
-            </a:endParaRPr>
-          </a:p>
-          <a:p>
-            <a:pPr indent="-368300" lvl="0" marL="457200" rtl="0" algn="l">
-              <a:spcBef>
-                <a:spcPts val="0"/>
-              </a:spcBef>
-              <a:spcAft>
-                <a:spcPts val="0"/>
-              </a:spcAft>
-              <a:buClr>
-                <a:schemeClr val="dk2"/>
-              </a:buClr>
-              <a:buSzPts val="2200"/>
-              <a:buFont typeface="Ubuntu Light"/>
-              <a:buChar char="●"/>
-            </a:pPr>
-            <a:r>
-              <a:rPr lang="en" sz="2200">
-                <a:solidFill>
-                  <a:schemeClr val="dk2"/>
-                </a:solidFill>
-                <a:latin typeface="Ubuntu Light"/>
-                <a:ea typeface="Ubuntu Light"/>
-                <a:cs typeface="Ubuntu Light"/>
-                <a:sym typeface="Ubuntu Light"/>
-              </a:rPr>
-              <a:t>ML Algorithms</a:t>
-            </a:r>
-            <a:endParaRPr sz="2200">
-              <a:solidFill>
-                <a:schemeClr val="dk2"/>
-              </a:solidFill>
-              <a:latin typeface="Ubuntu Light"/>
-              <a:ea typeface="Ubuntu Light"/>
-              <a:cs typeface="Ubuntu Light"/>
-              <a:sym typeface="Ubuntu Light"/>
-            </a:endParaRPr>
-          </a:p>
-          <a:p>
-            <a:pPr indent="-368300" lvl="0" marL="457200" rtl="0" algn="l">
-              <a:spcBef>
-                <a:spcPts val="0"/>
-              </a:spcBef>
-              <a:spcAft>
-                <a:spcPts val="0"/>
-              </a:spcAft>
-              <a:buSzPts val="2200"/>
-              <a:buFont typeface="Ubuntu Light"/>
-              <a:buChar char="●"/>
-            </a:pPr>
-            <a:r>
-              <a:rPr lang="en" sz="2200">
-                <a:latin typeface="Ubuntu Light"/>
-                <a:ea typeface="Ubuntu Light"/>
-                <a:cs typeface="Ubuntu Light"/>
-                <a:sym typeface="Ubuntu Light"/>
-              </a:rPr>
-              <a:t>Summary</a:t>
-            </a:r>
-            <a:endParaRPr sz="2200">
-              <a:latin typeface="Ubuntu Light"/>
-              <a:ea typeface="Ubuntu Light"/>
-              <a:cs typeface="Ubuntu Light"/>
-              <a:sym typeface="Ubuntu Light"/>
-            </a:endParaRPr>
-          </a:p>
-          <a:p>
-            <a:pPr indent="-368300" lvl="0" marL="457200" rtl="0" algn="l">
-              <a:spcBef>
-                <a:spcPts val="0"/>
-              </a:spcBef>
-              <a:spcAft>
-                <a:spcPts val="0"/>
-              </a:spcAft>
-              <a:buSzPts val="2200"/>
-              <a:buFont typeface="Ubuntu Light"/>
-              <a:buChar char="●"/>
-            </a:pPr>
-            <a:r>
-              <a:rPr lang="en" sz="2200">
-                <a:latin typeface="Ubuntu Light"/>
-                <a:ea typeface="Ubuntu Light"/>
-                <a:cs typeface="Ubuntu Light"/>
-                <a:sym typeface="Ubuntu Light"/>
-              </a:rPr>
-              <a:t>Final Report</a:t>
-            </a:r>
-            <a:endParaRPr sz="2200">
-              <a:latin typeface="Ubuntu Light"/>
-              <a:ea typeface="Ubuntu Light"/>
-              <a:cs typeface="Ubuntu Light"/>
-              <a:sym typeface="Ubuntu Light"/>
-            </a:endParaRPr>
-          </a:p>
-          <a:p>
-            <a:pPr indent="-368300" lvl="0" marL="457200" rtl="0" algn="l">
-              <a:spcBef>
-                <a:spcPts val="0"/>
-              </a:spcBef>
-              <a:spcAft>
-                <a:spcPts val="0"/>
-              </a:spcAft>
-              <a:buClr>
-                <a:schemeClr val="dk2"/>
-              </a:buClr>
-              <a:buSzPts val="2200"/>
-              <a:buFont typeface="Ubuntu Light"/>
-              <a:buChar char="●"/>
-            </a:pPr>
-            <a:r>
-              <a:rPr lang="en" sz="2200">
-                <a:solidFill>
-                  <a:schemeClr val="dk2"/>
-                </a:solidFill>
-                <a:latin typeface="Ubuntu Light"/>
-                <a:ea typeface="Ubuntu Light"/>
-                <a:cs typeface="Ubuntu Light"/>
-                <a:sym typeface="Ubuntu Light"/>
-              </a:rPr>
-              <a:t>Known Limitations of Project</a:t>
-            </a:r>
-            <a:endParaRPr sz="2200">
-              <a:solidFill>
-                <a:schemeClr val="dk2"/>
-              </a:solidFill>
-              <a:latin typeface="Ubuntu Light"/>
-              <a:ea typeface="Ubuntu Light"/>
-              <a:cs typeface="Ubuntu Light"/>
-              <a:sym typeface="Ubuntu Light"/>
-            </a:endParaRPr>
-          </a:p>
-          <a:p>
-            <a:pPr indent="-368300" lvl="0" marL="457200" rtl="0" algn="l">
-              <a:spcBef>
-                <a:spcPts val="0"/>
-              </a:spcBef>
-              <a:spcAft>
-                <a:spcPts val="0"/>
-              </a:spcAft>
-              <a:buClr>
-                <a:schemeClr val="dk2"/>
-              </a:buClr>
-              <a:buSzPts val="2200"/>
-              <a:buFont typeface="Ubuntu Light"/>
-              <a:buChar char="●"/>
-            </a:pPr>
-            <a:r>
-              <a:rPr lang="en" sz="2200">
-                <a:solidFill>
-                  <a:schemeClr val="dk2"/>
-                </a:solidFill>
-                <a:latin typeface="Ubuntu Light"/>
-                <a:ea typeface="Ubuntu Light"/>
-                <a:cs typeface="Ubuntu Light"/>
-                <a:sym typeface="Ubuntu Light"/>
-              </a:rPr>
-              <a:t>Potential Future Development</a:t>
-            </a:r>
-            <a:endParaRPr>
-              <a:solidFill>
-                <a:schemeClr val="dk2"/>
-              </a:solidFill>
-              <a:latin typeface="Ubuntu Light"/>
-              <a:ea typeface="Ubuntu Light"/>
-              <a:cs typeface="Ubuntu Light"/>
-              <a:sym typeface="Ubuntu Light"/>
-            </a:endParaRPr>
-          </a:p>
-        </p:txBody>
-      </p:sp>
+      <p:graphicFrame>
+        <p:nvGraphicFramePr>
+          <p:cNvPr id="186" name="Google Shape;186;gec2e1cceae_0_140"/>
+          <p:cNvGraphicFramePr/>
+          <p:nvPr/>
+        </p:nvGraphicFramePr>
+        <p:xfrm>
+          <a:off x="236525" y="2042730"/>
+          <a:ext cx="3000000" cy="3000000"/>
+        </p:xfrm>
+        <a:graphic>
+          <a:graphicData uri="http://schemas.openxmlformats.org/drawingml/2006/table">
+            <a:tbl>
+              <a:tblPr>
+                <a:noFill/>
+                <a:tableStyleId>{0D4D9A23-EF9B-4464-9C6F-9FA0BF278C17}</a:tableStyleId>
+              </a:tblPr>
+              <a:tblGrid>
+                <a:gridCol w="1641800"/>
+                <a:gridCol w="1265825"/>
+                <a:gridCol w="1250550"/>
+                <a:gridCol w="1079325"/>
+                <a:gridCol w="649400"/>
+                <a:gridCol w="677525"/>
+                <a:gridCol w="1570825"/>
+              </a:tblGrid>
+              <a:tr h="960100">
+                <a:tc>
+                  <a:txBody>
+                    <a:bodyPr/>
+                    <a:lstStyle/>
+                    <a:p>
+                      <a:pPr indent="0" lvl="0" marL="0" rtl="0" algn="l">
+                        <a:spcBef>
+                          <a:spcPts val="0"/>
+                        </a:spcBef>
+                        <a:spcAft>
+                          <a:spcPts val="0"/>
+                        </a:spcAft>
+                        <a:buNone/>
+                      </a:pPr>
+                      <a:r>
+                        <a:t/>
+                      </a:r>
+                      <a:endParaRPr sz="1700">
+                        <a:latin typeface="Ubuntu Light"/>
+                        <a:ea typeface="Ubuntu Light"/>
+                        <a:cs typeface="Ubuntu Light"/>
+                        <a:sym typeface="Ubuntu Light"/>
+                      </a:endParaRPr>
+                    </a:p>
+                  </a:txBody>
+                  <a:tcPr marT="91425" marB="91425" marR="91425" marL="91425"/>
+                </a:tc>
+                <a:tc>
+                  <a:txBody>
+                    <a:bodyPr/>
+                    <a:lstStyle/>
+                    <a:p>
+                      <a:pPr indent="0" lvl="0" marL="0" rtl="0" algn="l">
+                        <a:spcBef>
+                          <a:spcPts val="0"/>
+                        </a:spcBef>
+                        <a:spcAft>
+                          <a:spcPts val="0"/>
+                        </a:spcAft>
+                        <a:buNone/>
+                      </a:pPr>
+                      <a:r>
+                        <a:rPr lang="en" sz="1700">
+                          <a:latin typeface="Ubuntu Light"/>
+                          <a:ea typeface="Ubuntu Light"/>
+                          <a:cs typeface="Ubuntu Light"/>
+                          <a:sym typeface="Ubuntu Light"/>
+                        </a:rPr>
+                        <a:t>Logistic</a:t>
+                      </a:r>
+                      <a:endParaRPr sz="1700">
+                        <a:latin typeface="Ubuntu Light"/>
+                        <a:ea typeface="Ubuntu Light"/>
+                        <a:cs typeface="Ubuntu Light"/>
+                        <a:sym typeface="Ubuntu Light"/>
+                      </a:endParaRPr>
+                    </a:p>
+                    <a:p>
+                      <a:pPr indent="0" lvl="0" marL="0" rtl="0" algn="l">
+                        <a:spcBef>
+                          <a:spcPts val="0"/>
+                        </a:spcBef>
+                        <a:spcAft>
+                          <a:spcPts val="0"/>
+                        </a:spcAft>
+                        <a:buNone/>
+                      </a:pPr>
+                      <a:r>
+                        <a:rPr lang="en" sz="1700">
+                          <a:latin typeface="Ubuntu Light"/>
+                          <a:ea typeface="Ubuntu Light"/>
+                          <a:cs typeface="Ubuntu Light"/>
+                          <a:sym typeface="Ubuntu Light"/>
+                        </a:rPr>
+                        <a:t>Regression (LR)</a:t>
+                      </a:r>
+                      <a:endParaRPr sz="1700">
+                        <a:latin typeface="Ubuntu Light"/>
+                        <a:ea typeface="Ubuntu Light"/>
+                        <a:cs typeface="Ubuntu Light"/>
+                        <a:sym typeface="Ubuntu Light"/>
+                      </a:endParaRPr>
+                    </a:p>
+                  </a:txBody>
+                  <a:tcPr marT="91425" marB="91425" marR="91425" marL="91425"/>
+                </a:tc>
+                <a:tc>
+                  <a:txBody>
+                    <a:bodyPr/>
+                    <a:lstStyle/>
+                    <a:p>
+                      <a:pPr indent="0" lvl="0" marL="0" rtl="0" algn="l">
+                        <a:spcBef>
+                          <a:spcPts val="0"/>
+                        </a:spcBef>
+                        <a:spcAft>
+                          <a:spcPts val="0"/>
+                        </a:spcAft>
+                        <a:buNone/>
+                      </a:pPr>
+                      <a:r>
+                        <a:rPr lang="en" sz="1700">
+                          <a:latin typeface="Ubuntu Light"/>
+                          <a:ea typeface="Ubuntu Light"/>
+                          <a:cs typeface="Ubuntu Light"/>
+                          <a:sym typeface="Ubuntu Light"/>
+                        </a:rPr>
+                        <a:t>Softmax</a:t>
+                      </a:r>
+                      <a:endParaRPr sz="1700">
+                        <a:latin typeface="Ubuntu Light"/>
+                        <a:ea typeface="Ubuntu Light"/>
+                        <a:cs typeface="Ubuntu Light"/>
+                        <a:sym typeface="Ubuntu Light"/>
+                      </a:endParaRPr>
+                    </a:p>
+                    <a:p>
+                      <a:pPr indent="0" lvl="0" marL="0" rtl="0" algn="l">
+                        <a:spcBef>
+                          <a:spcPts val="0"/>
+                        </a:spcBef>
+                        <a:spcAft>
+                          <a:spcPts val="0"/>
+                        </a:spcAft>
+                        <a:buNone/>
+                      </a:pPr>
+                      <a:r>
+                        <a:rPr lang="en" sz="1700">
+                          <a:latin typeface="Ubuntu Light"/>
+                          <a:ea typeface="Ubuntu Light"/>
+                          <a:cs typeface="Ubuntu Light"/>
+                          <a:sym typeface="Ubuntu Light"/>
+                        </a:rPr>
+                        <a:t>Regression</a:t>
+                      </a:r>
+                      <a:endParaRPr sz="1700">
+                        <a:latin typeface="Ubuntu Light"/>
+                        <a:ea typeface="Ubuntu Light"/>
+                        <a:cs typeface="Ubuntu Light"/>
+                        <a:sym typeface="Ubuntu Light"/>
+                      </a:endParaRPr>
+                    </a:p>
+                  </a:txBody>
+                  <a:tcPr marT="91425" marB="91425" marR="91425" marL="91425"/>
+                </a:tc>
+                <a:tc>
+                  <a:txBody>
+                    <a:bodyPr/>
+                    <a:lstStyle/>
+                    <a:p>
+                      <a:pPr indent="0" lvl="0" marL="0" rtl="0" algn="l">
+                        <a:spcBef>
+                          <a:spcPts val="0"/>
+                        </a:spcBef>
+                        <a:spcAft>
+                          <a:spcPts val="0"/>
+                        </a:spcAft>
+                        <a:buNone/>
+                      </a:pPr>
+                      <a:r>
+                        <a:rPr lang="en" sz="1700">
+                          <a:latin typeface="Ubuntu Light"/>
+                          <a:ea typeface="Ubuntu Light"/>
+                          <a:cs typeface="Ubuntu Light"/>
+                          <a:sym typeface="Ubuntu Light"/>
+                        </a:rPr>
+                        <a:t>Random</a:t>
+                      </a:r>
+                      <a:endParaRPr sz="1700">
+                        <a:latin typeface="Ubuntu Light"/>
+                        <a:ea typeface="Ubuntu Light"/>
+                        <a:cs typeface="Ubuntu Light"/>
+                        <a:sym typeface="Ubuntu Light"/>
+                      </a:endParaRPr>
+                    </a:p>
+                    <a:p>
+                      <a:pPr indent="0" lvl="0" marL="0" rtl="0" algn="l">
+                        <a:spcBef>
+                          <a:spcPts val="0"/>
+                        </a:spcBef>
+                        <a:spcAft>
+                          <a:spcPts val="0"/>
+                        </a:spcAft>
+                        <a:buNone/>
+                      </a:pPr>
+                      <a:r>
+                        <a:rPr lang="en" sz="1700">
+                          <a:latin typeface="Ubuntu Light"/>
+                          <a:ea typeface="Ubuntu Light"/>
+                          <a:cs typeface="Ubuntu Light"/>
+                          <a:sym typeface="Ubuntu Light"/>
+                        </a:rPr>
+                        <a:t>Forest</a:t>
+                      </a:r>
+                      <a:endParaRPr sz="1700">
+                        <a:latin typeface="Ubuntu Light"/>
+                        <a:ea typeface="Ubuntu Light"/>
+                        <a:cs typeface="Ubuntu Light"/>
+                        <a:sym typeface="Ubuntu Light"/>
+                      </a:endParaRPr>
+                    </a:p>
+                  </a:txBody>
+                  <a:tcPr marT="91425" marB="91425" marR="91425" marL="91425"/>
+                </a:tc>
+                <a:tc>
+                  <a:txBody>
+                    <a:bodyPr/>
+                    <a:lstStyle/>
+                    <a:p>
+                      <a:pPr indent="0" lvl="0" marL="0" rtl="0" algn="l">
+                        <a:spcBef>
+                          <a:spcPts val="0"/>
+                        </a:spcBef>
+                        <a:spcAft>
+                          <a:spcPts val="0"/>
+                        </a:spcAft>
+                        <a:buNone/>
+                      </a:pPr>
+                      <a:r>
+                        <a:rPr lang="en" sz="1700">
+                          <a:latin typeface="Ubuntu Light"/>
+                          <a:ea typeface="Ubuntu Light"/>
+                          <a:cs typeface="Ubuntu Light"/>
+                          <a:sym typeface="Ubuntu Light"/>
+                        </a:rPr>
+                        <a:t>SVM</a:t>
+                      </a:r>
+                      <a:endParaRPr sz="1700">
+                        <a:latin typeface="Ubuntu Light"/>
+                        <a:ea typeface="Ubuntu Light"/>
+                        <a:cs typeface="Ubuntu Light"/>
+                        <a:sym typeface="Ubuntu Light"/>
+                      </a:endParaRPr>
+                    </a:p>
+                  </a:txBody>
+                  <a:tcPr marT="91425" marB="91425" marR="91425" marL="91425"/>
+                </a:tc>
+                <a:tc>
+                  <a:txBody>
+                    <a:bodyPr/>
+                    <a:lstStyle/>
+                    <a:p>
+                      <a:pPr indent="0" lvl="0" marL="0" rtl="0" algn="l">
+                        <a:spcBef>
+                          <a:spcPts val="0"/>
+                        </a:spcBef>
+                        <a:spcAft>
+                          <a:spcPts val="0"/>
+                        </a:spcAft>
+                        <a:buNone/>
+                      </a:pPr>
+                      <a:r>
+                        <a:rPr lang="en" sz="1700">
+                          <a:latin typeface="Ubuntu Light"/>
+                          <a:ea typeface="Ubuntu Light"/>
+                          <a:cs typeface="Ubuntu Light"/>
+                          <a:sym typeface="Ubuntu Light"/>
+                        </a:rPr>
+                        <a:t>PCA+LR</a:t>
+                      </a:r>
+                      <a:endParaRPr sz="1700">
+                        <a:latin typeface="Ubuntu Light"/>
+                        <a:ea typeface="Ubuntu Light"/>
+                        <a:cs typeface="Ubuntu Light"/>
+                        <a:sym typeface="Ubuntu Light"/>
+                      </a:endParaRPr>
+                    </a:p>
+                  </a:txBody>
+                  <a:tcPr marT="91425" marB="91425" marR="91425" marL="91425"/>
+                </a:tc>
+                <a:tc>
+                  <a:txBody>
+                    <a:bodyPr/>
+                    <a:lstStyle/>
+                    <a:p>
+                      <a:pPr indent="0" lvl="0" marL="0" rtl="0" algn="l">
+                        <a:spcBef>
+                          <a:spcPts val="0"/>
+                        </a:spcBef>
+                        <a:spcAft>
+                          <a:spcPts val="0"/>
+                        </a:spcAft>
+                        <a:buNone/>
+                      </a:pPr>
+                      <a:r>
+                        <a:rPr lang="en" sz="1700">
+                          <a:latin typeface="Ubuntu Light"/>
+                          <a:ea typeface="Ubuntu Light"/>
+                          <a:cs typeface="Ubuntu Light"/>
+                          <a:sym typeface="Ubuntu Light"/>
+                        </a:rPr>
+                        <a:t>Kernel PCA+LR</a:t>
+                      </a:r>
+                      <a:endParaRPr sz="1700">
+                        <a:latin typeface="Ubuntu Light"/>
+                        <a:ea typeface="Ubuntu Light"/>
+                        <a:cs typeface="Ubuntu Light"/>
+                        <a:sym typeface="Ubuntu Light"/>
+                      </a:endParaRPr>
+                    </a:p>
+                  </a:txBody>
+                  <a:tcPr marT="91425" marB="91425" marR="91425" marL="91425"/>
+                </a:tc>
+              </a:tr>
+              <a:tr h="865675">
+                <a:tc>
+                  <a:txBody>
+                    <a:bodyPr/>
+                    <a:lstStyle/>
+                    <a:p>
+                      <a:pPr indent="0" lvl="0" marL="0" rtl="0" algn="l">
+                        <a:spcBef>
+                          <a:spcPts val="0"/>
+                        </a:spcBef>
+                        <a:spcAft>
+                          <a:spcPts val="0"/>
+                        </a:spcAft>
+                        <a:buNone/>
+                      </a:pPr>
+                      <a:r>
+                        <a:rPr lang="en" sz="1700">
+                          <a:latin typeface="Ubuntu Light"/>
+                          <a:ea typeface="Ubuntu Light"/>
+                          <a:cs typeface="Ubuntu Light"/>
+                          <a:sym typeface="Ubuntu Light"/>
+                        </a:rPr>
+                        <a:t>“At Risk” Recall</a:t>
+                      </a:r>
+                      <a:endParaRPr sz="1700">
+                        <a:latin typeface="Ubuntu Light"/>
+                        <a:ea typeface="Ubuntu Light"/>
+                        <a:cs typeface="Ubuntu Light"/>
+                        <a:sym typeface="Ubuntu Light"/>
+                      </a:endParaRPr>
+                    </a:p>
+                  </a:txBody>
+                  <a:tcPr marT="91425" marB="91425" marR="91425" marL="91425"/>
+                </a:tc>
+                <a:tc>
+                  <a:txBody>
+                    <a:bodyPr/>
+                    <a:lstStyle/>
+                    <a:p>
+                      <a:pPr indent="0" lvl="0" marL="0" rtl="0" algn="l">
+                        <a:spcBef>
+                          <a:spcPts val="0"/>
+                        </a:spcBef>
+                        <a:spcAft>
+                          <a:spcPts val="0"/>
+                        </a:spcAft>
+                        <a:buNone/>
+                      </a:pPr>
+                      <a:r>
+                        <a:rPr lang="en" sz="1700">
+                          <a:latin typeface="Ubuntu Light"/>
+                          <a:ea typeface="Ubuntu Light"/>
+                          <a:cs typeface="Ubuntu Light"/>
+                          <a:sym typeface="Ubuntu Light"/>
+                        </a:rPr>
+                        <a:t>0.87</a:t>
+                      </a:r>
+                      <a:endParaRPr sz="1700">
+                        <a:latin typeface="Ubuntu Light"/>
+                        <a:ea typeface="Ubuntu Light"/>
+                        <a:cs typeface="Ubuntu Light"/>
+                        <a:sym typeface="Ubuntu Light"/>
+                      </a:endParaRPr>
+                    </a:p>
+                  </a:txBody>
+                  <a:tcPr marT="91425" marB="91425" marR="91425" marL="91425"/>
+                </a:tc>
+                <a:tc>
+                  <a:txBody>
+                    <a:bodyPr/>
+                    <a:lstStyle/>
+                    <a:p>
+                      <a:pPr indent="0" lvl="0" marL="0" rtl="0" algn="l">
+                        <a:spcBef>
+                          <a:spcPts val="0"/>
+                        </a:spcBef>
+                        <a:spcAft>
+                          <a:spcPts val="0"/>
+                        </a:spcAft>
+                        <a:buNone/>
+                      </a:pPr>
+                      <a:r>
+                        <a:rPr lang="en" sz="1700">
+                          <a:latin typeface="Ubuntu Light"/>
+                          <a:ea typeface="Ubuntu Light"/>
+                          <a:cs typeface="Ubuntu Light"/>
+                          <a:sym typeface="Ubuntu Light"/>
+                        </a:rPr>
+                        <a:t>0.87</a:t>
+                      </a:r>
+                      <a:endParaRPr sz="1700">
+                        <a:latin typeface="Ubuntu Light"/>
+                        <a:ea typeface="Ubuntu Light"/>
+                        <a:cs typeface="Ubuntu Light"/>
+                        <a:sym typeface="Ubuntu Light"/>
+                      </a:endParaRPr>
+                    </a:p>
+                  </a:txBody>
+                  <a:tcPr marT="91425" marB="91425" marR="91425" marL="91425"/>
+                </a:tc>
+                <a:tc>
+                  <a:txBody>
+                    <a:bodyPr/>
+                    <a:lstStyle/>
+                    <a:p>
+                      <a:pPr indent="0" lvl="0" marL="0" rtl="0" algn="l">
+                        <a:spcBef>
+                          <a:spcPts val="0"/>
+                        </a:spcBef>
+                        <a:spcAft>
+                          <a:spcPts val="0"/>
+                        </a:spcAft>
+                        <a:buNone/>
+                      </a:pPr>
+                      <a:r>
+                        <a:rPr lang="en" sz="1700">
+                          <a:latin typeface="Ubuntu Light"/>
+                          <a:ea typeface="Ubuntu Light"/>
+                          <a:cs typeface="Ubuntu Light"/>
+                          <a:sym typeface="Ubuntu Light"/>
+                        </a:rPr>
+                        <a:t>0.84</a:t>
+                      </a:r>
+                      <a:endParaRPr sz="1700">
+                        <a:latin typeface="Ubuntu Light"/>
+                        <a:ea typeface="Ubuntu Light"/>
+                        <a:cs typeface="Ubuntu Light"/>
+                        <a:sym typeface="Ubuntu Light"/>
+                      </a:endParaRPr>
+                    </a:p>
+                  </a:txBody>
+                  <a:tcPr marT="91425" marB="91425" marR="91425" marL="91425"/>
+                </a:tc>
+                <a:tc>
+                  <a:txBody>
+                    <a:bodyPr/>
+                    <a:lstStyle/>
+                    <a:p>
+                      <a:pPr indent="0" lvl="0" marL="0" rtl="0" algn="l">
+                        <a:spcBef>
+                          <a:spcPts val="0"/>
+                        </a:spcBef>
+                        <a:spcAft>
+                          <a:spcPts val="0"/>
+                        </a:spcAft>
+                        <a:buNone/>
+                      </a:pPr>
+                      <a:r>
+                        <a:t/>
+                      </a:r>
+                      <a:endParaRPr sz="1700">
+                        <a:latin typeface="Ubuntu Light"/>
+                        <a:ea typeface="Ubuntu Light"/>
+                        <a:cs typeface="Ubuntu Light"/>
+                        <a:sym typeface="Ubuntu Light"/>
+                      </a:endParaRPr>
+                    </a:p>
+                  </a:txBody>
+                  <a:tcPr marT="91425" marB="91425" marR="91425" marL="91425"/>
+                </a:tc>
+                <a:tc>
+                  <a:txBody>
+                    <a:bodyPr/>
+                    <a:lstStyle/>
+                    <a:p>
+                      <a:pPr indent="0" lvl="0" marL="0" rtl="0" algn="l">
+                        <a:spcBef>
+                          <a:spcPts val="0"/>
+                        </a:spcBef>
+                        <a:spcAft>
+                          <a:spcPts val="0"/>
+                        </a:spcAft>
+                        <a:buNone/>
+                      </a:pPr>
+                      <a:r>
+                        <a:rPr lang="en" sz="1700">
+                          <a:latin typeface="Ubuntu Light"/>
+                          <a:ea typeface="Ubuntu Light"/>
+                          <a:cs typeface="Ubuntu Light"/>
+                          <a:sym typeface="Ubuntu Light"/>
+                        </a:rPr>
+                        <a:t>0.87</a:t>
+                      </a:r>
+                      <a:endParaRPr sz="1700">
+                        <a:latin typeface="Ubuntu Light"/>
+                        <a:ea typeface="Ubuntu Light"/>
+                        <a:cs typeface="Ubuntu Light"/>
+                        <a:sym typeface="Ubuntu Light"/>
+                      </a:endParaRPr>
+                    </a:p>
+                  </a:txBody>
+                  <a:tcPr marT="91425" marB="91425" marR="91425" marL="91425"/>
+                </a:tc>
+                <a:tc>
+                  <a:txBody>
+                    <a:bodyPr/>
+                    <a:lstStyle/>
+                    <a:p>
+                      <a:pPr indent="0" lvl="0" marL="0" rtl="0" algn="l">
+                        <a:spcBef>
+                          <a:spcPts val="0"/>
+                        </a:spcBef>
+                        <a:spcAft>
+                          <a:spcPts val="0"/>
+                        </a:spcAft>
+                        <a:buNone/>
+                      </a:pPr>
+                      <a:r>
+                        <a:rPr lang="en" sz="1700">
+                          <a:latin typeface="Ubuntu Light"/>
+                          <a:ea typeface="Ubuntu Light"/>
+                          <a:cs typeface="Ubuntu Light"/>
+                          <a:sym typeface="Ubuntu Light"/>
+                        </a:rPr>
+                        <a:t>0.85</a:t>
+                      </a:r>
+                      <a:endParaRPr sz="1700">
+                        <a:latin typeface="Ubuntu Light"/>
+                        <a:ea typeface="Ubuntu Light"/>
+                        <a:cs typeface="Ubuntu Light"/>
+                        <a:sym typeface="Ubuntu Light"/>
+                      </a:endParaRPr>
+                    </a:p>
+                  </a:txBody>
+                  <a:tcPr marT="91425" marB="91425" marR="91425" marL="91425"/>
+                </a:tc>
+              </a:tr>
+              <a:tr h="791800">
+                <a:tc>
+                  <a:txBody>
+                    <a:bodyPr/>
+                    <a:lstStyle/>
+                    <a:p>
+                      <a:pPr indent="0" lvl="0" marL="0" rtl="0" algn="l">
+                        <a:spcBef>
+                          <a:spcPts val="0"/>
+                        </a:spcBef>
+                        <a:spcAft>
+                          <a:spcPts val="0"/>
+                        </a:spcAft>
+                        <a:buNone/>
+                      </a:pPr>
+                      <a:r>
+                        <a:rPr lang="en" sz="1700">
+                          <a:latin typeface="Ubuntu Light"/>
+                          <a:ea typeface="Ubuntu Light"/>
+                          <a:cs typeface="Ubuntu Light"/>
+                          <a:sym typeface="Ubuntu Light"/>
+                        </a:rPr>
+                        <a:t>Accuracy</a:t>
+                      </a:r>
+                      <a:endParaRPr sz="1700">
+                        <a:latin typeface="Ubuntu Light"/>
+                        <a:ea typeface="Ubuntu Light"/>
+                        <a:cs typeface="Ubuntu Light"/>
+                        <a:sym typeface="Ubuntu Light"/>
+                      </a:endParaRPr>
+                    </a:p>
+                  </a:txBody>
+                  <a:tcPr marT="91425" marB="91425" marR="91425" marL="91425"/>
+                </a:tc>
+                <a:tc>
+                  <a:txBody>
+                    <a:bodyPr/>
+                    <a:lstStyle/>
+                    <a:p>
+                      <a:pPr indent="0" lvl="0" marL="0" rtl="0" algn="l">
+                        <a:spcBef>
+                          <a:spcPts val="0"/>
+                        </a:spcBef>
+                        <a:spcAft>
+                          <a:spcPts val="0"/>
+                        </a:spcAft>
+                        <a:buNone/>
+                      </a:pPr>
+                      <a:r>
+                        <a:rPr lang="en" sz="1700">
+                          <a:latin typeface="Ubuntu Light"/>
+                          <a:ea typeface="Ubuntu Light"/>
+                          <a:cs typeface="Ubuntu Light"/>
+                          <a:sym typeface="Ubuntu Light"/>
+                        </a:rPr>
+                        <a:t>0.94</a:t>
+                      </a:r>
+                      <a:endParaRPr sz="1700">
+                        <a:latin typeface="Ubuntu Light"/>
+                        <a:ea typeface="Ubuntu Light"/>
+                        <a:cs typeface="Ubuntu Light"/>
+                        <a:sym typeface="Ubuntu Light"/>
+                      </a:endParaRPr>
+                    </a:p>
+                  </a:txBody>
+                  <a:tcPr marT="91425" marB="91425" marR="91425" marL="91425"/>
+                </a:tc>
+                <a:tc>
+                  <a:txBody>
+                    <a:bodyPr/>
+                    <a:lstStyle/>
+                    <a:p>
+                      <a:pPr indent="0" lvl="0" marL="0" rtl="0" algn="l">
+                        <a:spcBef>
+                          <a:spcPts val="0"/>
+                        </a:spcBef>
+                        <a:spcAft>
+                          <a:spcPts val="0"/>
+                        </a:spcAft>
+                        <a:buNone/>
+                      </a:pPr>
+                      <a:r>
+                        <a:rPr lang="en" sz="1700">
+                          <a:latin typeface="Ubuntu Light"/>
+                          <a:ea typeface="Ubuntu Light"/>
+                          <a:cs typeface="Ubuntu Light"/>
+                          <a:sym typeface="Ubuntu Light"/>
+                        </a:rPr>
+                        <a:t>0.94</a:t>
+                      </a:r>
+                      <a:endParaRPr sz="1700">
+                        <a:latin typeface="Ubuntu Light"/>
+                        <a:ea typeface="Ubuntu Light"/>
+                        <a:cs typeface="Ubuntu Light"/>
+                        <a:sym typeface="Ubuntu Light"/>
+                      </a:endParaRPr>
+                    </a:p>
+                  </a:txBody>
+                  <a:tcPr marT="91425" marB="91425" marR="91425" marL="91425"/>
+                </a:tc>
+                <a:tc>
+                  <a:txBody>
+                    <a:bodyPr/>
+                    <a:lstStyle/>
+                    <a:p>
+                      <a:pPr indent="0" lvl="0" marL="0" rtl="0" algn="l">
+                        <a:spcBef>
+                          <a:spcPts val="0"/>
+                        </a:spcBef>
+                        <a:spcAft>
+                          <a:spcPts val="0"/>
+                        </a:spcAft>
+                        <a:buNone/>
+                      </a:pPr>
+                      <a:r>
+                        <a:rPr lang="en" sz="1700">
+                          <a:latin typeface="Ubuntu Light"/>
+                          <a:ea typeface="Ubuntu Light"/>
+                          <a:cs typeface="Ubuntu Light"/>
+                          <a:sym typeface="Ubuntu Light"/>
+                        </a:rPr>
+                        <a:t>0.94</a:t>
+                      </a:r>
+                      <a:endParaRPr sz="1700">
+                        <a:latin typeface="Ubuntu Light"/>
+                        <a:ea typeface="Ubuntu Light"/>
+                        <a:cs typeface="Ubuntu Light"/>
+                        <a:sym typeface="Ubuntu Light"/>
+                      </a:endParaRPr>
+                    </a:p>
+                  </a:txBody>
+                  <a:tcPr marT="91425" marB="91425" marR="91425" marL="91425"/>
+                </a:tc>
+                <a:tc>
+                  <a:txBody>
+                    <a:bodyPr/>
+                    <a:lstStyle/>
+                    <a:p>
+                      <a:pPr indent="0" lvl="0" marL="0" rtl="0" algn="l">
+                        <a:spcBef>
+                          <a:spcPts val="0"/>
+                        </a:spcBef>
+                        <a:spcAft>
+                          <a:spcPts val="0"/>
+                        </a:spcAft>
+                        <a:buNone/>
+                      </a:pPr>
+                      <a:r>
+                        <a:t/>
+                      </a:r>
+                      <a:endParaRPr sz="1700">
+                        <a:latin typeface="Ubuntu Light"/>
+                        <a:ea typeface="Ubuntu Light"/>
+                        <a:cs typeface="Ubuntu Light"/>
+                        <a:sym typeface="Ubuntu Light"/>
+                      </a:endParaRPr>
+                    </a:p>
+                  </a:txBody>
+                  <a:tcPr marT="91425" marB="91425" marR="91425" marL="91425"/>
+                </a:tc>
+                <a:tc>
+                  <a:txBody>
+                    <a:bodyPr/>
+                    <a:lstStyle/>
+                    <a:p>
+                      <a:pPr indent="0" lvl="0" marL="0" rtl="0" algn="l">
+                        <a:spcBef>
+                          <a:spcPts val="0"/>
+                        </a:spcBef>
+                        <a:spcAft>
+                          <a:spcPts val="0"/>
+                        </a:spcAft>
+                        <a:buNone/>
+                      </a:pPr>
+                      <a:r>
+                        <a:rPr lang="en" sz="1700">
+                          <a:latin typeface="Ubuntu Light"/>
+                          <a:ea typeface="Ubuntu Light"/>
+                          <a:cs typeface="Ubuntu Light"/>
+                          <a:sym typeface="Ubuntu Light"/>
+                        </a:rPr>
+                        <a:t>0.94</a:t>
+                      </a:r>
+                      <a:endParaRPr sz="1700">
+                        <a:latin typeface="Ubuntu Light"/>
+                        <a:ea typeface="Ubuntu Light"/>
+                        <a:cs typeface="Ubuntu Light"/>
+                        <a:sym typeface="Ubuntu Light"/>
+                      </a:endParaRPr>
+                    </a:p>
+                  </a:txBody>
+                  <a:tcPr marT="91425" marB="91425" marR="91425" marL="91425"/>
+                </a:tc>
+                <a:tc>
+                  <a:txBody>
+                    <a:bodyPr/>
+                    <a:lstStyle/>
+                    <a:p>
+                      <a:pPr indent="0" lvl="0" marL="0" rtl="0" algn="l">
+                        <a:spcBef>
+                          <a:spcPts val="0"/>
+                        </a:spcBef>
+                        <a:spcAft>
+                          <a:spcPts val="0"/>
+                        </a:spcAft>
+                        <a:buNone/>
+                      </a:pPr>
+                      <a:r>
+                        <a:rPr lang="en" sz="1700">
+                          <a:latin typeface="Ubuntu Light"/>
+                          <a:ea typeface="Ubuntu Light"/>
+                          <a:cs typeface="Ubuntu Light"/>
+                          <a:sym typeface="Ubuntu Light"/>
+                        </a:rPr>
+                        <a:t>0.87</a:t>
+                      </a:r>
+                      <a:endParaRPr sz="1700">
+                        <a:latin typeface="Ubuntu Light"/>
+                        <a:ea typeface="Ubuntu Light"/>
+                        <a:cs typeface="Ubuntu Light"/>
+                        <a:sym typeface="Ubuntu Light"/>
+                      </a:endParaRPr>
+                    </a:p>
+                  </a:txBody>
+                  <a:tcPr marT="91425" marB="91425" marR="91425" marL="91425"/>
+                </a:tc>
+              </a:tr>
+            </a:tbl>
+          </a:graphicData>
+        </a:graphic>
+      </p:graphicFrame>
     </p:spTree>
   </p:cSld>
   <p:clrMapOvr>
@@ -15460,7 +16238,7 @@
       </p:grpSpPr>
       <p:sp>
         <p:nvSpPr>
-          <p:cNvPr id="191" name="Google Shape;191;p16"/>
+          <p:cNvPr id="191" name="Google Shape;191;gec2e1cceae_0_10"/>
           <p:cNvSpPr txBox="1"/>
           <p:nvPr>
             <p:ph type="title"/>
@@ -15481,7 +16259,7 @@
         </p:spPr>
         <p:txBody>
           <a:bodyPr anchorCtr="0" anchor="b" bIns="91425" lIns="91425" spcFirstLastPara="1" rIns="91425" wrap="square" tIns="91425">
-            <a:normAutofit fontScale="90000"/>
+            <a:normAutofit/>
           </a:bodyPr>
           <a:lstStyle/>
           <a:p>
@@ -15495,7 +16273,7 @@
               <a:spcAft>
                 <a:spcPts val="0"/>
               </a:spcAft>
-              <a:buSzPct val="100000"/>
+              <a:buSzPts val="4200"/>
               <a:buNone/>
             </a:pPr>
             <a:r>
@@ -15505,29 +16283,20 @@
                 <a:cs typeface="Ubuntu"/>
                 <a:sym typeface="Ubuntu"/>
               </a:rPr>
-              <a:t>Summary of </a:t>
-            </a:r>
-            <a:r>
-              <a:rPr lang="en">
-                <a:latin typeface="Consolas"/>
-                <a:ea typeface="Consolas"/>
-                <a:cs typeface="Consolas"/>
-                <a:sym typeface="Consolas"/>
-              </a:rPr>
-              <a:t>classification_report</a:t>
+              <a:t>AGENDA</a:t>
             </a:r>
             <a:endParaRPr>
-              <a:latin typeface="Consolas"/>
-              <a:ea typeface="Consolas"/>
-              <a:cs typeface="Consolas"/>
-              <a:sym typeface="Consolas"/>
+              <a:latin typeface="Ubuntu"/>
+              <a:ea typeface="Ubuntu"/>
+              <a:cs typeface="Ubuntu"/>
+              <a:sym typeface="Ubuntu"/>
             </a:endParaRPr>
           </a:p>
         </p:txBody>
       </p:sp>
       <p:sp>
         <p:nvSpPr>
-          <p:cNvPr id="192" name="Google Shape;192;p16"/>
+          <p:cNvPr id="192" name="Google Shape;192;gec2e1cceae_0_10"/>
           <p:cNvSpPr txBox="1"/>
           <p:nvPr>
             <p:ph idx="1" type="body"/>
@@ -15552,28 +16321,281 @@
           </a:bodyPr>
           <a:lstStyle/>
           <a:p>
-            <a:pPr indent="-342900" lvl="0" marL="457200" rtl="0" algn="l">
-              <a:lnSpc>
-                <a:spcPct val="115000"/>
-              </a:lnSpc>
-              <a:spcBef>
-                <a:spcPts val="1200"/>
-              </a:spcBef>
-              <a:spcAft>
-                <a:spcPts val="0"/>
-              </a:spcAft>
-              <a:buSzPts val="1800"/>
-              <a:buFont typeface="Ubuntu"/>
+            <a:pPr indent="-368300" lvl="0" marL="457200" rtl="0" algn="l">
+              <a:spcBef>
+                <a:spcPts val="0"/>
+              </a:spcBef>
+              <a:spcAft>
+                <a:spcPts val="0"/>
+              </a:spcAft>
+              <a:buClr>
+                <a:schemeClr val="dk2"/>
+              </a:buClr>
+              <a:buSzPts val="2200"/>
+              <a:buFont typeface="Ubuntu Light"/>
               <a:buChar char="●"/>
             </a:pPr>
             <a:r>
-              <a:t/>
+              <a:rPr lang="en" sz="2200">
+                <a:solidFill>
+                  <a:schemeClr val="dk2"/>
+                </a:solidFill>
+                <a:latin typeface="Ubuntu Light"/>
+                <a:ea typeface="Ubuntu Light"/>
+                <a:cs typeface="Ubuntu Light"/>
+                <a:sym typeface="Ubuntu Light"/>
+              </a:rPr>
+              <a:t>Project Overview</a:t>
+            </a:r>
+            <a:endParaRPr sz="2200">
+              <a:solidFill>
+                <a:schemeClr val="dk2"/>
+              </a:solidFill>
+              <a:latin typeface="Ubuntu Light"/>
+              <a:ea typeface="Ubuntu Light"/>
+              <a:cs typeface="Ubuntu Light"/>
+              <a:sym typeface="Ubuntu Light"/>
+            </a:endParaRPr>
+          </a:p>
+          <a:p>
+            <a:pPr indent="-368300" lvl="0" marL="457200" rtl="0" algn="l">
+              <a:spcBef>
+                <a:spcPts val="0"/>
+              </a:spcBef>
+              <a:spcAft>
+                <a:spcPts val="0"/>
+              </a:spcAft>
+              <a:buClr>
+                <a:schemeClr val="dk2"/>
+              </a:buClr>
+              <a:buSzPts val="2200"/>
+              <a:buFont typeface="Ubuntu Light"/>
+              <a:buChar char="●"/>
+            </a:pPr>
+            <a:r>
+              <a:rPr lang="en" sz="2200">
+                <a:solidFill>
+                  <a:schemeClr val="dk2"/>
+                </a:solidFill>
+                <a:latin typeface="Ubuntu Light"/>
+                <a:ea typeface="Ubuntu Light"/>
+                <a:cs typeface="Ubuntu Light"/>
+                <a:sym typeface="Ubuntu Light"/>
+              </a:rPr>
+              <a:t>Data Overview</a:t>
+            </a:r>
+            <a:endParaRPr sz="2200">
+              <a:solidFill>
+                <a:schemeClr val="dk2"/>
+              </a:solidFill>
+              <a:latin typeface="Ubuntu Light"/>
+              <a:ea typeface="Ubuntu Light"/>
+              <a:cs typeface="Ubuntu Light"/>
+              <a:sym typeface="Ubuntu Light"/>
+            </a:endParaRPr>
+          </a:p>
+          <a:p>
+            <a:pPr indent="-368300" lvl="0" marL="457200" rtl="0" algn="l">
+              <a:spcBef>
+                <a:spcPts val="0"/>
+              </a:spcBef>
+              <a:spcAft>
+                <a:spcPts val="0"/>
+              </a:spcAft>
+              <a:buClr>
+                <a:schemeClr val="dk2"/>
+              </a:buClr>
+              <a:buSzPts val="2200"/>
+              <a:buFont typeface="Ubuntu Light"/>
+              <a:buChar char="●"/>
+            </a:pPr>
+            <a:r>
+              <a:rPr lang="en" sz="2200">
+                <a:solidFill>
+                  <a:schemeClr val="dk2"/>
+                </a:solidFill>
+                <a:latin typeface="Ubuntu Light"/>
+                <a:ea typeface="Ubuntu Light"/>
+                <a:cs typeface="Ubuntu Light"/>
+                <a:sym typeface="Ubuntu Light"/>
+              </a:rPr>
+              <a:t>EDA and Pipeline Set Up</a:t>
+            </a:r>
+            <a:endParaRPr sz="2200">
+              <a:solidFill>
+                <a:schemeClr val="dk2"/>
+              </a:solidFill>
+              <a:latin typeface="Ubuntu Light"/>
+              <a:ea typeface="Ubuntu Light"/>
+              <a:cs typeface="Ubuntu Light"/>
+              <a:sym typeface="Ubuntu Light"/>
+            </a:endParaRPr>
+          </a:p>
+          <a:p>
+            <a:pPr indent="-368300" lvl="0" marL="457200" rtl="0" algn="l">
+              <a:spcBef>
+                <a:spcPts val="0"/>
+              </a:spcBef>
+              <a:spcAft>
+                <a:spcPts val="0"/>
+              </a:spcAft>
+              <a:buClr>
+                <a:schemeClr val="dk2"/>
+              </a:buClr>
+              <a:buSzPts val="2200"/>
+              <a:buFont typeface="Ubuntu Light"/>
+              <a:buChar char="●"/>
+            </a:pPr>
+            <a:r>
+              <a:rPr lang="en" sz="2200">
+                <a:solidFill>
+                  <a:schemeClr val="dk2"/>
+                </a:solidFill>
+                <a:latin typeface="Ubuntu Light"/>
+                <a:ea typeface="Ubuntu Light"/>
+                <a:cs typeface="Ubuntu Light"/>
+                <a:sym typeface="Ubuntu Light"/>
+              </a:rPr>
+              <a:t>ML Algorithms</a:t>
+            </a:r>
+            <a:endParaRPr sz="2200">
+              <a:solidFill>
+                <a:schemeClr val="dk2"/>
+              </a:solidFill>
+              <a:latin typeface="Ubuntu Light"/>
+              <a:ea typeface="Ubuntu Light"/>
+              <a:cs typeface="Ubuntu Light"/>
+              <a:sym typeface="Ubuntu Light"/>
+            </a:endParaRPr>
+          </a:p>
+          <a:p>
+            <a:pPr indent="-368300" lvl="0" marL="457200" rtl="0" algn="l">
+              <a:spcBef>
+                <a:spcPts val="0"/>
+              </a:spcBef>
+              <a:spcAft>
+                <a:spcPts val="0"/>
+              </a:spcAft>
+              <a:buSzPts val="2200"/>
+              <a:buFont typeface="Ubuntu Light"/>
+              <a:buChar char="●"/>
+            </a:pPr>
+            <a:r>
+              <a:rPr lang="en" sz="2200">
+                <a:latin typeface="Ubuntu Light"/>
+                <a:ea typeface="Ubuntu Light"/>
+                <a:cs typeface="Ubuntu Light"/>
+                <a:sym typeface="Ubuntu Light"/>
+              </a:rPr>
+              <a:t>Summary</a:t>
+            </a:r>
+            <a:endParaRPr sz="2200">
+              <a:latin typeface="Ubuntu Light"/>
+              <a:ea typeface="Ubuntu Light"/>
+              <a:cs typeface="Ubuntu Light"/>
+              <a:sym typeface="Ubuntu Light"/>
+            </a:endParaRPr>
+          </a:p>
+          <a:p>
+            <a:pPr indent="-368300" lvl="0" marL="457200" rtl="0" algn="l">
+              <a:spcBef>
+                <a:spcPts val="0"/>
+              </a:spcBef>
+              <a:spcAft>
+                <a:spcPts val="0"/>
+              </a:spcAft>
+              <a:buSzPts val="2200"/>
+              <a:buFont typeface="Ubuntu Light"/>
+              <a:buChar char="●"/>
+            </a:pPr>
+            <a:r>
+              <a:rPr lang="en" sz="2200">
+                <a:latin typeface="Ubuntu Light"/>
+                <a:ea typeface="Ubuntu Light"/>
+                <a:cs typeface="Ubuntu Light"/>
+                <a:sym typeface="Ubuntu Light"/>
+              </a:rPr>
+              <a:t>Final Report</a:t>
+            </a:r>
+            <a:endParaRPr sz="2200">
+              <a:latin typeface="Ubuntu Light"/>
+              <a:ea typeface="Ubuntu Light"/>
+              <a:cs typeface="Ubuntu Light"/>
+              <a:sym typeface="Ubuntu Light"/>
+            </a:endParaRPr>
+          </a:p>
+          <a:p>
+            <a:pPr indent="-368300" lvl="0" marL="457200" rtl="0" algn="l">
+              <a:spcBef>
+                <a:spcPts val="0"/>
+              </a:spcBef>
+              <a:spcAft>
+                <a:spcPts val="0"/>
+              </a:spcAft>
+              <a:buClr>
+                <a:schemeClr val="dk2"/>
+              </a:buClr>
+              <a:buSzPts val="2200"/>
+              <a:buFont typeface="Ubuntu Light"/>
+              <a:buChar char="●"/>
+            </a:pPr>
+            <a:r>
+              <a:rPr lang="en" sz="2200">
+                <a:solidFill>
+                  <a:schemeClr val="dk2"/>
+                </a:solidFill>
+                <a:latin typeface="Ubuntu Light"/>
+                <a:ea typeface="Ubuntu Light"/>
+                <a:cs typeface="Ubuntu Light"/>
+                <a:sym typeface="Ubuntu Light"/>
+              </a:rPr>
+              <a:t>Known Limitations of Project</a:t>
+            </a:r>
+            <a:endParaRPr sz="2200">
+              <a:solidFill>
+                <a:schemeClr val="dk2"/>
+              </a:solidFill>
+              <a:latin typeface="Ubuntu Light"/>
+              <a:ea typeface="Ubuntu Light"/>
+              <a:cs typeface="Ubuntu Light"/>
+              <a:sym typeface="Ubuntu Light"/>
+            </a:endParaRPr>
+          </a:p>
+          <a:p>
+            <a:pPr indent="-368300" lvl="0" marL="457200" rtl="0" algn="l">
+              <a:spcBef>
+                <a:spcPts val="0"/>
+              </a:spcBef>
+              <a:spcAft>
+                <a:spcPts val="0"/>
+              </a:spcAft>
+              <a:buClr>
+                <a:schemeClr val="dk2"/>
+              </a:buClr>
+              <a:buSzPts val="2200"/>
+              <a:buFont typeface="Ubuntu Light"/>
+              <a:buChar char="●"/>
+            </a:pPr>
+            <a:r>
+              <a:rPr lang="en" sz="2200">
+                <a:solidFill>
+                  <a:schemeClr val="dk2"/>
+                </a:solidFill>
+                <a:latin typeface="Ubuntu Light"/>
+                <a:ea typeface="Ubuntu Light"/>
+                <a:cs typeface="Ubuntu Light"/>
+                <a:sym typeface="Ubuntu Light"/>
+              </a:rPr>
+              <a:t>Potential Future Development</a:t>
             </a:r>
             <a:endParaRPr>
-              <a:latin typeface="Ubuntu"/>
-              <a:ea typeface="Ubuntu"/>
-              <a:cs typeface="Ubuntu"/>
-              <a:sym typeface="Ubuntu"/>
+              <a:solidFill>
+                <a:schemeClr val="dk2"/>
+              </a:solidFill>
+              <a:latin typeface="Ubuntu Light"/>
+              <a:ea typeface="Ubuntu Light"/>
+              <a:cs typeface="Ubuntu Light"/>
+              <a:sym typeface="Ubuntu Light"/>
             </a:endParaRPr>
           </a:p>
         </p:txBody>
@@ -15605,7 +16627,7 @@
       </p:grpSpPr>
       <p:sp>
         <p:nvSpPr>
-          <p:cNvPr id="197" name="Google Shape;197;gec2e1cceae_0_20"/>
+          <p:cNvPr id="197" name="Google Shape;197;p16"/>
           <p:cNvSpPr txBox="1"/>
           <p:nvPr>
             <p:ph type="title"/>
@@ -15626,7 +16648,7 @@
         </p:spPr>
         <p:txBody>
           <a:bodyPr anchorCtr="0" anchor="b" bIns="91425" lIns="91425" spcFirstLastPara="1" rIns="91425" wrap="square" tIns="91425">
-            <a:normAutofit/>
+            <a:normAutofit fontScale="90000"/>
           </a:bodyPr>
           <a:lstStyle/>
           <a:p>
@@ -15640,7 +16662,7 @@
               <a:spcAft>
                 <a:spcPts val="0"/>
               </a:spcAft>
-              <a:buSzPts val="4200"/>
+              <a:buSzPct val="100000"/>
               <a:buNone/>
             </a:pPr>
             <a:r>
@@ -15650,20 +16672,29 @@
                 <a:cs typeface="Ubuntu"/>
                 <a:sym typeface="Ubuntu"/>
               </a:rPr>
-              <a:t>AGENDA</a:t>
+              <a:t>Summary of </a:t>
+            </a:r>
+            <a:r>
+              <a:rPr lang="en">
+                <a:latin typeface="Consolas"/>
+                <a:ea typeface="Consolas"/>
+                <a:cs typeface="Consolas"/>
+                <a:sym typeface="Consolas"/>
+              </a:rPr>
+              <a:t>classification_report</a:t>
             </a:r>
             <a:endParaRPr>
-              <a:latin typeface="Ubuntu"/>
-              <a:ea typeface="Ubuntu"/>
-              <a:cs typeface="Ubuntu"/>
-              <a:sym typeface="Ubuntu"/>
+              <a:latin typeface="Consolas"/>
+              <a:ea typeface="Consolas"/>
+              <a:cs typeface="Consolas"/>
+              <a:sym typeface="Consolas"/>
             </a:endParaRPr>
           </a:p>
         </p:txBody>
       </p:sp>
       <p:sp>
         <p:nvSpPr>
-          <p:cNvPr id="198" name="Google Shape;198;gec2e1cceae_0_20"/>
+          <p:cNvPr id="198" name="Google Shape;198;p16"/>
           <p:cNvSpPr txBox="1"/>
           <p:nvPr>
             <p:ph idx="1" type="body"/>
@@ -15688,290 +16719,28 @@
           </a:bodyPr>
           <a:lstStyle/>
           <a:p>
-            <a:pPr indent="-368300" lvl="0" marL="457200" rtl="0" algn="l">
-              <a:spcBef>
-                <a:spcPts val="0"/>
-              </a:spcBef>
-              <a:spcAft>
-                <a:spcPts val="0"/>
-              </a:spcAft>
-              <a:buClr>
-                <a:schemeClr val="dk2"/>
-              </a:buClr>
-              <a:buSzPts val="2200"/>
-              <a:buFont typeface="Ubuntu Light"/>
+            <a:pPr indent="-342900" lvl="0" marL="457200" rtl="0" algn="l">
+              <a:lnSpc>
+                <a:spcPct val="115000"/>
+              </a:lnSpc>
+              <a:spcBef>
+                <a:spcPts val="1200"/>
+              </a:spcBef>
+              <a:spcAft>
+                <a:spcPts val="0"/>
+              </a:spcAft>
+              <a:buSzPts val="1800"/>
+              <a:buFont typeface="Ubuntu"/>
               <a:buChar char="●"/>
             </a:pPr>
             <a:r>
-              <a:rPr lang="en" sz="2200">
-                <a:solidFill>
-                  <a:schemeClr val="dk2"/>
-                </a:solidFill>
-                <a:latin typeface="Ubuntu Light"/>
-                <a:ea typeface="Ubuntu Light"/>
-                <a:cs typeface="Ubuntu Light"/>
-                <a:sym typeface="Ubuntu Light"/>
-              </a:rPr>
-              <a:t>Project Overview</a:t>
-            </a:r>
-            <a:endParaRPr sz="2200">
-              <a:solidFill>
-                <a:schemeClr val="dk2"/>
-              </a:solidFill>
-              <a:latin typeface="Ubuntu Light"/>
-              <a:ea typeface="Ubuntu Light"/>
-              <a:cs typeface="Ubuntu Light"/>
-              <a:sym typeface="Ubuntu Light"/>
-            </a:endParaRPr>
-          </a:p>
-          <a:p>
-            <a:pPr indent="-368300" lvl="0" marL="457200" rtl="0" algn="l">
-              <a:spcBef>
-                <a:spcPts val="0"/>
-              </a:spcBef>
-              <a:spcAft>
-                <a:spcPts val="0"/>
-              </a:spcAft>
-              <a:buClr>
-                <a:schemeClr val="dk2"/>
-              </a:buClr>
-              <a:buSzPts val="2200"/>
-              <a:buFont typeface="Ubuntu Light"/>
-              <a:buChar char="●"/>
-            </a:pPr>
-            <a:r>
-              <a:rPr lang="en" sz="2200">
-                <a:solidFill>
-                  <a:schemeClr val="dk2"/>
-                </a:solidFill>
-                <a:latin typeface="Ubuntu Light"/>
-                <a:ea typeface="Ubuntu Light"/>
-                <a:cs typeface="Ubuntu Light"/>
-                <a:sym typeface="Ubuntu Light"/>
-              </a:rPr>
-              <a:t>Data Overview</a:t>
-            </a:r>
-            <a:endParaRPr sz="2200">
-              <a:solidFill>
-                <a:schemeClr val="dk2"/>
-              </a:solidFill>
-              <a:latin typeface="Ubuntu Light"/>
-              <a:ea typeface="Ubuntu Light"/>
-              <a:cs typeface="Ubuntu Light"/>
-              <a:sym typeface="Ubuntu Light"/>
-            </a:endParaRPr>
-          </a:p>
-          <a:p>
-            <a:pPr indent="-368300" lvl="0" marL="457200" rtl="0" algn="l">
-              <a:spcBef>
-                <a:spcPts val="0"/>
-              </a:spcBef>
-              <a:spcAft>
-                <a:spcPts val="0"/>
-              </a:spcAft>
-              <a:buClr>
-                <a:schemeClr val="dk2"/>
-              </a:buClr>
-              <a:buSzPts val="2200"/>
-              <a:buFont typeface="Ubuntu Light"/>
-              <a:buChar char="●"/>
-            </a:pPr>
-            <a:r>
-              <a:rPr lang="en" sz="2200">
-                <a:solidFill>
-                  <a:schemeClr val="dk2"/>
-                </a:solidFill>
-                <a:latin typeface="Ubuntu Light"/>
-                <a:ea typeface="Ubuntu Light"/>
-                <a:cs typeface="Ubuntu Light"/>
-                <a:sym typeface="Ubuntu Light"/>
-              </a:rPr>
-              <a:t>EDA and Pipeline Set Up</a:t>
-            </a:r>
-            <a:endParaRPr sz="2200">
-              <a:solidFill>
-                <a:schemeClr val="dk2"/>
-              </a:solidFill>
-              <a:latin typeface="Ubuntu Light"/>
-              <a:ea typeface="Ubuntu Light"/>
-              <a:cs typeface="Ubuntu Light"/>
-              <a:sym typeface="Ubuntu Light"/>
-            </a:endParaRPr>
-          </a:p>
-          <a:p>
-            <a:pPr indent="-368300" lvl="0" marL="457200" rtl="0" algn="l">
-              <a:spcBef>
-                <a:spcPts val="0"/>
-              </a:spcBef>
-              <a:spcAft>
-                <a:spcPts val="0"/>
-              </a:spcAft>
-              <a:buClr>
-                <a:schemeClr val="dk2"/>
-              </a:buClr>
-              <a:buSzPts val="2200"/>
-              <a:buFont typeface="Ubuntu Light"/>
-              <a:buChar char="●"/>
-            </a:pPr>
-            <a:r>
-              <a:rPr lang="en" sz="2200">
-                <a:solidFill>
-                  <a:schemeClr val="dk2"/>
-                </a:solidFill>
-                <a:latin typeface="Ubuntu Light"/>
-                <a:ea typeface="Ubuntu Light"/>
-                <a:cs typeface="Ubuntu Light"/>
-                <a:sym typeface="Ubuntu Light"/>
-              </a:rPr>
-              <a:t>ML Algorithms</a:t>
-            </a:r>
-            <a:endParaRPr sz="2200">
-              <a:solidFill>
-                <a:schemeClr val="dk2"/>
-              </a:solidFill>
-              <a:latin typeface="Ubuntu Light"/>
-              <a:ea typeface="Ubuntu Light"/>
-              <a:cs typeface="Ubuntu Light"/>
-              <a:sym typeface="Ubuntu Light"/>
-            </a:endParaRPr>
-          </a:p>
-          <a:p>
-            <a:pPr indent="-368300" lvl="0" marL="457200" rtl="0" algn="l">
-              <a:spcBef>
-                <a:spcPts val="0"/>
-              </a:spcBef>
-              <a:spcAft>
-                <a:spcPts val="0"/>
-              </a:spcAft>
-              <a:buClr>
-                <a:schemeClr val="dk2"/>
-              </a:buClr>
-              <a:buSzPts val="2200"/>
-              <a:buFont typeface="Ubuntu Light"/>
-              <a:buChar char="●"/>
-            </a:pPr>
-            <a:r>
-              <a:rPr lang="en" sz="2200">
-                <a:solidFill>
-                  <a:schemeClr val="dk2"/>
-                </a:solidFill>
-                <a:latin typeface="Ubuntu Light"/>
-                <a:ea typeface="Ubuntu Light"/>
-                <a:cs typeface="Ubuntu Light"/>
-                <a:sym typeface="Ubuntu Light"/>
-              </a:rPr>
-              <a:t>Summary</a:t>
-            </a:r>
-            <a:endParaRPr sz="2200">
-              <a:solidFill>
-                <a:schemeClr val="dk2"/>
-              </a:solidFill>
-              <a:latin typeface="Ubuntu Light"/>
-              <a:ea typeface="Ubuntu Light"/>
-              <a:cs typeface="Ubuntu Light"/>
-              <a:sym typeface="Ubuntu Light"/>
-            </a:endParaRPr>
-          </a:p>
-          <a:p>
-            <a:pPr indent="-368300" lvl="0" marL="457200" rtl="0" algn="l">
-              <a:spcBef>
-                <a:spcPts val="0"/>
-              </a:spcBef>
-              <a:spcAft>
-                <a:spcPts val="0"/>
-              </a:spcAft>
-              <a:buClr>
-                <a:schemeClr val="dk2"/>
-              </a:buClr>
-              <a:buSzPts val="2200"/>
-              <a:buFont typeface="Ubuntu Light"/>
-              <a:buChar char="●"/>
-            </a:pPr>
-            <a:r>
-              <a:rPr lang="en" sz="2200">
-                <a:solidFill>
-                  <a:schemeClr val="dk2"/>
-                </a:solidFill>
-                <a:latin typeface="Ubuntu Light"/>
-                <a:ea typeface="Ubuntu Light"/>
-                <a:cs typeface="Ubuntu Light"/>
-                <a:sym typeface="Ubuntu Light"/>
-              </a:rPr>
-              <a:t>Final Report</a:t>
-            </a:r>
-            <a:endParaRPr sz="2200">
-              <a:solidFill>
-                <a:schemeClr val="dk2"/>
-              </a:solidFill>
-              <a:latin typeface="Ubuntu Light"/>
-              <a:ea typeface="Ubuntu Light"/>
-              <a:cs typeface="Ubuntu Light"/>
-              <a:sym typeface="Ubuntu Light"/>
-            </a:endParaRPr>
-          </a:p>
-          <a:p>
-            <a:pPr indent="-368300" lvl="0" marL="457200" rtl="0" algn="l">
-              <a:spcBef>
-                <a:spcPts val="0"/>
-              </a:spcBef>
-              <a:spcAft>
-                <a:spcPts val="0"/>
-              </a:spcAft>
-              <a:buSzPts val="2200"/>
-              <a:buFont typeface="Ubuntu Light"/>
-              <a:buChar char="●"/>
-            </a:pPr>
-            <a:r>
-              <a:rPr lang="en" sz="2200">
-                <a:latin typeface="Ubuntu Light"/>
-                <a:ea typeface="Ubuntu Light"/>
-                <a:cs typeface="Ubuntu Light"/>
-                <a:sym typeface="Ubuntu Light"/>
-              </a:rPr>
-              <a:t>Known Limitations of Project</a:t>
-            </a:r>
-            <a:endParaRPr sz="2200">
-              <a:latin typeface="Ubuntu Light"/>
-              <a:ea typeface="Ubuntu Light"/>
-              <a:cs typeface="Ubuntu Light"/>
-              <a:sym typeface="Ubuntu Light"/>
-            </a:endParaRPr>
-          </a:p>
-          <a:p>
-            <a:pPr indent="-368300" lvl="0" marL="457200" rtl="0" algn="l">
-              <a:spcBef>
-                <a:spcPts val="0"/>
-              </a:spcBef>
-              <a:spcAft>
-                <a:spcPts val="0"/>
-              </a:spcAft>
-              <a:buClr>
-                <a:schemeClr val="dk2"/>
-              </a:buClr>
-              <a:buSzPts val="2200"/>
-              <a:buFont typeface="Ubuntu Light"/>
-              <a:buChar char="●"/>
-            </a:pPr>
-            <a:r>
-              <a:rPr lang="en" sz="2200">
-                <a:solidFill>
-                  <a:schemeClr val="dk2"/>
-                </a:solidFill>
-                <a:latin typeface="Ubuntu Light"/>
-                <a:ea typeface="Ubuntu Light"/>
-                <a:cs typeface="Ubuntu Light"/>
-                <a:sym typeface="Ubuntu Light"/>
-              </a:rPr>
-              <a:t>Potential Future Development</a:t>
+              <a:t/>
             </a:r>
             <a:endParaRPr>
-              <a:solidFill>
-                <a:schemeClr val="dk2"/>
-              </a:solidFill>
-              <a:latin typeface="Ubuntu Light"/>
-              <a:ea typeface="Ubuntu Light"/>
-              <a:cs typeface="Ubuntu Light"/>
-              <a:sym typeface="Ubuntu Light"/>
+              <a:latin typeface="Ubuntu"/>
+              <a:ea typeface="Ubuntu"/>
+              <a:cs typeface="Ubuntu"/>
+              <a:sym typeface="Ubuntu"/>
             </a:endParaRPr>
           </a:p>
         </p:txBody>
@@ -16003,7 +16772,7 @@
       </p:grpSpPr>
       <p:sp>
         <p:nvSpPr>
-          <p:cNvPr id="203" name="Google Shape;203;p25"/>
+          <p:cNvPr id="203" name="Google Shape;203;gec2e1cceae_0_20"/>
           <p:cNvSpPr txBox="1"/>
           <p:nvPr>
             <p:ph type="title"/>
@@ -16011,8 +16780,8 @@
         </p:nvSpPr>
         <p:spPr>
           <a:xfrm>
-            <a:off x="56950" y="202100"/>
-            <a:ext cx="9483300" cy="831300"/>
+            <a:off x="311700" y="315925"/>
+            <a:ext cx="8520600" cy="831300"/>
           </a:xfrm>
           <a:prstGeom prst="rect">
             <a:avLst/>
@@ -16048,7 +16817,7 @@
                 <a:cs typeface="Ubuntu"/>
                 <a:sym typeface="Ubuntu"/>
               </a:rPr>
-              <a:t>Known Limitations of Project</a:t>
+              <a:t>AGENDA</a:t>
             </a:r>
             <a:endParaRPr>
               <a:latin typeface="Ubuntu"/>
@@ -16061,7 +16830,7 @@
       </p:sp>
       <p:sp>
         <p:nvSpPr>
-          <p:cNvPr id="204" name="Google Shape;204;p25"/>
+          <p:cNvPr id="204" name="Google Shape;204;gec2e1cceae_0_20"/>
           <p:cNvSpPr txBox="1"/>
           <p:nvPr>
             <p:ph idx="1" type="body"/>
@@ -16069,8 +16838,8 @@
         </p:nvSpPr>
         <p:spPr>
           <a:xfrm>
-            <a:off x="0" y="985800"/>
-            <a:ext cx="5478000" cy="3171900"/>
+            <a:off x="311700" y="1225225"/>
+            <a:ext cx="8520600" cy="3354000"/>
           </a:xfrm>
           <a:prstGeom prst="rect">
             <a:avLst/>
@@ -16086,28 +16855,290 @@
           </a:bodyPr>
           <a:lstStyle/>
           <a:p>
-            <a:pPr indent="-342900" lvl="0" marL="457200" rtl="0" algn="l">
-              <a:lnSpc>
-                <a:spcPct val="115000"/>
-              </a:lnSpc>
-              <a:spcBef>
-                <a:spcPts val="0"/>
-              </a:spcBef>
-              <a:spcAft>
-                <a:spcPts val="0"/>
-              </a:spcAft>
-              <a:buSzPts val="1800"/>
-              <a:buFont typeface="Ubuntu"/>
+            <a:pPr indent="-368300" lvl="0" marL="457200" rtl="0" algn="l">
+              <a:spcBef>
+                <a:spcPts val="0"/>
+              </a:spcBef>
+              <a:spcAft>
+                <a:spcPts val="0"/>
+              </a:spcAft>
+              <a:buClr>
+                <a:schemeClr val="dk2"/>
+              </a:buClr>
+              <a:buSzPts val="2200"/>
+              <a:buFont typeface="Ubuntu Light"/>
               <a:buChar char="●"/>
             </a:pPr>
             <a:r>
-              <a:t/>
+              <a:rPr lang="en" sz="2200">
+                <a:solidFill>
+                  <a:schemeClr val="dk2"/>
+                </a:solidFill>
+                <a:latin typeface="Ubuntu Light"/>
+                <a:ea typeface="Ubuntu Light"/>
+                <a:cs typeface="Ubuntu Light"/>
+                <a:sym typeface="Ubuntu Light"/>
+              </a:rPr>
+              <a:t>Project Overview</a:t>
+            </a:r>
+            <a:endParaRPr sz="2200">
+              <a:solidFill>
+                <a:schemeClr val="dk2"/>
+              </a:solidFill>
+              <a:latin typeface="Ubuntu Light"/>
+              <a:ea typeface="Ubuntu Light"/>
+              <a:cs typeface="Ubuntu Light"/>
+              <a:sym typeface="Ubuntu Light"/>
+            </a:endParaRPr>
+          </a:p>
+          <a:p>
+            <a:pPr indent="-368300" lvl="0" marL="457200" rtl="0" algn="l">
+              <a:spcBef>
+                <a:spcPts val="0"/>
+              </a:spcBef>
+              <a:spcAft>
+                <a:spcPts val="0"/>
+              </a:spcAft>
+              <a:buClr>
+                <a:schemeClr val="dk2"/>
+              </a:buClr>
+              <a:buSzPts val="2200"/>
+              <a:buFont typeface="Ubuntu Light"/>
+              <a:buChar char="●"/>
+            </a:pPr>
+            <a:r>
+              <a:rPr lang="en" sz="2200">
+                <a:solidFill>
+                  <a:schemeClr val="dk2"/>
+                </a:solidFill>
+                <a:latin typeface="Ubuntu Light"/>
+                <a:ea typeface="Ubuntu Light"/>
+                <a:cs typeface="Ubuntu Light"/>
+                <a:sym typeface="Ubuntu Light"/>
+              </a:rPr>
+              <a:t>Data Overview</a:t>
+            </a:r>
+            <a:endParaRPr sz="2200">
+              <a:solidFill>
+                <a:schemeClr val="dk2"/>
+              </a:solidFill>
+              <a:latin typeface="Ubuntu Light"/>
+              <a:ea typeface="Ubuntu Light"/>
+              <a:cs typeface="Ubuntu Light"/>
+              <a:sym typeface="Ubuntu Light"/>
+            </a:endParaRPr>
+          </a:p>
+          <a:p>
+            <a:pPr indent="-368300" lvl="0" marL="457200" rtl="0" algn="l">
+              <a:spcBef>
+                <a:spcPts val="0"/>
+              </a:spcBef>
+              <a:spcAft>
+                <a:spcPts val="0"/>
+              </a:spcAft>
+              <a:buClr>
+                <a:schemeClr val="dk2"/>
+              </a:buClr>
+              <a:buSzPts val="2200"/>
+              <a:buFont typeface="Ubuntu Light"/>
+              <a:buChar char="●"/>
+            </a:pPr>
+            <a:r>
+              <a:rPr lang="en" sz="2200">
+                <a:solidFill>
+                  <a:schemeClr val="dk2"/>
+                </a:solidFill>
+                <a:latin typeface="Ubuntu Light"/>
+                <a:ea typeface="Ubuntu Light"/>
+                <a:cs typeface="Ubuntu Light"/>
+                <a:sym typeface="Ubuntu Light"/>
+              </a:rPr>
+              <a:t>EDA and Pipeline Set Up</a:t>
+            </a:r>
+            <a:endParaRPr sz="2200">
+              <a:solidFill>
+                <a:schemeClr val="dk2"/>
+              </a:solidFill>
+              <a:latin typeface="Ubuntu Light"/>
+              <a:ea typeface="Ubuntu Light"/>
+              <a:cs typeface="Ubuntu Light"/>
+              <a:sym typeface="Ubuntu Light"/>
+            </a:endParaRPr>
+          </a:p>
+          <a:p>
+            <a:pPr indent="-368300" lvl="0" marL="457200" rtl="0" algn="l">
+              <a:spcBef>
+                <a:spcPts val="0"/>
+              </a:spcBef>
+              <a:spcAft>
+                <a:spcPts val="0"/>
+              </a:spcAft>
+              <a:buClr>
+                <a:schemeClr val="dk2"/>
+              </a:buClr>
+              <a:buSzPts val="2200"/>
+              <a:buFont typeface="Ubuntu Light"/>
+              <a:buChar char="●"/>
+            </a:pPr>
+            <a:r>
+              <a:rPr lang="en" sz="2200">
+                <a:solidFill>
+                  <a:schemeClr val="dk2"/>
+                </a:solidFill>
+                <a:latin typeface="Ubuntu Light"/>
+                <a:ea typeface="Ubuntu Light"/>
+                <a:cs typeface="Ubuntu Light"/>
+                <a:sym typeface="Ubuntu Light"/>
+              </a:rPr>
+              <a:t>ML Algorithms</a:t>
+            </a:r>
+            <a:endParaRPr sz="2200">
+              <a:solidFill>
+                <a:schemeClr val="dk2"/>
+              </a:solidFill>
+              <a:latin typeface="Ubuntu Light"/>
+              <a:ea typeface="Ubuntu Light"/>
+              <a:cs typeface="Ubuntu Light"/>
+              <a:sym typeface="Ubuntu Light"/>
+            </a:endParaRPr>
+          </a:p>
+          <a:p>
+            <a:pPr indent="-368300" lvl="0" marL="457200" rtl="0" algn="l">
+              <a:spcBef>
+                <a:spcPts val="0"/>
+              </a:spcBef>
+              <a:spcAft>
+                <a:spcPts val="0"/>
+              </a:spcAft>
+              <a:buClr>
+                <a:schemeClr val="dk2"/>
+              </a:buClr>
+              <a:buSzPts val="2200"/>
+              <a:buFont typeface="Ubuntu Light"/>
+              <a:buChar char="●"/>
+            </a:pPr>
+            <a:r>
+              <a:rPr lang="en" sz="2200">
+                <a:solidFill>
+                  <a:schemeClr val="dk2"/>
+                </a:solidFill>
+                <a:latin typeface="Ubuntu Light"/>
+                <a:ea typeface="Ubuntu Light"/>
+                <a:cs typeface="Ubuntu Light"/>
+                <a:sym typeface="Ubuntu Light"/>
+              </a:rPr>
+              <a:t>Summary</a:t>
+            </a:r>
+            <a:endParaRPr sz="2200">
+              <a:solidFill>
+                <a:schemeClr val="dk2"/>
+              </a:solidFill>
+              <a:latin typeface="Ubuntu Light"/>
+              <a:ea typeface="Ubuntu Light"/>
+              <a:cs typeface="Ubuntu Light"/>
+              <a:sym typeface="Ubuntu Light"/>
+            </a:endParaRPr>
+          </a:p>
+          <a:p>
+            <a:pPr indent="-368300" lvl="0" marL="457200" rtl="0" algn="l">
+              <a:spcBef>
+                <a:spcPts val="0"/>
+              </a:spcBef>
+              <a:spcAft>
+                <a:spcPts val="0"/>
+              </a:spcAft>
+              <a:buClr>
+                <a:schemeClr val="dk2"/>
+              </a:buClr>
+              <a:buSzPts val="2200"/>
+              <a:buFont typeface="Ubuntu Light"/>
+              <a:buChar char="●"/>
+            </a:pPr>
+            <a:r>
+              <a:rPr lang="en" sz="2200">
+                <a:solidFill>
+                  <a:schemeClr val="dk2"/>
+                </a:solidFill>
+                <a:latin typeface="Ubuntu Light"/>
+                <a:ea typeface="Ubuntu Light"/>
+                <a:cs typeface="Ubuntu Light"/>
+                <a:sym typeface="Ubuntu Light"/>
+              </a:rPr>
+              <a:t>Final Report</a:t>
+            </a:r>
+            <a:endParaRPr sz="2200">
+              <a:solidFill>
+                <a:schemeClr val="dk2"/>
+              </a:solidFill>
+              <a:latin typeface="Ubuntu Light"/>
+              <a:ea typeface="Ubuntu Light"/>
+              <a:cs typeface="Ubuntu Light"/>
+              <a:sym typeface="Ubuntu Light"/>
+            </a:endParaRPr>
+          </a:p>
+          <a:p>
+            <a:pPr indent="-368300" lvl="0" marL="457200" rtl="0" algn="l">
+              <a:spcBef>
+                <a:spcPts val="0"/>
+              </a:spcBef>
+              <a:spcAft>
+                <a:spcPts val="0"/>
+              </a:spcAft>
+              <a:buSzPts val="2200"/>
+              <a:buFont typeface="Ubuntu Light"/>
+              <a:buChar char="●"/>
+            </a:pPr>
+            <a:r>
+              <a:rPr lang="en" sz="2200">
+                <a:latin typeface="Ubuntu Light"/>
+                <a:ea typeface="Ubuntu Light"/>
+                <a:cs typeface="Ubuntu Light"/>
+                <a:sym typeface="Ubuntu Light"/>
+              </a:rPr>
+              <a:t>Known Limitations of Project</a:t>
+            </a:r>
+            <a:endParaRPr sz="2200">
+              <a:latin typeface="Ubuntu Light"/>
+              <a:ea typeface="Ubuntu Light"/>
+              <a:cs typeface="Ubuntu Light"/>
+              <a:sym typeface="Ubuntu Light"/>
+            </a:endParaRPr>
+          </a:p>
+          <a:p>
+            <a:pPr indent="-368300" lvl="0" marL="457200" rtl="0" algn="l">
+              <a:spcBef>
+                <a:spcPts val="0"/>
+              </a:spcBef>
+              <a:spcAft>
+                <a:spcPts val="0"/>
+              </a:spcAft>
+              <a:buClr>
+                <a:schemeClr val="dk2"/>
+              </a:buClr>
+              <a:buSzPts val="2200"/>
+              <a:buFont typeface="Ubuntu Light"/>
+              <a:buChar char="●"/>
+            </a:pPr>
+            <a:r>
+              <a:rPr lang="en" sz="2200">
+                <a:solidFill>
+                  <a:schemeClr val="dk2"/>
+                </a:solidFill>
+                <a:latin typeface="Ubuntu Light"/>
+                <a:ea typeface="Ubuntu Light"/>
+                <a:cs typeface="Ubuntu Light"/>
+                <a:sym typeface="Ubuntu Light"/>
+              </a:rPr>
+              <a:t>Potential Future Development</a:t>
             </a:r>
             <a:endParaRPr>
-              <a:latin typeface="Ubuntu"/>
-              <a:ea typeface="Ubuntu"/>
-              <a:cs typeface="Ubuntu"/>
-              <a:sym typeface="Ubuntu"/>
+              <a:solidFill>
+                <a:schemeClr val="dk2"/>
+              </a:solidFill>
+              <a:latin typeface="Ubuntu Light"/>
+              <a:ea typeface="Ubuntu Light"/>
+              <a:cs typeface="Ubuntu Light"/>
+              <a:sym typeface="Ubuntu Light"/>
             </a:endParaRPr>
           </a:p>
         </p:txBody>
@@ -16139,7 +17170,7 @@
       </p:grpSpPr>
       <p:sp>
         <p:nvSpPr>
-          <p:cNvPr id="209" name="Google Shape;209;gec2e1cceae_0_25"/>
+          <p:cNvPr id="209" name="Google Shape;209;p25"/>
           <p:cNvSpPr txBox="1"/>
           <p:nvPr>
             <p:ph type="title"/>
@@ -16147,8 +17178,8 @@
         </p:nvSpPr>
         <p:spPr>
           <a:xfrm>
-            <a:off x="311700" y="315925"/>
-            <a:ext cx="8520600" cy="831300"/>
+            <a:off x="56950" y="202100"/>
+            <a:ext cx="9483300" cy="831300"/>
           </a:xfrm>
           <a:prstGeom prst="rect">
             <a:avLst/>
@@ -16184,7 +17215,7 @@
                 <a:cs typeface="Ubuntu"/>
                 <a:sym typeface="Ubuntu"/>
               </a:rPr>
-              <a:t>AGENDA</a:t>
+              <a:t>Known Limitations of Project</a:t>
             </a:r>
             <a:endParaRPr>
               <a:latin typeface="Ubuntu"/>
@@ -16197,7 +17228,7 @@
       </p:sp>
       <p:sp>
         <p:nvSpPr>
-          <p:cNvPr id="210" name="Google Shape;210;gec2e1cceae_0_25"/>
+          <p:cNvPr id="210" name="Google Shape;210;p25"/>
           <p:cNvSpPr txBox="1"/>
           <p:nvPr>
             <p:ph idx="1" type="body"/>
@@ -16205,8 +17236,8 @@
         </p:nvSpPr>
         <p:spPr>
           <a:xfrm>
-            <a:off x="311700" y="1225225"/>
-            <a:ext cx="8520600" cy="3354000"/>
+            <a:off x="0" y="985800"/>
+            <a:ext cx="5478000" cy="3171900"/>
           </a:xfrm>
           <a:prstGeom prst="rect">
             <a:avLst/>
@@ -16222,290 +17253,96 @@
           </a:bodyPr>
           <a:lstStyle/>
           <a:p>
-            <a:pPr indent="-368300" lvl="0" marL="457200" rtl="0" algn="l">
-              <a:spcBef>
-                <a:spcPts val="0"/>
-              </a:spcBef>
-              <a:spcAft>
-                <a:spcPts val="0"/>
-              </a:spcAft>
-              <a:buClr>
-                <a:schemeClr val="dk2"/>
-              </a:buClr>
-              <a:buSzPts val="2200"/>
-              <a:buFont typeface="Ubuntu Light"/>
+            <a:pPr indent="-342900" lvl="0" marL="457200" rtl="0" algn="l">
+              <a:lnSpc>
+                <a:spcPct val="115000"/>
+              </a:lnSpc>
+              <a:spcBef>
+                <a:spcPts val="0"/>
+              </a:spcBef>
+              <a:spcAft>
+                <a:spcPts val="0"/>
+              </a:spcAft>
+              <a:buSzPts val="1800"/>
+              <a:buFont typeface="Ubuntu"/>
               <a:buChar char="●"/>
             </a:pPr>
             <a:r>
-              <a:rPr lang="en" sz="2200">
-                <a:solidFill>
-                  <a:schemeClr val="dk2"/>
-                </a:solidFill>
-                <a:latin typeface="Ubuntu Light"/>
-                <a:ea typeface="Ubuntu Light"/>
-                <a:cs typeface="Ubuntu Light"/>
-                <a:sym typeface="Ubuntu Light"/>
+              <a:rPr lang="en">
+                <a:latin typeface="Ubuntu"/>
+                <a:ea typeface="Ubuntu"/>
+                <a:cs typeface="Ubuntu"/>
+                <a:sym typeface="Ubuntu"/>
               </a:rPr>
-              <a:t>Project Overview</a:t>
-            </a:r>
-            <a:endParaRPr sz="2200">
-              <a:solidFill>
-                <a:schemeClr val="dk2"/>
-              </a:solidFill>
-              <a:latin typeface="Ubuntu Light"/>
-              <a:ea typeface="Ubuntu Light"/>
-              <a:cs typeface="Ubuntu Light"/>
-              <a:sym typeface="Ubuntu Light"/>
+              <a:t>Does not consider ANNs</a:t>
+            </a:r>
+            <a:endParaRPr>
+              <a:latin typeface="Ubuntu"/>
+              <a:ea typeface="Ubuntu"/>
+              <a:cs typeface="Ubuntu"/>
+              <a:sym typeface="Ubuntu"/>
             </a:endParaRPr>
           </a:p>
           <a:p>
-            <a:pPr indent="-368300" lvl="0" marL="457200" rtl="0" algn="l">
-              <a:spcBef>
-                <a:spcPts val="0"/>
-              </a:spcBef>
-              <a:spcAft>
-                <a:spcPts val="0"/>
-              </a:spcAft>
-              <a:buClr>
-                <a:schemeClr val="dk2"/>
-              </a:buClr>
-              <a:buSzPts val="2200"/>
-              <a:buFont typeface="Ubuntu Light"/>
+            <a:pPr indent="-342900" lvl="0" marL="457200" rtl="0" algn="l">
+              <a:lnSpc>
+                <a:spcPct val="115000"/>
+              </a:lnSpc>
+              <a:spcBef>
+                <a:spcPts val="0"/>
+              </a:spcBef>
+              <a:spcAft>
+                <a:spcPts val="0"/>
+              </a:spcAft>
+              <a:buSzPts val="1800"/>
+              <a:buFont typeface="Ubuntu"/>
               <a:buChar char="●"/>
             </a:pPr>
             <a:r>
-              <a:rPr lang="en" sz="2200">
-                <a:solidFill>
-                  <a:schemeClr val="dk2"/>
-                </a:solidFill>
-                <a:latin typeface="Ubuntu Light"/>
-                <a:ea typeface="Ubuntu Light"/>
-                <a:cs typeface="Ubuntu Light"/>
-                <a:sym typeface="Ubuntu Light"/>
+              <a:rPr lang="en">
+                <a:latin typeface="Ubuntu"/>
+                <a:ea typeface="Ubuntu"/>
+                <a:cs typeface="Ubuntu"/>
+                <a:sym typeface="Ubuntu"/>
               </a:rPr>
-              <a:t>Data Overview</a:t>
-            </a:r>
-            <a:endParaRPr sz="2200">
-              <a:solidFill>
-                <a:schemeClr val="dk2"/>
-              </a:solidFill>
-              <a:latin typeface="Ubuntu Light"/>
-              <a:ea typeface="Ubuntu Light"/>
-              <a:cs typeface="Ubuntu Light"/>
-              <a:sym typeface="Ubuntu Light"/>
+              <a:t>Small dataset (only 300 instances)</a:t>
+            </a:r>
+            <a:endParaRPr>
+              <a:latin typeface="Ubuntu"/>
+              <a:ea typeface="Ubuntu"/>
+              <a:cs typeface="Ubuntu"/>
+              <a:sym typeface="Ubuntu"/>
             </a:endParaRPr>
           </a:p>
           <a:p>
-            <a:pPr indent="-368300" lvl="0" marL="457200" rtl="0" algn="l">
-              <a:spcBef>
-                <a:spcPts val="0"/>
-              </a:spcBef>
-              <a:spcAft>
-                <a:spcPts val="0"/>
-              </a:spcAft>
-              <a:buClr>
-                <a:schemeClr val="dk2"/>
-              </a:buClr>
-              <a:buSzPts val="2200"/>
-              <a:buFont typeface="Ubuntu Light"/>
+            <a:pPr indent="-342900" lvl="0" marL="457200" rtl="0" algn="l">
+              <a:lnSpc>
+                <a:spcPct val="115000"/>
+              </a:lnSpc>
+              <a:spcBef>
+                <a:spcPts val="0"/>
+              </a:spcBef>
+              <a:spcAft>
+                <a:spcPts val="0"/>
+              </a:spcAft>
+              <a:buSzPts val="1800"/>
+              <a:buFont typeface="Ubuntu"/>
               <a:buChar char="●"/>
             </a:pPr>
             <a:r>
-              <a:rPr lang="en" sz="2200">
-                <a:solidFill>
-                  <a:schemeClr val="dk2"/>
-                </a:solidFill>
-                <a:latin typeface="Ubuntu Light"/>
-                <a:ea typeface="Ubuntu Light"/>
-                <a:cs typeface="Ubuntu Light"/>
-                <a:sym typeface="Ubuntu Light"/>
+              <a:rPr lang="en">
+                <a:latin typeface="Ubuntu"/>
+                <a:ea typeface="Ubuntu"/>
+                <a:cs typeface="Ubuntu"/>
+                <a:sym typeface="Ubuntu"/>
               </a:rPr>
-              <a:t>EDA and Pipeline Set Up</a:t>
-            </a:r>
-            <a:endParaRPr sz="2200">
-              <a:solidFill>
-                <a:schemeClr val="dk2"/>
-              </a:solidFill>
-              <a:latin typeface="Ubuntu Light"/>
-              <a:ea typeface="Ubuntu Light"/>
-              <a:cs typeface="Ubuntu Light"/>
-              <a:sym typeface="Ubuntu Light"/>
-            </a:endParaRPr>
-          </a:p>
-          <a:p>
-            <a:pPr indent="-368300" lvl="0" marL="457200" rtl="0" algn="l">
-              <a:spcBef>
-                <a:spcPts val="0"/>
-              </a:spcBef>
-              <a:spcAft>
-                <a:spcPts val="0"/>
-              </a:spcAft>
-              <a:buClr>
-                <a:schemeClr val="dk2"/>
-              </a:buClr>
-              <a:buSzPts val="2200"/>
-              <a:buFont typeface="Ubuntu Light"/>
-              <a:buChar char="●"/>
-            </a:pPr>
-            <a:r>
-              <a:rPr lang="en" sz="2200">
-                <a:solidFill>
-                  <a:schemeClr val="dk2"/>
-                </a:solidFill>
-                <a:latin typeface="Ubuntu Light"/>
-                <a:ea typeface="Ubuntu Light"/>
-                <a:cs typeface="Ubuntu Light"/>
-                <a:sym typeface="Ubuntu Light"/>
-              </a:rPr>
-              <a:t>ML Algorithms</a:t>
-            </a:r>
-            <a:endParaRPr sz="2200">
-              <a:solidFill>
-                <a:schemeClr val="dk2"/>
-              </a:solidFill>
-              <a:latin typeface="Ubuntu Light"/>
-              <a:ea typeface="Ubuntu Light"/>
-              <a:cs typeface="Ubuntu Light"/>
-              <a:sym typeface="Ubuntu Light"/>
-            </a:endParaRPr>
-          </a:p>
-          <a:p>
-            <a:pPr indent="-368300" lvl="0" marL="457200" rtl="0" algn="l">
-              <a:spcBef>
-                <a:spcPts val="0"/>
-              </a:spcBef>
-              <a:spcAft>
-                <a:spcPts val="0"/>
-              </a:spcAft>
-              <a:buClr>
-                <a:schemeClr val="dk2"/>
-              </a:buClr>
-              <a:buSzPts val="2200"/>
-              <a:buFont typeface="Ubuntu Light"/>
-              <a:buChar char="●"/>
-            </a:pPr>
-            <a:r>
-              <a:rPr lang="en" sz="2200">
-                <a:solidFill>
-                  <a:schemeClr val="dk2"/>
-                </a:solidFill>
-                <a:latin typeface="Ubuntu Light"/>
-                <a:ea typeface="Ubuntu Light"/>
-                <a:cs typeface="Ubuntu Light"/>
-                <a:sym typeface="Ubuntu Light"/>
-              </a:rPr>
-              <a:t>Summary</a:t>
-            </a:r>
-            <a:endParaRPr sz="2200">
-              <a:solidFill>
-                <a:schemeClr val="dk2"/>
-              </a:solidFill>
-              <a:latin typeface="Ubuntu Light"/>
-              <a:ea typeface="Ubuntu Light"/>
-              <a:cs typeface="Ubuntu Light"/>
-              <a:sym typeface="Ubuntu Light"/>
-            </a:endParaRPr>
-          </a:p>
-          <a:p>
-            <a:pPr indent="-368300" lvl="0" marL="457200" rtl="0" algn="l">
-              <a:spcBef>
-                <a:spcPts val="0"/>
-              </a:spcBef>
-              <a:spcAft>
-                <a:spcPts val="0"/>
-              </a:spcAft>
-              <a:buClr>
-                <a:schemeClr val="dk2"/>
-              </a:buClr>
-              <a:buSzPts val="2200"/>
-              <a:buFont typeface="Ubuntu Light"/>
-              <a:buChar char="●"/>
-            </a:pPr>
-            <a:r>
-              <a:rPr lang="en" sz="2200">
-                <a:solidFill>
-                  <a:schemeClr val="dk2"/>
-                </a:solidFill>
-                <a:latin typeface="Ubuntu Light"/>
-                <a:ea typeface="Ubuntu Light"/>
-                <a:cs typeface="Ubuntu Light"/>
-                <a:sym typeface="Ubuntu Light"/>
-              </a:rPr>
-              <a:t>Final Report</a:t>
-            </a:r>
-            <a:endParaRPr sz="2200">
-              <a:solidFill>
-                <a:schemeClr val="dk2"/>
-              </a:solidFill>
-              <a:latin typeface="Ubuntu Light"/>
-              <a:ea typeface="Ubuntu Light"/>
-              <a:cs typeface="Ubuntu Light"/>
-              <a:sym typeface="Ubuntu Light"/>
-            </a:endParaRPr>
-          </a:p>
-          <a:p>
-            <a:pPr indent="-368300" lvl="0" marL="457200" rtl="0" algn="l">
-              <a:spcBef>
-                <a:spcPts val="0"/>
-              </a:spcBef>
-              <a:spcAft>
-                <a:spcPts val="0"/>
-              </a:spcAft>
-              <a:buClr>
-                <a:schemeClr val="dk2"/>
-              </a:buClr>
-              <a:buSzPts val="2200"/>
-              <a:buFont typeface="Ubuntu Light"/>
-              <a:buChar char="●"/>
-            </a:pPr>
-            <a:r>
-              <a:rPr lang="en" sz="2200">
-                <a:solidFill>
-                  <a:schemeClr val="dk2"/>
-                </a:solidFill>
-                <a:latin typeface="Ubuntu Light"/>
-                <a:ea typeface="Ubuntu Light"/>
-                <a:cs typeface="Ubuntu Light"/>
-                <a:sym typeface="Ubuntu Light"/>
-              </a:rPr>
-              <a:t>Known Limitations of Project</a:t>
-            </a:r>
-            <a:endParaRPr sz="2200">
-              <a:solidFill>
-                <a:schemeClr val="dk2"/>
-              </a:solidFill>
-              <a:latin typeface="Ubuntu Light"/>
-              <a:ea typeface="Ubuntu Light"/>
-              <a:cs typeface="Ubuntu Light"/>
-              <a:sym typeface="Ubuntu Light"/>
-            </a:endParaRPr>
-          </a:p>
-          <a:p>
-            <a:pPr indent="-368300" lvl="0" marL="457200" rtl="0" algn="l">
-              <a:spcBef>
-                <a:spcPts val="0"/>
-              </a:spcBef>
-              <a:spcAft>
-                <a:spcPts val="0"/>
-              </a:spcAft>
-              <a:buSzPts val="2200"/>
-              <a:buFont typeface="Ubuntu Light"/>
-              <a:buChar char="●"/>
-            </a:pPr>
-            <a:r>
-              <a:rPr lang="en" sz="2200">
-                <a:latin typeface="Ubuntu Light"/>
-                <a:ea typeface="Ubuntu Light"/>
-                <a:cs typeface="Ubuntu Light"/>
-                <a:sym typeface="Ubuntu Light"/>
-              </a:rPr>
-              <a:t>Potential Future Development</a:t>
+              <a:t>Did not fully investigate source and origin of MCI’s data</a:t>
             </a:r>
             <a:endParaRPr>
-              <a:latin typeface="Ubuntu Light"/>
-              <a:ea typeface="Ubuntu Light"/>
-              <a:cs typeface="Ubuntu Light"/>
-              <a:sym typeface="Ubuntu Light"/>
+              <a:latin typeface="Ubuntu"/>
+              <a:ea typeface="Ubuntu"/>
+              <a:cs typeface="Ubuntu"/>
+              <a:sym typeface="Ubuntu"/>
             </a:endParaRPr>
           </a:p>
         </p:txBody>
@@ -16537,7 +17374,7 @@
       </p:grpSpPr>
       <p:sp>
         <p:nvSpPr>
-          <p:cNvPr id="215" name="Google Shape;215;p40"/>
+          <p:cNvPr id="215" name="Google Shape;215;gec2e1cceae_0_25"/>
           <p:cNvSpPr txBox="1"/>
           <p:nvPr>
             <p:ph type="title"/>
@@ -16582,7 +17419,7 @@
                 <a:cs typeface="Ubuntu"/>
                 <a:sym typeface="Ubuntu"/>
               </a:rPr>
-              <a:t>References </a:t>
+              <a:t>AGENDA</a:t>
             </a:r>
             <a:endParaRPr>
               <a:latin typeface="Ubuntu"/>
@@ -16595,7 +17432,7 @@
       </p:sp>
       <p:sp>
         <p:nvSpPr>
-          <p:cNvPr id="216" name="Google Shape;216;p40"/>
+          <p:cNvPr id="216" name="Google Shape;216;gec2e1cceae_0_25"/>
           <p:cNvSpPr txBox="1"/>
           <p:nvPr>
             <p:ph idx="1" type="body"/>
@@ -16620,6 +17457,404 @@
           </a:bodyPr>
           <a:lstStyle/>
           <a:p>
+            <a:pPr indent="-368300" lvl="0" marL="457200" rtl="0" algn="l">
+              <a:spcBef>
+                <a:spcPts val="0"/>
+              </a:spcBef>
+              <a:spcAft>
+                <a:spcPts val="0"/>
+              </a:spcAft>
+              <a:buClr>
+                <a:schemeClr val="dk2"/>
+              </a:buClr>
+              <a:buSzPts val="2200"/>
+              <a:buFont typeface="Ubuntu Light"/>
+              <a:buChar char="●"/>
+            </a:pPr>
+            <a:r>
+              <a:rPr lang="en" sz="2200">
+                <a:solidFill>
+                  <a:schemeClr val="dk2"/>
+                </a:solidFill>
+                <a:latin typeface="Ubuntu Light"/>
+                <a:ea typeface="Ubuntu Light"/>
+                <a:cs typeface="Ubuntu Light"/>
+                <a:sym typeface="Ubuntu Light"/>
+              </a:rPr>
+              <a:t>Project Overview</a:t>
+            </a:r>
+            <a:endParaRPr sz="2200">
+              <a:solidFill>
+                <a:schemeClr val="dk2"/>
+              </a:solidFill>
+              <a:latin typeface="Ubuntu Light"/>
+              <a:ea typeface="Ubuntu Light"/>
+              <a:cs typeface="Ubuntu Light"/>
+              <a:sym typeface="Ubuntu Light"/>
+            </a:endParaRPr>
+          </a:p>
+          <a:p>
+            <a:pPr indent="-368300" lvl="0" marL="457200" rtl="0" algn="l">
+              <a:spcBef>
+                <a:spcPts val="0"/>
+              </a:spcBef>
+              <a:spcAft>
+                <a:spcPts val="0"/>
+              </a:spcAft>
+              <a:buClr>
+                <a:schemeClr val="dk2"/>
+              </a:buClr>
+              <a:buSzPts val="2200"/>
+              <a:buFont typeface="Ubuntu Light"/>
+              <a:buChar char="●"/>
+            </a:pPr>
+            <a:r>
+              <a:rPr lang="en" sz="2200">
+                <a:solidFill>
+                  <a:schemeClr val="dk2"/>
+                </a:solidFill>
+                <a:latin typeface="Ubuntu Light"/>
+                <a:ea typeface="Ubuntu Light"/>
+                <a:cs typeface="Ubuntu Light"/>
+                <a:sym typeface="Ubuntu Light"/>
+              </a:rPr>
+              <a:t>Data Overview</a:t>
+            </a:r>
+            <a:endParaRPr sz="2200">
+              <a:solidFill>
+                <a:schemeClr val="dk2"/>
+              </a:solidFill>
+              <a:latin typeface="Ubuntu Light"/>
+              <a:ea typeface="Ubuntu Light"/>
+              <a:cs typeface="Ubuntu Light"/>
+              <a:sym typeface="Ubuntu Light"/>
+            </a:endParaRPr>
+          </a:p>
+          <a:p>
+            <a:pPr indent="-368300" lvl="0" marL="457200" rtl="0" algn="l">
+              <a:spcBef>
+                <a:spcPts val="0"/>
+              </a:spcBef>
+              <a:spcAft>
+                <a:spcPts val="0"/>
+              </a:spcAft>
+              <a:buClr>
+                <a:schemeClr val="dk2"/>
+              </a:buClr>
+              <a:buSzPts val="2200"/>
+              <a:buFont typeface="Ubuntu Light"/>
+              <a:buChar char="●"/>
+            </a:pPr>
+            <a:r>
+              <a:rPr lang="en" sz="2200">
+                <a:solidFill>
+                  <a:schemeClr val="dk2"/>
+                </a:solidFill>
+                <a:latin typeface="Ubuntu Light"/>
+                <a:ea typeface="Ubuntu Light"/>
+                <a:cs typeface="Ubuntu Light"/>
+                <a:sym typeface="Ubuntu Light"/>
+              </a:rPr>
+              <a:t>EDA and Pipeline Set Up</a:t>
+            </a:r>
+            <a:endParaRPr sz="2200">
+              <a:solidFill>
+                <a:schemeClr val="dk2"/>
+              </a:solidFill>
+              <a:latin typeface="Ubuntu Light"/>
+              <a:ea typeface="Ubuntu Light"/>
+              <a:cs typeface="Ubuntu Light"/>
+              <a:sym typeface="Ubuntu Light"/>
+            </a:endParaRPr>
+          </a:p>
+          <a:p>
+            <a:pPr indent="-368300" lvl="0" marL="457200" rtl="0" algn="l">
+              <a:spcBef>
+                <a:spcPts val="0"/>
+              </a:spcBef>
+              <a:spcAft>
+                <a:spcPts val="0"/>
+              </a:spcAft>
+              <a:buClr>
+                <a:schemeClr val="dk2"/>
+              </a:buClr>
+              <a:buSzPts val="2200"/>
+              <a:buFont typeface="Ubuntu Light"/>
+              <a:buChar char="●"/>
+            </a:pPr>
+            <a:r>
+              <a:rPr lang="en" sz="2200">
+                <a:solidFill>
+                  <a:schemeClr val="dk2"/>
+                </a:solidFill>
+                <a:latin typeface="Ubuntu Light"/>
+                <a:ea typeface="Ubuntu Light"/>
+                <a:cs typeface="Ubuntu Light"/>
+                <a:sym typeface="Ubuntu Light"/>
+              </a:rPr>
+              <a:t>ML Algorithms</a:t>
+            </a:r>
+            <a:endParaRPr sz="2200">
+              <a:solidFill>
+                <a:schemeClr val="dk2"/>
+              </a:solidFill>
+              <a:latin typeface="Ubuntu Light"/>
+              <a:ea typeface="Ubuntu Light"/>
+              <a:cs typeface="Ubuntu Light"/>
+              <a:sym typeface="Ubuntu Light"/>
+            </a:endParaRPr>
+          </a:p>
+          <a:p>
+            <a:pPr indent="-368300" lvl="0" marL="457200" rtl="0" algn="l">
+              <a:spcBef>
+                <a:spcPts val="0"/>
+              </a:spcBef>
+              <a:spcAft>
+                <a:spcPts val="0"/>
+              </a:spcAft>
+              <a:buClr>
+                <a:schemeClr val="dk2"/>
+              </a:buClr>
+              <a:buSzPts val="2200"/>
+              <a:buFont typeface="Ubuntu Light"/>
+              <a:buChar char="●"/>
+            </a:pPr>
+            <a:r>
+              <a:rPr lang="en" sz="2200">
+                <a:solidFill>
+                  <a:schemeClr val="dk2"/>
+                </a:solidFill>
+                <a:latin typeface="Ubuntu Light"/>
+                <a:ea typeface="Ubuntu Light"/>
+                <a:cs typeface="Ubuntu Light"/>
+                <a:sym typeface="Ubuntu Light"/>
+              </a:rPr>
+              <a:t>Summary</a:t>
+            </a:r>
+            <a:endParaRPr sz="2200">
+              <a:solidFill>
+                <a:schemeClr val="dk2"/>
+              </a:solidFill>
+              <a:latin typeface="Ubuntu Light"/>
+              <a:ea typeface="Ubuntu Light"/>
+              <a:cs typeface="Ubuntu Light"/>
+              <a:sym typeface="Ubuntu Light"/>
+            </a:endParaRPr>
+          </a:p>
+          <a:p>
+            <a:pPr indent="-368300" lvl="0" marL="457200" rtl="0" algn="l">
+              <a:spcBef>
+                <a:spcPts val="0"/>
+              </a:spcBef>
+              <a:spcAft>
+                <a:spcPts val="0"/>
+              </a:spcAft>
+              <a:buClr>
+                <a:schemeClr val="dk2"/>
+              </a:buClr>
+              <a:buSzPts val="2200"/>
+              <a:buFont typeface="Ubuntu Light"/>
+              <a:buChar char="●"/>
+            </a:pPr>
+            <a:r>
+              <a:rPr lang="en" sz="2200">
+                <a:solidFill>
+                  <a:schemeClr val="dk2"/>
+                </a:solidFill>
+                <a:latin typeface="Ubuntu Light"/>
+                <a:ea typeface="Ubuntu Light"/>
+                <a:cs typeface="Ubuntu Light"/>
+                <a:sym typeface="Ubuntu Light"/>
+              </a:rPr>
+              <a:t>Final Report</a:t>
+            </a:r>
+            <a:endParaRPr sz="2200">
+              <a:solidFill>
+                <a:schemeClr val="dk2"/>
+              </a:solidFill>
+              <a:latin typeface="Ubuntu Light"/>
+              <a:ea typeface="Ubuntu Light"/>
+              <a:cs typeface="Ubuntu Light"/>
+              <a:sym typeface="Ubuntu Light"/>
+            </a:endParaRPr>
+          </a:p>
+          <a:p>
+            <a:pPr indent="-368300" lvl="0" marL="457200" rtl="0" algn="l">
+              <a:spcBef>
+                <a:spcPts val="0"/>
+              </a:spcBef>
+              <a:spcAft>
+                <a:spcPts val="0"/>
+              </a:spcAft>
+              <a:buClr>
+                <a:schemeClr val="dk2"/>
+              </a:buClr>
+              <a:buSzPts val="2200"/>
+              <a:buFont typeface="Ubuntu Light"/>
+              <a:buChar char="●"/>
+            </a:pPr>
+            <a:r>
+              <a:rPr lang="en" sz="2200">
+                <a:solidFill>
+                  <a:schemeClr val="dk2"/>
+                </a:solidFill>
+                <a:latin typeface="Ubuntu Light"/>
+                <a:ea typeface="Ubuntu Light"/>
+                <a:cs typeface="Ubuntu Light"/>
+                <a:sym typeface="Ubuntu Light"/>
+              </a:rPr>
+              <a:t>Known Limitations of Project</a:t>
+            </a:r>
+            <a:endParaRPr sz="2200">
+              <a:solidFill>
+                <a:schemeClr val="dk2"/>
+              </a:solidFill>
+              <a:latin typeface="Ubuntu Light"/>
+              <a:ea typeface="Ubuntu Light"/>
+              <a:cs typeface="Ubuntu Light"/>
+              <a:sym typeface="Ubuntu Light"/>
+            </a:endParaRPr>
+          </a:p>
+          <a:p>
+            <a:pPr indent="-368300" lvl="0" marL="457200" rtl="0" algn="l">
+              <a:spcBef>
+                <a:spcPts val="0"/>
+              </a:spcBef>
+              <a:spcAft>
+                <a:spcPts val="0"/>
+              </a:spcAft>
+              <a:buSzPts val="2200"/>
+              <a:buFont typeface="Ubuntu Light"/>
+              <a:buChar char="●"/>
+            </a:pPr>
+            <a:r>
+              <a:rPr lang="en" sz="2200">
+                <a:latin typeface="Ubuntu Light"/>
+                <a:ea typeface="Ubuntu Light"/>
+                <a:cs typeface="Ubuntu Light"/>
+                <a:sym typeface="Ubuntu Light"/>
+              </a:rPr>
+              <a:t>Potential Future Development</a:t>
+            </a:r>
+            <a:endParaRPr>
+              <a:latin typeface="Ubuntu Light"/>
+              <a:ea typeface="Ubuntu Light"/>
+              <a:cs typeface="Ubuntu Light"/>
+              <a:sym typeface="Ubuntu Light"/>
+            </a:endParaRPr>
+          </a:p>
+        </p:txBody>
+      </p:sp>
+    </p:spTree>
+  </p:cSld>
+  <p:clrMapOvr>
+    <a:masterClrMapping/>
+  </p:clrMapOvr>
+</p:sld>
+</file>
+
+<file path=ppt/slides/slide26.xml><?xml version="1.0" encoding="utf-8"?>
+<p:sld xmlns:a="http://schemas.openxmlformats.org/drawingml/2006/main" xmlns:r="http://schemas.openxmlformats.org/officeDocument/2006/relationships" xmlns:mc="http://schemas.openxmlformats.org/markup-compatibility/2006" xmlns:mv="urn:schemas-microsoft-com:mac:vml" xmlns:p="http://schemas.openxmlformats.org/presentationml/2006/main" xmlns:c="http://schemas.openxmlformats.org/drawingml/2006/chart" xmlns:dgm="http://schemas.openxmlformats.org/drawingml/2006/diagram" xmlns:o="urn:schemas-microsoft-com:office:office" xmlns:v="urn:schemas-microsoft-com:vml" xmlns:pvml="urn:schemas-microsoft-com:office:powerpoint" xmlns:com="http://schemas.openxmlformats.org/drawingml/2006/compatibility" xmlns:p14="http://schemas.microsoft.com/office/powerpoint/2010/main" xmlns:p15="http://schemas.microsoft.com/office/powerpoint/2012/main" xmlns:ahyp="http://schemas.microsoft.com/office/drawing/2018/hyperlinkcolor">
+  <p:cSld>
+    <p:spTree>
+      <p:nvGrpSpPr>
+        <p:cNvPr id="220" name="Shape 220"/>
+        <p:cNvGrpSpPr/>
+        <p:nvPr/>
+      </p:nvGrpSpPr>
+      <p:grpSpPr>
+        <a:xfrm>
+          <a:off x="0" y="0"/>
+          <a:ext cx="0" cy="0"/>
+          <a:chOff x="0" y="0"/>
+          <a:chExt cx="0" cy="0"/>
+        </a:xfrm>
+      </p:grpSpPr>
+      <p:sp>
+        <p:nvSpPr>
+          <p:cNvPr id="221" name="Google Shape;221;p40"/>
+          <p:cNvSpPr txBox="1"/>
+          <p:nvPr>
+            <p:ph type="title"/>
+          </p:nvPr>
+        </p:nvSpPr>
+        <p:spPr>
+          <a:xfrm>
+            <a:off x="311700" y="315925"/>
+            <a:ext cx="8520600" cy="831300"/>
+          </a:xfrm>
+          <a:prstGeom prst="rect">
+            <a:avLst/>
+          </a:prstGeom>
+          <a:noFill/>
+          <a:ln>
+            <a:noFill/>
+          </a:ln>
+        </p:spPr>
+        <p:txBody>
+          <a:bodyPr anchorCtr="0" anchor="b" bIns="91425" lIns="91425" spcFirstLastPara="1" rIns="91425" wrap="square" tIns="91425">
+            <a:normAutofit/>
+          </a:bodyPr>
+          <a:lstStyle/>
+          <a:p>
+            <a:pPr indent="0" lvl="0" marL="0" rtl="0" algn="l">
+              <a:lnSpc>
+                <a:spcPct val="100000"/>
+              </a:lnSpc>
+              <a:spcBef>
+                <a:spcPts val="0"/>
+              </a:spcBef>
+              <a:spcAft>
+                <a:spcPts val="0"/>
+              </a:spcAft>
+              <a:buSzPts val="4200"/>
+              <a:buNone/>
+            </a:pPr>
+            <a:r>
+              <a:rPr lang="en">
+                <a:latin typeface="Ubuntu"/>
+                <a:ea typeface="Ubuntu"/>
+                <a:cs typeface="Ubuntu"/>
+                <a:sym typeface="Ubuntu"/>
+              </a:rPr>
+              <a:t>References </a:t>
+            </a:r>
+            <a:endParaRPr>
+              <a:latin typeface="Ubuntu"/>
+              <a:ea typeface="Ubuntu"/>
+              <a:cs typeface="Ubuntu"/>
+              <a:sym typeface="Ubuntu"/>
+            </a:endParaRPr>
+          </a:p>
+        </p:txBody>
+      </p:sp>
+      <p:sp>
+        <p:nvSpPr>
+          <p:cNvPr id="222" name="Google Shape;222;p40"/>
+          <p:cNvSpPr txBox="1"/>
+          <p:nvPr>
+            <p:ph idx="1" type="body"/>
+          </p:nvPr>
+        </p:nvSpPr>
+        <p:spPr>
+          <a:xfrm>
+            <a:off x="311700" y="1225225"/>
+            <a:ext cx="8520600" cy="1062000"/>
+          </a:xfrm>
+          <a:prstGeom prst="rect">
+            <a:avLst/>
+          </a:prstGeom>
+          <a:noFill/>
+          <a:ln>
+            <a:noFill/>
+          </a:ln>
+        </p:spPr>
+        <p:txBody>
+          <a:bodyPr anchorCtr="0" anchor="t" bIns="91425" lIns="91425" spcFirstLastPara="1" rIns="91425" wrap="square" tIns="91425">
+            <a:normAutofit/>
+          </a:bodyPr>
+          <a:lstStyle/>
+          <a:p>
             <a:pPr indent="-323850" lvl="0" marL="457200" rtl="0" algn="l">
               <a:lnSpc>
                 <a:spcPct val="115000"/>
@@ -16678,6 +17913,7 @@
                 <a:ea typeface="Ubuntu Light"/>
                 <a:cs typeface="Ubuntu Light"/>
                 <a:sym typeface="Ubuntu Light"/>
+                <a:hlinkClick r:id="rId4"/>
               </a:rPr>
               <a:t>https://archive.ics.uci.edu/ml/datasets/Heart+Disease</a:t>
             </a:r>
@@ -16712,7 +17948,7 @@
                 <a:ea typeface="Ubuntu Light"/>
                 <a:cs typeface="Ubuntu Light"/>
                 <a:sym typeface="Ubuntu Light"/>
-                <a:hlinkClick r:id="rId4"/>
+                <a:hlinkClick r:id="rId5"/>
               </a:rPr>
               <a:t>https://github.com/zachcarlson/HeartAttackPredictor/blob/main/HeartAttackPredictor.ipynb</a:t>
             </a:r>

</xml_diff>

<commit_message>
Finished first draft of presentation
</commit_message>
<xml_diff>
--- a/documents/DSCI 631 Final Project Presentation.pptx
+++ b/documents/DSCI 631 Final Project Presentation.pptx
@@ -34,37 +34,40 @@
     <p:sldId id="279" r:id="rId30"/>
     <p:sldId id="280" r:id="rId31"/>
     <p:sldId id="281" r:id="rId32"/>
+    <p:sldId id="282" r:id="rId33"/>
+    <p:sldId id="283" r:id="rId34"/>
+    <p:sldId id="284" r:id="rId35"/>
   </p:sldIdLst>
   <p:sldSz cy="5143500" cx="9144000"/>
   <p:notesSz cx="6858000" cy="9144000"/>
   <p:embeddedFontLst>
     <p:embeddedFont>
       <p:font typeface="Ubuntu"/>
-      <p:regular r:id="rId33"/>
-      <p:bold r:id="rId34"/>
-      <p:italic r:id="rId35"/>
-      <p:boldItalic r:id="rId36"/>
+      <p:regular r:id="rId36"/>
+      <p:bold r:id="rId37"/>
+      <p:italic r:id="rId38"/>
+      <p:boldItalic r:id="rId39"/>
     </p:embeddedFont>
     <p:embeddedFont>
       <p:font typeface="Ubuntu Light"/>
-      <p:regular r:id="rId37"/>
-      <p:bold r:id="rId38"/>
-      <p:italic r:id="rId39"/>
-      <p:boldItalic r:id="rId40"/>
+      <p:regular r:id="rId40"/>
+      <p:bold r:id="rId41"/>
+      <p:italic r:id="rId42"/>
+      <p:boldItalic r:id="rId43"/>
     </p:embeddedFont>
     <p:embeddedFont>
       <p:font typeface="Economica"/>
-      <p:regular r:id="rId41"/>
-      <p:bold r:id="rId42"/>
-      <p:italic r:id="rId43"/>
-      <p:boldItalic r:id="rId44"/>
+      <p:regular r:id="rId44"/>
+      <p:bold r:id="rId45"/>
+      <p:italic r:id="rId46"/>
+      <p:boldItalic r:id="rId47"/>
     </p:embeddedFont>
     <p:embeddedFont>
       <p:font typeface="Open Sans"/>
-      <p:regular r:id="rId45"/>
-      <p:bold r:id="rId46"/>
-      <p:italic r:id="rId47"/>
-      <p:boldItalic r:id="rId48"/>
+      <p:regular r:id="rId48"/>
+      <p:bold r:id="rId49"/>
+      <p:italic r:id="rId50"/>
+      <p:boldItalic r:id="rId51"/>
     </p:embeddedFont>
   </p:embeddedFontLst>
   <p:defaultTextStyle>
@@ -312,7 +315,7 @@
       </p15:sldGuideLst>
     </p:ext>
     <p:ext uri="http://customooxmlschemas.google.com/">
-      <go:slidesCustomData xmlns:go="http://customooxmlschemas.google.com/" r:id="rId49" roundtripDataSignature="AMtx7mgqphWjFLhbkVsTYQf+b77XAZhvmA=="/>
+      <go:slidesCustomData xmlns:go="http://customooxmlschemas.google.com/" r:id="rId52" roundtripDataSignature="AMtx7mgpjbNnCptJa/P6cW6lzwORlvdbFg=="/>
     </p:ext>
   </p:extLst>
 </p:presentation>
@@ -2032,7 +2035,7 @@
       </p:grpSpPr>
       <p:sp>
         <p:nvSpPr>
-          <p:cNvPr id="176" name="Google Shape;176;p11:notes"/>
+          <p:cNvPr id="176" name="Google Shape;176;gec2e1cceae_0_140:notes"/>
           <p:cNvSpPr/>
           <p:nvPr>
             <p:ph idx="2" type="sldImg"/>
@@ -2077,7 +2080,7 @@
       </p:sp>
       <p:sp>
         <p:nvSpPr>
-          <p:cNvPr id="177" name="Google Shape;177;p11:notes"/>
+          <p:cNvPr id="177" name="Google Shape;177;gec2e1cceae_0_140:notes"/>
           <p:cNvSpPr txBox="1"/>
           <p:nvPr>
             <p:ph idx="1" type="body"/>
@@ -2266,7 +2269,7 @@
       </p:grpSpPr>
       <p:sp>
         <p:nvSpPr>
-          <p:cNvPr id="182" name="Google Shape;182;gec2e1cceae_0_140:notes"/>
+          <p:cNvPr id="182" name="Google Shape;182;gec2e1cceae_0_185:notes"/>
           <p:cNvSpPr/>
           <p:nvPr>
             <p:ph idx="2" type="sldImg"/>
@@ -2311,7 +2314,7 @@
       </p:sp>
       <p:sp>
         <p:nvSpPr>
-          <p:cNvPr id="183" name="Google Shape;183;gec2e1cceae_0_140:notes"/>
+          <p:cNvPr id="183" name="Google Shape;183;gec2e1cceae_0_185:notes"/>
           <p:cNvSpPr txBox="1"/>
           <p:nvPr>
             <p:ph idx="1" type="body"/>
@@ -2369,7 +2372,7 @@
   <p:cSld>
     <p:spTree>
       <p:nvGrpSpPr>
-        <p:cNvPr id="187" name="Shape 187"/>
+        <p:cNvPr id="188" name="Shape 188"/>
         <p:cNvGrpSpPr/>
         <p:nvPr/>
       </p:nvGrpSpPr>
@@ -2383,7 +2386,7 @@
       </p:grpSpPr>
       <p:sp>
         <p:nvSpPr>
-          <p:cNvPr id="188" name="Google Shape;188;gec2e1cceae_0_10:notes"/>
+          <p:cNvPr id="189" name="Google Shape;189;gec2e1cceae_0_192:notes"/>
           <p:cNvSpPr/>
           <p:nvPr>
             <p:ph idx="2" type="sldImg"/>
@@ -2428,7 +2431,7 @@
       </p:sp>
       <p:sp>
         <p:nvSpPr>
-          <p:cNvPr id="189" name="Google Shape;189;gec2e1cceae_0_10:notes"/>
+          <p:cNvPr id="190" name="Google Shape;190;gec2e1cceae_0_192:notes"/>
           <p:cNvSpPr txBox="1"/>
           <p:nvPr>
             <p:ph idx="1" type="body"/>
@@ -2486,7 +2489,7 @@
   <p:cSld>
     <p:spTree>
       <p:nvGrpSpPr>
-        <p:cNvPr id="193" name="Shape 193"/>
+        <p:cNvPr id="196" name="Shape 196"/>
         <p:cNvGrpSpPr/>
         <p:nvPr/>
       </p:nvGrpSpPr>
@@ -2500,7 +2503,7 @@
       </p:grpSpPr>
       <p:sp>
         <p:nvSpPr>
-          <p:cNvPr id="194" name="Google Shape;194;p16:notes"/>
+          <p:cNvPr id="197" name="Google Shape;197;gec2e1cceae_0_180:notes"/>
           <p:cNvSpPr/>
           <p:nvPr>
             <p:ph idx="2" type="sldImg"/>
@@ -2545,7 +2548,7 @@
       </p:sp>
       <p:sp>
         <p:nvSpPr>
-          <p:cNvPr id="195" name="Google Shape;195;p16:notes"/>
+          <p:cNvPr id="198" name="Google Shape;198;gec2e1cceae_0_180:notes"/>
           <p:cNvSpPr txBox="1"/>
           <p:nvPr>
             <p:ph idx="1" type="body"/>
@@ -2603,7 +2606,7 @@
   <p:cSld>
     <p:spTree>
       <p:nvGrpSpPr>
-        <p:cNvPr id="199" name="Shape 199"/>
+        <p:cNvPr id="202" name="Shape 202"/>
         <p:cNvGrpSpPr/>
         <p:nvPr/>
       </p:nvGrpSpPr>
@@ -2617,7 +2620,7 @@
       </p:grpSpPr>
       <p:sp>
         <p:nvSpPr>
-          <p:cNvPr id="200" name="Google Shape;200;gec2e1cceae_0_20:notes"/>
+          <p:cNvPr id="203" name="Google Shape;203;gec2e1cd1f0_0_2:notes"/>
           <p:cNvSpPr/>
           <p:nvPr>
             <p:ph idx="2" type="sldImg"/>
@@ -2662,7 +2665,7 @@
       </p:sp>
       <p:sp>
         <p:nvSpPr>
-          <p:cNvPr id="201" name="Google Shape;201;gec2e1cceae_0_20:notes"/>
+          <p:cNvPr id="204" name="Google Shape;204;gec2e1cd1f0_0_2:notes"/>
           <p:cNvSpPr txBox="1"/>
           <p:nvPr>
             <p:ph idx="1" type="body"/>
@@ -2720,7 +2723,7 @@
   <p:cSld>
     <p:spTree>
       <p:nvGrpSpPr>
-        <p:cNvPr id="205" name="Shape 205"/>
+        <p:cNvPr id="208" name="Shape 208"/>
         <p:cNvGrpSpPr/>
         <p:nvPr/>
       </p:nvGrpSpPr>
@@ -2734,7 +2737,7 @@
       </p:grpSpPr>
       <p:sp>
         <p:nvSpPr>
-          <p:cNvPr id="206" name="Google Shape;206;p25:notes"/>
+          <p:cNvPr id="209" name="Google Shape;209;gec2e1cceae_0_10:notes"/>
           <p:cNvSpPr/>
           <p:nvPr>
             <p:ph idx="2" type="sldImg"/>
@@ -2779,7 +2782,7 @@
       </p:sp>
       <p:sp>
         <p:nvSpPr>
-          <p:cNvPr id="207" name="Google Shape;207;p25:notes"/>
+          <p:cNvPr id="210" name="Google Shape;210;gec2e1cceae_0_10:notes"/>
           <p:cNvSpPr txBox="1"/>
           <p:nvPr>
             <p:ph idx="1" type="body"/>
@@ -2837,7 +2840,7 @@
   <p:cSld>
     <p:spTree>
       <p:nvGrpSpPr>
-        <p:cNvPr id="211" name="Shape 211"/>
+        <p:cNvPr id="214" name="Shape 214"/>
         <p:cNvGrpSpPr/>
         <p:nvPr/>
       </p:nvGrpSpPr>
@@ -2851,7 +2854,7 @@
       </p:grpSpPr>
       <p:sp>
         <p:nvSpPr>
-          <p:cNvPr id="212" name="Google Shape;212;gec2e1cceae_0_25:notes"/>
+          <p:cNvPr id="215" name="Google Shape;215;gec2e1cd1f0_0_7:notes"/>
           <p:cNvSpPr/>
           <p:nvPr>
             <p:ph idx="2" type="sldImg"/>
@@ -2896,7 +2899,7 @@
       </p:sp>
       <p:sp>
         <p:nvSpPr>
-          <p:cNvPr id="213" name="Google Shape;213;gec2e1cceae_0_25:notes"/>
+          <p:cNvPr id="216" name="Google Shape;216;gec2e1cd1f0_0_7:notes"/>
           <p:cNvSpPr txBox="1"/>
           <p:nvPr>
             <p:ph idx="1" type="body"/>
@@ -2954,7 +2957,7 @@
   <p:cSld>
     <p:spTree>
       <p:nvGrpSpPr>
-        <p:cNvPr id="217" name="Shape 217"/>
+        <p:cNvPr id="220" name="Shape 220"/>
         <p:cNvGrpSpPr/>
         <p:nvPr/>
       </p:nvGrpSpPr>
@@ -2968,7 +2971,7 @@
       </p:grpSpPr>
       <p:sp>
         <p:nvSpPr>
-          <p:cNvPr id="218" name="Google Shape;218;p40:notes"/>
+          <p:cNvPr id="221" name="Google Shape;221;gec2e1cceae_0_20:notes"/>
           <p:cNvSpPr/>
           <p:nvPr>
             <p:ph idx="2" type="sldImg"/>
@@ -3013,7 +3016,358 @@
       </p:sp>
       <p:sp>
         <p:nvSpPr>
-          <p:cNvPr id="219" name="Google Shape;219;p40:notes"/>
+          <p:cNvPr id="222" name="Google Shape;222;gec2e1cceae_0_20:notes"/>
+          <p:cNvSpPr txBox="1"/>
+          <p:nvPr>
+            <p:ph idx="1" type="body"/>
+          </p:nvPr>
+        </p:nvSpPr>
+        <p:spPr>
+          <a:xfrm>
+            <a:off x="685800" y="4343400"/>
+            <a:ext cx="5486400" cy="4114800"/>
+          </a:xfrm>
+          <a:prstGeom prst="rect">
+            <a:avLst/>
+          </a:prstGeom>
+          <a:noFill/>
+          <a:ln>
+            <a:noFill/>
+          </a:ln>
+        </p:spPr>
+        <p:txBody>
+          <a:bodyPr anchorCtr="0" anchor="t" bIns="91425" lIns="91425" spcFirstLastPara="1" rIns="91425" wrap="square" tIns="91425">
+            <a:noAutofit/>
+          </a:bodyPr>
+          <a:lstStyle/>
+          <a:p>
+            <a:pPr indent="0" lvl="0" marL="0" rtl="0" algn="l">
+              <a:lnSpc>
+                <a:spcPct val="100000"/>
+              </a:lnSpc>
+              <a:spcBef>
+                <a:spcPts val="0"/>
+              </a:spcBef>
+              <a:spcAft>
+                <a:spcPts val="0"/>
+              </a:spcAft>
+              <a:buSzPts val="1100"/>
+              <a:buNone/>
+            </a:pPr>
+            <a:r>
+              <a:t/>
+            </a:r>
+            <a:endParaRPr/>
+          </a:p>
+        </p:txBody>
+      </p:sp>
+    </p:spTree>
+  </p:cSld>
+  <p:clrMapOvr>
+    <a:masterClrMapping/>
+  </p:clrMapOvr>
+</p:notes>
+</file>
+
+<file path=ppt/notesSlides/notesSlide27.xml><?xml version="1.0" encoding="utf-8"?>
+<p:notes xmlns:a="http://schemas.openxmlformats.org/drawingml/2006/main" xmlns:r="http://schemas.openxmlformats.org/officeDocument/2006/relationships" xmlns:mc="http://schemas.openxmlformats.org/markup-compatibility/2006" xmlns:mv="urn:schemas-microsoft-com:mac:vml" xmlns:p="http://schemas.openxmlformats.org/presentationml/2006/main" xmlns:c="http://schemas.openxmlformats.org/drawingml/2006/chart" xmlns:dgm="http://schemas.openxmlformats.org/drawingml/2006/diagram" xmlns:o="urn:schemas-microsoft-com:office:office" xmlns:v="urn:schemas-microsoft-com:vml" xmlns:pvml="urn:schemas-microsoft-com:office:powerpoint" xmlns:com="http://schemas.openxmlformats.org/drawingml/2006/compatibility" xmlns:p14="http://schemas.microsoft.com/office/powerpoint/2010/main" xmlns:p15="http://schemas.microsoft.com/office/powerpoint/2012/main" xmlns:ahyp="http://schemas.microsoft.com/office/drawing/2018/hyperlinkcolor" showMasterPhAnim="0" showMasterSp="0">
+  <p:cSld>
+    <p:spTree>
+      <p:nvGrpSpPr>
+        <p:cNvPr id="226" name="Shape 226"/>
+        <p:cNvGrpSpPr/>
+        <p:nvPr/>
+      </p:nvGrpSpPr>
+      <p:grpSpPr>
+        <a:xfrm>
+          <a:off x="0" y="0"/>
+          <a:ext cx="0" cy="0"/>
+          <a:chOff x="0" y="0"/>
+          <a:chExt cx="0" cy="0"/>
+        </a:xfrm>
+      </p:grpSpPr>
+      <p:sp>
+        <p:nvSpPr>
+          <p:cNvPr id="227" name="Google Shape;227;p25:notes"/>
+          <p:cNvSpPr/>
+          <p:nvPr>
+            <p:ph idx="2" type="sldImg"/>
+          </p:nvPr>
+        </p:nvSpPr>
+        <p:spPr>
+          <a:xfrm>
+            <a:off x="381300" y="685800"/>
+            <a:ext cx="6096000" cy="3429000"/>
+          </a:xfrm>
+          <a:custGeom>
+            <a:rect b="b" l="l" r="r" t="t"/>
+            <a:pathLst>
+              <a:path extrusionOk="0" h="120000" w="120000">
+                <a:moveTo>
+                  <a:pt x="0" y="0"/>
+                </a:moveTo>
+                <a:lnTo>
+                  <a:pt x="120000" y="0"/>
+                </a:lnTo>
+                <a:lnTo>
+                  <a:pt x="120000" y="120000"/>
+                </a:lnTo>
+                <a:lnTo>
+                  <a:pt x="0" y="120000"/>
+                </a:lnTo>
+                <a:close/>
+              </a:path>
+            </a:pathLst>
+          </a:custGeom>
+          <a:noFill/>
+          <a:ln cap="flat" cmpd="sng" w="9525">
+            <a:solidFill>
+              <a:srgbClr val="000000"/>
+            </a:solidFill>
+            <a:prstDash val="solid"/>
+            <a:round/>
+            <a:headEnd len="sm" w="sm" type="none"/>
+            <a:tailEnd len="sm" w="sm" type="none"/>
+          </a:ln>
+        </p:spPr>
+      </p:sp>
+      <p:sp>
+        <p:nvSpPr>
+          <p:cNvPr id="228" name="Google Shape;228;p25:notes"/>
+          <p:cNvSpPr txBox="1"/>
+          <p:nvPr>
+            <p:ph idx="1" type="body"/>
+          </p:nvPr>
+        </p:nvSpPr>
+        <p:spPr>
+          <a:xfrm>
+            <a:off x="685800" y="4343400"/>
+            <a:ext cx="5486400" cy="4114800"/>
+          </a:xfrm>
+          <a:prstGeom prst="rect">
+            <a:avLst/>
+          </a:prstGeom>
+          <a:noFill/>
+          <a:ln>
+            <a:noFill/>
+          </a:ln>
+        </p:spPr>
+        <p:txBody>
+          <a:bodyPr anchorCtr="0" anchor="t" bIns="91425" lIns="91425" spcFirstLastPara="1" rIns="91425" wrap="square" tIns="91425">
+            <a:noAutofit/>
+          </a:bodyPr>
+          <a:lstStyle/>
+          <a:p>
+            <a:pPr indent="0" lvl="0" marL="0" rtl="0" algn="l">
+              <a:lnSpc>
+                <a:spcPct val="100000"/>
+              </a:lnSpc>
+              <a:spcBef>
+                <a:spcPts val="0"/>
+              </a:spcBef>
+              <a:spcAft>
+                <a:spcPts val="0"/>
+              </a:spcAft>
+              <a:buSzPts val="1100"/>
+              <a:buNone/>
+            </a:pPr>
+            <a:r>
+              <a:t/>
+            </a:r>
+            <a:endParaRPr/>
+          </a:p>
+        </p:txBody>
+      </p:sp>
+    </p:spTree>
+  </p:cSld>
+  <p:clrMapOvr>
+    <a:masterClrMapping/>
+  </p:clrMapOvr>
+</p:notes>
+</file>
+
+<file path=ppt/notesSlides/notesSlide28.xml><?xml version="1.0" encoding="utf-8"?>
+<p:notes xmlns:a="http://schemas.openxmlformats.org/drawingml/2006/main" xmlns:r="http://schemas.openxmlformats.org/officeDocument/2006/relationships" xmlns:mc="http://schemas.openxmlformats.org/markup-compatibility/2006" xmlns:mv="urn:schemas-microsoft-com:mac:vml" xmlns:p="http://schemas.openxmlformats.org/presentationml/2006/main" xmlns:c="http://schemas.openxmlformats.org/drawingml/2006/chart" xmlns:dgm="http://schemas.openxmlformats.org/drawingml/2006/diagram" xmlns:o="urn:schemas-microsoft-com:office:office" xmlns:v="urn:schemas-microsoft-com:vml" xmlns:pvml="urn:schemas-microsoft-com:office:powerpoint" xmlns:com="http://schemas.openxmlformats.org/drawingml/2006/compatibility" xmlns:p14="http://schemas.microsoft.com/office/powerpoint/2010/main" xmlns:p15="http://schemas.microsoft.com/office/powerpoint/2012/main" xmlns:ahyp="http://schemas.microsoft.com/office/drawing/2018/hyperlinkcolor" showMasterPhAnim="0" showMasterSp="0">
+  <p:cSld>
+    <p:spTree>
+      <p:nvGrpSpPr>
+        <p:cNvPr id="232" name="Shape 232"/>
+        <p:cNvGrpSpPr/>
+        <p:nvPr/>
+      </p:nvGrpSpPr>
+      <p:grpSpPr>
+        <a:xfrm>
+          <a:off x="0" y="0"/>
+          <a:ext cx="0" cy="0"/>
+          <a:chOff x="0" y="0"/>
+          <a:chExt cx="0" cy="0"/>
+        </a:xfrm>
+      </p:grpSpPr>
+      <p:sp>
+        <p:nvSpPr>
+          <p:cNvPr id="233" name="Google Shape;233;gec2e1cceae_0_25:notes"/>
+          <p:cNvSpPr/>
+          <p:nvPr>
+            <p:ph idx="2" type="sldImg"/>
+          </p:nvPr>
+        </p:nvSpPr>
+        <p:spPr>
+          <a:xfrm>
+            <a:off x="381300" y="685800"/>
+            <a:ext cx="6096000" cy="3429000"/>
+          </a:xfrm>
+          <a:custGeom>
+            <a:rect b="b" l="l" r="r" t="t"/>
+            <a:pathLst>
+              <a:path extrusionOk="0" h="120000" w="120000">
+                <a:moveTo>
+                  <a:pt x="0" y="0"/>
+                </a:moveTo>
+                <a:lnTo>
+                  <a:pt x="120000" y="0"/>
+                </a:lnTo>
+                <a:lnTo>
+                  <a:pt x="120000" y="120000"/>
+                </a:lnTo>
+                <a:lnTo>
+                  <a:pt x="0" y="120000"/>
+                </a:lnTo>
+                <a:close/>
+              </a:path>
+            </a:pathLst>
+          </a:custGeom>
+          <a:noFill/>
+          <a:ln cap="flat" cmpd="sng" w="9525">
+            <a:solidFill>
+              <a:srgbClr val="000000"/>
+            </a:solidFill>
+            <a:prstDash val="solid"/>
+            <a:round/>
+            <a:headEnd len="sm" w="sm" type="none"/>
+            <a:tailEnd len="sm" w="sm" type="none"/>
+          </a:ln>
+        </p:spPr>
+      </p:sp>
+      <p:sp>
+        <p:nvSpPr>
+          <p:cNvPr id="234" name="Google Shape;234;gec2e1cceae_0_25:notes"/>
+          <p:cNvSpPr txBox="1"/>
+          <p:nvPr>
+            <p:ph idx="1" type="body"/>
+          </p:nvPr>
+        </p:nvSpPr>
+        <p:spPr>
+          <a:xfrm>
+            <a:off x="685800" y="4343400"/>
+            <a:ext cx="5486400" cy="4114800"/>
+          </a:xfrm>
+          <a:prstGeom prst="rect">
+            <a:avLst/>
+          </a:prstGeom>
+          <a:noFill/>
+          <a:ln>
+            <a:noFill/>
+          </a:ln>
+        </p:spPr>
+        <p:txBody>
+          <a:bodyPr anchorCtr="0" anchor="t" bIns="91425" lIns="91425" spcFirstLastPara="1" rIns="91425" wrap="square" tIns="91425">
+            <a:noAutofit/>
+          </a:bodyPr>
+          <a:lstStyle/>
+          <a:p>
+            <a:pPr indent="0" lvl="0" marL="0" rtl="0" algn="l">
+              <a:lnSpc>
+                <a:spcPct val="100000"/>
+              </a:lnSpc>
+              <a:spcBef>
+                <a:spcPts val="0"/>
+              </a:spcBef>
+              <a:spcAft>
+                <a:spcPts val="0"/>
+              </a:spcAft>
+              <a:buSzPts val="1100"/>
+              <a:buNone/>
+            </a:pPr>
+            <a:r>
+              <a:t/>
+            </a:r>
+            <a:endParaRPr/>
+          </a:p>
+        </p:txBody>
+      </p:sp>
+    </p:spTree>
+  </p:cSld>
+  <p:clrMapOvr>
+    <a:masterClrMapping/>
+  </p:clrMapOvr>
+</p:notes>
+</file>
+
+<file path=ppt/notesSlides/notesSlide29.xml><?xml version="1.0" encoding="utf-8"?>
+<p:notes xmlns:a="http://schemas.openxmlformats.org/drawingml/2006/main" xmlns:r="http://schemas.openxmlformats.org/officeDocument/2006/relationships" xmlns:mc="http://schemas.openxmlformats.org/markup-compatibility/2006" xmlns:mv="urn:schemas-microsoft-com:mac:vml" xmlns:p="http://schemas.openxmlformats.org/presentationml/2006/main" xmlns:c="http://schemas.openxmlformats.org/drawingml/2006/chart" xmlns:dgm="http://schemas.openxmlformats.org/drawingml/2006/diagram" xmlns:o="urn:schemas-microsoft-com:office:office" xmlns:v="urn:schemas-microsoft-com:vml" xmlns:pvml="urn:schemas-microsoft-com:office:powerpoint" xmlns:com="http://schemas.openxmlformats.org/drawingml/2006/compatibility" xmlns:p14="http://schemas.microsoft.com/office/powerpoint/2010/main" xmlns:p15="http://schemas.microsoft.com/office/powerpoint/2012/main" xmlns:ahyp="http://schemas.microsoft.com/office/drawing/2018/hyperlinkcolor" showMasterPhAnim="0" showMasterSp="0">
+  <p:cSld>
+    <p:spTree>
+      <p:nvGrpSpPr>
+        <p:cNvPr id="238" name="Shape 238"/>
+        <p:cNvGrpSpPr/>
+        <p:nvPr/>
+      </p:nvGrpSpPr>
+      <p:grpSpPr>
+        <a:xfrm>
+          <a:off x="0" y="0"/>
+          <a:ext cx="0" cy="0"/>
+          <a:chOff x="0" y="0"/>
+          <a:chExt cx="0" cy="0"/>
+        </a:xfrm>
+      </p:grpSpPr>
+      <p:sp>
+        <p:nvSpPr>
+          <p:cNvPr id="239" name="Google Shape;239;p40:notes"/>
+          <p:cNvSpPr/>
+          <p:nvPr>
+            <p:ph idx="2" type="sldImg"/>
+          </p:nvPr>
+        </p:nvSpPr>
+        <p:spPr>
+          <a:xfrm>
+            <a:off x="381300" y="685800"/>
+            <a:ext cx="6096000" cy="3429000"/>
+          </a:xfrm>
+          <a:custGeom>
+            <a:rect b="b" l="l" r="r" t="t"/>
+            <a:pathLst>
+              <a:path extrusionOk="0" h="120000" w="120000">
+                <a:moveTo>
+                  <a:pt x="0" y="0"/>
+                </a:moveTo>
+                <a:lnTo>
+                  <a:pt x="120000" y="0"/>
+                </a:lnTo>
+                <a:lnTo>
+                  <a:pt x="120000" y="120000"/>
+                </a:lnTo>
+                <a:lnTo>
+                  <a:pt x="0" y="120000"/>
+                </a:lnTo>
+                <a:close/>
+              </a:path>
+            </a:pathLst>
+          </a:custGeom>
+          <a:noFill/>
+          <a:ln cap="flat" cmpd="sng" w="9525">
+            <a:solidFill>
+              <a:srgbClr val="000000"/>
+            </a:solidFill>
+            <a:prstDash val="solid"/>
+            <a:round/>
+            <a:headEnd len="sm" w="sm" type="none"/>
+            <a:tailEnd len="sm" w="sm" type="none"/>
+          </a:ln>
+        </p:spPr>
+      </p:sp>
+      <p:sp>
+        <p:nvSpPr>
+          <p:cNvPr id="240" name="Google Shape;240;p40:notes"/>
           <p:cNvSpPr txBox="1"/>
           <p:nvPr>
             <p:ph idx="1" type="body"/>
@@ -12236,7 +12590,7 @@
             <a:avLst/>
           </a:prstGeom>
           <a:solidFill>
-            <a:srgbClr val="CC0000"/>
+            <a:srgbClr val="073763"/>
           </a:solidFill>
           <a:ln>
             <a:noFill/>
@@ -12302,7 +12656,7 @@
             <a:avLst/>
           </a:prstGeom>
           <a:solidFill>
-            <a:srgbClr val="FF0000"/>
+            <a:srgbClr val="073763"/>
           </a:solidFill>
           <a:ln>
             <a:noFill/>
@@ -14371,7 +14725,7 @@
         </p:spPr>
         <p:txBody>
           <a:bodyPr anchorCtr="0" anchor="b" bIns="91425" lIns="91425" spcFirstLastPara="1" rIns="91425" wrap="square" tIns="91425">
-            <a:normAutofit/>
+            <a:noAutofit/>
           </a:bodyPr>
           <a:lstStyle/>
           <a:p>
@@ -14389,7 +14743,7 @@
               <a:buNone/>
             </a:pPr>
             <a:r>
-              <a:rPr lang="en">
+              <a:rPr lang="en" sz="3750">
                 <a:latin typeface="Ubuntu"/>
                 <a:ea typeface="Ubuntu"/>
                 <a:cs typeface="Ubuntu"/>
@@ -14397,7 +14751,7 @@
               </a:rPr>
               <a:t>AGENDA</a:t>
             </a:r>
-            <a:endParaRPr>
+            <a:endParaRPr sz="3750">
               <a:latin typeface="Ubuntu"/>
               <a:ea typeface="Ubuntu"/>
               <a:cs typeface="Ubuntu"/>
@@ -14748,7 +15102,7 @@
       </p:grpSpPr>
       <p:sp>
         <p:nvSpPr>
-          <p:cNvPr id="179" name="Google Shape;179;p11"/>
+          <p:cNvPr id="179" name="Google Shape;179;gec2e1cceae_0_140"/>
           <p:cNvSpPr txBox="1"/>
           <p:nvPr>
             <p:ph type="title"/>
@@ -14769,7 +15123,7 @@
         </p:spPr>
         <p:txBody>
           <a:bodyPr anchorCtr="0" anchor="b" bIns="91425" lIns="91425" spcFirstLastPara="1" rIns="91425" wrap="square" tIns="91425">
-            <a:normAutofit/>
+            <a:normAutofit fontScale="90000"/>
           </a:bodyPr>
           <a:lstStyle/>
           <a:p>
@@ -14783,7 +15137,31 @@
               <a:spcAft>
                 <a:spcPts val="0"/>
               </a:spcAft>
-              <a:buSzPts val="4200"/>
+              <a:buSzPct val="100000"/>
+              <a:buNone/>
+            </a:pPr>
+            <a:r>
+              <a:t/>
+            </a:r>
+            <a:endParaRPr>
+              <a:latin typeface="Ubuntu"/>
+              <a:ea typeface="Ubuntu"/>
+              <a:cs typeface="Ubuntu"/>
+              <a:sym typeface="Ubuntu"/>
+            </a:endParaRPr>
+          </a:p>
+          <a:p>
+            <a:pPr indent="0" lvl="0" marL="0" rtl="0" algn="l">
+              <a:lnSpc>
+                <a:spcPct val="100000"/>
+              </a:lnSpc>
+              <a:spcBef>
+                <a:spcPts val="0"/>
+              </a:spcBef>
+              <a:spcAft>
+                <a:spcPts val="0"/>
+              </a:spcAft>
+              <a:buSzPct val="100000"/>
               <a:buNone/>
             </a:pPr>
             <a:r>
@@ -14804,158 +15182,635 @@
           </a:p>
         </p:txBody>
       </p:sp>
-      <p:sp>
-        <p:nvSpPr>
-          <p:cNvPr id="180" name="Google Shape;180;p11"/>
-          <p:cNvSpPr txBox="1"/>
-          <p:nvPr>
-            <p:ph idx="1" type="body"/>
-          </p:nvPr>
-        </p:nvSpPr>
-        <p:spPr>
-          <a:xfrm>
-            <a:off x="311700" y="1225225"/>
-            <a:ext cx="8520600" cy="3354000"/>
-          </a:xfrm>
-          <a:prstGeom prst="rect">
-            <a:avLst/>
-          </a:prstGeom>
-          <a:noFill/>
-          <a:ln>
-            <a:noFill/>
-          </a:ln>
-        </p:spPr>
-        <p:txBody>
-          <a:bodyPr anchorCtr="0" anchor="t" bIns="91425" lIns="91425" spcFirstLastPara="1" rIns="91425" wrap="square" tIns="91425">
-            <a:normAutofit/>
-          </a:bodyPr>
-          <a:lstStyle/>
-          <a:p>
-            <a:pPr indent="-342900" lvl="0" marL="457200" rtl="0" algn="l">
-              <a:lnSpc>
-                <a:spcPct val="115000"/>
-              </a:lnSpc>
-              <a:spcBef>
-                <a:spcPts val="0"/>
-              </a:spcBef>
-              <a:spcAft>
-                <a:spcPts val="0"/>
-              </a:spcAft>
-              <a:buSzPts val="1800"/>
-              <a:buFont typeface="Ubuntu Light"/>
-              <a:buChar char="●"/>
-            </a:pPr>
-            <a:r>
-              <a:rPr lang="en">
-                <a:latin typeface="Ubuntu Light"/>
-                <a:ea typeface="Ubuntu Light"/>
-                <a:cs typeface="Ubuntu Light"/>
-                <a:sym typeface="Ubuntu Light"/>
-              </a:rPr>
-              <a:t>Logistic Regression (+Softmax)</a:t>
-            </a:r>
-            <a:endParaRPr>
-              <a:latin typeface="Ubuntu Light"/>
-              <a:ea typeface="Ubuntu Light"/>
-              <a:cs typeface="Ubuntu Light"/>
-              <a:sym typeface="Ubuntu Light"/>
-            </a:endParaRPr>
-          </a:p>
-          <a:p>
-            <a:pPr indent="-342900" lvl="0" marL="457200" rtl="0" algn="l">
-              <a:lnSpc>
-                <a:spcPct val="115000"/>
-              </a:lnSpc>
-              <a:spcBef>
-                <a:spcPts val="0"/>
-              </a:spcBef>
-              <a:spcAft>
-                <a:spcPts val="0"/>
-              </a:spcAft>
-              <a:buSzPts val="1800"/>
-              <a:buFont typeface="Ubuntu Light"/>
-              <a:buChar char="●"/>
-            </a:pPr>
-            <a:r>
-              <a:rPr lang="en">
-                <a:latin typeface="Ubuntu Light"/>
-                <a:ea typeface="Ubuntu Light"/>
-                <a:cs typeface="Ubuntu Light"/>
-                <a:sym typeface="Ubuntu Light"/>
-              </a:rPr>
-              <a:t>Random Forests</a:t>
-            </a:r>
-            <a:endParaRPr>
-              <a:latin typeface="Ubuntu Light"/>
-              <a:ea typeface="Ubuntu Light"/>
-              <a:cs typeface="Ubuntu Light"/>
-              <a:sym typeface="Ubuntu Light"/>
-            </a:endParaRPr>
-          </a:p>
-          <a:p>
-            <a:pPr indent="-342900" lvl="0" marL="457200" rtl="0" algn="l">
-              <a:lnSpc>
-                <a:spcPct val="115000"/>
-              </a:lnSpc>
-              <a:spcBef>
-                <a:spcPts val="0"/>
-              </a:spcBef>
-              <a:spcAft>
-                <a:spcPts val="0"/>
-              </a:spcAft>
-              <a:buSzPts val="1800"/>
-              <a:buFont typeface="Ubuntu Light"/>
-              <a:buChar char="●"/>
-            </a:pPr>
-            <a:r>
-              <a:rPr lang="en">
-                <a:latin typeface="Ubuntu Light"/>
-                <a:ea typeface="Ubuntu Light"/>
-                <a:cs typeface="Ubuntu Light"/>
-                <a:sym typeface="Ubuntu Light"/>
-              </a:rPr>
-              <a:t>SVMs</a:t>
-            </a:r>
-            <a:endParaRPr>
-              <a:latin typeface="Ubuntu Light"/>
-              <a:ea typeface="Ubuntu Light"/>
-              <a:cs typeface="Ubuntu Light"/>
-              <a:sym typeface="Ubuntu Light"/>
-            </a:endParaRPr>
-          </a:p>
-          <a:p>
-            <a:pPr indent="-342900" lvl="0" marL="457200" rtl="0" algn="l">
-              <a:lnSpc>
-                <a:spcPct val="115000"/>
-              </a:lnSpc>
-              <a:spcBef>
-                <a:spcPts val="0"/>
-              </a:spcBef>
-              <a:spcAft>
-                <a:spcPts val="0"/>
-              </a:spcAft>
-              <a:buSzPts val="1800"/>
-              <a:buFont typeface="Ubuntu Light"/>
-              <a:buChar char="●"/>
-            </a:pPr>
-            <a:r>
-              <a:rPr lang="en">
-                <a:latin typeface="Ubuntu Light"/>
-                <a:ea typeface="Ubuntu Light"/>
-                <a:cs typeface="Ubuntu Light"/>
-                <a:sym typeface="Ubuntu Light"/>
-              </a:rPr>
-              <a:t>PCA (+KernelPCA)</a:t>
-            </a:r>
-            <a:endParaRPr>
-              <a:latin typeface="Ubuntu Light"/>
-              <a:ea typeface="Ubuntu Light"/>
-              <a:cs typeface="Ubuntu Light"/>
-              <a:sym typeface="Ubuntu Light"/>
-            </a:endParaRPr>
-          </a:p>
-        </p:txBody>
-      </p:sp>
+      <p:graphicFrame>
+        <p:nvGraphicFramePr>
+          <p:cNvPr id="180" name="Google Shape;180;gec2e1cceae_0_140"/>
+          <p:cNvGraphicFramePr/>
+          <p:nvPr/>
+        </p:nvGraphicFramePr>
+        <p:xfrm>
+          <a:off x="906163" y="1147230"/>
+          <a:ext cx="3000000" cy="3000000"/>
+        </p:xfrm>
+        <a:graphic>
+          <a:graphicData uri="http://schemas.openxmlformats.org/drawingml/2006/table">
+            <a:tbl>
+              <a:tblPr>
+                <a:noFill/>
+                <a:tableStyleId>{4BE756BA-E4D6-4DD5-AE8F-E202BB676858}</a:tableStyleId>
+              </a:tblPr>
+              <a:tblGrid>
+                <a:gridCol w="1968825"/>
+                <a:gridCol w="1457725"/>
+                <a:gridCol w="1429250"/>
+                <a:gridCol w="1397650"/>
+                <a:gridCol w="1078225"/>
+              </a:tblGrid>
+              <a:tr h="1096100">
+                <a:tc>
+                  <a:txBody>
+                    <a:bodyPr/>
+                    <a:lstStyle/>
+                    <a:p>
+                      <a:pPr indent="0" lvl="0" marL="0" rtl="0" algn="l">
+                        <a:spcBef>
+                          <a:spcPts val="0"/>
+                        </a:spcBef>
+                        <a:spcAft>
+                          <a:spcPts val="0"/>
+                        </a:spcAft>
+                        <a:buNone/>
+                      </a:pPr>
+                      <a:r>
+                        <a:t/>
+                      </a:r>
+                      <a:endParaRPr b="1" sz="1700">
+                        <a:latin typeface="Ubuntu"/>
+                        <a:ea typeface="Ubuntu"/>
+                        <a:cs typeface="Ubuntu"/>
+                        <a:sym typeface="Ubuntu"/>
+                      </a:endParaRPr>
+                    </a:p>
+                  </a:txBody>
+                  <a:tcPr marT="91425" marB="91425" marR="91425" marL="91425">
+                    <a:solidFill>
+                      <a:srgbClr val="FCE5CD"/>
+                    </a:solidFill>
+                  </a:tcPr>
+                </a:tc>
+                <a:tc>
+                  <a:txBody>
+                    <a:bodyPr/>
+                    <a:lstStyle/>
+                    <a:p>
+                      <a:pPr indent="0" lvl="0" marL="0" rtl="0" algn="ctr">
+                        <a:spcBef>
+                          <a:spcPts val="0"/>
+                        </a:spcBef>
+                        <a:spcAft>
+                          <a:spcPts val="0"/>
+                        </a:spcAft>
+                        <a:buNone/>
+                      </a:pPr>
+                      <a:r>
+                        <a:rPr b="1" lang="en" sz="1700">
+                          <a:latin typeface="Ubuntu"/>
+                          <a:ea typeface="Ubuntu"/>
+                          <a:cs typeface="Ubuntu"/>
+                          <a:sym typeface="Ubuntu"/>
+                        </a:rPr>
+                        <a:t>Logistic</a:t>
+                      </a:r>
+                      <a:endParaRPr b="1" sz="1700">
+                        <a:latin typeface="Ubuntu"/>
+                        <a:ea typeface="Ubuntu"/>
+                        <a:cs typeface="Ubuntu"/>
+                        <a:sym typeface="Ubuntu"/>
+                      </a:endParaRPr>
+                    </a:p>
+                    <a:p>
+                      <a:pPr indent="0" lvl="0" marL="0" rtl="0" algn="ctr">
+                        <a:spcBef>
+                          <a:spcPts val="0"/>
+                        </a:spcBef>
+                        <a:spcAft>
+                          <a:spcPts val="0"/>
+                        </a:spcAft>
+                        <a:buNone/>
+                      </a:pPr>
+                      <a:r>
+                        <a:rPr b="1" lang="en" sz="1700">
+                          <a:latin typeface="Ubuntu"/>
+                          <a:ea typeface="Ubuntu"/>
+                          <a:cs typeface="Ubuntu"/>
+                          <a:sym typeface="Ubuntu"/>
+                        </a:rPr>
+                        <a:t>Regression</a:t>
+                      </a:r>
+                      <a:endParaRPr b="1" sz="1700">
+                        <a:latin typeface="Ubuntu"/>
+                        <a:ea typeface="Ubuntu"/>
+                        <a:cs typeface="Ubuntu"/>
+                        <a:sym typeface="Ubuntu"/>
+                      </a:endParaRPr>
+                    </a:p>
+                  </a:txBody>
+                  <a:tcPr marT="91425" marB="91425" marR="91425" marL="91425" anchor="ctr">
+                    <a:solidFill>
+                      <a:srgbClr val="F9CB9C"/>
+                    </a:solidFill>
+                  </a:tcPr>
+                </a:tc>
+                <a:tc>
+                  <a:txBody>
+                    <a:bodyPr/>
+                    <a:lstStyle/>
+                    <a:p>
+                      <a:pPr indent="0" lvl="0" marL="0" rtl="0" algn="ctr">
+                        <a:spcBef>
+                          <a:spcPts val="0"/>
+                        </a:spcBef>
+                        <a:spcAft>
+                          <a:spcPts val="0"/>
+                        </a:spcAft>
+                        <a:buNone/>
+                      </a:pPr>
+                      <a:r>
+                        <a:rPr b="1" lang="en" sz="1700">
+                          <a:latin typeface="Ubuntu"/>
+                          <a:ea typeface="Ubuntu"/>
+                          <a:cs typeface="Ubuntu"/>
+                          <a:sym typeface="Ubuntu"/>
+                        </a:rPr>
+                        <a:t>Softmax</a:t>
+                      </a:r>
+                      <a:endParaRPr b="1" sz="1700">
+                        <a:latin typeface="Ubuntu"/>
+                        <a:ea typeface="Ubuntu"/>
+                        <a:cs typeface="Ubuntu"/>
+                        <a:sym typeface="Ubuntu"/>
+                      </a:endParaRPr>
+                    </a:p>
+                    <a:p>
+                      <a:pPr indent="0" lvl="0" marL="0" rtl="0" algn="ctr">
+                        <a:spcBef>
+                          <a:spcPts val="0"/>
+                        </a:spcBef>
+                        <a:spcAft>
+                          <a:spcPts val="0"/>
+                        </a:spcAft>
+                        <a:buNone/>
+                      </a:pPr>
+                      <a:r>
+                        <a:rPr b="1" lang="en" sz="1700">
+                          <a:latin typeface="Ubuntu"/>
+                          <a:ea typeface="Ubuntu"/>
+                          <a:cs typeface="Ubuntu"/>
+                          <a:sym typeface="Ubuntu"/>
+                        </a:rPr>
+                        <a:t>Regression</a:t>
+                      </a:r>
+                      <a:endParaRPr b="1" sz="1700">
+                        <a:latin typeface="Ubuntu"/>
+                        <a:ea typeface="Ubuntu"/>
+                        <a:cs typeface="Ubuntu"/>
+                        <a:sym typeface="Ubuntu"/>
+                      </a:endParaRPr>
+                    </a:p>
+                  </a:txBody>
+                  <a:tcPr marT="91425" marB="91425" marR="91425" marL="91425" anchor="ctr">
+                    <a:solidFill>
+                      <a:srgbClr val="F9CB9C"/>
+                    </a:solidFill>
+                  </a:tcPr>
+                </a:tc>
+                <a:tc>
+                  <a:txBody>
+                    <a:bodyPr/>
+                    <a:lstStyle/>
+                    <a:p>
+                      <a:pPr indent="0" lvl="0" marL="0" rtl="0" algn="ctr">
+                        <a:spcBef>
+                          <a:spcPts val="0"/>
+                        </a:spcBef>
+                        <a:spcAft>
+                          <a:spcPts val="0"/>
+                        </a:spcAft>
+                        <a:buNone/>
+                      </a:pPr>
+                      <a:r>
+                        <a:rPr b="1" lang="en" sz="1700">
+                          <a:latin typeface="Ubuntu"/>
+                          <a:ea typeface="Ubuntu"/>
+                          <a:cs typeface="Ubuntu"/>
+                          <a:sym typeface="Ubuntu"/>
+                        </a:rPr>
+                        <a:t>Random</a:t>
+                      </a:r>
+                      <a:endParaRPr b="1" sz="1700">
+                        <a:latin typeface="Ubuntu"/>
+                        <a:ea typeface="Ubuntu"/>
+                        <a:cs typeface="Ubuntu"/>
+                        <a:sym typeface="Ubuntu"/>
+                      </a:endParaRPr>
+                    </a:p>
+                    <a:p>
+                      <a:pPr indent="0" lvl="0" marL="0" rtl="0" algn="ctr">
+                        <a:spcBef>
+                          <a:spcPts val="0"/>
+                        </a:spcBef>
+                        <a:spcAft>
+                          <a:spcPts val="0"/>
+                        </a:spcAft>
+                        <a:buNone/>
+                      </a:pPr>
+                      <a:r>
+                        <a:rPr b="1" lang="en" sz="1700">
+                          <a:latin typeface="Ubuntu"/>
+                          <a:ea typeface="Ubuntu"/>
+                          <a:cs typeface="Ubuntu"/>
+                          <a:sym typeface="Ubuntu"/>
+                        </a:rPr>
+                        <a:t>Forest</a:t>
+                      </a:r>
+                      <a:endParaRPr b="1" sz="1700">
+                        <a:latin typeface="Ubuntu"/>
+                        <a:ea typeface="Ubuntu"/>
+                        <a:cs typeface="Ubuntu"/>
+                        <a:sym typeface="Ubuntu"/>
+                      </a:endParaRPr>
+                    </a:p>
+                  </a:txBody>
+                  <a:tcPr marT="91425" marB="91425" marR="91425" marL="91425" anchor="ctr">
+                    <a:solidFill>
+                      <a:srgbClr val="F9CB9C"/>
+                    </a:solidFill>
+                  </a:tcPr>
+                </a:tc>
+                <a:tc>
+                  <a:txBody>
+                    <a:bodyPr/>
+                    <a:lstStyle/>
+                    <a:p>
+                      <a:pPr indent="0" lvl="0" marL="0" rtl="0" algn="ctr">
+                        <a:spcBef>
+                          <a:spcPts val="0"/>
+                        </a:spcBef>
+                        <a:spcAft>
+                          <a:spcPts val="0"/>
+                        </a:spcAft>
+                        <a:buNone/>
+                      </a:pPr>
+                      <a:r>
+                        <a:rPr b="1" lang="en" sz="1700">
+                          <a:latin typeface="Ubuntu"/>
+                          <a:ea typeface="Ubuntu"/>
+                          <a:cs typeface="Ubuntu"/>
+                          <a:sym typeface="Ubuntu"/>
+                        </a:rPr>
+                        <a:t>SVC</a:t>
+                      </a:r>
+                      <a:endParaRPr b="1" sz="1700">
+                        <a:latin typeface="Ubuntu"/>
+                        <a:ea typeface="Ubuntu"/>
+                        <a:cs typeface="Ubuntu"/>
+                        <a:sym typeface="Ubuntu"/>
+                      </a:endParaRPr>
+                    </a:p>
+                  </a:txBody>
+                  <a:tcPr marT="91425" marB="91425" marR="91425" marL="91425" anchor="ctr">
+                    <a:solidFill>
+                      <a:srgbClr val="F9CB9C"/>
+                    </a:solidFill>
+                  </a:tcPr>
+                </a:tc>
+              </a:tr>
+              <a:tr h="1187525">
+                <a:tc>
+                  <a:txBody>
+                    <a:bodyPr/>
+                    <a:lstStyle/>
+                    <a:p>
+                      <a:pPr indent="0" lvl="0" marL="0" rtl="0" algn="ctr">
+                        <a:spcBef>
+                          <a:spcPts val="0"/>
+                        </a:spcBef>
+                        <a:spcAft>
+                          <a:spcPts val="0"/>
+                        </a:spcAft>
+                        <a:buNone/>
+                      </a:pPr>
+                      <a:r>
+                        <a:rPr lang="en" sz="1700">
+                          <a:latin typeface="Ubuntu Light"/>
+                          <a:ea typeface="Ubuntu Light"/>
+                          <a:cs typeface="Ubuntu Light"/>
+                          <a:sym typeface="Ubuntu Light"/>
+                        </a:rPr>
+                        <a:t>“At Risk” Recall</a:t>
+                      </a:r>
+                      <a:endParaRPr sz="1700">
+                        <a:latin typeface="Ubuntu Light"/>
+                        <a:ea typeface="Ubuntu Light"/>
+                        <a:cs typeface="Ubuntu Light"/>
+                        <a:sym typeface="Ubuntu Light"/>
+                      </a:endParaRPr>
+                    </a:p>
+                  </a:txBody>
+                  <a:tcPr marT="91425" marB="91425" marR="91425" marL="91425" anchor="ctr">
+                    <a:solidFill>
+                      <a:schemeClr val="lt1"/>
+                    </a:solidFill>
+                  </a:tcPr>
+                </a:tc>
+                <a:tc>
+                  <a:txBody>
+                    <a:bodyPr/>
+                    <a:lstStyle/>
+                    <a:p>
+                      <a:pPr indent="0" lvl="0" marL="0" rtl="0" algn="ctr">
+                        <a:spcBef>
+                          <a:spcPts val="0"/>
+                        </a:spcBef>
+                        <a:spcAft>
+                          <a:spcPts val="0"/>
+                        </a:spcAft>
+                        <a:buNone/>
+                      </a:pPr>
+                      <a:r>
+                        <a:rPr lang="en" sz="1800">
+                          <a:latin typeface="Ubuntu Light"/>
+                          <a:ea typeface="Ubuntu Light"/>
+                          <a:cs typeface="Ubuntu Light"/>
+                          <a:sym typeface="Ubuntu Light"/>
+                        </a:rPr>
+                        <a:t>0.90</a:t>
+                      </a:r>
+                      <a:endParaRPr sz="1800">
+                        <a:latin typeface="Ubuntu Light"/>
+                        <a:ea typeface="Ubuntu Light"/>
+                        <a:cs typeface="Ubuntu Light"/>
+                        <a:sym typeface="Ubuntu Light"/>
+                      </a:endParaRPr>
+                    </a:p>
+                  </a:txBody>
+                  <a:tcPr marT="91425" marB="91425" marR="91425" marL="91425" anchor="ctr">
+                    <a:solidFill>
+                      <a:schemeClr val="lt1"/>
+                    </a:solidFill>
+                  </a:tcPr>
+                </a:tc>
+                <a:tc>
+                  <a:txBody>
+                    <a:bodyPr/>
+                    <a:lstStyle/>
+                    <a:p>
+                      <a:pPr indent="0" lvl="0" marL="0" rtl="0" algn="ctr">
+                        <a:spcBef>
+                          <a:spcPts val="0"/>
+                        </a:spcBef>
+                        <a:spcAft>
+                          <a:spcPts val="0"/>
+                        </a:spcAft>
+                        <a:buNone/>
+                      </a:pPr>
+                      <a:r>
+                        <a:rPr lang="en" sz="1800">
+                          <a:latin typeface="Ubuntu Light"/>
+                          <a:ea typeface="Ubuntu Light"/>
+                          <a:cs typeface="Ubuntu Light"/>
+                          <a:sym typeface="Ubuntu Light"/>
+                        </a:rPr>
+                        <a:t>0.94</a:t>
+                      </a:r>
+                      <a:endParaRPr sz="1800">
+                        <a:latin typeface="Ubuntu Light"/>
+                        <a:ea typeface="Ubuntu Light"/>
+                        <a:cs typeface="Ubuntu Light"/>
+                        <a:sym typeface="Ubuntu Light"/>
+                      </a:endParaRPr>
+                    </a:p>
+                  </a:txBody>
+                  <a:tcPr marT="91425" marB="91425" marR="91425" marL="91425" anchor="ctr"/>
+                </a:tc>
+                <a:tc>
+                  <a:txBody>
+                    <a:bodyPr/>
+                    <a:lstStyle/>
+                    <a:p>
+                      <a:pPr indent="0" lvl="0" marL="0" rtl="0" algn="ctr">
+                        <a:spcBef>
+                          <a:spcPts val="0"/>
+                        </a:spcBef>
+                        <a:spcAft>
+                          <a:spcPts val="0"/>
+                        </a:spcAft>
+                        <a:buNone/>
+                      </a:pPr>
+                      <a:r>
+                        <a:rPr lang="en" sz="1800">
+                          <a:latin typeface="Ubuntu Light"/>
+                          <a:ea typeface="Ubuntu Light"/>
+                          <a:cs typeface="Ubuntu Light"/>
+                          <a:sym typeface="Ubuntu Light"/>
+                        </a:rPr>
+                        <a:t>0.94</a:t>
+                      </a:r>
+                      <a:endParaRPr sz="1800">
+                        <a:latin typeface="Ubuntu Light"/>
+                        <a:ea typeface="Ubuntu Light"/>
+                        <a:cs typeface="Ubuntu Light"/>
+                        <a:sym typeface="Ubuntu Light"/>
+                      </a:endParaRPr>
+                    </a:p>
+                  </a:txBody>
+                  <a:tcPr marT="91425" marB="91425" marR="91425" marL="91425" anchor="ctr"/>
+                </a:tc>
+                <a:tc>
+                  <a:txBody>
+                    <a:bodyPr/>
+                    <a:lstStyle/>
+                    <a:p>
+                      <a:pPr indent="0" lvl="0" marL="0" rtl="0" algn="ctr">
+                        <a:spcBef>
+                          <a:spcPts val="0"/>
+                        </a:spcBef>
+                        <a:spcAft>
+                          <a:spcPts val="0"/>
+                        </a:spcAft>
+                        <a:buNone/>
+                      </a:pPr>
+                      <a:r>
+                        <a:rPr lang="en" sz="1800">
+                          <a:latin typeface="Ubuntu Light"/>
+                          <a:ea typeface="Ubuntu Light"/>
+                          <a:cs typeface="Ubuntu Light"/>
+                          <a:sym typeface="Ubuntu Light"/>
+                        </a:rPr>
+                        <a:t>0.97</a:t>
+                      </a:r>
+                      <a:endParaRPr sz="1800">
+                        <a:latin typeface="Ubuntu Light"/>
+                        <a:ea typeface="Ubuntu Light"/>
+                        <a:cs typeface="Ubuntu Light"/>
+                        <a:sym typeface="Ubuntu Light"/>
+                      </a:endParaRPr>
+                    </a:p>
+                  </a:txBody>
+                  <a:tcPr marT="91425" marB="91425" marR="91425" marL="91425" anchor="ctr"/>
+                </a:tc>
+              </a:tr>
+              <a:tr h="1086175">
+                <a:tc>
+                  <a:txBody>
+                    <a:bodyPr/>
+                    <a:lstStyle/>
+                    <a:p>
+                      <a:pPr indent="0" lvl="0" marL="0" rtl="0" algn="ctr">
+                        <a:spcBef>
+                          <a:spcPts val="0"/>
+                        </a:spcBef>
+                        <a:spcAft>
+                          <a:spcPts val="0"/>
+                        </a:spcAft>
+                        <a:buNone/>
+                      </a:pPr>
+                      <a:r>
+                        <a:rPr lang="en" sz="1700">
+                          <a:latin typeface="Ubuntu Light"/>
+                          <a:ea typeface="Ubuntu Light"/>
+                          <a:cs typeface="Ubuntu Light"/>
+                          <a:sym typeface="Ubuntu Light"/>
+                        </a:rPr>
+                        <a:t>Accuracy</a:t>
+                      </a:r>
+                      <a:endParaRPr sz="1700">
+                        <a:latin typeface="Ubuntu Light"/>
+                        <a:ea typeface="Ubuntu Light"/>
+                        <a:cs typeface="Ubuntu Light"/>
+                        <a:sym typeface="Ubuntu Light"/>
+                      </a:endParaRPr>
+                    </a:p>
+                  </a:txBody>
+                  <a:tcPr marT="91425" marB="91425" marR="91425" marL="91425" anchor="ctr"/>
+                </a:tc>
+                <a:tc>
+                  <a:txBody>
+                    <a:bodyPr/>
+                    <a:lstStyle/>
+                    <a:p>
+                      <a:pPr indent="0" lvl="0" marL="0" rtl="0" algn="ctr">
+                        <a:spcBef>
+                          <a:spcPts val="0"/>
+                        </a:spcBef>
+                        <a:spcAft>
+                          <a:spcPts val="0"/>
+                        </a:spcAft>
+                        <a:buNone/>
+                      </a:pPr>
+                      <a:r>
+                        <a:rPr lang="en" sz="1800">
+                          <a:latin typeface="Ubuntu Light"/>
+                          <a:ea typeface="Ubuntu Light"/>
+                          <a:cs typeface="Ubuntu Light"/>
+                          <a:sym typeface="Ubuntu Light"/>
+                        </a:rPr>
+                        <a:t>0.85</a:t>
+                      </a:r>
+                      <a:endParaRPr sz="1800">
+                        <a:latin typeface="Ubuntu Light"/>
+                        <a:ea typeface="Ubuntu Light"/>
+                        <a:cs typeface="Ubuntu Light"/>
+                        <a:sym typeface="Ubuntu Light"/>
+                      </a:endParaRPr>
+                    </a:p>
+                  </a:txBody>
+                  <a:tcPr marT="91425" marB="91425" marR="91425" marL="91425" anchor="ctr"/>
+                </a:tc>
+                <a:tc>
+                  <a:txBody>
+                    <a:bodyPr/>
+                    <a:lstStyle/>
+                    <a:p>
+                      <a:pPr indent="0" lvl="0" marL="0" rtl="0" algn="ctr">
+                        <a:spcBef>
+                          <a:spcPts val="0"/>
+                        </a:spcBef>
+                        <a:spcAft>
+                          <a:spcPts val="0"/>
+                        </a:spcAft>
+                        <a:buNone/>
+                      </a:pPr>
+                      <a:r>
+                        <a:rPr lang="en" sz="1800">
+                          <a:latin typeface="Ubuntu Light"/>
+                          <a:ea typeface="Ubuntu Light"/>
+                          <a:cs typeface="Ubuntu Light"/>
+                          <a:sym typeface="Ubuntu Light"/>
+                        </a:rPr>
+                        <a:t>0.87</a:t>
+                      </a:r>
+                      <a:endParaRPr sz="1800">
+                        <a:latin typeface="Ubuntu Light"/>
+                        <a:ea typeface="Ubuntu Light"/>
+                        <a:cs typeface="Ubuntu Light"/>
+                        <a:sym typeface="Ubuntu Light"/>
+                      </a:endParaRPr>
+                    </a:p>
+                  </a:txBody>
+                  <a:tcPr marT="91425" marB="91425" marR="91425" marL="91425" anchor="ctr"/>
+                </a:tc>
+                <a:tc>
+                  <a:txBody>
+                    <a:bodyPr/>
+                    <a:lstStyle/>
+                    <a:p>
+                      <a:pPr indent="0" lvl="0" marL="0" rtl="0" algn="ctr">
+                        <a:spcBef>
+                          <a:spcPts val="0"/>
+                        </a:spcBef>
+                        <a:spcAft>
+                          <a:spcPts val="0"/>
+                        </a:spcAft>
+                        <a:buNone/>
+                      </a:pPr>
+                      <a:r>
+                        <a:rPr lang="en" sz="1800">
+                          <a:latin typeface="Ubuntu Light"/>
+                          <a:ea typeface="Ubuntu Light"/>
+                          <a:cs typeface="Ubuntu Light"/>
+                          <a:sym typeface="Ubuntu Light"/>
+                        </a:rPr>
+                        <a:t>0.84</a:t>
+                      </a:r>
+                      <a:endParaRPr sz="1800">
+                        <a:latin typeface="Ubuntu Light"/>
+                        <a:ea typeface="Ubuntu Light"/>
+                        <a:cs typeface="Ubuntu Light"/>
+                        <a:sym typeface="Ubuntu Light"/>
+                      </a:endParaRPr>
+                    </a:p>
+                  </a:txBody>
+                  <a:tcPr marT="91425" marB="91425" marR="91425" marL="91425" anchor="ctr"/>
+                </a:tc>
+                <a:tc>
+                  <a:txBody>
+                    <a:bodyPr/>
+                    <a:lstStyle/>
+                    <a:p>
+                      <a:pPr indent="0" lvl="0" marL="0" rtl="0" algn="ctr">
+                        <a:spcBef>
+                          <a:spcPts val="0"/>
+                        </a:spcBef>
+                        <a:spcAft>
+                          <a:spcPts val="0"/>
+                        </a:spcAft>
+                        <a:buNone/>
+                      </a:pPr>
+                      <a:r>
+                        <a:rPr lang="en" sz="1800">
+                          <a:latin typeface="Ubuntu Light"/>
+                          <a:ea typeface="Ubuntu Light"/>
+                          <a:cs typeface="Ubuntu Light"/>
+                          <a:sym typeface="Ubuntu Light"/>
+                        </a:rPr>
+                        <a:t>0.89</a:t>
+                      </a:r>
+                      <a:endParaRPr sz="1800">
+                        <a:latin typeface="Ubuntu Light"/>
+                        <a:ea typeface="Ubuntu Light"/>
+                        <a:cs typeface="Ubuntu Light"/>
+                        <a:sym typeface="Ubuntu Light"/>
+                      </a:endParaRPr>
+                    </a:p>
+                  </a:txBody>
+                  <a:tcPr marT="91425" marB="91425" marR="91425" marL="91425" anchor="ctr"/>
+                </a:tc>
+              </a:tr>
+            </a:tbl>
+          </a:graphicData>
+        </a:graphic>
+      </p:graphicFrame>
     </p:spTree>
   </p:cSld>
   <p:clrMapOvr>
@@ -15342,7 +16197,1351 @@
       </p:grpSpPr>
       <p:sp>
         <p:nvSpPr>
-          <p:cNvPr id="185" name="Google Shape;185;gec2e1cceae_0_140"/>
+          <p:cNvPr id="185" name="Google Shape;185;gec2e1cceae_0_185"/>
+          <p:cNvSpPr txBox="1"/>
+          <p:nvPr>
+            <p:ph type="title"/>
+          </p:nvPr>
+        </p:nvSpPr>
+        <p:spPr>
+          <a:xfrm>
+            <a:off x="311700" y="315925"/>
+            <a:ext cx="8520600" cy="831300"/>
+          </a:xfrm>
+          <a:prstGeom prst="rect">
+            <a:avLst/>
+          </a:prstGeom>
+          <a:noFill/>
+          <a:ln>
+            <a:noFill/>
+          </a:ln>
+        </p:spPr>
+        <p:txBody>
+          <a:bodyPr anchorCtr="0" anchor="b" bIns="91425" lIns="91425" spcFirstLastPara="1" rIns="91425" wrap="square" tIns="91425">
+            <a:normAutofit/>
+          </a:bodyPr>
+          <a:lstStyle/>
+          <a:p>
+            <a:pPr indent="0" lvl="0" marL="0" rtl="0" algn="l">
+              <a:lnSpc>
+                <a:spcPct val="100000"/>
+              </a:lnSpc>
+              <a:spcBef>
+                <a:spcPts val="0"/>
+              </a:spcBef>
+              <a:spcAft>
+                <a:spcPts val="0"/>
+              </a:spcAft>
+              <a:buSzPts val="4200"/>
+              <a:buNone/>
+            </a:pPr>
+            <a:r>
+              <a:rPr lang="en">
+                <a:latin typeface="Ubuntu"/>
+                <a:ea typeface="Ubuntu"/>
+                <a:cs typeface="Ubuntu"/>
+                <a:sym typeface="Ubuntu"/>
+              </a:rPr>
+              <a:t>Dimensionality Reduction</a:t>
+            </a:r>
+            <a:endParaRPr>
+              <a:latin typeface="Ubuntu"/>
+              <a:ea typeface="Ubuntu"/>
+              <a:cs typeface="Ubuntu"/>
+              <a:sym typeface="Ubuntu"/>
+            </a:endParaRPr>
+          </a:p>
+        </p:txBody>
+      </p:sp>
+      <p:sp>
+        <p:nvSpPr>
+          <p:cNvPr id="186" name="Google Shape;186;gec2e1cceae_0_185"/>
+          <p:cNvSpPr txBox="1"/>
+          <p:nvPr/>
+        </p:nvSpPr>
+        <p:spPr>
+          <a:xfrm>
+            <a:off x="573125" y="1559925"/>
+            <a:ext cx="4613700" cy="738900"/>
+          </a:xfrm>
+          <a:prstGeom prst="rect">
+            <a:avLst/>
+          </a:prstGeom>
+          <a:noFill/>
+          <a:ln>
+            <a:noFill/>
+          </a:ln>
+        </p:spPr>
+        <p:txBody>
+          <a:bodyPr anchorCtr="0" anchor="t" bIns="91425" lIns="91425" spcFirstLastPara="1" rIns="91425" wrap="square" tIns="91425">
+            <a:spAutoFit/>
+          </a:bodyPr>
+          <a:lstStyle/>
+          <a:p>
+            <a:pPr indent="-342900" lvl="0" marL="457200" rtl="0" algn="l">
+              <a:spcBef>
+                <a:spcPts val="0"/>
+              </a:spcBef>
+              <a:spcAft>
+                <a:spcPts val="0"/>
+              </a:spcAft>
+              <a:buSzPts val="1800"/>
+              <a:buFont typeface="Open Sans"/>
+              <a:buChar char="●"/>
+            </a:pPr>
+            <a:r>
+              <a:rPr lang="en" sz="1800">
+                <a:latin typeface="Open Sans"/>
+                <a:ea typeface="Open Sans"/>
+                <a:cs typeface="Open Sans"/>
+                <a:sym typeface="Open Sans"/>
+              </a:rPr>
+              <a:t>Can maintain 95% variance with 14 features - half of the total, 30.</a:t>
+            </a:r>
+            <a:endParaRPr sz="1800">
+              <a:latin typeface="Open Sans"/>
+              <a:ea typeface="Open Sans"/>
+              <a:cs typeface="Open Sans"/>
+              <a:sym typeface="Open Sans"/>
+            </a:endParaRPr>
+          </a:p>
+        </p:txBody>
+      </p:sp>
+      <p:pic>
+        <p:nvPicPr>
+          <p:cNvPr id="187" name="Google Shape;187;gec2e1cceae_0_185"/>
+          <p:cNvPicPr preferRelativeResize="0"/>
+          <p:nvPr/>
+        </p:nvPicPr>
+        <p:blipFill>
+          <a:blip r:embed="rId3">
+            <a:alphaModFix/>
+          </a:blip>
+          <a:stretch>
+            <a:fillRect/>
+          </a:stretch>
+        </p:blipFill>
+        <p:spPr>
+          <a:xfrm>
+            <a:off x="5022475" y="1559925"/>
+            <a:ext cx="3809813" cy="2539875"/>
+          </a:xfrm>
+          <a:prstGeom prst="rect">
+            <a:avLst/>
+          </a:prstGeom>
+          <a:noFill/>
+          <a:ln>
+            <a:noFill/>
+          </a:ln>
+        </p:spPr>
+      </p:pic>
+    </p:spTree>
+  </p:cSld>
+  <p:clrMapOvr>
+    <a:masterClrMapping/>
+  </p:clrMapOvr>
+</p:sld>
+</file>
+
+<file path=ppt/slides/slide21.xml><?xml version="1.0" encoding="utf-8"?>
+<p:sld xmlns:a="http://schemas.openxmlformats.org/drawingml/2006/main" xmlns:r="http://schemas.openxmlformats.org/officeDocument/2006/relationships" xmlns:mc="http://schemas.openxmlformats.org/markup-compatibility/2006" xmlns:mv="urn:schemas-microsoft-com:mac:vml" xmlns:p="http://schemas.openxmlformats.org/presentationml/2006/main" xmlns:c="http://schemas.openxmlformats.org/drawingml/2006/chart" xmlns:dgm="http://schemas.openxmlformats.org/drawingml/2006/diagram" xmlns:o="urn:schemas-microsoft-com:office:office" xmlns:v="urn:schemas-microsoft-com:vml" xmlns:pvml="urn:schemas-microsoft-com:office:powerpoint" xmlns:com="http://schemas.openxmlformats.org/drawingml/2006/compatibility" xmlns:p14="http://schemas.microsoft.com/office/powerpoint/2010/main" xmlns:p15="http://schemas.microsoft.com/office/powerpoint/2012/main" xmlns:ahyp="http://schemas.microsoft.com/office/drawing/2018/hyperlinkcolor">
+  <p:cSld>
+    <p:spTree>
+      <p:nvGrpSpPr>
+        <p:cNvPr id="191" name="Shape 191"/>
+        <p:cNvGrpSpPr/>
+        <p:nvPr/>
+      </p:nvGrpSpPr>
+      <p:grpSpPr>
+        <a:xfrm>
+          <a:off x="0" y="0"/>
+          <a:ext cx="0" cy="0"/>
+          <a:chOff x="0" y="0"/>
+          <a:chExt cx="0" cy="0"/>
+        </a:xfrm>
+      </p:grpSpPr>
+      <p:sp>
+        <p:nvSpPr>
+          <p:cNvPr id="192" name="Google Shape;192;gec2e1cceae_0_192"/>
+          <p:cNvSpPr txBox="1"/>
+          <p:nvPr>
+            <p:ph type="title"/>
+          </p:nvPr>
+        </p:nvSpPr>
+        <p:spPr>
+          <a:xfrm>
+            <a:off x="311700" y="315925"/>
+            <a:ext cx="8520600" cy="831300"/>
+          </a:xfrm>
+          <a:prstGeom prst="rect">
+            <a:avLst/>
+          </a:prstGeom>
+          <a:noFill/>
+          <a:ln>
+            <a:noFill/>
+          </a:ln>
+        </p:spPr>
+        <p:txBody>
+          <a:bodyPr anchorCtr="0" anchor="b" bIns="91425" lIns="91425" spcFirstLastPara="1" rIns="91425" wrap="square" tIns="91425">
+            <a:normAutofit/>
+          </a:bodyPr>
+          <a:lstStyle/>
+          <a:p>
+            <a:pPr indent="0" lvl="0" marL="0" rtl="0" algn="l">
+              <a:lnSpc>
+                <a:spcPct val="100000"/>
+              </a:lnSpc>
+              <a:spcBef>
+                <a:spcPts val="0"/>
+              </a:spcBef>
+              <a:spcAft>
+                <a:spcPts val="0"/>
+              </a:spcAft>
+              <a:buSzPts val="4200"/>
+              <a:buNone/>
+            </a:pPr>
+            <a:r>
+              <a:rPr lang="en">
+                <a:latin typeface="Ubuntu"/>
+                <a:ea typeface="Ubuntu"/>
+                <a:cs typeface="Ubuntu"/>
+                <a:sym typeface="Ubuntu"/>
+              </a:rPr>
+              <a:t>Dimensionality Reduction</a:t>
+            </a:r>
+            <a:endParaRPr>
+              <a:latin typeface="Ubuntu"/>
+              <a:ea typeface="Ubuntu"/>
+              <a:cs typeface="Ubuntu"/>
+              <a:sym typeface="Ubuntu"/>
+            </a:endParaRPr>
+          </a:p>
+        </p:txBody>
+      </p:sp>
+      <p:sp>
+        <p:nvSpPr>
+          <p:cNvPr id="193" name="Google Shape;193;gec2e1cceae_0_192"/>
+          <p:cNvSpPr txBox="1"/>
+          <p:nvPr/>
+        </p:nvSpPr>
+        <p:spPr>
+          <a:xfrm>
+            <a:off x="573125" y="1559925"/>
+            <a:ext cx="3999000" cy="738900"/>
+          </a:xfrm>
+          <a:prstGeom prst="rect">
+            <a:avLst/>
+          </a:prstGeom>
+          <a:noFill/>
+          <a:ln>
+            <a:noFill/>
+          </a:ln>
+        </p:spPr>
+        <p:txBody>
+          <a:bodyPr anchorCtr="0" anchor="t" bIns="91425" lIns="91425" spcFirstLastPara="1" rIns="91425" wrap="square" tIns="91425">
+            <a:spAutoFit/>
+          </a:bodyPr>
+          <a:lstStyle/>
+          <a:p>
+            <a:pPr indent="-342900" lvl="0" marL="457200" rtl="0" algn="l">
+              <a:spcBef>
+                <a:spcPts val="0"/>
+              </a:spcBef>
+              <a:spcAft>
+                <a:spcPts val="0"/>
+              </a:spcAft>
+              <a:buSzPts val="1800"/>
+              <a:buFont typeface="Open Sans"/>
+              <a:buChar char="●"/>
+            </a:pPr>
+            <a:r>
+              <a:rPr lang="en" sz="1800">
+                <a:latin typeface="Open Sans"/>
+                <a:ea typeface="Open Sans"/>
+                <a:cs typeface="Open Sans"/>
+                <a:sym typeface="Open Sans"/>
+              </a:rPr>
+              <a:t>2D/3D visualization show two clusters </a:t>
+            </a:r>
+            <a:r>
+              <a:rPr lang="en" sz="1800">
+                <a:latin typeface="Open Sans"/>
+                <a:ea typeface="Open Sans"/>
+                <a:cs typeface="Open Sans"/>
+                <a:sym typeface="Open Sans"/>
+              </a:rPr>
+              <a:t>l</a:t>
+            </a:r>
+            <a:r>
+              <a:rPr lang="en" sz="1800">
+                <a:latin typeface="Open Sans"/>
+                <a:ea typeface="Open Sans"/>
+                <a:cs typeface="Open Sans"/>
+                <a:sym typeface="Open Sans"/>
+              </a:rPr>
+              <a:t>argely overlap</a:t>
+            </a:r>
+            <a:endParaRPr sz="1800">
+              <a:latin typeface="Open Sans"/>
+              <a:ea typeface="Open Sans"/>
+              <a:cs typeface="Open Sans"/>
+              <a:sym typeface="Open Sans"/>
+            </a:endParaRPr>
+          </a:p>
+        </p:txBody>
+      </p:sp>
+      <p:pic>
+        <p:nvPicPr>
+          <p:cNvPr id="194" name="Google Shape;194;gec2e1cceae_0_192"/>
+          <p:cNvPicPr preferRelativeResize="0"/>
+          <p:nvPr/>
+        </p:nvPicPr>
+        <p:blipFill>
+          <a:blip r:embed="rId3">
+            <a:alphaModFix/>
+          </a:blip>
+          <a:stretch>
+            <a:fillRect/>
+          </a:stretch>
+        </p:blipFill>
+        <p:spPr>
+          <a:xfrm>
+            <a:off x="4724525" y="1299625"/>
+            <a:ext cx="4267076" cy="2844717"/>
+          </a:xfrm>
+          <a:prstGeom prst="rect">
+            <a:avLst/>
+          </a:prstGeom>
+          <a:noFill/>
+          <a:ln>
+            <a:noFill/>
+          </a:ln>
+        </p:spPr>
+      </p:pic>
+      <p:pic>
+        <p:nvPicPr>
+          <p:cNvPr id="195" name="Google Shape;195;gec2e1cceae_0_192"/>
+          <p:cNvPicPr preferRelativeResize="0"/>
+          <p:nvPr/>
+        </p:nvPicPr>
+        <p:blipFill>
+          <a:blip r:embed="rId4">
+            <a:alphaModFix/>
+          </a:blip>
+          <a:stretch>
+            <a:fillRect/>
+          </a:stretch>
+        </p:blipFill>
+        <p:spPr>
+          <a:xfrm>
+            <a:off x="152400" y="2451225"/>
+            <a:ext cx="3047850" cy="2539875"/>
+          </a:xfrm>
+          <a:prstGeom prst="rect">
+            <a:avLst/>
+          </a:prstGeom>
+          <a:noFill/>
+          <a:ln>
+            <a:noFill/>
+          </a:ln>
+        </p:spPr>
+      </p:pic>
+    </p:spTree>
+  </p:cSld>
+  <p:clrMapOvr>
+    <a:masterClrMapping/>
+  </p:clrMapOvr>
+</p:sld>
+</file>
+
+<file path=ppt/slides/slide22.xml><?xml version="1.0" encoding="utf-8"?>
+<p:sld xmlns:a="http://schemas.openxmlformats.org/drawingml/2006/main" xmlns:r="http://schemas.openxmlformats.org/officeDocument/2006/relationships" xmlns:mc="http://schemas.openxmlformats.org/markup-compatibility/2006" xmlns:mv="urn:schemas-microsoft-com:mac:vml" xmlns:p="http://schemas.openxmlformats.org/presentationml/2006/main" xmlns:c="http://schemas.openxmlformats.org/drawingml/2006/chart" xmlns:dgm="http://schemas.openxmlformats.org/drawingml/2006/diagram" xmlns:o="urn:schemas-microsoft-com:office:office" xmlns:v="urn:schemas-microsoft-com:vml" xmlns:pvml="urn:schemas-microsoft-com:office:powerpoint" xmlns:com="http://schemas.openxmlformats.org/drawingml/2006/compatibility" xmlns:p14="http://schemas.microsoft.com/office/powerpoint/2010/main" xmlns:p15="http://schemas.microsoft.com/office/powerpoint/2012/main" xmlns:ahyp="http://schemas.microsoft.com/office/drawing/2018/hyperlinkcolor">
+  <p:cSld>
+    <p:spTree>
+      <p:nvGrpSpPr>
+        <p:cNvPr id="199" name="Shape 199"/>
+        <p:cNvGrpSpPr/>
+        <p:nvPr/>
+      </p:nvGrpSpPr>
+      <p:grpSpPr>
+        <a:xfrm>
+          <a:off x="0" y="0"/>
+          <a:ext cx="0" cy="0"/>
+          <a:chOff x="0" y="0"/>
+          <a:chExt cx="0" cy="0"/>
+        </a:xfrm>
+      </p:grpSpPr>
+      <p:sp>
+        <p:nvSpPr>
+          <p:cNvPr id="200" name="Google Shape;200;gec2e1cceae_0_180"/>
+          <p:cNvSpPr txBox="1"/>
+          <p:nvPr>
+            <p:ph type="title"/>
+          </p:nvPr>
+        </p:nvSpPr>
+        <p:spPr>
+          <a:xfrm>
+            <a:off x="311700" y="315925"/>
+            <a:ext cx="8520600" cy="831300"/>
+          </a:xfrm>
+          <a:prstGeom prst="rect">
+            <a:avLst/>
+          </a:prstGeom>
+          <a:noFill/>
+          <a:ln>
+            <a:noFill/>
+          </a:ln>
+        </p:spPr>
+        <p:txBody>
+          <a:bodyPr anchorCtr="0" anchor="b" bIns="91425" lIns="91425" spcFirstLastPara="1" rIns="91425" wrap="square" tIns="91425">
+            <a:normAutofit/>
+          </a:bodyPr>
+          <a:lstStyle/>
+          <a:p>
+            <a:pPr indent="0" lvl="0" marL="0" rtl="0" algn="l">
+              <a:lnSpc>
+                <a:spcPct val="100000"/>
+              </a:lnSpc>
+              <a:spcBef>
+                <a:spcPts val="0"/>
+              </a:spcBef>
+              <a:spcAft>
+                <a:spcPts val="0"/>
+              </a:spcAft>
+              <a:buSzPts val="4200"/>
+              <a:buNone/>
+            </a:pPr>
+            <a:r>
+              <a:rPr lang="en">
+                <a:latin typeface="Ubuntu"/>
+                <a:ea typeface="Ubuntu"/>
+                <a:cs typeface="Ubuntu"/>
+                <a:sym typeface="Ubuntu"/>
+              </a:rPr>
+              <a:t>Dimensionality Reduction</a:t>
+            </a:r>
+            <a:endParaRPr>
+              <a:latin typeface="Ubuntu"/>
+              <a:ea typeface="Ubuntu"/>
+              <a:cs typeface="Ubuntu"/>
+              <a:sym typeface="Ubuntu"/>
+            </a:endParaRPr>
+          </a:p>
+        </p:txBody>
+      </p:sp>
+      <p:graphicFrame>
+        <p:nvGraphicFramePr>
+          <p:cNvPr id="201" name="Google Shape;201;gec2e1cceae_0_180"/>
+          <p:cNvGraphicFramePr/>
+          <p:nvPr/>
+        </p:nvGraphicFramePr>
+        <p:xfrm>
+          <a:off x="2072450" y="1541380"/>
+          <a:ext cx="3000000" cy="3000000"/>
+        </p:xfrm>
+        <a:graphic>
+          <a:graphicData uri="http://schemas.openxmlformats.org/drawingml/2006/table">
+            <a:tbl>
+              <a:tblPr>
+                <a:noFill/>
+                <a:tableStyleId>{4BE756BA-E4D6-4DD5-AE8F-E202BB676858}</a:tableStyleId>
+              </a:tblPr>
+              <a:tblGrid>
+                <a:gridCol w="1715450"/>
+                <a:gridCol w="896550"/>
+                <a:gridCol w="912550"/>
+                <a:gridCol w="1474550"/>
+              </a:tblGrid>
+              <a:tr h="712125">
+                <a:tc>
+                  <a:txBody>
+                    <a:bodyPr/>
+                    <a:lstStyle/>
+                    <a:p>
+                      <a:pPr indent="0" lvl="0" marL="0" rtl="0" algn="l">
+                        <a:spcBef>
+                          <a:spcPts val="0"/>
+                        </a:spcBef>
+                        <a:spcAft>
+                          <a:spcPts val="0"/>
+                        </a:spcAft>
+                        <a:buNone/>
+                      </a:pPr>
+                      <a:r>
+                        <a:t/>
+                      </a:r>
+                      <a:endParaRPr b="1" sz="1700">
+                        <a:latin typeface="Ubuntu"/>
+                        <a:ea typeface="Ubuntu"/>
+                        <a:cs typeface="Ubuntu"/>
+                        <a:sym typeface="Ubuntu"/>
+                      </a:endParaRPr>
+                    </a:p>
+                  </a:txBody>
+                  <a:tcPr marT="91425" marB="91425" marR="91425" marL="91425">
+                    <a:lnL cap="flat" cmpd="sng" w="9525">
+                      <a:solidFill>
+                        <a:srgbClr val="9E9E9E"/>
+                      </a:solidFill>
+                      <a:prstDash val="solid"/>
+                      <a:round/>
+                      <a:headEnd len="sm" w="sm" type="none"/>
+                      <a:tailEnd len="sm" w="sm" type="none"/>
+                    </a:lnL>
+                    <a:lnR cap="flat" cmpd="sng" w="9525">
+                      <a:solidFill>
+                        <a:srgbClr val="9E9E9E"/>
+                      </a:solidFill>
+                      <a:prstDash val="solid"/>
+                      <a:round/>
+                      <a:headEnd len="sm" w="sm" type="none"/>
+                      <a:tailEnd len="sm" w="sm" type="none"/>
+                    </a:lnR>
+                    <a:lnT cap="flat" cmpd="sng" w="9525">
+                      <a:solidFill>
+                        <a:srgbClr val="9E9E9E"/>
+                      </a:solidFill>
+                      <a:prstDash val="solid"/>
+                      <a:round/>
+                      <a:headEnd len="sm" w="sm" type="none"/>
+                      <a:tailEnd len="sm" w="sm" type="none"/>
+                    </a:lnT>
+                    <a:lnB cap="flat" cmpd="sng" w="9525">
+                      <a:solidFill>
+                        <a:srgbClr val="9E9E9E"/>
+                      </a:solidFill>
+                      <a:prstDash val="solid"/>
+                      <a:round/>
+                      <a:headEnd len="sm" w="sm" type="none"/>
+                      <a:tailEnd len="sm" w="sm" type="none"/>
+                    </a:lnB>
+                    <a:solidFill>
+                      <a:srgbClr val="FCE5CD"/>
+                    </a:solidFill>
+                  </a:tcPr>
+                </a:tc>
+                <a:tc>
+                  <a:txBody>
+                    <a:bodyPr/>
+                    <a:lstStyle/>
+                    <a:p>
+                      <a:pPr indent="0" lvl="0" marL="0" rtl="0" algn="ctr">
+                        <a:spcBef>
+                          <a:spcPts val="0"/>
+                        </a:spcBef>
+                        <a:spcAft>
+                          <a:spcPts val="0"/>
+                        </a:spcAft>
+                        <a:buNone/>
+                      </a:pPr>
+                      <a:r>
+                        <a:rPr b="1" lang="en" sz="1700">
+                          <a:latin typeface="Ubuntu"/>
+                          <a:ea typeface="Ubuntu"/>
+                          <a:cs typeface="Ubuntu"/>
+                          <a:sym typeface="Ubuntu"/>
+                        </a:rPr>
+                        <a:t>SVC</a:t>
+                      </a:r>
+                      <a:endParaRPr b="1" sz="1700">
+                        <a:latin typeface="Ubuntu"/>
+                        <a:ea typeface="Ubuntu"/>
+                        <a:cs typeface="Ubuntu"/>
+                        <a:sym typeface="Ubuntu"/>
+                      </a:endParaRPr>
+                    </a:p>
+                  </a:txBody>
+                  <a:tcPr marT="91425" marB="91425" marR="91425" marL="91425" anchor="ctr">
+                    <a:lnL cap="flat" cmpd="sng" w="9525">
+                      <a:solidFill>
+                        <a:srgbClr val="9E9E9E"/>
+                      </a:solidFill>
+                      <a:prstDash val="solid"/>
+                      <a:round/>
+                      <a:headEnd len="sm" w="sm" type="none"/>
+                      <a:tailEnd len="sm" w="sm" type="none"/>
+                    </a:lnL>
+                    <a:lnR cap="flat" cmpd="sng" w="9525">
+                      <a:solidFill>
+                        <a:srgbClr val="9E9E9E"/>
+                      </a:solidFill>
+                      <a:prstDash val="solid"/>
+                      <a:round/>
+                      <a:headEnd len="sm" w="sm" type="none"/>
+                      <a:tailEnd len="sm" w="sm" type="none"/>
+                    </a:lnR>
+                    <a:lnT cap="flat" cmpd="sng" w="9525">
+                      <a:solidFill>
+                        <a:srgbClr val="9E9E9E"/>
+                      </a:solidFill>
+                      <a:prstDash val="solid"/>
+                      <a:round/>
+                      <a:headEnd len="sm" w="sm" type="none"/>
+                      <a:tailEnd len="sm" w="sm" type="none"/>
+                    </a:lnT>
+                    <a:lnB cap="flat" cmpd="sng" w="9525">
+                      <a:solidFill>
+                        <a:srgbClr val="9E9E9E"/>
+                      </a:solidFill>
+                      <a:prstDash val="solid"/>
+                      <a:round/>
+                      <a:headEnd len="sm" w="sm" type="none"/>
+                      <a:tailEnd len="sm" w="sm" type="none"/>
+                    </a:lnB>
+                    <a:solidFill>
+                      <a:srgbClr val="F9CB9C"/>
+                    </a:solidFill>
+                  </a:tcPr>
+                </a:tc>
+                <a:tc>
+                  <a:txBody>
+                    <a:bodyPr/>
+                    <a:lstStyle/>
+                    <a:p>
+                      <a:pPr indent="0" lvl="0" marL="0" rtl="0" algn="ctr">
+                        <a:spcBef>
+                          <a:spcPts val="0"/>
+                        </a:spcBef>
+                        <a:spcAft>
+                          <a:spcPts val="0"/>
+                        </a:spcAft>
+                        <a:buNone/>
+                      </a:pPr>
+                      <a:r>
+                        <a:rPr b="1" lang="en" sz="1700">
+                          <a:latin typeface="Ubuntu"/>
+                          <a:ea typeface="Ubuntu"/>
+                          <a:cs typeface="Ubuntu"/>
+                          <a:sym typeface="Ubuntu"/>
+                        </a:rPr>
+                        <a:t>PCA+ SVC</a:t>
+                      </a:r>
+                      <a:endParaRPr b="1" sz="1700">
+                        <a:latin typeface="Ubuntu"/>
+                        <a:ea typeface="Ubuntu"/>
+                        <a:cs typeface="Ubuntu"/>
+                        <a:sym typeface="Ubuntu"/>
+                      </a:endParaRPr>
+                    </a:p>
+                  </a:txBody>
+                  <a:tcPr marT="91425" marB="91425" marR="91425" marL="91425" anchor="ctr">
+                    <a:lnL cap="flat" cmpd="sng" w="9525">
+                      <a:solidFill>
+                        <a:srgbClr val="9E9E9E"/>
+                      </a:solidFill>
+                      <a:prstDash val="solid"/>
+                      <a:round/>
+                      <a:headEnd len="sm" w="sm" type="none"/>
+                      <a:tailEnd len="sm" w="sm" type="none"/>
+                    </a:lnL>
+                    <a:lnR cap="flat" cmpd="sng" w="9525">
+                      <a:solidFill>
+                        <a:srgbClr val="9E9E9E"/>
+                      </a:solidFill>
+                      <a:prstDash val="solid"/>
+                      <a:round/>
+                      <a:headEnd len="sm" w="sm" type="none"/>
+                      <a:tailEnd len="sm" w="sm" type="none"/>
+                    </a:lnR>
+                    <a:lnT cap="flat" cmpd="sng" w="9525">
+                      <a:solidFill>
+                        <a:srgbClr val="9E9E9E"/>
+                      </a:solidFill>
+                      <a:prstDash val="solid"/>
+                      <a:round/>
+                      <a:headEnd len="sm" w="sm" type="none"/>
+                      <a:tailEnd len="sm" w="sm" type="none"/>
+                    </a:lnT>
+                    <a:lnB cap="flat" cmpd="sng" w="9525">
+                      <a:solidFill>
+                        <a:srgbClr val="9E9E9E"/>
+                      </a:solidFill>
+                      <a:prstDash val="solid"/>
+                      <a:round/>
+                      <a:headEnd len="sm" w="sm" type="none"/>
+                      <a:tailEnd len="sm" w="sm" type="none"/>
+                    </a:lnB>
+                    <a:solidFill>
+                      <a:srgbClr val="F9CB9C"/>
+                    </a:solidFill>
+                  </a:tcPr>
+                </a:tc>
+                <a:tc>
+                  <a:txBody>
+                    <a:bodyPr/>
+                    <a:lstStyle/>
+                    <a:p>
+                      <a:pPr indent="0" lvl="0" marL="0" rtl="0" algn="ctr">
+                        <a:spcBef>
+                          <a:spcPts val="0"/>
+                        </a:spcBef>
+                        <a:spcAft>
+                          <a:spcPts val="0"/>
+                        </a:spcAft>
+                        <a:buNone/>
+                      </a:pPr>
+                      <a:r>
+                        <a:rPr b="1" lang="en" sz="1700">
+                          <a:latin typeface="Ubuntu"/>
+                          <a:ea typeface="Ubuntu"/>
+                          <a:cs typeface="Ubuntu"/>
+                          <a:sym typeface="Ubuntu"/>
+                        </a:rPr>
+                        <a:t>KernelPCA+ SVC</a:t>
+                      </a:r>
+                      <a:endParaRPr b="1" sz="1700">
+                        <a:latin typeface="Ubuntu"/>
+                        <a:ea typeface="Ubuntu"/>
+                        <a:cs typeface="Ubuntu"/>
+                        <a:sym typeface="Ubuntu"/>
+                      </a:endParaRPr>
+                    </a:p>
+                  </a:txBody>
+                  <a:tcPr marT="91425" marB="91425" marR="91425" marL="91425" anchor="ctr">
+                    <a:lnL cap="flat" cmpd="sng" w="9525">
+                      <a:solidFill>
+                        <a:srgbClr val="9E9E9E"/>
+                      </a:solidFill>
+                      <a:prstDash val="solid"/>
+                      <a:round/>
+                      <a:headEnd len="sm" w="sm" type="none"/>
+                      <a:tailEnd len="sm" w="sm" type="none"/>
+                    </a:lnL>
+                    <a:lnR cap="flat" cmpd="sng" w="9525">
+                      <a:solidFill>
+                        <a:srgbClr val="9E9E9E"/>
+                      </a:solidFill>
+                      <a:prstDash val="solid"/>
+                      <a:round/>
+                      <a:headEnd len="sm" w="sm" type="none"/>
+                      <a:tailEnd len="sm" w="sm" type="none"/>
+                    </a:lnR>
+                    <a:lnT cap="flat" cmpd="sng" w="9525">
+                      <a:solidFill>
+                        <a:srgbClr val="9E9E9E"/>
+                      </a:solidFill>
+                      <a:prstDash val="solid"/>
+                      <a:round/>
+                      <a:headEnd len="sm" w="sm" type="none"/>
+                      <a:tailEnd len="sm" w="sm" type="none"/>
+                    </a:lnT>
+                    <a:lnB cap="flat" cmpd="sng" w="9525">
+                      <a:solidFill>
+                        <a:srgbClr val="9E9E9E"/>
+                      </a:solidFill>
+                      <a:prstDash val="solid"/>
+                      <a:round/>
+                      <a:headEnd len="sm" w="sm" type="none"/>
+                      <a:tailEnd len="sm" w="sm" type="none"/>
+                    </a:lnB>
+                    <a:solidFill>
+                      <a:srgbClr val="F9CB9C"/>
+                    </a:solidFill>
+                  </a:tcPr>
+                </a:tc>
+              </a:tr>
+              <a:tr h="834025">
+                <a:tc>
+                  <a:txBody>
+                    <a:bodyPr/>
+                    <a:lstStyle/>
+                    <a:p>
+                      <a:pPr indent="0" lvl="0" marL="0" rtl="0" algn="ctr">
+                        <a:spcBef>
+                          <a:spcPts val="0"/>
+                        </a:spcBef>
+                        <a:spcAft>
+                          <a:spcPts val="0"/>
+                        </a:spcAft>
+                        <a:buNone/>
+                      </a:pPr>
+                      <a:r>
+                        <a:rPr lang="en" sz="1700">
+                          <a:latin typeface="Ubuntu Light"/>
+                          <a:ea typeface="Ubuntu Light"/>
+                          <a:cs typeface="Ubuntu Light"/>
+                          <a:sym typeface="Ubuntu Light"/>
+                        </a:rPr>
+                        <a:t>“At Risk” Recall</a:t>
+                      </a:r>
+                      <a:endParaRPr sz="1700">
+                        <a:latin typeface="Ubuntu Light"/>
+                        <a:ea typeface="Ubuntu Light"/>
+                        <a:cs typeface="Ubuntu Light"/>
+                        <a:sym typeface="Ubuntu Light"/>
+                      </a:endParaRPr>
+                    </a:p>
+                  </a:txBody>
+                  <a:tcPr marT="91425" marB="91425" marR="91425" marL="91425" anchor="ctr">
+                    <a:lnL cap="flat" cmpd="sng" w="9525">
+                      <a:solidFill>
+                        <a:srgbClr val="9E9E9E"/>
+                      </a:solidFill>
+                      <a:prstDash val="solid"/>
+                      <a:round/>
+                      <a:headEnd len="sm" w="sm" type="none"/>
+                      <a:tailEnd len="sm" w="sm" type="none"/>
+                    </a:lnL>
+                    <a:lnR cap="flat" cmpd="sng" w="9525">
+                      <a:solidFill>
+                        <a:srgbClr val="9E9E9E"/>
+                      </a:solidFill>
+                      <a:prstDash val="solid"/>
+                      <a:round/>
+                      <a:headEnd len="sm" w="sm" type="none"/>
+                      <a:tailEnd len="sm" w="sm" type="none"/>
+                    </a:lnR>
+                    <a:lnT cap="flat" cmpd="sng" w="9525">
+                      <a:solidFill>
+                        <a:srgbClr val="9E9E9E"/>
+                      </a:solidFill>
+                      <a:prstDash val="solid"/>
+                      <a:round/>
+                      <a:headEnd len="sm" w="sm" type="none"/>
+                      <a:tailEnd len="sm" w="sm" type="none"/>
+                    </a:lnT>
+                    <a:lnB cap="flat" cmpd="sng" w="9525">
+                      <a:solidFill>
+                        <a:srgbClr val="9E9E9E"/>
+                      </a:solidFill>
+                      <a:prstDash val="solid"/>
+                      <a:round/>
+                      <a:headEnd len="sm" w="sm" type="none"/>
+                      <a:tailEnd len="sm" w="sm" type="none"/>
+                    </a:lnB>
+                    <a:solidFill>
+                      <a:schemeClr val="lt1"/>
+                    </a:solidFill>
+                  </a:tcPr>
+                </a:tc>
+                <a:tc>
+                  <a:txBody>
+                    <a:bodyPr/>
+                    <a:lstStyle/>
+                    <a:p>
+                      <a:pPr indent="0" lvl="0" marL="0" rtl="0" algn="ctr">
+                        <a:spcBef>
+                          <a:spcPts val="0"/>
+                        </a:spcBef>
+                        <a:spcAft>
+                          <a:spcPts val="0"/>
+                        </a:spcAft>
+                        <a:buNone/>
+                      </a:pPr>
+                      <a:r>
+                        <a:rPr lang="en" sz="1800">
+                          <a:latin typeface="Ubuntu Light"/>
+                          <a:ea typeface="Ubuntu Light"/>
+                          <a:cs typeface="Ubuntu Light"/>
+                          <a:sym typeface="Ubuntu Light"/>
+                        </a:rPr>
+                        <a:t>0.97</a:t>
+                      </a:r>
+                      <a:endParaRPr sz="1800">
+                        <a:latin typeface="Ubuntu Light"/>
+                        <a:ea typeface="Ubuntu Light"/>
+                        <a:cs typeface="Ubuntu Light"/>
+                        <a:sym typeface="Ubuntu Light"/>
+                      </a:endParaRPr>
+                    </a:p>
+                  </a:txBody>
+                  <a:tcPr marT="91425" marB="91425" marR="91425" marL="91425" anchor="ctr">
+                    <a:lnL cap="flat" cmpd="sng" w="9525">
+                      <a:solidFill>
+                        <a:srgbClr val="9E9E9E"/>
+                      </a:solidFill>
+                      <a:prstDash val="solid"/>
+                      <a:round/>
+                      <a:headEnd len="sm" w="sm" type="none"/>
+                      <a:tailEnd len="sm" w="sm" type="none"/>
+                    </a:lnL>
+                    <a:lnR cap="flat" cmpd="sng" w="9525">
+                      <a:solidFill>
+                        <a:srgbClr val="9E9E9E"/>
+                      </a:solidFill>
+                      <a:prstDash val="solid"/>
+                      <a:round/>
+                      <a:headEnd len="sm" w="sm" type="none"/>
+                      <a:tailEnd len="sm" w="sm" type="none"/>
+                    </a:lnR>
+                    <a:lnT cap="flat" cmpd="sng" w="9525">
+                      <a:solidFill>
+                        <a:srgbClr val="9E9E9E"/>
+                      </a:solidFill>
+                      <a:prstDash val="solid"/>
+                      <a:round/>
+                      <a:headEnd len="sm" w="sm" type="none"/>
+                      <a:tailEnd len="sm" w="sm" type="none"/>
+                    </a:lnT>
+                    <a:lnB cap="flat" cmpd="sng" w="9525">
+                      <a:solidFill>
+                        <a:srgbClr val="9E9E9E"/>
+                      </a:solidFill>
+                      <a:prstDash val="solid"/>
+                      <a:round/>
+                      <a:headEnd len="sm" w="sm" type="none"/>
+                      <a:tailEnd len="sm" w="sm" type="none"/>
+                    </a:lnB>
+                    <a:solidFill>
+                      <a:schemeClr val="lt1"/>
+                    </a:solidFill>
+                  </a:tcPr>
+                </a:tc>
+                <a:tc>
+                  <a:txBody>
+                    <a:bodyPr/>
+                    <a:lstStyle/>
+                    <a:p>
+                      <a:pPr indent="0" lvl="0" marL="0" rtl="0" algn="ctr">
+                        <a:spcBef>
+                          <a:spcPts val="0"/>
+                        </a:spcBef>
+                        <a:spcAft>
+                          <a:spcPts val="0"/>
+                        </a:spcAft>
+                        <a:buNone/>
+                      </a:pPr>
+                      <a:r>
+                        <a:rPr lang="en" sz="1800">
+                          <a:latin typeface="Ubuntu Light"/>
+                          <a:ea typeface="Ubuntu Light"/>
+                          <a:cs typeface="Ubuntu Light"/>
+                          <a:sym typeface="Ubuntu Light"/>
+                        </a:rPr>
+                        <a:t>0.84</a:t>
+                      </a:r>
+                      <a:endParaRPr sz="1800">
+                        <a:latin typeface="Ubuntu Light"/>
+                        <a:ea typeface="Ubuntu Light"/>
+                        <a:cs typeface="Ubuntu Light"/>
+                        <a:sym typeface="Ubuntu Light"/>
+                      </a:endParaRPr>
+                    </a:p>
+                  </a:txBody>
+                  <a:tcPr marT="91425" marB="91425" marR="91425" marL="91425" anchor="ctr">
+                    <a:lnL cap="flat" cmpd="sng" w="9525">
+                      <a:solidFill>
+                        <a:srgbClr val="9E9E9E"/>
+                      </a:solidFill>
+                      <a:prstDash val="solid"/>
+                      <a:round/>
+                      <a:headEnd len="sm" w="sm" type="none"/>
+                      <a:tailEnd len="sm" w="sm" type="none"/>
+                    </a:lnL>
+                    <a:lnR cap="flat" cmpd="sng" w="9525">
+                      <a:solidFill>
+                        <a:srgbClr val="9E9E9E"/>
+                      </a:solidFill>
+                      <a:prstDash val="solid"/>
+                      <a:round/>
+                      <a:headEnd len="sm" w="sm" type="none"/>
+                      <a:tailEnd len="sm" w="sm" type="none"/>
+                    </a:lnR>
+                    <a:lnT cap="flat" cmpd="sng" w="9525">
+                      <a:solidFill>
+                        <a:srgbClr val="9E9E9E"/>
+                      </a:solidFill>
+                      <a:prstDash val="solid"/>
+                      <a:round/>
+                      <a:headEnd len="sm" w="sm" type="none"/>
+                      <a:tailEnd len="sm" w="sm" type="none"/>
+                    </a:lnT>
+                    <a:lnB cap="flat" cmpd="sng" w="9525">
+                      <a:solidFill>
+                        <a:srgbClr val="9E9E9E"/>
+                      </a:solidFill>
+                      <a:prstDash val="solid"/>
+                      <a:round/>
+                      <a:headEnd len="sm" w="sm" type="none"/>
+                      <a:tailEnd len="sm" w="sm" type="none"/>
+                    </a:lnB>
+                  </a:tcPr>
+                </a:tc>
+                <a:tc>
+                  <a:txBody>
+                    <a:bodyPr/>
+                    <a:lstStyle/>
+                    <a:p>
+                      <a:pPr indent="0" lvl="0" marL="0" rtl="0" algn="ctr">
+                        <a:spcBef>
+                          <a:spcPts val="0"/>
+                        </a:spcBef>
+                        <a:spcAft>
+                          <a:spcPts val="0"/>
+                        </a:spcAft>
+                        <a:buNone/>
+                      </a:pPr>
+                      <a:r>
+                        <a:rPr lang="en" sz="1800">
+                          <a:latin typeface="Ubuntu Light"/>
+                          <a:ea typeface="Ubuntu Light"/>
+                          <a:cs typeface="Ubuntu Light"/>
+                          <a:sym typeface="Ubuntu Light"/>
+                        </a:rPr>
+                        <a:t>0.87</a:t>
+                      </a:r>
+                      <a:endParaRPr sz="1800">
+                        <a:latin typeface="Ubuntu Light"/>
+                        <a:ea typeface="Ubuntu Light"/>
+                        <a:cs typeface="Ubuntu Light"/>
+                        <a:sym typeface="Ubuntu Light"/>
+                      </a:endParaRPr>
+                    </a:p>
+                  </a:txBody>
+                  <a:tcPr marT="91425" marB="91425" marR="91425" marL="91425" anchor="ctr">
+                    <a:lnL cap="flat" cmpd="sng" w="9525">
+                      <a:solidFill>
+                        <a:srgbClr val="9E9E9E"/>
+                      </a:solidFill>
+                      <a:prstDash val="solid"/>
+                      <a:round/>
+                      <a:headEnd len="sm" w="sm" type="none"/>
+                      <a:tailEnd len="sm" w="sm" type="none"/>
+                    </a:lnL>
+                    <a:lnR cap="flat" cmpd="sng" w="9525">
+                      <a:solidFill>
+                        <a:srgbClr val="9E9E9E"/>
+                      </a:solidFill>
+                      <a:prstDash val="solid"/>
+                      <a:round/>
+                      <a:headEnd len="sm" w="sm" type="none"/>
+                      <a:tailEnd len="sm" w="sm" type="none"/>
+                    </a:lnR>
+                    <a:lnT cap="flat" cmpd="sng" w="9525">
+                      <a:solidFill>
+                        <a:srgbClr val="9E9E9E"/>
+                      </a:solidFill>
+                      <a:prstDash val="solid"/>
+                      <a:round/>
+                      <a:headEnd len="sm" w="sm" type="none"/>
+                      <a:tailEnd len="sm" w="sm" type="none"/>
+                    </a:lnT>
+                    <a:lnB cap="flat" cmpd="sng" w="9525">
+                      <a:solidFill>
+                        <a:srgbClr val="9E9E9E"/>
+                      </a:solidFill>
+                      <a:prstDash val="solid"/>
+                      <a:round/>
+                      <a:headEnd len="sm" w="sm" type="none"/>
+                      <a:tailEnd len="sm" w="sm" type="none"/>
+                    </a:lnB>
+                  </a:tcPr>
+                </a:tc>
+              </a:tr>
+              <a:tr h="762850">
+                <a:tc>
+                  <a:txBody>
+                    <a:bodyPr/>
+                    <a:lstStyle/>
+                    <a:p>
+                      <a:pPr indent="0" lvl="0" marL="0" rtl="0" algn="ctr">
+                        <a:spcBef>
+                          <a:spcPts val="0"/>
+                        </a:spcBef>
+                        <a:spcAft>
+                          <a:spcPts val="0"/>
+                        </a:spcAft>
+                        <a:buNone/>
+                      </a:pPr>
+                      <a:r>
+                        <a:rPr lang="en" sz="1700">
+                          <a:latin typeface="Ubuntu Light"/>
+                          <a:ea typeface="Ubuntu Light"/>
+                          <a:cs typeface="Ubuntu Light"/>
+                          <a:sym typeface="Ubuntu Light"/>
+                        </a:rPr>
+                        <a:t>Accuracy</a:t>
+                      </a:r>
+                      <a:endParaRPr sz="1700">
+                        <a:latin typeface="Ubuntu Light"/>
+                        <a:ea typeface="Ubuntu Light"/>
+                        <a:cs typeface="Ubuntu Light"/>
+                        <a:sym typeface="Ubuntu Light"/>
+                      </a:endParaRPr>
+                    </a:p>
+                  </a:txBody>
+                  <a:tcPr marT="91425" marB="91425" marR="91425" marL="91425" anchor="ctr">
+                    <a:lnL cap="flat" cmpd="sng" w="9525">
+                      <a:solidFill>
+                        <a:srgbClr val="9E9E9E"/>
+                      </a:solidFill>
+                      <a:prstDash val="solid"/>
+                      <a:round/>
+                      <a:headEnd len="sm" w="sm" type="none"/>
+                      <a:tailEnd len="sm" w="sm" type="none"/>
+                    </a:lnL>
+                    <a:lnR cap="flat" cmpd="sng" w="9525">
+                      <a:solidFill>
+                        <a:srgbClr val="9E9E9E"/>
+                      </a:solidFill>
+                      <a:prstDash val="solid"/>
+                      <a:round/>
+                      <a:headEnd len="sm" w="sm" type="none"/>
+                      <a:tailEnd len="sm" w="sm" type="none"/>
+                    </a:lnR>
+                    <a:lnT cap="flat" cmpd="sng" w="9525">
+                      <a:solidFill>
+                        <a:srgbClr val="9E9E9E"/>
+                      </a:solidFill>
+                      <a:prstDash val="solid"/>
+                      <a:round/>
+                      <a:headEnd len="sm" w="sm" type="none"/>
+                      <a:tailEnd len="sm" w="sm" type="none"/>
+                    </a:lnT>
+                    <a:lnB cap="flat" cmpd="sng" w="9525">
+                      <a:solidFill>
+                        <a:srgbClr val="9E9E9E"/>
+                      </a:solidFill>
+                      <a:prstDash val="solid"/>
+                      <a:round/>
+                      <a:headEnd len="sm" w="sm" type="none"/>
+                      <a:tailEnd len="sm" w="sm" type="none"/>
+                    </a:lnB>
+                  </a:tcPr>
+                </a:tc>
+                <a:tc>
+                  <a:txBody>
+                    <a:bodyPr/>
+                    <a:lstStyle/>
+                    <a:p>
+                      <a:pPr indent="0" lvl="0" marL="0" rtl="0" algn="ctr">
+                        <a:spcBef>
+                          <a:spcPts val="0"/>
+                        </a:spcBef>
+                        <a:spcAft>
+                          <a:spcPts val="0"/>
+                        </a:spcAft>
+                        <a:buNone/>
+                      </a:pPr>
+                      <a:r>
+                        <a:rPr lang="en" sz="1800">
+                          <a:latin typeface="Ubuntu Light"/>
+                          <a:ea typeface="Ubuntu Light"/>
+                          <a:cs typeface="Ubuntu Light"/>
+                          <a:sym typeface="Ubuntu Light"/>
+                        </a:rPr>
+                        <a:t>0.89</a:t>
+                      </a:r>
+                      <a:endParaRPr sz="1800">
+                        <a:latin typeface="Ubuntu Light"/>
+                        <a:ea typeface="Ubuntu Light"/>
+                        <a:cs typeface="Ubuntu Light"/>
+                        <a:sym typeface="Ubuntu Light"/>
+                      </a:endParaRPr>
+                    </a:p>
+                  </a:txBody>
+                  <a:tcPr marT="91425" marB="91425" marR="91425" marL="91425" anchor="ctr">
+                    <a:lnL cap="flat" cmpd="sng" w="9525">
+                      <a:solidFill>
+                        <a:srgbClr val="9E9E9E"/>
+                      </a:solidFill>
+                      <a:prstDash val="solid"/>
+                      <a:round/>
+                      <a:headEnd len="sm" w="sm" type="none"/>
+                      <a:tailEnd len="sm" w="sm" type="none"/>
+                    </a:lnL>
+                    <a:lnR cap="flat" cmpd="sng" w="9525">
+                      <a:solidFill>
+                        <a:srgbClr val="9E9E9E"/>
+                      </a:solidFill>
+                      <a:prstDash val="solid"/>
+                      <a:round/>
+                      <a:headEnd len="sm" w="sm" type="none"/>
+                      <a:tailEnd len="sm" w="sm" type="none"/>
+                    </a:lnR>
+                    <a:lnT cap="flat" cmpd="sng" w="9525">
+                      <a:solidFill>
+                        <a:srgbClr val="9E9E9E"/>
+                      </a:solidFill>
+                      <a:prstDash val="solid"/>
+                      <a:round/>
+                      <a:headEnd len="sm" w="sm" type="none"/>
+                      <a:tailEnd len="sm" w="sm" type="none"/>
+                    </a:lnT>
+                    <a:lnB cap="flat" cmpd="sng" w="9525">
+                      <a:solidFill>
+                        <a:srgbClr val="9E9E9E"/>
+                      </a:solidFill>
+                      <a:prstDash val="solid"/>
+                      <a:round/>
+                      <a:headEnd len="sm" w="sm" type="none"/>
+                      <a:tailEnd len="sm" w="sm" type="none"/>
+                    </a:lnB>
+                  </a:tcPr>
+                </a:tc>
+                <a:tc>
+                  <a:txBody>
+                    <a:bodyPr/>
+                    <a:lstStyle/>
+                    <a:p>
+                      <a:pPr indent="0" lvl="0" marL="0" rtl="0" algn="ctr">
+                        <a:spcBef>
+                          <a:spcPts val="0"/>
+                        </a:spcBef>
+                        <a:spcAft>
+                          <a:spcPts val="0"/>
+                        </a:spcAft>
+                        <a:buNone/>
+                      </a:pPr>
+                      <a:r>
+                        <a:rPr lang="en" sz="1800">
+                          <a:latin typeface="Ubuntu Light"/>
+                          <a:ea typeface="Ubuntu Light"/>
+                          <a:cs typeface="Ubuntu Light"/>
+                          <a:sym typeface="Ubuntu Light"/>
+                        </a:rPr>
+                        <a:t>0.82</a:t>
+                      </a:r>
+                      <a:endParaRPr sz="1800">
+                        <a:latin typeface="Ubuntu Light"/>
+                        <a:ea typeface="Ubuntu Light"/>
+                        <a:cs typeface="Ubuntu Light"/>
+                        <a:sym typeface="Ubuntu Light"/>
+                      </a:endParaRPr>
+                    </a:p>
+                  </a:txBody>
+                  <a:tcPr marT="91425" marB="91425" marR="91425" marL="91425" anchor="ctr">
+                    <a:lnL cap="flat" cmpd="sng" w="9525">
+                      <a:solidFill>
+                        <a:srgbClr val="9E9E9E"/>
+                      </a:solidFill>
+                      <a:prstDash val="solid"/>
+                      <a:round/>
+                      <a:headEnd len="sm" w="sm" type="none"/>
+                      <a:tailEnd len="sm" w="sm" type="none"/>
+                    </a:lnL>
+                    <a:lnR cap="flat" cmpd="sng" w="9525">
+                      <a:solidFill>
+                        <a:srgbClr val="9E9E9E"/>
+                      </a:solidFill>
+                      <a:prstDash val="solid"/>
+                      <a:round/>
+                      <a:headEnd len="sm" w="sm" type="none"/>
+                      <a:tailEnd len="sm" w="sm" type="none"/>
+                    </a:lnR>
+                    <a:lnT cap="flat" cmpd="sng" w="9525">
+                      <a:solidFill>
+                        <a:srgbClr val="9E9E9E"/>
+                      </a:solidFill>
+                      <a:prstDash val="solid"/>
+                      <a:round/>
+                      <a:headEnd len="sm" w="sm" type="none"/>
+                      <a:tailEnd len="sm" w="sm" type="none"/>
+                    </a:lnT>
+                    <a:lnB cap="flat" cmpd="sng" w="9525">
+                      <a:solidFill>
+                        <a:srgbClr val="9E9E9E"/>
+                      </a:solidFill>
+                      <a:prstDash val="solid"/>
+                      <a:round/>
+                      <a:headEnd len="sm" w="sm" type="none"/>
+                      <a:tailEnd len="sm" w="sm" type="none"/>
+                    </a:lnB>
+                  </a:tcPr>
+                </a:tc>
+                <a:tc>
+                  <a:txBody>
+                    <a:bodyPr/>
+                    <a:lstStyle/>
+                    <a:p>
+                      <a:pPr indent="0" lvl="0" marL="0" rtl="0" algn="ctr">
+                        <a:spcBef>
+                          <a:spcPts val="0"/>
+                        </a:spcBef>
+                        <a:spcAft>
+                          <a:spcPts val="0"/>
+                        </a:spcAft>
+                        <a:buNone/>
+                      </a:pPr>
+                      <a:r>
+                        <a:rPr lang="en" sz="1800">
+                          <a:latin typeface="Ubuntu Light"/>
+                          <a:ea typeface="Ubuntu Light"/>
+                          <a:cs typeface="Ubuntu Light"/>
+                          <a:sym typeface="Ubuntu Light"/>
+                        </a:rPr>
+                        <a:t>0.85</a:t>
+                      </a:r>
+                      <a:endParaRPr sz="1800">
+                        <a:latin typeface="Ubuntu Light"/>
+                        <a:ea typeface="Ubuntu Light"/>
+                        <a:cs typeface="Ubuntu Light"/>
+                        <a:sym typeface="Ubuntu Light"/>
+                      </a:endParaRPr>
+                    </a:p>
+                  </a:txBody>
+                  <a:tcPr marT="91425" marB="91425" marR="91425" marL="91425" anchor="ctr">
+                    <a:lnL cap="flat" cmpd="sng" w="9525">
+                      <a:solidFill>
+                        <a:srgbClr val="9E9E9E"/>
+                      </a:solidFill>
+                      <a:prstDash val="solid"/>
+                      <a:round/>
+                      <a:headEnd len="sm" w="sm" type="none"/>
+                      <a:tailEnd len="sm" w="sm" type="none"/>
+                    </a:lnL>
+                    <a:lnR cap="flat" cmpd="sng" w="9525">
+                      <a:solidFill>
+                        <a:srgbClr val="9E9E9E"/>
+                      </a:solidFill>
+                      <a:prstDash val="solid"/>
+                      <a:round/>
+                      <a:headEnd len="sm" w="sm" type="none"/>
+                      <a:tailEnd len="sm" w="sm" type="none"/>
+                    </a:lnR>
+                    <a:lnT cap="flat" cmpd="sng" w="9525">
+                      <a:solidFill>
+                        <a:srgbClr val="9E9E9E"/>
+                      </a:solidFill>
+                      <a:prstDash val="solid"/>
+                      <a:round/>
+                      <a:headEnd len="sm" w="sm" type="none"/>
+                      <a:tailEnd len="sm" w="sm" type="none"/>
+                    </a:lnT>
+                    <a:lnB cap="flat" cmpd="sng" w="9525">
+                      <a:solidFill>
+                        <a:srgbClr val="9E9E9E"/>
+                      </a:solidFill>
+                      <a:prstDash val="solid"/>
+                      <a:round/>
+                      <a:headEnd len="sm" w="sm" type="none"/>
+                      <a:tailEnd len="sm" w="sm" type="none"/>
+                    </a:lnB>
+                  </a:tcPr>
+                </a:tc>
+              </a:tr>
+            </a:tbl>
+          </a:graphicData>
+        </a:graphic>
+      </p:graphicFrame>
+    </p:spTree>
+  </p:cSld>
+  <p:clrMapOvr>
+    <a:masterClrMapping/>
+  </p:clrMapOvr>
+</p:sld>
+</file>
+
+<file path=ppt/slides/slide23.xml><?xml version="1.0" encoding="utf-8"?>
+<p:sld xmlns:a="http://schemas.openxmlformats.org/drawingml/2006/main" xmlns:r="http://schemas.openxmlformats.org/officeDocument/2006/relationships" xmlns:mc="http://schemas.openxmlformats.org/markup-compatibility/2006" xmlns:mv="urn:schemas-microsoft-com:mac:vml" xmlns:p="http://schemas.openxmlformats.org/presentationml/2006/main" xmlns:c="http://schemas.openxmlformats.org/drawingml/2006/chart" xmlns:dgm="http://schemas.openxmlformats.org/drawingml/2006/diagram" xmlns:o="urn:schemas-microsoft-com:office:office" xmlns:v="urn:schemas-microsoft-com:vml" xmlns:pvml="urn:schemas-microsoft-com:office:powerpoint" xmlns:com="http://schemas.openxmlformats.org/drawingml/2006/compatibility" xmlns:p14="http://schemas.microsoft.com/office/powerpoint/2010/main" xmlns:p15="http://schemas.microsoft.com/office/powerpoint/2012/main" xmlns:ahyp="http://schemas.microsoft.com/office/drawing/2018/hyperlinkcolor">
+  <p:cSld>
+    <p:spTree>
+      <p:nvGrpSpPr>
+        <p:cNvPr id="205" name="Shape 205"/>
+        <p:cNvGrpSpPr/>
+        <p:nvPr/>
+      </p:nvGrpSpPr>
+      <p:grpSpPr>
+        <a:xfrm>
+          <a:off x="0" y="0"/>
+          <a:ext cx="0" cy="0"/>
+          <a:chOff x="0" y="0"/>
+          <a:chExt cx="0" cy="0"/>
+        </a:xfrm>
+      </p:grpSpPr>
+      <p:sp>
+        <p:nvSpPr>
+          <p:cNvPr id="206" name="Google Shape;206;gec2e1cd1f0_0_2"/>
           <p:cNvSpPr txBox="1"/>
           <p:nvPr>
             <p:ph type="title"/>
@@ -15411,7 +17610,7 @@
                 <a:cs typeface="Ubuntu"/>
                 <a:sym typeface="Ubuntu"/>
               </a:rPr>
-              <a:t>ML Algorithms</a:t>
+              <a:t>Ensemble Learning</a:t>
             </a:r>
             <a:endParaRPr>
               <a:latin typeface="Ubuntu"/>
@@ -15424,12 +17623,12 @@
       </p:sp>
       <p:graphicFrame>
         <p:nvGraphicFramePr>
-          <p:cNvPr id="186" name="Google Shape;186;gec2e1cceae_0_140"/>
+          <p:cNvPr id="207" name="Google Shape;207;gec2e1cd1f0_0_2"/>
           <p:cNvGraphicFramePr/>
           <p:nvPr/>
         </p:nvGraphicFramePr>
         <p:xfrm>
-          <a:off x="236525" y="2042730"/>
+          <a:off x="2072450" y="1582755"/>
           <a:ext cx="3000000" cy="3000000"/>
         </p:xfrm>
         <a:graphic>
@@ -15437,18 +17636,14 @@
             <a:tbl>
               <a:tblPr>
                 <a:noFill/>
-                <a:tableStyleId>{0D4D9A23-EF9B-4464-9C6F-9FA0BF278C17}</a:tableStyleId>
+                <a:tableStyleId>{4BE756BA-E4D6-4DD5-AE8F-E202BB676858}</a:tableStyleId>
               </a:tblPr>
               <a:tblGrid>
-                <a:gridCol w="1641800"/>
-                <a:gridCol w="1265825"/>
-                <a:gridCol w="1250550"/>
-                <a:gridCol w="1079325"/>
-                <a:gridCol w="649400"/>
-                <a:gridCol w="677525"/>
-                <a:gridCol w="1570825"/>
+                <a:gridCol w="1761800"/>
+                <a:gridCol w="1692275"/>
+                <a:gridCol w="1922325"/>
               </a:tblGrid>
-              <a:tr h="960100">
+              <a:tr h="670750">
                 <a:tc>
                   <a:txBody>
                     <a:bodyPr/>
@@ -15466,22 +17661,62 @@
                       <a:r>
                         <a:t/>
                       </a:r>
-                      <a:endParaRPr sz="1700">
-                        <a:latin typeface="Ubuntu Light"/>
-                        <a:ea typeface="Ubuntu Light"/>
-                        <a:cs typeface="Ubuntu Light"/>
-                        <a:sym typeface="Ubuntu Light"/>
+                      <a:endParaRPr b="1" sz="1700">
+                        <a:latin typeface="Ubuntu"/>
+                        <a:ea typeface="Ubuntu"/>
+                        <a:cs typeface="Ubuntu"/>
+                        <a:sym typeface="Ubuntu"/>
                       </a:endParaRPr>
                     </a:p>
                   </a:txBody>
-                  <a:tcPr marT="91425" marB="91425" marR="91425" marL="91425"/>
+                  <a:tcPr marT="91425" marB="91425" marR="91425" marL="91425">
+                    <a:lnL cap="flat" cmpd="sng" w="9525">
+                      <a:solidFill>
+                        <a:srgbClr val="9E9E9E"/>
+                      </a:solidFill>
+                      <a:prstDash val="solid"/>
+                      <a:round/>
+                      <a:headEnd len="sm" w="sm" type="none"/>
+                      <a:tailEnd len="sm" w="sm" type="none"/>
+                    </a:lnL>
+                    <a:lnR cap="flat" cmpd="sng" w="9525">
+                      <a:solidFill>
+                        <a:srgbClr val="9E9E9E"/>
+                      </a:solidFill>
+                      <a:prstDash val="solid"/>
+                      <a:round/>
+                      <a:headEnd len="sm" w="sm" type="none"/>
+                      <a:tailEnd len="sm" w="sm" type="none"/>
+                    </a:lnR>
+                    <a:lnT cap="flat" cmpd="sng" w="9525">
+                      <a:solidFill>
+                        <a:srgbClr val="9E9E9E"/>
+                      </a:solidFill>
+                      <a:prstDash val="solid"/>
+                      <a:round/>
+                      <a:headEnd len="sm" w="sm" type="none"/>
+                      <a:tailEnd len="sm" w="sm" type="none"/>
+                    </a:lnT>
+                    <a:lnB cap="flat" cmpd="sng" w="9525">
+                      <a:solidFill>
+                        <a:srgbClr val="9E9E9E"/>
+                      </a:solidFill>
+                      <a:prstDash val="solid"/>
+                      <a:round/>
+                      <a:headEnd len="sm" w="sm" type="none"/>
+                      <a:tailEnd len="sm" w="sm" type="none"/>
+                    </a:lnB>
+                    <a:solidFill>
+                      <a:srgbClr val="FCE5CD"/>
+                    </a:solidFill>
+                  </a:tcPr>
                 </a:tc>
                 <a:tc>
                   <a:txBody>
                     <a:bodyPr/>
                     <a:lstStyle/>
                     <a:p>
-                      <a:pPr indent="0" lvl="0" marL="0" rtl="0" algn="l">
+                      <a:pPr indent="0" lvl="0" marL="0" rtl="0" algn="ctr">
                         <a:spcBef>
                           <a:spcPts val="0"/>
                         </a:spcBef>
@@ -15491,23 +17726,70 @@
                         <a:buNone/>
                       </a:pPr>
                       <a:r>
-                        <a:rPr lang="en" sz="1700">
-                          <a:latin typeface="Ubuntu Light"/>
-                          <a:ea typeface="Ubuntu Light"/>
-                          <a:cs typeface="Ubuntu Light"/>
-                          <a:sym typeface="Ubuntu Light"/>
+                        <a:rPr b="1" lang="en" sz="1700">
+                          <a:latin typeface="Ubuntu"/>
+                          <a:ea typeface="Ubuntu"/>
+                          <a:cs typeface="Ubuntu"/>
+                          <a:sym typeface="Ubuntu"/>
                         </a:rPr>
-                        <a:t>Logistic</a:t>
+                        <a:t>XGBoost</a:t>
                       </a:r>
-                      <a:endParaRPr sz="1700">
-                        <a:latin typeface="Ubuntu Light"/>
-                        <a:ea typeface="Ubuntu Light"/>
-                        <a:cs typeface="Ubuntu Light"/>
-                        <a:sym typeface="Ubuntu Light"/>
+                      <a:endParaRPr b="1" sz="1700">
+                        <a:latin typeface="Ubuntu"/>
+                        <a:ea typeface="Ubuntu"/>
+                        <a:cs typeface="Ubuntu"/>
+                        <a:sym typeface="Ubuntu"/>
                       </a:endParaRPr>
                     </a:p>
+                  </a:txBody>
+                  <a:tcPr marT="91425" marB="91425" marR="91425" marL="91425" anchor="ctr">
+                    <a:lnL cap="flat" cmpd="sng" w="9525">
+                      <a:solidFill>
+                        <a:srgbClr val="9E9E9E"/>
+                      </a:solidFill>
+                      <a:prstDash val="solid"/>
+                      <a:round/>
+                      <a:headEnd len="sm" w="sm" type="none"/>
+                      <a:tailEnd len="sm" w="sm" type="none"/>
+                    </a:lnL>
+                    <a:lnR cap="flat" cmpd="sng" w="9525">
+                      <a:solidFill>
+                        <a:srgbClr val="9E9E9E"/>
+                      </a:solidFill>
+                      <a:prstDash val="solid"/>
+                      <a:round/>
+                      <a:headEnd len="sm" w="sm" type="none"/>
+                      <a:tailEnd len="sm" w="sm" type="none"/>
+                    </a:lnR>
+                    <a:lnT cap="flat" cmpd="sng" w="9525">
+                      <a:solidFill>
+                        <a:srgbClr val="9E9E9E"/>
+                      </a:solidFill>
+                      <a:prstDash val="solid"/>
+                      <a:round/>
+                      <a:headEnd len="sm" w="sm" type="none"/>
+                      <a:tailEnd len="sm" w="sm" type="none"/>
+                    </a:lnT>
+                    <a:lnB cap="flat" cmpd="sng" w="9525">
+                      <a:solidFill>
+                        <a:srgbClr val="9E9E9E"/>
+                      </a:solidFill>
+                      <a:prstDash val="solid"/>
+                      <a:round/>
+                      <a:headEnd len="sm" w="sm" type="none"/>
+                      <a:tailEnd len="sm" w="sm" type="none"/>
+                    </a:lnB>
+                    <a:solidFill>
+                      <a:srgbClr val="F9CB9C"/>
+                    </a:solidFill>
+                  </a:tcPr>
+                </a:tc>
+                <a:tc>
+                  <a:txBody>
+                    <a:bodyPr/>
+                    <a:lstStyle/>
                     <a:p>
-                      <a:pPr indent="0" lvl="0" marL="0" rtl="0" algn="l">
+                      <a:pPr indent="0" lvl="0" marL="0" rtl="0" algn="ctr">
                         <a:spcBef>
                           <a:spcPts val="0"/>
                         </a:spcBef>
@@ -15517,249 +17799,72 @@
                         <a:buNone/>
                       </a:pPr>
                       <a:r>
-                        <a:rPr lang="en" sz="1700">
-                          <a:latin typeface="Ubuntu Light"/>
-                          <a:ea typeface="Ubuntu Light"/>
-                          <a:cs typeface="Ubuntu Light"/>
-                          <a:sym typeface="Ubuntu Light"/>
+                        <a:rPr b="1" lang="en" sz="1700">
+                          <a:latin typeface="Ubuntu"/>
+                          <a:ea typeface="Ubuntu"/>
+                          <a:cs typeface="Ubuntu"/>
+                          <a:sym typeface="Ubuntu"/>
                         </a:rPr>
-                        <a:t>Regression (LR)</a:t>
+                        <a:t>VotingClassifier</a:t>
                       </a:r>
-                      <a:endParaRPr sz="1700">
-                        <a:latin typeface="Ubuntu Light"/>
-                        <a:ea typeface="Ubuntu Light"/>
-                        <a:cs typeface="Ubuntu Light"/>
-                        <a:sym typeface="Ubuntu Light"/>
+                      <a:endParaRPr b="1" sz="1700">
+                        <a:latin typeface="Ubuntu"/>
+                        <a:ea typeface="Ubuntu"/>
+                        <a:cs typeface="Ubuntu"/>
+                        <a:sym typeface="Ubuntu"/>
                       </a:endParaRPr>
                     </a:p>
                   </a:txBody>
-                  <a:tcPr marT="91425" marB="91425" marR="91425" marL="91425"/>
+                  <a:tcPr marT="91425" marB="91425" marR="91425" marL="91425" anchor="ctr">
+                    <a:lnL cap="flat" cmpd="sng" w="9525">
+                      <a:solidFill>
+                        <a:srgbClr val="9E9E9E"/>
+                      </a:solidFill>
+                      <a:prstDash val="solid"/>
+                      <a:round/>
+                      <a:headEnd len="sm" w="sm" type="none"/>
+                      <a:tailEnd len="sm" w="sm" type="none"/>
+                    </a:lnL>
+                    <a:lnR cap="flat" cmpd="sng" w="9525">
+                      <a:solidFill>
+                        <a:srgbClr val="9E9E9E"/>
+                      </a:solidFill>
+                      <a:prstDash val="solid"/>
+                      <a:round/>
+                      <a:headEnd len="sm" w="sm" type="none"/>
+                      <a:tailEnd len="sm" w="sm" type="none"/>
+                    </a:lnR>
+                    <a:lnT cap="flat" cmpd="sng" w="9525">
+                      <a:solidFill>
+                        <a:srgbClr val="9E9E9E"/>
+                      </a:solidFill>
+                      <a:prstDash val="solid"/>
+                      <a:round/>
+                      <a:headEnd len="sm" w="sm" type="none"/>
+                      <a:tailEnd len="sm" w="sm" type="none"/>
+                    </a:lnT>
+                    <a:lnB cap="flat" cmpd="sng" w="9525">
+                      <a:solidFill>
+                        <a:srgbClr val="9E9E9E"/>
+                      </a:solidFill>
+                      <a:prstDash val="solid"/>
+                      <a:round/>
+                      <a:headEnd len="sm" w="sm" type="none"/>
+                      <a:tailEnd len="sm" w="sm" type="none"/>
+                    </a:lnB>
+                    <a:solidFill>
+                      <a:srgbClr val="F9CB9C"/>
+                    </a:solidFill>
+                  </a:tcPr>
                 </a:tc>
+              </a:tr>
+              <a:tr h="834025">
                 <a:tc>
                   <a:txBody>
                     <a:bodyPr/>
                     <a:lstStyle/>
                     <a:p>
-                      <a:pPr indent="0" lvl="0" marL="0" rtl="0" algn="l">
-                        <a:spcBef>
-                          <a:spcPts val="0"/>
-                        </a:spcBef>
-                        <a:spcAft>
-                          <a:spcPts val="0"/>
-                        </a:spcAft>
-                        <a:buNone/>
-                      </a:pPr>
-                      <a:r>
-                        <a:rPr lang="en" sz="1700">
-                          <a:latin typeface="Ubuntu Light"/>
-                          <a:ea typeface="Ubuntu Light"/>
-                          <a:cs typeface="Ubuntu Light"/>
-                          <a:sym typeface="Ubuntu Light"/>
-                        </a:rPr>
-                        <a:t>Softmax</a:t>
-                      </a:r>
-                      <a:endParaRPr sz="1700">
-                        <a:latin typeface="Ubuntu Light"/>
-                        <a:ea typeface="Ubuntu Light"/>
-                        <a:cs typeface="Ubuntu Light"/>
-                        <a:sym typeface="Ubuntu Light"/>
-                      </a:endParaRPr>
-                    </a:p>
-                    <a:p>
-                      <a:pPr indent="0" lvl="0" marL="0" rtl="0" algn="l">
-                        <a:spcBef>
-                          <a:spcPts val="0"/>
-                        </a:spcBef>
-                        <a:spcAft>
-                          <a:spcPts val="0"/>
-                        </a:spcAft>
-                        <a:buNone/>
-                      </a:pPr>
-                      <a:r>
-                        <a:rPr lang="en" sz="1700">
-                          <a:latin typeface="Ubuntu Light"/>
-                          <a:ea typeface="Ubuntu Light"/>
-                          <a:cs typeface="Ubuntu Light"/>
-                          <a:sym typeface="Ubuntu Light"/>
-                        </a:rPr>
-                        <a:t>Regression</a:t>
-                      </a:r>
-                      <a:endParaRPr sz="1700">
-                        <a:latin typeface="Ubuntu Light"/>
-                        <a:ea typeface="Ubuntu Light"/>
-                        <a:cs typeface="Ubuntu Light"/>
-                        <a:sym typeface="Ubuntu Light"/>
-                      </a:endParaRPr>
-                    </a:p>
-                  </a:txBody>
-                  <a:tcPr marT="91425" marB="91425" marR="91425" marL="91425"/>
-                </a:tc>
-                <a:tc>
-                  <a:txBody>
-                    <a:bodyPr/>
-                    <a:lstStyle/>
-                    <a:p>
-                      <a:pPr indent="0" lvl="0" marL="0" rtl="0" algn="l">
-                        <a:spcBef>
-                          <a:spcPts val="0"/>
-                        </a:spcBef>
-                        <a:spcAft>
-                          <a:spcPts val="0"/>
-                        </a:spcAft>
-                        <a:buNone/>
-                      </a:pPr>
-                      <a:r>
-                        <a:rPr lang="en" sz="1700">
-                          <a:latin typeface="Ubuntu Light"/>
-                          <a:ea typeface="Ubuntu Light"/>
-                          <a:cs typeface="Ubuntu Light"/>
-                          <a:sym typeface="Ubuntu Light"/>
-                        </a:rPr>
-                        <a:t>Random</a:t>
-                      </a:r>
-                      <a:endParaRPr sz="1700">
-                        <a:latin typeface="Ubuntu Light"/>
-                        <a:ea typeface="Ubuntu Light"/>
-                        <a:cs typeface="Ubuntu Light"/>
-                        <a:sym typeface="Ubuntu Light"/>
-                      </a:endParaRPr>
-                    </a:p>
-                    <a:p>
-                      <a:pPr indent="0" lvl="0" marL="0" rtl="0" algn="l">
-                        <a:spcBef>
-                          <a:spcPts val="0"/>
-                        </a:spcBef>
-                        <a:spcAft>
-                          <a:spcPts val="0"/>
-                        </a:spcAft>
-                        <a:buNone/>
-                      </a:pPr>
-                      <a:r>
-                        <a:rPr lang="en" sz="1700">
-                          <a:latin typeface="Ubuntu Light"/>
-                          <a:ea typeface="Ubuntu Light"/>
-                          <a:cs typeface="Ubuntu Light"/>
-                          <a:sym typeface="Ubuntu Light"/>
-                        </a:rPr>
-                        <a:t>Forest</a:t>
-                      </a:r>
-                      <a:endParaRPr sz="1700">
-                        <a:latin typeface="Ubuntu Light"/>
-                        <a:ea typeface="Ubuntu Light"/>
-                        <a:cs typeface="Ubuntu Light"/>
-                        <a:sym typeface="Ubuntu Light"/>
-                      </a:endParaRPr>
-                    </a:p>
-                  </a:txBody>
-                  <a:tcPr marT="91425" marB="91425" marR="91425" marL="91425"/>
-                </a:tc>
-                <a:tc>
-                  <a:txBody>
-                    <a:bodyPr/>
-                    <a:lstStyle/>
-                    <a:p>
-                      <a:pPr indent="0" lvl="0" marL="0" rtl="0" algn="l">
-                        <a:spcBef>
-                          <a:spcPts val="0"/>
-                        </a:spcBef>
-                        <a:spcAft>
-                          <a:spcPts val="0"/>
-                        </a:spcAft>
-                        <a:buNone/>
-                      </a:pPr>
-                      <a:r>
-                        <a:rPr lang="en" sz="1700">
-                          <a:latin typeface="Ubuntu Light"/>
-                          <a:ea typeface="Ubuntu Light"/>
-                          <a:cs typeface="Ubuntu Light"/>
-                          <a:sym typeface="Ubuntu Light"/>
-                        </a:rPr>
-                        <a:t>SVM</a:t>
-                      </a:r>
-                      <a:endParaRPr sz="1700">
-                        <a:latin typeface="Ubuntu Light"/>
-                        <a:ea typeface="Ubuntu Light"/>
-                        <a:cs typeface="Ubuntu Light"/>
-                        <a:sym typeface="Ubuntu Light"/>
-                      </a:endParaRPr>
-                    </a:p>
-                  </a:txBody>
-                  <a:tcPr marT="91425" marB="91425" marR="91425" marL="91425"/>
-                </a:tc>
-                <a:tc>
-                  <a:txBody>
-                    <a:bodyPr/>
-                    <a:lstStyle/>
-                    <a:p>
-                      <a:pPr indent="0" lvl="0" marL="0" rtl="0" algn="l">
-                        <a:spcBef>
-                          <a:spcPts val="0"/>
-                        </a:spcBef>
-                        <a:spcAft>
-                          <a:spcPts val="0"/>
-                        </a:spcAft>
-                        <a:buNone/>
-                      </a:pPr>
-                      <a:r>
-                        <a:rPr lang="en" sz="1700">
-                          <a:latin typeface="Ubuntu Light"/>
-                          <a:ea typeface="Ubuntu Light"/>
-                          <a:cs typeface="Ubuntu Light"/>
-                          <a:sym typeface="Ubuntu Light"/>
-                        </a:rPr>
-                        <a:t>PCA+LR</a:t>
-                      </a:r>
-                      <a:endParaRPr sz="1700">
-                        <a:latin typeface="Ubuntu Light"/>
-                        <a:ea typeface="Ubuntu Light"/>
-                        <a:cs typeface="Ubuntu Light"/>
-                        <a:sym typeface="Ubuntu Light"/>
-                      </a:endParaRPr>
-                    </a:p>
-                  </a:txBody>
-                  <a:tcPr marT="91425" marB="91425" marR="91425" marL="91425"/>
-                </a:tc>
-                <a:tc>
-                  <a:txBody>
-                    <a:bodyPr/>
-                    <a:lstStyle/>
-                    <a:p>
-                      <a:pPr indent="0" lvl="0" marL="0" rtl="0" algn="l">
-                        <a:spcBef>
-                          <a:spcPts val="0"/>
-                        </a:spcBef>
-                        <a:spcAft>
-                          <a:spcPts val="0"/>
-                        </a:spcAft>
-                        <a:buNone/>
-                      </a:pPr>
-                      <a:r>
-                        <a:rPr lang="en" sz="1700">
-                          <a:latin typeface="Ubuntu Light"/>
-                          <a:ea typeface="Ubuntu Light"/>
-                          <a:cs typeface="Ubuntu Light"/>
-                          <a:sym typeface="Ubuntu Light"/>
-                        </a:rPr>
-                        <a:t>Kernel PCA+LR</a:t>
-                      </a:r>
-                      <a:endParaRPr sz="1700">
-                        <a:latin typeface="Ubuntu Light"/>
-                        <a:ea typeface="Ubuntu Light"/>
-                        <a:cs typeface="Ubuntu Light"/>
-                        <a:sym typeface="Ubuntu Light"/>
-                      </a:endParaRPr>
-                    </a:p>
-                  </a:txBody>
-                  <a:tcPr marT="91425" marB="91425" marR="91425" marL="91425"/>
-                </a:tc>
-              </a:tr>
-              <a:tr h="865675">
-                <a:tc>
-                  <a:txBody>
-                    <a:bodyPr/>
-                    <a:lstStyle/>
-                    <a:p>
-                      <a:pPr indent="0" lvl="0" marL="0" rtl="0" algn="l">
+                      <a:pPr indent="0" lvl="0" marL="0" rtl="0" algn="ctr">
                         <a:spcBef>
                           <a:spcPts val="0"/>
                         </a:spcBef>
@@ -15785,14 +17890,54 @@
                       </a:endParaRPr>
                     </a:p>
                   </a:txBody>
-                  <a:tcPr marT="91425" marB="91425" marR="91425" marL="91425"/>
+                  <a:tcPr marT="91425" marB="91425" marR="91425" marL="91425" anchor="ctr">
+                    <a:lnL cap="flat" cmpd="sng" w="9525">
+                      <a:solidFill>
+                        <a:srgbClr val="9E9E9E"/>
+                      </a:solidFill>
+                      <a:prstDash val="solid"/>
+                      <a:round/>
+                      <a:headEnd len="sm" w="sm" type="none"/>
+                      <a:tailEnd len="sm" w="sm" type="none"/>
+                    </a:lnL>
+                    <a:lnR cap="flat" cmpd="sng" w="9525">
+                      <a:solidFill>
+                        <a:srgbClr val="9E9E9E"/>
+                      </a:solidFill>
+                      <a:prstDash val="solid"/>
+                      <a:round/>
+                      <a:headEnd len="sm" w="sm" type="none"/>
+                      <a:tailEnd len="sm" w="sm" type="none"/>
+                    </a:lnR>
+                    <a:lnT cap="flat" cmpd="sng" w="9525">
+                      <a:solidFill>
+                        <a:srgbClr val="9E9E9E"/>
+                      </a:solidFill>
+                      <a:prstDash val="solid"/>
+                      <a:round/>
+                      <a:headEnd len="sm" w="sm" type="none"/>
+                      <a:tailEnd len="sm" w="sm" type="none"/>
+                    </a:lnT>
+                    <a:lnB cap="flat" cmpd="sng" w="9525">
+                      <a:solidFill>
+                        <a:srgbClr val="9E9E9E"/>
+                      </a:solidFill>
+                      <a:prstDash val="solid"/>
+                      <a:round/>
+                      <a:headEnd len="sm" w="sm" type="none"/>
+                      <a:tailEnd len="sm" w="sm" type="none"/>
+                    </a:lnB>
+                    <a:solidFill>
+                      <a:schemeClr val="lt1"/>
+                    </a:solidFill>
+                  </a:tcPr>
                 </a:tc>
                 <a:tc>
                   <a:txBody>
                     <a:bodyPr/>
                     <a:lstStyle/>
                     <a:p>
-                      <a:pPr indent="0" lvl="0" marL="0" rtl="0" algn="l">
+                      <a:pPr indent="0" lvl="0" marL="0" rtl="0" algn="ctr">
                         <a:spcBef>
                           <a:spcPts val="0"/>
                         </a:spcBef>
@@ -15802,15 +17947,15 @@
                         <a:buNone/>
                       </a:pPr>
                       <a:r>
-                        <a:rPr lang="en" sz="1700">
+                        <a:rPr lang="en" sz="1800">
                           <a:latin typeface="Ubuntu Light"/>
                           <a:ea typeface="Ubuntu Light"/>
                           <a:cs typeface="Ubuntu Light"/>
                           <a:sym typeface="Ubuntu Light"/>
                         </a:rPr>
-                        <a:t>0.87</a:t>
+                        <a:t>0.84</a:t>
                       </a:r>
-                      <a:endParaRPr sz="1700">
+                      <a:endParaRPr sz="1800">
                         <a:latin typeface="Ubuntu Light"/>
                         <a:ea typeface="Ubuntu Light"/>
                         <a:cs typeface="Ubuntu Light"/>
@@ -15818,14 +17963,54 @@
                       </a:endParaRPr>
                     </a:p>
                   </a:txBody>
-                  <a:tcPr marT="91425" marB="91425" marR="91425" marL="91425"/>
+                  <a:tcPr marT="91425" marB="91425" marR="91425" marL="91425" anchor="ctr">
+                    <a:lnL cap="flat" cmpd="sng" w="9525">
+                      <a:solidFill>
+                        <a:srgbClr val="9E9E9E"/>
+                      </a:solidFill>
+                      <a:prstDash val="solid"/>
+                      <a:round/>
+                      <a:headEnd len="sm" w="sm" type="none"/>
+                      <a:tailEnd len="sm" w="sm" type="none"/>
+                    </a:lnL>
+                    <a:lnR cap="flat" cmpd="sng" w="9525">
+                      <a:solidFill>
+                        <a:srgbClr val="9E9E9E"/>
+                      </a:solidFill>
+                      <a:prstDash val="solid"/>
+                      <a:round/>
+                      <a:headEnd len="sm" w="sm" type="none"/>
+                      <a:tailEnd len="sm" w="sm" type="none"/>
+                    </a:lnR>
+                    <a:lnT cap="flat" cmpd="sng" w="9525">
+                      <a:solidFill>
+                        <a:srgbClr val="9E9E9E"/>
+                      </a:solidFill>
+                      <a:prstDash val="solid"/>
+                      <a:round/>
+                      <a:headEnd len="sm" w="sm" type="none"/>
+                      <a:tailEnd len="sm" w="sm" type="none"/>
+                    </a:lnT>
+                    <a:lnB cap="flat" cmpd="sng" w="9525">
+                      <a:solidFill>
+                        <a:srgbClr val="9E9E9E"/>
+                      </a:solidFill>
+                      <a:prstDash val="solid"/>
+                      <a:round/>
+                      <a:headEnd len="sm" w="sm" type="none"/>
+                      <a:tailEnd len="sm" w="sm" type="none"/>
+                    </a:lnB>
+                    <a:solidFill>
+                      <a:schemeClr val="lt1"/>
+                    </a:solidFill>
+                  </a:tcPr>
                 </a:tc>
                 <a:tc>
                   <a:txBody>
                     <a:bodyPr/>
                     <a:lstStyle/>
                     <a:p>
-                      <a:pPr indent="0" lvl="0" marL="0" rtl="0" algn="l">
+                      <a:pPr indent="0" lvl="0" marL="0" rtl="0" algn="ctr">
                         <a:spcBef>
                           <a:spcPts val="0"/>
                         </a:spcBef>
@@ -15835,15 +18020,15 @@
                         <a:buNone/>
                       </a:pPr>
                       <a:r>
-                        <a:rPr lang="en" sz="1700">
+                        <a:rPr lang="en" sz="1800">
                           <a:latin typeface="Ubuntu Light"/>
                           <a:ea typeface="Ubuntu Light"/>
                           <a:cs typeface="Ubuntu Light"/>
                           <a:sym typeface="Ubuntu Light"/>
                         </a:rPr>
-                        <a:t>0.87</a:t>
+                        <a:t>0.94</a:t>
                       </a:r>
-                      <a:endParaRPr sz="1700">
+                      <a:endParaRPr sz="1800">
                         <a:latin typeface="Ubuntu Light"/>
                         <a:ea typeface="Ubuntu Light"/>
                         <a:cs typeface="Ubuntu Light"/>
@@ -15851,142 +18036,53 @@
                       </a:endParaRPr>
                     </a:p>
                   </a:txBody>
-                  <a:tcPr marT="91425" marB="91425" marR="91425" marL="91425"/>
+                  <a:tcPr marT="91425" marB="91425" marR="91425" marL="91425" anchor="ctr">
+                    <a:lnL cap="flat" cmpd="sng" w="9525">
+                      <a:solidFill>
+                        <a:srgbClr val="9E9E9E"/>
+                      </a:solidFill>
+                      <a:prstDash val="solid"/>
+                      <a:round/>
+                      <a:headEnd len="sm" w="sm" type="none"/>
+                      <a:tailEnd len="sm" w="sm" type="none"/>
+                    </a:lnL>
+                    <a:lnR cap="flat" cmpd="sng" w="9525">
+                      <a:solidFill>
+                        <a:srgbClr val="9E9E9E"/>
+                      </a:solidFill>
+                      <a:prstDash val="solid"/>
+                      <a:round/>
+                      <a:headEnd len="sm" w="sm" type="none"/>
+                      <a:tailEnd len="sm" w="sm" type="none"/>
+                    </a:lnR>
+                    <a:lnT cap="flat" cmpd="sng" w="9525">
+                      <a:solidFill>
+                        <a:srgbClr val="9E9E9E"/>
+                      </a:solidFill>
+                      <a:prstDash val="solid"/>
+                      <a:round/>
+                      <a:headEnd len="sm" w="sm" type="none"/>
+                      <a:tailEnd len="sm" w="sm" type="none"/>
+                    </a:lnT>
+                    <a:lnB cap="flat" cmpd="sng" w="9525">
+                      <a:solidFill>
+                        <a:srgbClr val="9E9E9E"/>
+                      </a:solidFill>
+                      <a:prstDash val="solid"/>
+                      <a:round/>
+                      <a:headEnd len="sm" w="sm" type="none"/>
+                      <a:tailEnd len="sm" w="sm" type="none"/>
+                    </a:lnB>
+                  </a:tcPr>
                 </a:tc>
+              </a:tr>
+              <a:tr h="762850">
                 <a:tc>
                   <a:txBody>
                     <a:bodyPr/>
                     <a:lstStyle/>
                     <a:p>
-                      <a:pPr indent="0" lvl="0" marL="0" rtl="0" algn="l">
-                        <a:spcBef>
-                          <a:spcPts val="0"/>
-                        </a:spcBef>
-                        <a:spcAft>
-                          <a:spcPts val="0"/>
-                        </a:spcAft>
-                        <a:buNone/>
-                      </a:pPr>
-                      <a:r>
-                        <a:rPr lang="en" sz="1700">
-                          <a:latin typeface="Ubuntu Light"/>
-                          <a:ea typeface="Ubuntu Light"/>
-                          <a:cs typeface="Ubuntu Light"/>
-                          <a:sym typeface="Ubuntu Light"/>
-                        </a:rPr>
-                        <a:t>0.84</a:t>
-                      </a:r>
-                      <a:endParaRPr sz="1700">
-                        <a:latin typeface="Ubuntu Light"/>
-                        <a:ea typeface="Ubuntu Light"/>
-                        <a:cs typeface="Ubuntu Light"/>
-                        <a:sym typeface="Ubuntu Light"/>
-                      </a:endParaRPr>
-                    </a:p>
-                  </a:txBody>
-                  <a:tcPr marT="91425" marB="91425" marR="91425" marL="91425"/>
-                </a:tc>
-                <a:tc>
-                  <a:txBody>
-                    <a:bodyPr/>
-                    <a:lstStyle/>
-                    <a:p>
-                      <a:pPr indent="0" lvl="0" marL="0" rtl="0" algn="l">
-                        <a:spcBef>
-                          <a:spcPts val="0"/>
-                        </a:spcBef>
-                        <a:spcAft>
-                          <a:spcPts val="0"/>
-                        </a:spcAft>
-                        <a:buNone/>
-                      </a:pPr>
-                      <a:r>
-                        <a:t/>
-                      </a:r>
-                      <a:endParaRPr sz="1700">
-                        <a:latin typeface="Ubuntu Light"/>
-                        <a:ea typeface="Ubuntu Light"/>
-                        <a:cs typeface="Ubuntu Light"/>
-                        <a:sym typeface="Ubuntu Light"/>
-                      </a:endParaRPr>
-                    </a:p>
-                  </a:txBody>
-                  <a:tcPr marT="91425" marB="91425" marR="91425" marL="91425"/>
-                </a:tc>
-                <a:tc>
-                  <a:txBody>
-                    <a:bodyPr/>
-                    <a:lstStyle/>
-                    <a:p>
-                      <a:pPr indent="0" lvl="0" marL="0" rtl="0" algn="l">
-                        <a:spcBef>
-                          <a:spcPts val="0"/>
-                        </a:spcBef>
-                        <a:spcAft>
-                          <a:spcPts val="0"/>
-                        </a:spcAft>
-                        <a:buNone/>
-                      </a:pPr>
-                      <a:r>
-                        <a:rPr lang="en" sz="1700">
-                          <a:latin typeface="Ubuntu Light"/>
-                          <a:ea typeface="Ubuntu Light"/>
-                          <a:cs typeface="Ubuntu Light"/>
-                          <a:sym typeface="Ubuntu Light"/>
-                        </a:rPr>
-                        <a:t>0.87</a:t>
-                      </a:r>
-                      <a:endParaRPr sz="1700">
-                        <a:latin typeface="Ubuntu Light"/>
-                        <a:ea typeface="Ubuntu Light"/>
-                        <a:cs typeface="Ubuntu Light"/>
-                        <a:sym typeface="Ubuntu Light"/>
-                      </a:endParaRPr>
-                    </a:p>
-                  </a:txBody>
-                  <a:tcPr marT="91425" marB="91425" marR="91425" marL="91425"/>
-                </a:tc>
-                <a:tc>
-                  <a:txBody>
-                    <a:bodyPr/>
-                    <a:lstStyle/>
-                    <a:p>
-                      <a:pPr indent="0" lvl="0" marL="0" rtl="0" algn="l">
-                        <a:spcBef>
-                          <a:spcPts val="0"/>
-                        </a:spcBef>
-                        <a:spcAft>
-                          <a:spcPts val="0"/>
-                        </a:spcAft>
-                        <a:buNone/>
-                      </a:pPr>
-                      <a:r>
-                        <a:rPr lang="en" sz="1700">
-                          <a:latin typeface="Ubuntu Light"/>
-                          <a:ea typeface="Ubuntu Light"/>
-                          <a:cs typeface="Ubuntu Light"/>
-                          <a:sym typeface="Ubuntu Light"/>
-                        </a:rPr>
-                        <a:t>0.85</a:t>
-                      </a:r>
-                      <a:endParaRPr sz="1700">
-                        <a:latin typeface="Ubuntu Light"/>
-                        <a:ea typeface="Ubuntu Light"/>
-                        <a:cs typeface="Ubuntu Light"/>
-                        <a:sym typeface="Ubuntu Light"/>
-                      </a:endParaRPr>
-                    </a:p>
-                  </a:txBody>
-                  <a:tcPr marT="91425" marB="91425" marR="91425" marL="91425"/>
-                </a:tc>
-              </a:tr>
-              <a:tr h="791800">
-                <a:tc>
-                  <a:txBody>
-                    <a:bodyPr/>
-                    <a:lstStyle/>
-                    <a:p>
-                      <a:pPr indent="0" lvl="0" marL="0" rtl="0" algn="l">
+                      <a:pPr indent="0" lvl="0" marL="0" rtl="0" algn="ctr">
                         <a:spcBef>
                           <a:spcPts val="0"/>
                         </a:spcBef>
@@ -16012,14 +18108,51 @@
                       </a:endParaRPr>
                     </a:p>
                   </a:txBody>
-                  <a:tcPr marT="91425" marB="91425" marR="91425" marL="91425"/>
+                  <a:tcPr marT="91425" marB="91425" marR="91425" marL="91425" anchor="ctr">
+                    <a:lnL cap="flat" cmpd="sng" w="9525">
+                      <a:solidFill>
+                        <a:srgbClr val="9E9E9E"/>
+                      </a:solidFill>
+                      <a:prstDash val="solid"/>
+                      <a:round/>
+                      <a:headEnd len="sm" w="sm" type="none"/>
+                      <a:tailEnd len="sm" w="sm" type="none"/>
+                    </a:lnL>
+                    <a:lnR cap="flat" cmpd="sng" w="9525">
+                      <a:solidFill>
+                        <a:srgbClr val="9E9E9E"/>
+                      </a:solidFill>
+                      <a:prstDash val="solid"/>
+                      <a:round/>
+                      <a:headEnd len="sm" w="sm" type="none"/>
+                      <a:tailEnd len="sm" w="sm" type="none"/>
+                    </a:lnR>
+                    <a:lnT cap="flat" cmpd="sng" w="9525">
+                      <a:solidFill>
+                        <a:srgbClr val="9E9E9E"/>
+                      </a:solidFill>
+                      <a:prstDash val="solid"/>
+                      <a:round/>
+                      <a:headEnd len="sm" w="sm" type="none"/>
+                      <a:tailEnd len="sm" w="sm" type="none"/>
+                    </a:lnT>
+                    <a:lnB cap="flat" cmpd="sng" w="9525">
+                      <a:solidFill>
+                        <a:srgbClr val="9E9E9E"/>
+                      </a:solidFill>
+                      <a:prstDash val="solid"/>
+                      <a:round/>
+                      <a:headEnd len="sm" w="sm" type="none"/>
+                      <a:tailEnd len="sm" w="sm" type="none"/>
+                    </a:lnB>
+                  </a:tcPr>
                 </a:tc>
                 <a:tc>
                   <a:txBody>
                     <a:bodyPr/>
                     <a:lstStyle/>
                     <a:p>
-                      <a:pPr indent="0" lvl="0" marL="0" rtl="0" algn="l">
+                      <a:pPr indent="0" lvl="0" marL="0" rtl="0" algn="ctr">
                         <a:spcBef>
                           <a:spcPts val="0"/>
                         </a:spcBef>
@@ -16029,15 +18162,15 @@
                         <a:buNone/>
                       </a:pPr>
                       <a:r>
-                        <a:rPr lang="en" sz="1700">
+                        <a:rPr lang="en" sz="1800">
                           <a:latin typeface="Ubuntu Light"/>
                           <a:ea typeface="Ubuntu Light"/>
                           <a:cs typeface="Ubuntu Light"/>
                           <a:sym typeface="Ubuntu Light"/>
                         </a:rPr>
-                        <a:t>0.94</a:t>
+                        <a:t>0.84</a:t>
                       </a:r>
-                      <a:endParaRPr sz="1700">
+                      <a:endParaRPr sz="1800">
                         <a:latin typeface="Ubuntu Light"/>
                         <a:ea typeface="Ubuntu Light"/>
                         <a:cs typeface="Ubuntu Light"/>
@@ -16045,14 +18178,51 @@
                       </a:endParaRPr>
                     </a:p>
                   </a:txBody>
-                  <a:tcPr marT="91425" marB="91425" marR="91425" marL="91425"/>
+                  <a:tcPr marT="91425" marB="91425" marR="91425" marL="91425" anchor="ctr">
+                    <a:lnL cap="flat" cmpd="sng" w="9525">
+                      <a:solidFill>
+                        <a:srgbClr val="9E9E9E"/>
+                      </a:solidFill>
+                      <a:prstDash val="solid"/>
+                      <a:round/>
+                      <a:headEnd len="sm" w="sm" type="none"/>
+                      <a:tailEnd len="sm" w="sm" type="none"/>
+                    </a:lnL>
+                    <a:lnR cap="flat" cmpd="sng" w="9525">
+                      <a:solidFill>
+                        <a:srgbClr val="9E9E9E"/>
+                      </a:solidFill>
+                      <a:prstDash val="solid"/>
+                      <a:round/>
+                      <a:headEnd len="sm" w="sm" type="none"/>
+                      <a:tailEnd len="sm" w="sm" type="none"/>
+                    </a:lnR>
+                    <a:lnT cap="flat" cmpd="sng" w="9525">
+                      <a:solidFill>
+                        <a:srgbClr val="9E9E9E"/>
+                      </a:solidFill>
+                      <a:prstDash val="solid"/>
+                      <a:round/>
+                      <a:headEnd len="sm" w="sm" type="none"/>
+                      <a:tailEnd len="sm" w="sm" type="none"/>
+                    </a:lnT>
+                    <a:lnB cap="flat" cmpd="sng" w="9525">
+                      <a:solidFill>
+                        <a:srgbClr val="9E9E9E"/>
+                      </a:solidFill>
+                      <a:prstDash val="solid"/>
+                      <a:round/>
+                      <a:headEnd len="sm" w="sm" type="none"/>
+                      <a:tailEnd len="sm" w="sm" type="none"/>
+                    </a:lnB>
+                  </a:tcPr>
                 </a:tc>
                 <a:tc>
                   <a:txBody>
                     <a:bodyPr/>
                     <a:lstStyle/>
                     <a:p>
-                      <a:pPr indent="0" lvl="0" marL="0" rtl="0" algn="l">
+                      <a:pPr indent="0" lvl="0" marL="0" rtl="0" algn="ctr">
                         <a:spcBef>
                           <a:spcPts val="0"/>
                         </a:spcBef>
@@ -16062,15 +18232,15 @@
                         <a:buNone/>
                       </a:pPr>
                       <a:r>
-                        <a:rPr lang="en" sz="1700">
+                        <a:rPr lang="en" sz="1800">
                           <a:latin typeface="Ubuntu Light"/>
                           <a:ea typeface="Ubuntu Light"/>
                           <a:cs typeface="Ubuntu Light"/>
                           <a:sym typeface="Ubuntu Light"/>
                         </a:rPr>
-                        <a:t>0.94</a:t>
+                        <a:t>0.87</a:t>
                       </a:r>
-                      <a:endParaRPr sz="1700">
+                      <a:endParaRPr sz="1800">
                         <a:latin typeface="Ubuntu Light"/>
                         <a:ea typeface="Ubuntu Light"/>
                         <a:cs typeface="Ubuntu Light"/>
@@ -16078,133 +18248,44 @@
                       </a:endParaRPr>
                     </a:p>
                   </a:txBody>
-                  <a:tcPr marT="91425" marB="91425" marR="91425" marL="91425"/>
-                </a:tc>
-                <a:tc>
-                  <a:txBody>
-                    <a:bodyPr/>
-                    <a:lstStyle/>
-                    <a:p>
-                      <a:pPr indent="0" lvl="0" marL="0" rtl="0" algn="l">
-                        <a:spcBef>
-                          <a:spcPts val="0"/>
-                        </a:spcBef>
-                        <a:spcAft>
-                          <a:spcPts val="0"/>
-                        </a:spcAft>
-                        <a:buNone/>
-                      </a:pPr>
-                      <a:r>
-                        <a:rPr lang="en" sz="1700">
-                          <a:latin typeface="Ubuntu Light"/>
-                          <a:ea typeface="Ubuntu Light"/>
-                          <a:cs typeface="Ubuntu Light"/>
-                          <a:sym typeface="Ubuntu Light"/>
-                        </a:rPr>
-                        <a:t>0.94</a:t>
-                      </a:r>
-                      <a:endParaRPr sz="1700">
-                        <a:latin typeface="Ubuntu Light"/>
-                        <a:ea typeface="Ubuntu Light"/>
-                        <a:cs typeface="Ubuntu Light"/>
-                        <a:sym typeface="Ubuntu Light"/>
-                      </a:endParaRPr>
-                    </a:p>
-                  </a:txBody>
-                  <a:tcPr marT="91425" marB="91425" marR="91425" marL="91425"/>
-                </a:tc>
-                <a:tc>
-                  <a:txBody>
-                    <a:bodyPr/>
-                    <a:lstStyle/>
-                    <a:p>
-                      <a:pPr indent="0" lvl="0" marL="0" rtl="0" algn="l">
-                        <a:spcBef>
-                          <a:spcPts val="0"/>
-                        </a:spcBef>
-                        <a:spcAft>
-                          <a:spcPts val="0"/>
-                        </a:spcAft>
-                        <a:buNone/>
-                      </a:pPr>
-                      <a:r>
-                        <a:t/>
-                      </a:r>
-                      <a:endParaRPr sz="1700">
-                        <a:latin typeface="Ubuntu Light"/>
-                        <a:ea typeface="Ubuntu Light"/>
-                        <a:cs typeface="Ubuntu Light"/>
-                        <a:sym typeface="Ubuntu Light"/>
-                      </a:endParaRPr>
-                    </a:p>
-                  </a:txBody>
-                  <a:tcPr marT="91425" marB="91425" marR="91425" marL="91425"/>
-                </a:tc>
-                <a:tc>
-                  <a:txBody>
-                    <a:bodyPr/>
-                    <a:lstStyle/>
-                    <a:p>
-                      <a:pPr indent="0" lvl="0" marL="0" rtl="0" algn="l">
-                        <a:spcBef>
-                          <a:spcPts val="0"/>
-                        </a:spcBef>
-                        <a:spcAft>
-                          <a:spcPts val="0"/>
-                        </a:spcAft>
-                        <a:buNone/>
-                      </a:pPr>
-                      <a:r>
-                        <a:rPr lang="en" sz="1700">
-                          <a:latin typeface="Ubuntu Light"/>
-                          <a:ea typeface="Ubuntu Light"/>
-                          <a:cs typeface="Ubuntu Light"/>
-                          <a:sym typeface="Ubuntu Light"/>
-                        </a:rPr>
-                        <a:t>0.94</a:t>
-                      </a:r>
-                      <a:endParaRPr sz="1700">
-                        <a:latin typeface="Ubuntu Light"/>
-                        <a:ea typeface="Ubuntu Light"/>
-                        <a:cs typeface="Ubuntu Light"/>
-                        <a:sym typeface="Ubuntu Light"/>
-                      </a:endParaRPr>
-                    </a:p>
-                  </a:txBody>
-                  <a:tcPr marT="91425" marB="91425" marR="91425" marL="91425"/>
-                </a:tc>
-                <a:tc>
-                  <a:txBody>
-                    <a:bodyPr/>
-                    <a:lstStyle/>
-                    <a:p>
-                      <a:pPr indent="0" lvl="0" marL="0" rtl="0" algn="l">
-                        <a:spcBef>
-                          <a:spcPts val="0"/>
-                        </a:spcBef>
-                        <a:spcAft>
-                          <a:spcPts val="0"/>
-                        </a:spcAft>
-                        <a:buNone/>
-                      </a:pPr>
-                      <a:r>
-                        <a:rPr lang="en" sz="1700">
-                          <a:latin typeface="Ubuntu Light"/>
-                          <a:ea typeface="Ubuntu Light"/>
-                          <a:cs typeface="Ubuntu Light"/>
-                          <a:sym typeface="Ubuntu Light"/>
-                        </a:rPr>
-                        <a:t>0.87</a:t>
-                      </a:r>
-                      <a:endParaRPr sz="1700">
-                        <a:latin typeface="Ubuntu Light"/>
-                        <a:ea typeface="Ubuntu Light"/>
-                        <a:cs typeface="Ubuntu Light"/>
-                        <a:sym typeface="Ubuntu Light"/>
-                      </a:endParaRPr>
-                    </a:p>
-                  </a:txBody>
-                  <a:tcPr marT="91425" marB="91425" marR="91425" marL="91425"/>
+                  <a:tcPr marT="91425" marB="91425" marR="91425" marL="91425" anchor="ctr">
+                    <a:lnL cap="flat" cmpd="sng" w="9525">
+                      <a:solidFill>
+                        <a:srgbClr val="9E9E9E"/>
+                      </a:solidFill>
+                      <a:prstDash val="solid"/>
+                      <a:round/>
+                      <a:headEnd len="sm" w="sm" type="none"/>
+                      <a:tailEnd len="sm" w="sm" type="none"/>
+                    </a:lnL>
+                    <a:lnR cap="flat" cmpd="sng" w="9525">
+                      <a:solidFill>
+                        <a:srgbClr val="9E9E9E"/>
+                      </a:solidFill>
+                      <a:prstDash val="solid"/>
+                      <a:round/>
+                      <a:headEnd len="sm" w="sm" type="none"/>
+                      <a:tailEnd len="sm" w="sm" type="none"/>
+                    </a:lnR>
+                    <a:lnT cap="flat" cmpd="sng" w="9525">
+                      <a:solidFill>
+                        <a:srgbClr val="9E9E9E"/>
+                      </a:solidFill>
+                      <a:prstDash val="solid"/>
+                      <a:round/>
+                      <a:headEnd len="sm" w="sm" type="none"/>
+                      <a:tailEnd len="sm" w="sm" type="none"/>
+                    </a:lnT>
+                    <a:lnB cap="flat" cmpd="sng" w="9525">
+                      <a:solidFill>
+                        <a:srgbClr val="9E9E9E"/>
+                      </a:solidFill>
+                      <a:prstDash val="solid"/>
+                      <a:round/>
+                      <a:headEnd len="sm" w="sm" type="none"/>
+                      <a:tailEnd len="sm" w="sm" type="none"/>
+                    </a:lnB>
+                  </a:tcPr>
                 </a:tc>
               </a:tr>
             </a:tbl>
@@ -16219,12 +18300,12 @@
 </p:sld>
 </file>
 
-<file path=ppt/slides/slide21.xml><?xml version="1.0" encoding="utf-8"?>
+<file path=ppt/slides/slide24.xml><?xml version="1.0" encoding="utf-8"?>
 <p:sld xmlns:a="http://schemas.openxmlformats.org/drawingml/2006/main" xmlns:r="http://schemas.openxmlformats.org/officeDocument/2006/relationships" xmlns:mc="http://schemas.openxmlformats.org/markup-compatibility/2006" xmlns:mv="urn:schemas-microsoft-com:mac:vml" xmlns:p="http://schemas.openxmlformats.org/presentationml/2006/main" xmlns:c="http://schemas.openxmlformats.org/drawingml/2006/chart" xmlns:dgm="http://schemas.openxmlformats.org/drawingml/2006/diagram" xmlns:o="urn:schemas-microsoft-com:office:office" xmlns:v="urn:schemas-microsoft-com:vml" xmlns:pvml="urn:schemas-microsoft-com:office:powerpoint" xmlns:com="http://schemas.openxmlformats.org/drawingml/2006/compatibility" xmlns:p14="http://schemas.microsoft.com/office/powerpoint/2010/main" xmlns:p15="http://schemas.microsoft.com/office/powerpoint/2012/main" xmlns:ahyp="http://schemas.microsoft.com/office/drawing/2018/hyperlinkcolor">
   <p:cSld>
     <p:spTree>
       <p:nvGrpSpPr>
-        <p:cNvPr id="190" name="Shape 190"/>
+        <p:cNvPr id="211" name="Shape 211"/>
         <p:cNvGrpSpPr/>
         <p:nvPr/>
       </p:nvGrpSpPr>
@@ -16238,7 +18319,7 @@
       </p:grpSpPr>
       <p:sp>
         <p:nvSpPr>
-          <p:cNvPr id="191" name="Google Shape;191;gec2e1cceae_0_10"/>
+          <p:cNvPr id="212" name="Google Shape;212;gec2e1cceae_0_10"/>
           <p:cNvSpPr txBox="1"/>
           <p:nvPr>
             <p:ph type="title"/>
@@ -16277,7 +18358,7 @@
               <a:buNone/>
             </a:pPr>
             <a:r>
-              <a:rPr lang="en">
+              <a:rPr lang="en" sz="3750">
                 <a:latin typeface="Ubuntu"/>
                 <a:ea typeface="Ubuntu"/>
                 <a:cs typeface="Ubuntu"/>
@@ -16285,7 +18366,7 @@
               </a:rPr>
               <a:t>AGENDA</a:t>
             </a:r>
-            <a:endParaRPr>
+            <a:endParaRPr sz="3750">
               <a:latin typeface="Ubuntu"/>
               <a:ea typeface="Ubuntu"/>
               <a:cs typeface="Ubuntu"/>
@@ -16296,7 +18377,7 @@
       </p:sp>
       <p:sp>
         <p:nvSpPr>
-          <p:cNvPr id="192" name="Google Shape;192;gec2e1cceae_0_10"/>
+          <p:cNvPr id="213" name="Google Shape;213;gec2e1cceae_0_10"/>
           <p:cNvSpPr txBox="1"/>
           <p:nvPr>
             <p:ph idx="1" type="body"/>
@@ -16608,12 +18689,12 @@
 </p:sld>
 </file>
 
-<file path=ppt/slides/slide22.xml><?xml version="1.0" encoding="utf-8"?>
+<file path=ppt/slides/slide25.xml><?xml version="1.0" encoding="utf-8"?>
 <p:sld xmlns:a="http://schemas.openxmlformats.org/drawingml/2006/main" xmlns:r="http://schemas.openxmlformats.org/officeDocument/2006/relationships" xmlns:mc="http://schemas.openxmlformats.org/markup-compatibility/2006" xmlns:mv="urn:schemas-microsoft-com:mac:vml" xmlns:p="http://schemas.openxmlformats.org/presentationml/2006/main" xmlns:c="http://schemas.openxmlformats.org/drawingml/2006/chart" xmlns:dgm="http://schemas.openxmlformats.org/drawingml/2006/diagram" xmlns:o="urn:schemas-microsoft-com:office:office" xmlns:v="urn:schemas-microsoft-com:vml" xmlns:pvml="urn:schemas-microsoft-com:office:powerpoint" xmlns:com="http://schemas.openxmlformats.org/drawingml/2006/compatibility" xmlns:p14="http://schemas.microsoft.com/office/powerpoint/2010/main" xmlns:p15="http://schemas.microsoft.com/office/powerpoint/2012/main" xmlns:ahyp="http://schemas.microsoft.com/office/drawing/2018/hyperlinkcolor">
   <p:cSld>
     <p:spTree>
       <p:nvGrpSpPr>
-        <p:cNvPr id="196" name="Shape 196"/>
+        <p:cNvPr id="217" name="Shape 217"/>
         <p:cNvGrpSpPr/>
         <p:nvPr/>
       </p:nvGrpSpPr>
@@ -16627,7 +18708,7 @@
       </p:grpSpPr>
       <p:sp>
         <p:nvSpPr>
-          <p:cNvPr id="197" name="Google Shape;197;p16"/>
+          <p:cNvPr id="218" name="Google Shape;218;gec2e1cd1f0_0_7"/>
           <p:cNvSpPr txBox="1"/>
           <p:nvPr>
             <p:ph type="title"/>
@@ -16666,35 +18747,50 @@
               <a:buNone/>
             </a:pPr>
             <a:r>
+              <a:t/>
+            </a:r>
+            <a:endParaRPr>
+              <a:latin typeface="Ubuntu"/>
+              <a:ea typeface="Ubuntu"/>
+              <a:cs typeface="Ubuntu"/>
+              <a:sym typeface="Ubuntu"/>
+            </a:endParaRPr>
+          </a:p>
+          <a:p>
+            <a:pPr indent="0" lvl="0" marL="0" rtl="0" algn="l">
+              <a:lnSpc>
+                <a:spcPct val="100000"/>
+              </a:lnSpc>
+              <a:spcBef>
+                <a:spcPts val="0"/>
+              </a:spcBef>
+              <a:spcAft>
+                <a:spcPts val="0"/>
+              </a:spcAft>
+              <a:buSzPct val="100000"/>
+              <a:buNone/>
+            </a:pPr>
+            <a:r>
               <a:rPr lang="en">
                 <a:latin typeface="Ubuntu"/>
                 <a:ea typeface="Ubuntu"/>
                 <a:cs typeface="Ubuntu"/>
                 <a:sym typeface="Ubuntu"/>
               </a:rPr>
-              <a:t>Summary of </a:t>
-            </a:r>
-            <a:r>
-              <a:rPr lang="en">
-                <a:latin typeface="Consolas"/>
-                <a:ea typeface="Consolas"/>
-                <a:cs typeface="Consolas"/>
-                <a:sym typeface="Consolas"/>
-              </a:rPr>
-              <a:t>classification_report</a:t>
+              <a:t>Summary &amp; Final Report</a:t>
             </a:r>
             <a:endParaRPr>
-              <a:latin typeface="Consolas"/>
-              <a:ea typeface="Consolas"/>
-              <a:cs typeface="Consolas"/>
-              <a:sym typeface="Consolas"/>
+              <a:latin typeface="Ubuntu"/>
+              <a:ea typeface="Ubuntu"/>
+              <a:cs typeface="Ubuntu"/>
+              <a:sym typeface="Ubuntu"/>
             </a:endParaRPr>
           </a:p>
         </p:txBody>
       </p:sp>
       <p:sp>
         <p:nvSpPr>
-          <p:cNvPr id="198" name="Google Shape;198;p16"/>
+          <p:cNvPr id="219" name="Google Shape;219;gec2e1cd1f0_0_7"/>
           <p:cNvSpPr txBox="1"/>
           <p:nvPr>
             <p:ph idx="1" type="body"/>
@@ -16720,27 +18816,214 @@
           <a:lstStyle/>
           <a:p>
             <a:pPr indent="-342900" lvl="0" marL="457200" rtl="0" algn="l">
-              <a:lnSpc>
-                <a:spcPct val="115000"/>
-              </a:lnSpc>
-              <a:spcBef>
-                <a:spcPts val="1200"/>
+              <a:spcBef>
+                <a:spcPts val="0"/>
               </a:spcBef>
               <a:spcAft>
                 <a:spcPts val="0"/>
               </a:spcAft>
               <a:buSzPts val="1800"/>
-              <a:buFont typeface="Ubuntu"/>
+              <a:buFont typeface="Ubuntu Light"/>
               <a:buChar char="●"/>
             </a:pPr>
             <a:r>
-              <a:t/>
+              <a:rPr lang="en">
+                <a:latin typeface="Ubuntu Light"/>
+                <a:ea typeface="Ubuntu Light"/>
+                <a:cs typeface="Ubuntu Light"/>
+                <a:sym typeface="Ubuntu Light"/>
+              </a:rPr>
+              <a:t>The best estimator was </a:t>
+            </a:r>
+            <a:r>
+              <a:rPr lang="en">
+                <a:latin typeface="Consolas"/>
+                <a:ea typeface="Consolas"/>
+                <a:cs typeface="Consolas"/>
+                <a:sym typeface="Consolas"/>
+              </a:rPr>
+              <a:t>SVC</a:t>
+            </a:r>
+            <a:r>
+              <a:rPr lang="en">
+                <a:latin typeface="Ubuntu Light"/>
+                <a:ea typeface="Ubuntu Light"/>
+                <a:cs typeface="Ubuntu Light"/>
+                <a:sym typeface="Ubuntu Light"/>
+              </a:rPr>
+              <a:t> with an </a:t>
+            </a:r>
+            <a:r>
+              <a:rPr lang="en">
+                <a:latin typeface="Consolas"/>
+                <a:ea typeface="Consolas"/>
+                <a:cs typeface="Consolas"/>
+                <a:sym typeface="Consolas"/>
+              </a:rPr>
+              <a:t>accuracy</a:t>
+            </a:r>
+            <a:r>
+              <a:rPr lang="en">
+                <a:latin typeface="Ubuntu Light"/>
+                <a:ea typeface="Ubuntu Light"/>
+                <a:cs typeface="Ubuntu Light"/>
+                <a:sym typeface="Ubuntu Light"/>
+              </a:rPr>
+              <a:t> score of </a:t>
+            </a:r>
+            <a:r>
+              <a:rPr lang="en">
+                <a:latin typeface="Consolas"/>
+                <a:ea typeface="Consolas"/>
+                <a:cs typeface="Consolas"/>
+                <a:sym typeface="Consolas"/>
+              </a:rPr>
+              <a:t>0.89</a:t>
+            </a:r>
+            <a:r>
+              <a:rPr lang="en">
+                <a:latin typeface="Ubuntu Light"/>
+                <a:ea typeface="Ubuntu Light"/>
+                <a:cs typeface="Ubuntu Light"/>
+                <a:sym typeface="Ubuntu Light"/>
+              </a:rPr>
+              <a:t>.</a:t>
             </a:r>
             <a:endParaRPr>
-              <a:latin typeface="Ubuntu"/>
-              <a:ea typeface="Ubuntu"/>
-              <a:cs typeface="Ubuntu"/>
-              <a:sym typeface="Ubuntu"/>
+              <a:latin typeface="Ubuntu Light"/>
+              <a:ea typeface="Ubuntu Light"/>
+              <a:cs typeface="Ubuntu Light"/>
+              <a:sym typeface="Ubuntu Light"/>
+            </a:endParaRPr>
+          </a:p>
+          <a:p>
+            <a:pPr indent="-342900" lvl="0" marL="457200" rtl="0" algn="l">
+              <a:spcBef>
+                <a:spcPts val="0"/>
+              </a:spcBef>
+              <a:spcAft>
+                <a:spcPts val="0"/>
+              </a:spcAft>
+              <a:buSzPts val="1800"/>
+              <a:buFont typeface="Ubuntu Light"/>
+              <a:buChar char="●"/>
+            </a:pPr>
+            <a:r>
+              <a:rPr lang="en">
+                <a:latin typeface="Ubuntu Light"/>
+                <a:ea typeface="Ubuntu Light"/>
+                <a:cs typeface="Ubuntu Light"/>
+                <a:sym typeface="Ubuntu Light"/>
+              </a:rPr>
+              <a:t>The recall score was </a:t>
+            </a:r>
+            <a:r>
+              <a:rPr lang="en">
+                <a:latin typeface="Consolas"/>
+                <a:ea typeface="Consolas"/>
+                <a:cs typeface="Consolas"/>
+                <a:sym typeface="Consolas"/>
+              </a:rPr>
+              <a:t>0.97</a:t>
+            </a:r>
+            <a:r>
+              <a:rPr lang="en">
+                <a:latin typeface="Ubuntu Light"/>
+                <a:ea typeface="Ubuntu Light"/>
+                <a:cs typeface="Ubuntu Light"/>
+                <a:sym typeface="Ubuntu Light"/>
+              </a:rPr>
+              <a:t>.</a:t>
+            </a:r>
+            <a:endParaRPr>
+              <a:latin typeface="Ubuntu Light"/>
+              <a:ea typeface="Ubuntu Light"/>
+              <a:cs typeface="Ubuntu Light"/>
+              <a:sym typeface="Ubuntu Light"/>
+            </a:endParaRPr>
+          </a:p>
+          <a:p>
+            <a:pPr indent="-342900" lvl="0" marL="457200" rtl="0" algn="l">
+              <a:spcBef>
+                <a:spcPts val="0"/>
+              </a:spcBef>
+              <a:spcAft>
+                <a:spcPts val="0"/>
+              </a:spcAft>
+              <a:buSzPts val="1800"/>
+              <a:buFont typeface="Ubuntu Light"/>
+              <a:buChar char="●"/>
+            </a:pPr>
+            <a:r>
+              <a:rPr lang="en">
+                <a:latin typeface="Ubuntu Light"/>
+                <a:ea typeface="Ubuntu Light"/>
+                <a:cs typeface="Ubuntu Light"/>
+                <a:sym typeface="Ubuntu Light"/>
+              </a:rPr>
+              <a:t>Used MinMaxScaler(), OneHotEncoder(), and removed a feature to improve accuracy.</a:t>
+            </a:r>
+            <a:endParaRPr>
+              <a:latin typeface="Ubuntu Light"/>
+              <a:ea typeface="Ubuntu Light"/>
+              <a:cs typeface="Ubuntu Light"/>
+              <a:sym typeface="Ubuntu Light"/>
+            </a:endParaRPr>
+          </a:p>
+          <a:p>
+            <a:pPr indent="-342900" lvl="0" marL="457200" rtl="0" algn="l">
+              <a:spcBef>
+                <a:spcPts val="0"/>
+              </a:spcBef>
+              <a:spcAft>
+                <a:spcPts val="0"/>
+              </a:spcAft>
+              <a:buSzPts val="1800"/>
+              <a:buFont typeface="Ubuntu Light"/>
+              <a:buChar char="●"/>
+            </a:pPr>
+            <a:r>
+              <a:rPr lang="en">
+                <a:latin typeface="Ubuntu Light"/>
+                <a:ea typeface="Ubuntu Light"/>
+                <a:cs typeface="Ubuntu Light"/>
+                <a:sym typeface="Ubuntu Light"/>
+              </a:rPr>
+              <a:t>Dimensionality reduction did not improve accuracy.</a:t>
+            </a:r>
+            <a:endParaRPr>
+              <a:latin typeface="Ubuntu Light"/>
+              <a:ea typeface="Ubuntu Light"/>
+              <a:cs typeface="Ubuntu Light"/>
+              <a:sym typeface="Ubuntu Light"/>
+            </a:endParaRPr>
+          </a:p>
+          <a:p>
+            <a:pPr indent="-342900" lvl="0" marL="457200" rtl="0" algn="l">
+              <a:spcBef>
+                <a:spcPts val="0"/>
+              </a:spcBef>
+              <a:spcAft>
+                <a:spcPts val="0"/>
+              </a:spcAft>
+              <a:buSzPts val="1800"/>
+              <a:buFont typeface="Ubuntu Light"/>
+              <a:buChar char="●"/>
+            </a:pPr>
+            <a:r>
+              <a:rPr lang="en">
+                <a:latin typeface="Ubuntu Light"/>
+                <a:ea typeface="Ubuntu Light"/>
+                <a:cs typeface="Ubuntu Light"/>
+                <a:sym typeface="Ubuntu Light"/>
+              </a:rPr>
+              <a:t>Ensemble Learning did not improve accuracy.</a:t>
+            </a:r>
+            <a:endParaRPr>
+              <a:latin typeface="Ubuntu Light"/>
+              <a:ea typeface="Ubuntu Light"/>
+              <a:cs typeface="Ubuntu Light"/>
+              <a:sym typeface="Ubuntu Light"/>
             </a:endParaRPr>
           </a:p>
         </p:txBody>
@@ -16753,12 +19036,12 @@
 </p:sld>
 </file>
 
-<file path=ppt/slides/slide23.xml><?xml version="1.0" encoding="utf-8"?>
+<file path=ppt/slides/slide26.xml><?xml version="1.0" encoding="utf-8"?>
 <p:sld xmlns:a="http://schemas.openxmlformats.org/drawingml/2006/main" xmlns:r="http://schemas.openxmlformats.org/officeDocument/2006/relationships" xmlns:mc="http://schemas.openxmlformats.org/markup-compatibility/2006" xmlns:mv="urn:schemas-microsoft-com:mac:vml" xmlns:p="http://schemas.openxmlformats.org/presentationml/2006/main" xmlns:c="http://schemas.openxmlformats.org/drawingml/2006/chart" xmlns:dgm="http://schemas.openxmlformats.org/drawingml/2006/diagram" xmlns:o="urn:schemas-microsoft-com:office:office" xmlns:v="urn:schemas-microsoft-com:vml" xmlns:pvml="urn:schemas-microsoft-com:office:powerpoint" xmlns:com="http://schemas.openxmlformats.org/drawingml/2006/compatibility" xmlns:p14="http://schemas.microsoft.com/office/powerpoint/2010/main" xmlns:p15="http://schemas.microsoft.com/office/powerpoint/2012/main" xmlns:ahyp="http://schemas.microsoft.com/office/drawing/2018/hyperlinkcolor">
   <p:cSld>
     <p:spTree>
       <p:nvGrpSpPr>
-        <p:cNvPr id="202" name="Shape 202"/>
+        <p:cNvPr id="223" name="Shape 223"/>
         <p:cNvGrpSpPr/>
         <p:nvPr/>
       </p:nvGrpSpPr>
@@ -16772,7 +19055,7 @@
       </p:grpSpPr>
       <p:sp>
         <p:nvSpPr>
-          <p:cNvPr id="203" name="Google Shape;203;gec2e1cceae_0_20"/>
+          <p:cNvPr id="224" name="Google Shape;224;gec2e1cceae_0_20"/>
           <p:cNvSpPr txBox="1"/>
           <p:nvPr>
             <p:ph type="title"/>
@@ -16811,7 +19094,7 @@
               <a:buNone/>
             </a:pPr>
             <a:r>
-              <a:rPr lang="en">
+              <a:rPr lang="en" sz="3750">
                 <a:latin typeface="Ubuntu"/>
                 <a:ea typeface="Ubuntu"/>
                 <a:cs typeface="Ubuntu"/>
@@ -16819,7 +19102,7 @@
               </a:rPr>
               <a:t>AGENDA</a:t>
             </a:r>
-            <a:endParaRPr>
+            <a:endParaRPr sz="3750">
               <a:latin typeface="Ubuntu"/>
               <a:ea typeface="Ubuntu"/>
               <a:cs typeface="Ubuntu"/>
@@ -16830,7 +19113,7 @@
       </p:sp>
       <p:sp>
         <p:nvSpPr>
-          <p:cNvPr id="204" name="Google Shape;204;gec2e1cceae_0_20"/>
+          <p:cNvPr id="225" name="Google Shape;225;gec2e1cceae_0_20"/>
           <p:cNvSpPr txBox="1"/>
           <p:nvPr>
             <p:ph idx="1" type="body"/>
@@ -17151,12 +19434,12 @@
 </p:sld>
 </file>
 
-<file path=ppt/slides/slide24.xml><?xml version="1.0" encoding="utf-8"?>
+<file path=ppt/slides/slide27.xml><?xml version="1.0" encoding="utf-8"?>
 <p:sld xmlns:a="http://schemas.openxmlformats.org/drawingml/2006/main" xmlns:r="http://schemas.openxmlformats.org/officeDocument/2006/relationships" xmlns:mc="http://schemas.openxmlformats.org/markup-compatibility/2006" xmlns:mv="urn:schemas-microsoft-com:mac:vml" xmlns:p="http://schemas.openxmlformats.org/presentationml/2006/main" xmlns:c="http://schemas.openxmlformats.org/drawingml/2006/chart" xmlns:dgm="http://schemas.openxmlformats.org/drawingml/2006/diagram" xmlns:o="urn:schemas-microsoft-com:office:office" xmlns:v="urn:schemas-microsoft-com:vml" xmlns:pvml="urn:schemas-microsoft-com:office:powerpoint" xmlns:com="http://schemas.openxmlformats.org/drawingml/2006/compatibility" xmlns:p14="http://schemas.microsoft.com/office/powerpoint/2010/main" xmlns:p15="http://schemas.microsoft.com/office/powerpoint/2012/main" xmlns:ahyp="http://schemas.microsoft.com/office/drawing/2018/hyperlinkcolor">
   <p:cSld>
     <p:spTree>
       <p:nvGrpSpPr>
-        <p:cNvPr id="208" name="Shape 208"/>
+        <p:cNvPr id="229" name="Shape 229"/>
         <p:cNvGrpSpPr/>
         <p:nvPr/>
       </p:nvGrpSpPr>
@@ -17170,7 +19453,7 @@
       </p:grpSpPr>
       <p:sp>
         <p:nvSpPr>
-          <p:cNvPr id="209" name="Google Shape;209;p25"/>
+          <p:cNvPr id="230" name="Google Shape;230;p25"/>
           <p:cNvSpPr txBox="1"/>
           <p:nvPr>
             <p:ph type="title"/>
@@ -17209,7 +19492,7 @@
               <a:buNone/>
             </a:pPr>
             <a:r>
-              <a:rPr lang="en">
+              <a:rPr lang="en" sz="3750">
                 <a:latin typeface="Ubuntu"/>
                 <a:ea typeface="Ubuntu"/>
                 <a:cs typeface="Ubuntu"/>
@@ -17217,7 +19500,7 @@
               </a:rPr>
               <a:t>Known Limitations of Project</a:t>
             </a:r>
-            <a:endParaRPr>
+            <a:endParaRPr sz="3750">
               <a:latin typeface="Ubuntu"/>
               <a:ea typeface="Ubuntu"/>
               <a:cs typeface="Ubuntu"/>
@@ -17228,7 +19511,7 @@
       </p:sp>
       <p:sp>
         <p:nvSpPr>
-          <p:cNvPr id="210" name="Google Shape;210;p25"/>
+          <p:cNvPr id="231" name="Google Shape;231;p25"/>
           <p:cNvSpPr txBox="1"/>
           <p:nvPr>
             <p:ph idx="1" type="body"/>
@@ -17236,7 +19519,7 @@
         </p:nvSpPr>
         <p:spPr>
           <a:xfrm>
-            <a:off x="0" y="985800"/>
+            <a:off x="95425" y="1033400"/>
             <a:ext cx="5478000" cy="3171900"/>
           </a:xfrm>
           <a:prstGeom prst="rect">
@@ -17264,23 +19547,23 @@
                 <a:spcPts val="0"/>
               </a:spcAft>
               <a:buSzPts val="1800"/>
-              <a:buFont typeface="Ubuntu"/>
+              <a:buFont typeface="Ubuntu Light"/>
               <a:buChar char="●"/>
             </a:pPr>
             <a:r>
               <a:rPr lang="en">
-                <a:latin typeface="Ubuntu"/>
-                <a:ea typeface="Ubuntu"/>
-                <a:cs typeface="Ubuntu"/>
-                <a:sym typeface="Ubuntu"/>
+                <a:latin typeface="Ubuntu Light"/>
+                <a:ea typeface="Ubuntu Light"/>
+                <a:cs typeface="Ubuntu Light"/>
+                <a:sym typeface="Ubuntu Light"/>
               </a:rPr>
               <a:t>Does not consider ANNs</a:t>
             </a:r>
             <a:endParaRPr>
-              <a:latin typeface="Ubuntu"/>
-              <a:ea typeface="Ubuntu"/>
-              <a:cs typeface="Ubuntu"/>
-              <a:sym typeface="Ubuntu"/>
+              <a:latin typeface="Ubuntu Light"/>
+              <a:ea typeface="Ubuntu Light"/>
+              <a:cs typeface="Ubuntu Light"/>
+              <a:sym typeface="Ubuntu Light"/>
             </a:endParaRPr>
           </a:p>
           <a:p>
@@ -17295,23 +19578,23 @@
                 <a:spcPts val="0"/>
               </a:spcAft>
               <a:buSzPts val="1800"/>
-              <a:buFont typeface="Ubuntu"/>
+              <a:buFont typeface="Ubuntu Light"/>
               <a:buChar char="●"/>
             </a:pPr>
             <a:r>
               <a:rPr lang="en">
-                <a:latin typeface="Ubuntu"/>
-                <a:ea typeface="Ubuntu"/>
-                <a:cs typeface="Ubuntu"/>
-                <a:sym typeface="Ubuntu"/>
+                <a:latin typeface="Ubuntu Light"/>
+                <a:ea typeface="Ubuntu Light"/>
+                <a:cs typeface="Ubuntu Light"/>
+                <a:sym typeface="Ubuntu Light"/>
               </a:rPr>
               <a:t>Small dataset (only 300 instances)</a:t>
             </a:r>
             <a:endParaRPr>
-              <a:latin typeface="Ubuntu"/>
-              <a:ea typeface="Ubuntu"/>
-              <a:cs typeface="Ubuntu"/>
-              <a:sym typeface="Ubuntu"/>
+              <a:latin typeface="Ubuntu Light"/>
+              <a:ea typeface="Ubuntu Light"/>
+              <a:cs typeface="Ubuntu Light"/>
+              <a:sym typeface="Ubuntu Light"/>
             </a:endParaRPr>
           </a:p>
           <a:p>
@@ -17326,23 +19609,23 @@
                 <a:spcPts val="0"/>
               </a:spcAft>
               <a:buSzPts val="1800"/>
-              <a:buFont typeface="Ubuntu"/>
+              <a:buFont typeface="Ubuntu Light"/>
               <a:buChar char="●"/>
             </a:pPr>
             <a:r>
               <a:rPr lang="en">
-                <a:latin typeface="Ubuntu"/>
-                <a:ea typeface="Ubuntu"/>
-                <a:cs typeface="Ubuntu"/>
-                <a:sym typeface="Ubuntu"/>
+                <a:latin typeface="Ubuntu Light"/>
+                <a:ea typeface="Ubuntu Light"/>
+                <a:cs typeface="Ubuntu Light"/>
+                <a:sym typeface="Ubuntu Light"/>
               </a:rPr>
               <a:t>Did not fully investigate source and origin of MCI’s data</a:t>
             </a:r>
             <a:endParaRPr>
-              <a:latin typeface="Ubuntu"/>
-              <a:ea typeface="Ubuntu"/>
-              <a:cs typeface="Ubuntu"/>
-              <a:sym typeface="Ubuntu"/>
+              <a:latin typeface="Ubuntu Light"/>
+              <a:ea typeface="Ubuntu Light"/>
+              <a:cs typeface="Ubuntu Light"/>
+              <a:sym typeface="Ubuntu Light"/>
             </a:endParaRPr>
           </a:p>
         </p:txBody>
@@ -17355,12 +19638,12 @@
 </p:sld>
 </file>
 
-<file path=ppt/slides/slide25.xml><?xml version="1.0" encoding="utf-8"?>
+<file path=ppt/slides/slide28.xml><?xml version="1.0" encoding="utf-8"?>
 <p:sld xmlns:a="http://schemas.openxmlformats.org/drawingml/2006/main" xmlns:r="http://schemas.openxmlformats.org/officeDocument/2006/relationships" xmlns:mc="http://schemas.openxmlformats.org/markup-compatibility/2006" xmlns:mv="urn:schemas-microsoft-com:mac:vml" xmlns:p="http://schemas.openxmlformats.org/presentationml/2006/main" xmlns:c="http://schemas.openxmlformats.org/drawingml/2006/chart" xmlns:dgm="http://schemas.openxmlformats.org/drawingml/2006/diagram" xmlns:o="urn:schemas-microsoft-com:office:office" xmlns:v="urn:schemas-microsoft-com:vml" xmlns:pvml="urn:schemas-microsoft-com:office:powerpoint" xmlns:com="http://schemas.openxmlformats.org/drawingml/2006/compatibility" xmlns:p14="http://schemas.microsoft.com/office/powerpoint/2010/main" xmlns:p15="http://schemas.microsoft.com/office/powerpoint/2012/main" xmlns:ahyp="http://schemas.microsoft.com/office/drawing/2018/hyperlinkcolor">
   <p:cSld>
     <p:spTree>
       <p:nvGrpSpPr>
-        <p:cNvPr id="214" name="Shape 214"/>
+        <p:cNvPr id="235" name="Shape 235"/>
         <p:cNvGrpSpPr/>
         <p:nvPr/>
       </p:nvGrpSpPr>
@@ -17374,7 +19657,7 @@
       </p:grpSpPr>
       <p:sp>
         <p:nvSpPr>
-          <p:cNvPr id="215" name="Google Shape;215;gec2e1cceae_0_25"/>
+          <p:cNvPr id="236" name="Google Shape;236;gec2e1cceae_0_25"/>
           <p:cNvSpPr txBox="1"/>
           <p:nvPr>
             <p:ph type="title"/>
@@ -17413,7 +19696,7 @@
               <a:buNone/>
             </a:pPr>
             <a:r>
-              <a:rPr lang="en">
+              <a:rPr lang="en" sz="3750">
                 <a:latin typeface="Ubuntu"/>
                 <a:ea typeface="Ubuntu"/>
                 <a:cs typeface="Ubuntu"/>
@@ -17421,7 +19704,7 @@
               </a:rPr>
               <a:t>AGENDA</a:t>
             </a:r>
-            <a:endParaRPr>
+            <a:endParaRPr sz="3750">
               <a:latin typeface="Ubuntu"/>
               <a:ea typeface="Ubuntu"/>
               <a:cs typeface="Ubuntu"/>
@@ -17432,7 +19715,7 @@
       </p:sp>
       <p:sp>
         <p:nvSpPr>
-          <p:cNvPr id="216" name="Google Shape;216;gec2e1cceae_0_25"/>
+          <p:cNvPr id="237" name="Google Shape;237;gec2e1cceae_0_25"/>
           <p:cNvSpPr txBox="1"/>
           <p:nvPr>
             <p:ph idx="1" type="body"/>
@@ -17753,12 +20036,12 @@
 </p:sld>
 </file>
 
-<file path=ppt/slides/slide26.xml><?xml version="1.0" encoding="utf-8"?>
+<file path=ppt/slides/slide29.xml><?xml version="1.0" encoding="utf-8"?>
 <p:sld xmlns:a="http://schemas.openxmlformats.org/drawingml/2006/main" xmlns:r="http://schemas.openxmlformats.org/officeDocument/2006/relationships" xmlns:mc="http://schemas.openxmlformats.org/markup-compatibility/2006" xmlns:mv="urn:schemas-microsoft-com:mac:vml" xmlns:p="http://schemas.openxmlformats.org/presentationml/2006/main" xmlns:c="http://schemas.openxmlformats.org/drawingml/2006/chart" xmlns:dgm="http://schemas.openxmlformats.org/drawingml/2006/diagram" xmlns:o="urn:schemas-microsoft-com:office:office" xmlns:v="urn:schemas-microsoft-com:vml" xmlns:pvml="urn:schemas-microsoft-com:office:powerpoint" xmlns:com="http://schemas.openxmlformats.org/drawingml/2006/compatibility" xmlns:p14="http://schemas.microsoft.com/office/powerpoint/2010/main" xmlns:p15="http://schemas.microsoft.com/office/powerpoint/2012/main" xmlns:ahyp="http://schemas.microsoft.com/office/drawing/2018/hyperlinkcolor">
   <p:cSld>
     <p:spTree>
       <p:nvGrpSpPr>
-        <p:cNvPr id="220" name="Shape 220"/>
+        <p:cNvPr id="241" name="Shape 241"/>
         <p:cNvGrpSpPr/>
         <p:nvPr/>
       </p:nvGrpSpPr>
@@ -17772,7 +20055,7 @@
       </p:grpSpPr>
       <p:sp>
         <p:nvSpPr>
-          <p:cNvPr id="221" name="Google Shape;221;p40"/>
+          <p:cNvPr id="242" name="Google Shape;242;p40"/>
           <p:cNvSpPr txBox="1"/>
           <p:nvPr>
             <p:ph type="title"/>
@@ -17830,7 +20113,7 @@
       </p:sp>
       <p:sp>
         <p:nvSpPr>
-          <p:cNvPr id="222" name="Google Shape;222;p40"/>
+          <p:cNvPr id="243" name="Google Shape;243;p40"/>
           <p:cNvSpPr txBox="1"/>
           <p:nvPr>
             <p:ph idx="1" type="body"/>
@@ -17839,7 +20122,7 @@
         <p:spPr>
           <a:xfrm>
             <a:off x="311700" y="1225225"/>
-            <a:ext cx="8520600" cy="1062000"/>
+            <a:ext cx="8520600" cy="2678400"/>
           </a:xfrm>
           <a:prstGeom prst="rect">
             <a:avLst/>
@@ -17951,6 +20234,50 @@
                 <a:hlinkClick r:id="rId5"/>
               </a:rPr>
               <a:t>https://github.com/zachcarlson/HeartAttackPredictor/blob/main/HeartAttackPredictor.ipynb</a:t>
+            </a:r>
+            <a:endParaRPr sz="1500">
+              <a:latin typeface="Ubuntu Light"/>
+              <a:ea typeface="Ubuntu Light"/>
+              <a:cs typeface="Ubuntu Light"/>
+              <a:sym typeface="Ubuntu Light"/>
+            </a:endParaRPr>
+          </a:p>
+          <a:p>
+            <a:pPr indent="-323850" lvl="0" marL="457200" rtl="0" algn="l">
+              <a:lnSpc>
+                <a:spcPct val="115000"/>
+              </a:lnSpc>
+              <a:spcBef>
+                <a:spcPts val="0"/>
+              </a:spcBef>
+              <a:spcAft>
+                <a:spcPts val="0"/>
+              </a:spcAft>
+              <a:buSzPts val="1500"/>
+              <a:buFont typeface="Ubuntu Light"/>
+              <a:buAutoNum type="arabicPeriod"/>
+            </a:pPr>
+            <a:r>
+              <a:rPr lang="en" sz="1500">
+                <a:latin typeface="Ubuntu Light"/>
+                <a:ea typeface="Ubuntu Light"/>
+                <a:cs typeface="Ubuntu Light"/>
+                <a:sym typeface="Ubuntu Light"/>
+              </a:rPr>
+              <a:t>(Background Image) </a:t>
+            </a:r>
+            <a:r>
+              <a:rPr lang="en" sz="1500" u="sng">
+                <a:solidFill>
+                  <a:schemeClr val="hlink"/>
+                </a:solidFill>
+                <a:latin typeface="Ubuntu Light"/>
+                <a:ea typeface="Ubuntu Light"/>
+                <a:cs typeface="Ubuntu Light"/>
+                <a:sym typeface="Ubuntu Light"/>
+                <a:hlinkClick r:id="rId6"/>
+              </a:rPr>
+              <a:t>https://www.wbur.org/news/2020/06/15/see-doctor-use-telemedicine-coronavirus</a:t>
             </a:r>
             <a:endParaRPr sz="1500">
               <a:latin typeface="Ubuntu Light"/>
@@ -18027,7 +20354,7 @@
               <a:buNone/>
             </a:pPr>
             <a:r>
-              <a:rPr lang="en">
+              <a:rPr lang="en" sz="3750">
                 <a:latin typeface="Ubuntu"/>
                 <a:ea typeface="Ubuntu"/>
                 <a:cs typeface="Ubuntu"/>
@@ -18035,7 +20362,7 @@
               </a:rPr>
               <a:t>AGENDA</a:t>
             </a:r>
-            <a:endParaRPr>
+            <a:endParaRPr sz="3750">
               <a:latin typeface="Ubuntu"/>
               <a:ea typeface="Ubuntu"/>
               <a:cs typeface="Ubuntu"/>
@@ -18719,7 +21046,7 @@
               <a:buNone/>
             </a:pPr>
             <a:r>
-              <a:rPr lang="en">
+              <a:rPr lang="en" sz="3750">
                 <a:latin typeface="Ubuntu"/>
                 <a:ea typeface="Ubuntu"/>
                 <a:cs typeface="Ubuntu"/>
@@ -18727,7 +21054,7 @@
               </a:rPr>
               <a:t>AGENDA</a:t>
             </a:r>
-            <a:endParaRPr>
+            <a:endParaRPr sz="3750">
               <a:latin typeface="Ubuntu"/>
               <a:ea typeface="Ubuntu"/>
               <a:cs typeface="Ubuntu"/>
@@ -20057,7 +22384,7 @@
               <a:buNone/>
             </a:pPr>
             <a:r>
-              <a:rPr lang="en">
+              <a:rPr lang="en" sz="3750">
                 <a:latin typeface="Ubuntu"/>
                 <a:ea typeface="Ubuntu"/>
                 <a:cs typeface="Ubuntu"/>
@@ -20065,7 +22392,7 @@
               </a:rPr>
               <a:t>AGENDA</a:t>
             </a:r>
-            <a:endParaRPr>
+            <a:endParaRPr sz="3750">
               <a:latin typeface="Ubuntu"/>
               <a:ea typeface="Ubuntu"/>
               <a:cs typeface="Ubuntu"/>

</xml_diff>